<commit_message>
added link to wiki for confusion matrix and related stuff
</commit_message>
<xml_diff>
--- a/slides/ML_Lecture.pptx
+++ b/slides/ML_Lecture.pptx
@@ -37524,7 +37524,7 @@
         <p:spPr>
           <a:xfrm>
             <a:off x="5977178" y="2088492"/>
-            <a:ext cx="1345280" cy="738664"/>
+            <a:ext cx="1345280" cy="1169551"/>
           </a:xfrm>
           <a:prstGeom prst="rect">
             <a:avLst/>
@@ -37554,44 +37554,109 @@
               <a:buNone/>
             </a:pPr>
             <a:r>
-              <a:rPr lang="de-CH" dirty="0">
+              <a:rPr lang="de-CH">
                 <a:solidFill>
                   <a:schemeClr val="accent4">
                     <a:lumMod val="75000"/>
                   </a:schemeClr>
                 </a:solidFill>
               </a:rPr>
-              <a:t>Loss versus </a:t>
-            </a:r>
-            <a:r>
-              <a:rPr lang="de-CH" dirty="0" err="1">
+              <a:t>- Loss </a:t>
+            </a:r>
+            <a:r>
+              <a:rPr lang="de-CH" dirty="0">
                 <a:solidFill>
                   <a:schemeClr val="accent4">
                     <a:lumMod val="75000"/>
                   </a:schemeClr>
                 </a:solidFill>
               </a:rPr>
-              <a:t>performance</a:t>
-            </a:r>
-            <a:r>
-              <a:rPr lang="de-CH" dirty="0">
+              <a:t>versus </a:t>
+            </a:r>
+            <a:r>
+              <a:rPr lang="de-CH" dirty="0" err="1">
                 <a:solidFill>
                   <a:schemeClr val="accent4">
                     <a:lumMod val="75000"/>
                   </a:schemeClr>
                 </a:solidFill>
               </a:rPr>
-              <a:t> </a:t>
-            </a:r>
-            <a:r>
-              <a:rPr lang="de-CH" dirty="0" err="1">
+              <a:t>performance</a:t>
+            </a:r>
+            <a:r>
+              <a:rPr lang="de-CH" dirty="0">
                 <a:solidFill>
                   <a:schemeClr val="accent4">
                     <a:lumMod val="75000"/>
                   </a:schemeClr>
                 </a:solidFill>
               </a:rPr>
+              <a:t> </a:t>
+            </a:r>
+            <a:r>
+              <a:rPr lang="de-CH" dirty="0" err="1">
+                <a:solidFill>
+                  <a:schemeClr val="accent4">
+                    <a:lumMod val="75000"/>
+                  </a:schemeClr>
+                </a:solidFill>
+              </a:rPr>
               <a:t>metric</a:t>
+            </a:r>
+            <a:r>
+              <a:rPr lang="de-CH" dirty="0">
+                <a:solidFill>
+                  <a:schemeClr val="accent4">
+                    <a:lumMod val="75000"/>
+                  </a:schemeClr>
+                </a:solidFill>
+              </a:rPr>
+              <a:t>?</a:t>
+            </a:r>
+          </a:p>
+          <a:p>
+            <a:pPr marL="101600" indent="0">
+              <a:buNone/>
+            </a:pPr>
+            <a:r>
+              <a:rPr lang="de-CH" dirty="0">
+                <a:solidFill>
+                  <a:schemeClr val="accent4">
+                    <a:lumMod val="75000"/>
+                  </a:schemeClr>
+                </a:solidFill>
+              </a:rPr>
+              <a:t>- </a:t>
+            </a:r>
+            <a:r>
+              <a:rPr lang="de-CH" dirty="0" err="1">
+                <a:solidFill>
+                  <a:schemeClr val="accent4">
+                    <a:lumMod val="75000"/>
+                  </a:schemeClr>
+                </a:solidFill>
+              </a:rPr>
+              <a:t>Confusion</a:t>
+            </a:r>
+            <a:r>
+              <a:rPr lang="de-CH" dirty="0">
+                <a:solidFill>
+                  <a:schemeClr val="accent4">
+                    <a:lumMod val="75000"/>
+                  </a:schemeClr>
+                </a:solidFill>
+              </a:rPr>
+              <a:t> </a:t>
+            </a:r>
+            <a:r>
+              <a:rPr lang="de-CH" dirty="0" err="1">
+                <a:solidFill>
+                  <a:schemeClr val="accent4">
+                    <a:lumMod val="75000"/>
+                  </a:schemeClr>
+                </a:solidFill>
+              </a:rPr>
+              <a:t>matrix</a:t>
             </a:r>
             <a:r>
               <a:rPr lang="de-CH" dirty="0">

</xml_diff>

<commit_message>
review of Chapter 1 and solving problem with font in ppt
</commit_message>
<xml_diff>
--- a/slides/ML_Lecture.pptx
+++ b/slides/ML_Lecture.pptx
@@ -84,13 +84,6 @@
       <p:font typeface="Oswald" panose="020B0604020202020204" charset="0"/>
       <p:regular r:id="rId68"/>
       <p:bold r:id="rId69"/>
-    </p:embeddedFont>
-    <p:embeddedFont>
-      <p:font typeface="Roboto Condensed" pitchFamily="2" charset="0"/>
-      <p:regular r:id="rId70"/>
-      <p:bold r:id="rId71"/>
-      <p:italic r:id="rId72"/>
-      <p:boldItalic r:id="rId73"/>
     </p:embeddedFont>
   </p:embeddedFontLst>
   <p:defaultTextStyle>
@@ -12464,8 +12457,8 @@
           </a:p>
         </p:txBody>
       </p:sp>
-      <mc:AlternateContent xmlns:mc="http://schemas.openxmlformats.org/markup-compatibility/2006" xmlns:a14="http://schemas.microsoft.com/office/drawing/2010/main">
-        <mc:Choice Requires="a14">
+      <mc:AlternateContent xmlns:mc="http://schemas.openxmlformats.org/markup-compatibility/2006">
+        <mc:Choice xmlns:a14="http://schemas.microsoft.com/office/drawing/2010/main" Requires="a14">
           <p:sp>
             <p:nvSpPr>
               <p:cNvPr id="203" name="Google Shape;203;p17"/>
@@ -12771,7 +12764,7 @@
                 </a:r>
                 <a:r>
                   <a:rPr lang="de-CH" dirty="0" err="1"/>
-                  <a:t>coefficient</a:t>
+                  <a:t>coefficients</a:t>
                 </a:r>
                 <a:r>
                   <a:rPr lang="de-CH" dirty="0"/>
@@ -13157,7 +13150,7 @@
             </p:txBody>
           </p:sp>
         </mc:Choice>
-        <mc:Fallback xmlns="">
+        <mc:Fallback>
           <p:sp>
             <p:nvSpPr>
               <p:cNvPr id="203" name="Google Shape;203;p17"/>
@@ -13179,7 +13172,7 @@
               <a:blipFill>
                 <a:blip r:embed="rId3"/>
                 <a:stretch>
-                  <a:fillRect b="-2559"/>
+                  <a:fillRect b="-2772"/>
                 </a:stretch>
               </a:blipFill>
             </p:spPr>
@@ -13320,6 +13313,227 @@
           </a:p>
         </p:txBody>
       </p:sp>
+      <mc:AlternateContent xmlns:mc="http://schemas.openxmlformats.org/markup-compatibility/2006">
+        <mc:Choice xmlns:a14="http://schemas.microsoft.com/office/drawing/2010/main" Requires="a14">
+          <p:sp>
+            <p:nvSpPr>
+              <p:cNvPr id="4" name="Textfeld 3">
+                <a:extLst>
+                  <a:ext uri="{FF2B5EF4-FFF2-40B4-BE49-F238E27FC236}">
+                    <a16:creationId xmlns:a16="http://schemas.microsoft.com/office/drawing/2014/main" id="{31A97A64-972F-4DED-99A9-342111033E77}"/>
+                  </a:ext>
+                </a:extLst>
+              </p:cNvPr>
+              <p:cNvSpPr txBox="1"/>
+              <p:nvPr/>
+            </p:nvSpPr>
+            <p:spPr>
+              <a:xfrm>
+                <a:off x="5039233" y="3279164"/>
+                <a:ext cx="2162964" cy="319896"/>
+              </a:xfrm>
+              <a:prstGeom prst="rect">
+                <a:avLst/>
+              </a:prstGeom>
+            </p:spPr>
+            <p:style>
+              <a:lnRef idx="2">
+                <a:schemeClr val="accent4"/>
+              </a:lnRef>
+              <a:fillRef idx="1">
+                <a:schemeClr val="lt1"/>
+              </a:fillRef>
+              <a:effectRef idx="0">
+                <a:schemeClr val="accent4"/>
+              </a:effectRef>
+              <a:fontRef idx="minor">
+                <a:schemeClr val="dk1"/>
+              </a:fontRef>
+            </p:style>
+            <p:txBody>
+              <a:bodyPr wrap="none" rtlCol="0">
+                <a:spAutoFit/>
+              </a:bodyPr>
+              <a:lstStyle/>
+              <a:p>
+                <a14:m>
+                  <m:oMath xmlns:m="http://schemas.openxmlformats.org/officeDocument/2006/math">
+                    <m:acc>
+                      <m:accPr>
+                        <m:chr m:val="̂"/>
+                        <m:ctrlPr>
+                          <a:rPr lang="de-CH" b="0" i="1" dirty="0" smtClean="0">
+                            <a:solidFill>
+                              <a:schemeClr val="accent4">
+                                <a:lumMod val="75000"/>
+                              </a:schemeClr>
+                            </a:solidFill>
+                            <a:latin typeface="Cambria Math" panose="02040503050406030204" pitchFamily="18" charset="0"/>
+                          </a:rPr>
+                        </m:ctrlPr>
+                      </m:accPr>
+                      <m:e>
+                        <m:r>
+                          <a:rPr lang="de-CH" b="0" i="1" dirty="0" smtClean="0">
+                            <a:solidFill>
+                              <a:schemeClr val="accent4">
+                                <a:lumMod val="75000"/>
+                              </a:schemeClr>
+                            </a:solidFill>
+                            <a:latin typeface="Cambria Math" panose="02040503050406030204" pitchFamily="18" charset="0"/>
+                          </a:rPr>
+                          <m:t>𝑦</m:t>
+                        </m:r>
+                      </m:e>
+                    </m:acc>
+                    <m:r>
+                      <a:rPr lang="de-CH" b="0" i="1" dirty="0" smtClean="0">
+                        <a:solidFill>
+                          <a:schemeClr val="accent4">
+                            <a:lumMod val="75000"/>
+                          </a:schemeClr>
+                        </a:solidFill>
+                        <a:latin typeface="Cambria Math" panose="02040503050406030204" pitchFamily="18" charset="0"/>
+                      </a:rPr>
+                      <m:t>=</m:t>
+                    </m:r>
+                    <m:acc>
+                      <m:accPr>
+                        <m:chr m:val="̂"/>
+                        <m:ctrlPr>
+                          <a:rPr lang="de-CH" b="0" i="1" dirty="0" smtClean="0">
+                            <a:solidFill>
+                              <a:schemeClr val="accent4">
+                                <a:lumMod val="75000"/>
+                              </a:schemeClr>
+                            </a:solidFill>
+                            <a:latin typeface="Cambria Math" panose="02040503050406030204" pitchFamily="18" charset="0"/>
+                          </a:rPr>
+                        </m:ctrlPr>
+                      </m:accPr>
+                      <m:e>
+                        <m:r>
+                          <a:rPr lang="de-CH" b="0" i="1" dirty="0" smtClean="0">
+                            <a:solidFill>
+                              <a:schemeClr val="accent4">
+                                <a:lumMod val="75000"/>
+                              </a:schemeClr>
+                            </a:solidFill>
+                            <a:latin typeface="Cambria Math" panose="02040503050406030204" pitchFamily="18" charset="0"/>
+                          </a:rPr>
+                          <m:t>𝑓</m:t>
+                        </m:r>
+                      </m:e>
+                    </m:acc>
+                    <m:r>
+                      <a:rPr lang="de-CH" b="0" i="1" dirty="0" smtClean="0">
+                        <a:solidFill>
+                          <a:schemeClr val="accent4">
+                            <a:lumMod val="75000"/>
+                          </a:schemeClr>
+                        </a:solidFill>
+                        <a:latin typeface="Cambria Math" panose="02040503050406030204" pitchFamily="18" charset="0"/>
+                      </a:rPr>
+                      <m:t>(…)</m:t>
+                    </m:r>
+                  </m:oMath>
+                </a14:m>
+                <a:r>
+                  <a:rPr lang="de-CH" dirty="0">
+                    <a:solidFill>
+                      <a:schemeClr val="accent4">
+                        <a:lumMod val="75000"/>
+                      </a:schemeClr>
+                    </a:solidFill>
+                  </a:rPr>
+                  <a:t> </a:t>
+                </a:r>
+                <a:r>
+                  <a:rPr lang="de-CH" dirty="0" err="1">
+                    <a:solidFill>
+                      <a:schemeClr val="accent4">
+                        <a:lumMod val="75000"/>
+                      </a:schemeClr>
+                    </a:solidFill>
+                  </a:rPr>
+                  <a:t>are</a:t>
+                </a:r>
+                <a:r>
+                  <a:rPr lang="de-CH" dirty="0">
+                    <a:solidFill>
+                      <a:schemeClr val="accent4">
+                        <a:lumMod val="75000"/>
+                      </a:schemeClr>
+                    </a:solidFill>
+                  </a:rPr>
+                  <a:t> </a:t>
+                </a:r>
+                <a:r>
+                  <a:rPr lang="de-CH" dirty="0" err="1">
+                    <a:solidFill>
+                      <a:schemeClr val="accent4">
+                        <a:lumMod val="75000"/>
+                      </a:schemeClr>
+                    </a:solidFill>
+                  </a:rPr>
+                  <a:t>predictions</a:t>
+                </a:r>
+                <a:endParaRPr lang="de-CH" dirty="0">
+                  <a:solidFill>
+                    <a:schemeClr val="accent4">
+                      <a:lumMod val="75000"/>
+                    </a:schemeClr>
+                  </a:solidFill>
+                </a:endParaRPr>
+              </a:p>
+            </p:txBody>
+          </p:sp>
+        </mc:Choice>
+        <mc:Fallback>
+          <p:sp>
+            <p:nvSpPr>
+              <p:cNvPr id="4" name="Textfeld 3">
+                <a:extLst>
+                  <a:ext uri="{FF2B5EF4-FFF2-40B4-BE49-F238E27FC236}">
+                    <a16:creationId xmlns:a16="http://schemas.microsoft.com/office/drawing/2014/main" id="{31A97A64-972F-4DED-99A9-342111033E77}"/>
+                  </a:ext>
+                </a:extLst>
+              </p:cNvPr>
+              <p:cNvSpPr txBox="1">
+                <a:spLocks noRot="1" noChangeAspect="1" noMove="1" noResize="1" noEditPoints="1" noAdjustHandles="1" noChangeArrowheads="1" noChangeShapeType="1" noTextEdit="1"/>
+              </p:cNvSpPr>
+              <p:nvPr/>
+            </p:nvSpPr>
+            <p:spPr>
+              <a:xfrm>
+                <a:off x="5039233" y="3279164"/>
+                <a:ext cx="2162964" cy="319896"/>
+              </a:xfrm>
+              <a:prstGeom prst="rect">
+                <a:avLst/>
+              </a:prstGeom>
+              <a:blipFill>
+                <a:blip r:embed="rId4"/>
+                <a:stretch>
+                  <a:fillRect b="-14286"/>
+                </a:stretch>
+              </a:blipFill>
+            </p:spPr>
+            <p:txBody>
+              <a:bodyPr/>
+              <a:lstStyle/>
+              <a:p>
+                <a:r>
+                  <a:rPr lang="de-CH">
+                    <a:noFill/>
+                  </a:rPr>
+                  <a:t> </a:t>
+                </a:r>
+              </a:p>
+            </p:txBody>
+          </p:sp>
+        </mc:Fallback>
+      </mc:AlternateContent>
     </p:spTree>
     <p:extLst>
       <p:ext uri="{BB962C8B-B14F-4D97-AF65-F5344CB8AC3E}">
@@ -13383,8 +13597,8 @@
           </a:p>
         </p:txBody>
       </p:sp>
-      <mc:AlternateContent xmlns:mc="http://schemas.openxmlformats.org/markup-compatibility/2006" xmlns:a14="http://schemas.microsoft.com/office/drawing/2010/main">
-        <mc:Choice Requires="a14">
+      <mc:AlternateContent xmlns:mc="http://schemas.openxmlformats.org/markup-compatibility/2006">
+        <mc:Choice xmlns:a14="http://schemas.microsoft.com/office/drawing/2010/main" Requires="a14">
           <p:sp>
             <p:nvSpPr>
               <p:cNvPr id="203" name="Google Shape;203;p17"/>
@@ -13504,7 +13718,7 @@
                       <m:rPr>
                         <m:nor/>
                       </m:rPr>
-                      <a:rPr lang="de-CH" sz="1600" dirty="0" smtClean="0">
+                      <a:rPr lang="de-CH" sz="1400" dirty="0" smtClean="0">
                         <a:solidFill>
                           <a:schemeClr val="accent4">
                             <a:lumMod val="75000"/>
@@ -13514,7 +13728,7 @@
                       <m:t>MSE</m:t>
                     </m:r>
                     <m:r>
-                      <a:rPr lang="de-CH" sz="1600" b="0" i="1" dirty="0" smtClean="0">
+                      <a:rPr lang="de-CH" sz="1400" b="0" i="1" dirty="0" smtClean="0">
                         <a:latin typeface="Cambria Math" panose="02040503050406030204" pitchFamily="18" charset="0"/>
                       </a:rPr>
                       <m:t>=</m:t>
@@ -13522,14 +13736,14 @@
                     <m:f>
                       <m:fPr>
                         <m:ctrlPr>
-                          <a:rPr lang="de-CH" sz="1600" b="0" i="1" dirty="0" smtClean="0">
+                          <a:rPr lang="de-CH" sz="1400" b="0" i="1" dirty="0" smtClean="0">
                             <a:latin typeface="Cambria Math" panose="02040503050406030204" pitchFamily="18" charset="0"/>
                           </a:rPr>
                         </m:ctrlPr>
                       </m:fPr>
                       <m:num>
                         <m:r>
-                          <a:rPr lang="de-CH" sz="1600" b="0" i="1" dirty="0" smtClean="0">
+                          <a:rPr lang="de-CH" sz="1400" b="0" i="1" dirty="0" smtClean="0">
                             <a:latin typeface="Cambria Math" panose="02040503050406030204" pitchFamily="18" charset="0"/>
                           </a:rPr>
                           <m:t>1</m:t>
@@ -13537,7 +13751,7 @@
                       </m:num>
                       <m:den>
                         <m:r>
-                          <a:rPr lang="de-CH" sz="1600" b="0" i="1" dirty="0" smtClean="0">
+                          <a:rPr lang="de-CH" sz="1400" b="0" i="1" dirty="0" smtClean="0">
                             <a:latin typeface="Cambria Math" panose="02040503050406030204" pitchFamily="18" charset="0"/>
                           </a:rPr>
                           <m:t>𝑛</m:t>
@@ -13548,7 +13762,7 @@
                       <m:naryPr>
                         <m:chr m:val="∑"/>
                         <m:ctrlPr>
-                          <a:rPr lang="pt-BR" sz="1600" i="1" dirty="0" smtClean="0">
+                          <a:rPr lang="pt-BR" sz="1400" i="1" dirty="0" smtClean="0">
                             <a:latin typeface="Cambria Math" panose="02040503050406030204" pitchFamily="18" charset="0"/>
                           </a:rPr>
                         </m:ctrlPr>
@@ -13558,19 +13772,19 @@
                           <m:rPr>
                             <m:brk m:alnAt="23"/>
                           </m:rPr>
-                          <a:rPr lang="de-CH" sz="1600" i="1" dirty="0">
+                          <a:rPr lang="de-CH" sz="1400" i="1" dirty="0">
                             <a:latin typeface="Cambria Math" panose="02040503050406030204" pitchFamily="18" charset="0"/>
                           </a:rPr>
                           <m:t>𝑖</m:t>
                         </m:r>
                         <m:r>
-                          <a:rPr lang="pt-BR" sz="1600" i="1" dirty="0">
+                          <a:rPr lang="pt-BR" sz="1400" i="1" dirty="0">
                             <a:latin typeface="Cambria Math" panose="02040503050406030204" pitchFamily="18" charset="0"/>
                           </a:rPr>
                           <m:t>=</m:t>
                         </m:r>
                         <m:r>
-                          <a:rPr lang="de-CH" sz="1600" i="1" dirty="0">
+                          <a:rPr lang="de-CH" sz="1400" i="1" dirty="0">
                             <a:latin typeface="Cambria Math" panose="02040503050406030204" pitchFamily="18" charset="0"/>
                           </a:rPr>
                           <m:t>1</m:t>
@@ -13578,7 +13792,7 @@
                       </m:sub>
                       <m:sup>
                         <m:r>
-                          <a:rPr lang="pt-BR" sz="1600" i="1" dirty="0">
+                          <a:rPr lang="pt-BR" sz="1400" i="1" dirty="0">
                             <a:latin typeface="Cambria Math" panose="02040503050406030204" pitchFamily="18" charset="0"/>
                           </a:rPr>
                           <m:t>𝑛</m:t>
@@ -13588,7 +13802,7 @@
                         <m:sSup>
                           <m:sSupPr>
                             <m:ctrlPr>
-                              <a:rPr lang="de-CH" sz="1600" b="0" i="1" dirty="0" smtClean="0">
+                              <a:rPr lang="de-CH" sz="1400" b="0" i="1" dirty="0" smtClean="0">
                                 <a:latin typeface="Cambria Math" panose="02040503050406030204" pitchFamily="18" charset="0"/>
                               </a:rPr>
                             </m:ctrlPr>
@@ -13597,7 +13811,7 @@
                             <m:d>
                               <m:dPr>
                                 <m:ctrlPr>
-                                  <a:rPr lang="de-CH" sz="1600" b="0" i="1" dirty="0" smtClean="0">
+                                  <a:rPr lang="de-CH" sz="1400" b="0" i="1" dirty="0" smtClean="0">
                                     <a:latin typeface="Cambria Math" panose="02040503050406030204" pitchFamily="18" charset="0"/>
                                   </a:rPr>
                                 </m:ctrlPr>
@@ -13606,7 +13820,7 @@
                                 <m:sSub>
                                   <m:sSubPr>
                                     <m:ctrlPr>
-                                      <a:rPr lang="de-CH" sz="1600" b="0" i="1" dirty="0" smtClean="0">
+                                      <a:rPr lang="de-CH" sz="1400" b="0" i="1" dirty="0" smtClean="0">
                                         <a:latin typeface="Cambria Math" panose="02040503050406030204" pitchFamily="18" charset="0"/>
                                       </a:rPr>
                                     </m:ctrlPr>
@@ -13615,14 +13829,14 @@
                                     <m:sSub>
                                       <m:sSubPr>
                                         <m:ctrlPr>
-                                          <a:rPr lang="de-CH" sz="1600" b="0" i="1" dirty="0" smtClean="0">
+                                          <a:rPr lang="de-CH" sz="1400" b="0" i="1" dirty="0" smtClean="0">
                                             <a:latin typeface="Cambria Math" panose="02040503050406030204" pitchFamily="18" charset="0"/>
                                           </a:rPr>
                                         </m:ctrlPr>
                                       </m:sSubPr>
                                       <m:e>
                                         <m:r>
-                                          <a:rPr lang="de-CH" sz="1600" b="0" i="1" dirty="0" smtClean="0">
+                                          <a:rPr lang="de-CH" sz="1400" b="0" i="1" dirty="0" smtClean="0">
                                             <a:latin typeface="Cambria Math" panose="02040503050406030204" pitchFamily="18" charset="0"/>
                                           </a:rPr>
                                           <m:t>𝑦</m:t>
@@ -13630,7 +13844,7 @@
                                       </m:e>
                                       <m:sub>
                                         <m:r>
-                                          <a:rPr lang="de-CH" sz="1600" b="0" i="1" dirty="0" smtClean="0">
+                                          <a:rPr lang="de-CH" sz="1400" b="0" i="1" dirty="0" smtClean="0">
                                             <a:latin typeface="Cambria Math" panose="02040503050406030204" pitchFamily="18" charset="0"/>
                                           </a:rPr>
                                           <m:t>𝑖</m:t>
@@ -13638,7 +13852,7 @@
                                       </m:sub>
                                     </m:sSub>
                                     <m:r>
-                                      <a:rPr lang="de-CH" sz="1600" b="0" i="1" dirty="0" smtClean="0">
+                                      <a:rPr lang="de-CH" sz="1400" b="0" i="1" dirty="0" smtClean="0">
                                         <a:latin typeface="Cambria Math" panose="02040503050406030204" pitchFamily="18" charset="0"/>
                                       </a:rPr>
                                       <m:t>−</m:t>
@@ -13647,14 +13861,14 @@
                                       <m:accPr>
                                         <m:chr m:val="̂"/>
                                         <m:ctrlPr>
-                                          <a:rPr lang="de-CH" sz="1600" b="0" i="1" dirty="0" smtClean="0">
+                                          <a:rPr lang="de-CH" sz="1400" b="0" i="1" dirty="0" smtClean="0">
                                             <a:latin typeface="Cambria Math" panose="02040503050406030204" pitchFamily="18" charset="0"/>
                                           </a:rPr>
                                         </m:ctrlPr>
                                       </m:accPr>
                                       <m:e>
                                         <m:r>
-                                          <a:rPr lang="de-CH" sz="1600" b="0" i="1" dirty="0" smtClean="0">
+                                          <a:rPr lang="de-CH" sz="1400" b="0" i="1" dirty="0" smtClean="0">
                                             <a:latin typeface="Cambria Math" panose="02040503050406030204" pitchFamily="18" charset="0"/>
                                           </a:rPr>
                                           <m:t>𝑦</m:t>
@@ -13664,7 +13878,7 @@
                                   </m:e>
                                   <m:sub>
                                     <m:r>
-                                      <a:rPr lang="de-CH" sz="1600" b="0" i="1" dirty="0" smtClean="0">
+                                      <a:rPr lang="de-CH" sz="1400" b="0" i="1" dirty="0" smtClean="0">
                                         <a:latin typeface="Cambria Math" panose="02040503050406030204" pitchFamily="18" charset="0"/>
                                       </a:rPr>
                                       <m:t>𝑖</m:t>
@@ -13676,7 +13890,7 @@
                           </m:e>
                           <m:sup>
                             <m:r>
-                              <a:rPr lang="de-CH" sz="1600" b="0" i="1" dirty="0" smtClean="0">
+                              <a:rPr lang="de-CH" sz="1400" b="0" i="1" dirty="0" smtClean="0">
                                 <a:latin typeface="Cambria Math" panose="02040503050406030204" pitchFamily="18" charset="0"/>
                               </a:rPr>
                               <m:t>2</m:t>
@@ -13686,23 +13900,23 @@
                       </m:e>
                     </m:nary>
                     <m:r>
-                      <a:rPr lang="de-CH" sz="1600" b="0" i="1" dirty="0" smtClean="0">
+                      <a:rPr lang="de-CH" sz="1400" b="0" i="1" dirty="0" smtClean="0">
                         <a:latin typeface="Cambria Math" panose="02040503050406030204" pitchFamily="18" charset="0"/>
                       </a:rPr>
                       <m:t> </m:t>
                     </m:r>
                   </m:oMath>
                 </a14:m>
-                <a:endParaRPr lang="de-CH" sz="1600" dirty="0"/>
+                <a:endParaRPr lang="de-CH" sz="1400" dirty="0"/>
               </a:p>
               <a:p>
                 <a:pPr lvl="1"/>
                 <a:r>
-                  <a:rPr lang="de-CH" sz="1600" dirty="0"/>
+                  <a:rPr lang="de-CH" sz="1400" dirty="0"/>
                   <a:t>Root-MSE (</a:t>
                 </a:r>
                 <a:r>
-                  <a:rPr lang="de-CH" sz="1600" dirty="0">
+                  <a:rPr lang="de-CH" sz="1400" dirty="0">
                     <a:solidFill>
                       <a:schemeClr val="accent4">
                         <a:lumMod val="75000"/>
@@ -13712,7 +13926,7 @@
                   <a:t>RMSE</a:t>
                 </a:r>
                 <a:r>
-                  <a:rPr lang="de-CH" sz="1600" dirty="0"/>
+                  <a:rPr lang="de-CH" sz="1400" dirty="0"/>
                   <a:t>)</a:t>
                 </a:r>
               </a:p>
@@ -13806,7 +14020,7 @@
             </p:txBody>
           </p:sp>
         </mc:Choice>
-        <mc:Fallback xmlns="">
+        <mc:Fallback>
           <p:sp>
             <p:nvSpPr>
               <p:cNvPr id="203" name="Google Shape;203;p17"/>
@@ -13828,7 +14042,7 @@
               <a:blipFill>
                 <a:blip r:embed="rId3"/>
                 <a:stretch>
-                  <a:fillRect b="-4834"/>
+                  <a:fillRect b="-1511"/>
                 </a:stretch>
               </a:blipFill>
             </p:spPr>
@@ -14421,7 +14635,19 @@
                       <a:rPr lang="de-CH" sz="1600" b="0" i="1" smtClean="0">
                         <a:latin typeface="Cambria Math" panose="02040503050406030204" pitchFamily="18" charset="0"/>
                       </a:rPr>
-                      <m:t>(0, </m:t>
+                      <m:t>(</m:t>
+                    </m:r>
+                    <m:r>
+                      <a:rPr lang="de-CH" sz="1600" b="0" i="1" smtClean="0">
+                        <a:latin typeface="Cambria Math" panose="02040503050406030204" pitchFamily="18" charset="0"/>
+                      </a:rPr>
+                      <m:t>0</m:t>
+                    </m:r>
+                    <m:r>
+                      <a:rPr lang="de-CH" sz="1600" b="0" i="1" smtClean="0">
+                        <a:latin typeface="Cambria Math" panose="02040503050406030204" pitchFamily="18" charset="0"/>
+                      </a:rPr>
+                      <m:t>, </m:t>
                     </m:r>
                     <m:sSup>
                       <m:sSupPr>
@@ -16085,7 +16311,7 @@
         </p:blipFill>
         <p:spPr>
           <a:xfrm>
-            <a:off x="3690027" y="2413796"/>
+            <a:off x="4012757" y="2319066"/>
             <a:ext cx="3826879" cy="1532023"/>
           </a:xfrm>
           <a:prstGeom prst="rect">
@@ -16121,7 +16347,7 @@
         </p:nvSpPr>
         <p:spPr>
           <a:xfrm>
-            <a:off x="3589174" y="2114782"/>
+            <a:off x="3911904" y="2020052"/>
             <a:ext cx="2613216" cy="307777"/>
           </a:xfrm>
           <a:prstGeom prst="rect">
@@ -17538,8 +17764,8 @@
         </p:nvSpPr>
         <p:spPr>
           <a:xfrm>
-            <a:off x="869433" y="2004980"/>
-            <a:ext cx="4242985" cy="2342049"/>
+            <a:off x="833401" y="2023514"/>
+            <a:ext cx="4150863" cy="2342049"/>
           </a:xfrm>
           <a:prstGeom prst="rect">
             <a:avLst/>
@@ -17552,129 +17778,8 @@
           <a:lstStyle/>
           <a:p>
             <a:r>
-              <a:rPr lang="de-CH" sz="1800" dirty="0" err="1"/>
+              <a:rPr lang="de-CH" sz="1600" dirty="0" err="1"/>
               <a:t>Additivity</a:t>
-            </a:r>
-            <a:r>
-              <a:rPr lang="de-CH" sz="1800" dirty="0"/>
-              <a:t> </a:t>
-            </a:r>
-            <a:r>
-              <a:rPr lang="de-CH" sz="1800" dirty="0" err="1"/>
-              <a:t>of</a:t>
-            </a:r>
-            <a:r>
-              <a:rPr lang="de-CH" sz="1800" dirty="0"/>
-              <a:t> </a:t>
-            </a:r>
-            <a:r>
-              <a:rPr lang="de-CH" sz="1800" dirty="0" err="1"/>
-              <a:t>effects</a:t>
-            </a:r>
-            <a:r>
-              <a:rPr lang="de-CH" sz="1800" dirty="0"/>
-              <a:t> not </a:t>
-            </a:r>
-            <a:r>
-              <a:rPr lang="de-CH" sz="1800" dirty="0" err="1"/>
-              <a:t>always</a:t>
-            </a:r>
-            <a:r>
-              <a:rPr lang="de-CH" sz="1800" dirty="0"/>
-              <a:t> </a:t>
-            </a:r>
-            <a:r>
-              <a:rPr lang="de-CH" sz="1800" dirty="0" err="1"/>
-              <a:t>realistic</a:t>
-            </a:r>
-            <a:endParaRPr lang="de-CH" sz="1800" dirty="0"/>
-          </a:p>
-          <a:p>
-            <a:r>
-              <a:rPr lang="de-CH" sz="1800" dirty="0" err="1"/>
-              <a:t>Adding</a:t>
-            </a:r>
-            <a:r>
-              <a:rPr lang="de-CH" sz="1800" dirty="0"/>
-              <a:t> </a:t>
-            </a:r>
-            <a:r>
-              <a:rPr lang="de-CH" sz="1800" dirty="0" err="1"/>
-              <a:t>interaction</a:t>
-            </a:r>
-            <a:r>
-              <a:rPr lang="de-CH" sz="1800" dirty="0"/>
-              <a:t> </a:t>
-            </a:r>
-            <a:r>
-              <a:rPr lang="de-CH" sz="1800" dirty="0" err="1"/>
-              <a:t>terms</a:t>
-            </a:r>
-            <a:r>
-              <a:rPr lang="de-CH" sz="1800" dirty="0"/>
-              <a:t> </a:t>
-            </a:r>
-            <a:r>
-              <a:rPr lang="de-CH" sz="1800" dirty="0" err="1"/>
-              <a:t>brings</a:t>
-            </a:r>
-            <a:r>
-              <a:rPr lang="de-CH" sz="1800" dirty="0"/>
-              <a:t> </a:t>
-            </a:r>
-            <a:r>
-              <a:rPr lang="de-CH" sz="1800" dirty="0" err="1"/>
-              <a:t>necessary</a:t>
-            </a:r>
-            <a:r>
-              <a:rPr lang="de-CH" sz="1800" dirty="0"/>
-              <a:t> </a:t>
-            </a:r>
-            <a:r>
-              <a:rPr lang="de-CH" sz="1800" dirty="0" err="1"/>
-              <a:t>flexibility</a:t>
-            </a:r>
-            <a:endParaRPr lang="de-CH" sz="1800" dirty="0"/>
-          </a:p>
-          <a:p>
-            <a:r>
-              <a:rPr lang="de-CH" sz="1800" dirty="0"/>
-              <a:t>Interaction </a:t>
-            </a:r>
-            <a:r>
-              <a:rPr lang="de-CH" sz="1800" dirty="0" err="1"/>
-              <a:t>between</a:t>
-            </a:r>
-            <a:r>
-              <a:rPr lang="de-CH" sz="1800" dirty="0"/>
-              <a:t> </a:t>
-            </a:r>
-            <a:r>
-              <a:rPr lang="de-CH" sz="1800" dirty="0" err="1"/>
-              <a:t>features</a:t>
-            </a:r>
-            <a:r>
-              <a:rPr lang="de-CH" sz="1800" dirty="0"/>
-              <a:t> </a:t>
-            </a:r>
-            <a:r>
-              <a:rPr lang="de-CH" sz="1800" i="1" dirty="0"/>
-              <a:t>X</a:t>
-            </a:r>
-            <a:r>
-              <a:rPr lang="de-CH" sz="1800" dirty="0"/>
-              <a:t> and </a:t>
-            </a:r>
-            <a:r>
-              <a:rPr lang="de-CH" sz="1800" i="1" dirty="0"/>
-              <a:t>Z</a:t>
-            </a:r>
-          </a:p>
-          <a:p>
-            <a:pPr lvl="1"/>
-            <a:r>
-              <a:rPr lang="de-CH" sz="1600" dirty="0" err="1"/>
-              <a:t>For</a:t>
             </a:r>
             <a:r>
               <a:rPr lang="de-CH" sz="1600" dirty="0"/>
@@ -17682,117 +17787,238 @@
             </a:r>
             <a:r>
               <a:rPr lang="de-CH" sz="1600" dirty="0" err="1"/>
-              <a:t>categorical</a:t>
+              <a:t>of</a:t>
             </a:r>
             <a:r>
               <a:rPr lang="de-CH" sz="1600" dirty="0"/>
               <a:t> </a:t>
             </a:r>
             <a:r>
+              <a:rPr lang="de-CH" sz="1600" dirty="0" err="1"/>
+              <a:t>effects</a:t>
+            </a:r>
+            <a:r>
+              <a:rPr lang="de-CH" sz="1600" dirty="0"/>
+              <a:t> not </a:t>
+            </a:r>
+            <a:r>
+              <a:rPr lang="de-CH" sz="1600" dirty="0" err="1"/>
+              <a:t>always</a:t>
+            </a:r>
+            <a:r>
+              <a:rPr lang="de-CH" sz="1600" dirty="0"/>
+              <a:t> </a:t>
+            </a:r>
+            <a:r>
+              <a:rPr lang="de-CH" sz="1600" dirty="0" err="1"/>
+              <a:t>realistic</a:t>
+            </a:r>
+            <a:endParaRPr lang="de-CH" sz="1600" dirty="0"/>
+          </a:p>
+          <a:p>
+            <a:r>
+              <a:rPr lang="de-CH" sz="1600" dirty="0" err="1"/>
+              <a:t>Adding</a:t>
+            </a:r>
+            <a:r>
+              <a:rPr lang="de-CH" sz="1600" dirty="0"/>
+              <a:t> </a:t>
+            </a:r>
+            <a:r>
+              <a:rPr lang="de-CH" sz="1600" dirty="0" err="1"/>
+              <a:t>interaction</a:t>
+            </a:r>
+            <a:r>
+              <a:rPr lang="de-CH" sz="1600" dirty="0"/>
+              <a:t> </a:t>
+            </a:r>
+            <a:r>
+              <a:rPr lang="de-CH" sz="1600" dirty="0" err="1"/>
+              <a:t>terms</a:t>
+            </a:r>
+            <a:r>
+              <a:rPr lang="de-CH" sz="1600" dirty="0"/>
+              <a:t> </a:t>
+            </a:r>
+            <a:r>
+              <a:rPr lang="de-CH" sz="1600" dirty="0" err="1"/>
+              <a:t>brings</a:t>
+            </a:r>
+            <a:r>
+              <a:rPr lang="de-CH" sz="1600" dirty="0"/>
+              <a:t> </a:t>
+            </a:r>
+            <a:r>
+              <a:rPr lang="de-CH" sz="1600" dirty="0" err="1"/>
+              <a:t>necessary</a:t>
+            </a:r>
+            <a:r>
+              <a:rPr lang="de-CH" sz="1600" dirty="0"/>
+              <a:t> </a:t>
+            </a:r>
+            <a:r>
+              <a:rPr lang="de-CH" sz="1600" dirty="0" err="1"/>
+              <a:t>flexibility</a:t>
+            </a:r>
+            <a:endParaRPr lang="de-CH" sz="1600" dirty="0"/>
+          </a:p>
+          <a:p>
+            <a:r>
+              <a:rPr lang="de-CH" sz="1600" dirty="0"/>
+              <a:t>Interaction </a:t>
+            </a:r>
+            <a:r>
+              <a:rPr lang="de-CH" sz="1600" dirty="0" err="1"/>
+              <a:t>between</a:t>
+            </a:r>
+            <a:r>
+              <a:rPr lang="de-CH" sz="1600" dirty="0"/>
+              <a:t> </a:t>
+            </a:r>
+            <a:r>
+              <a:rPr lang="de-CH" sz="1600" dirty="0" err="1"/>
+              <a:t>features</a:t>
+            </a:r>
+            <a:r>
+              <a:rPr lang="de-CH" sz="1600" dirty="0"/>
+              <a:t> </a:t>
+            </a:r>
+            <a:r>
+              <a:rPr lang="de-CH" sz="1600" i="1" dirty="0"/>
+              <a:t>X</a:t>
+            </a:r>
+            <a:r>
+              <a:rPr lang="de-CH" sz="1600" dirty="0"/>
+              <a:t> and </a:t>
+            </a:r>
+            <a:r>
               <a:rPr lang="de-CH" sz="1600" i="1" dirty="0"/>
               <a:t>Z</a:t>
             </a:r>
-            <a:r>
-              <a:rPr lang="de-CH" sz="1600" dirty="0"/>
+          </a:p>
+          <a:p>
+            <a:pPr lvl="1"/>
+            <a:r>
+              <a:rPr lang="de-CH" sz="1400" dirty="0" err="1"/>
+              <a:t>For</a:t>
+            </a:r>
+            <a:r>
+              <a:rPr lang="de-CH" sz="1400" dirty="0"/>
+              <a:t> </a:t>
+            </a:r>
+            <a:r>
+              <a:rPr lang="de-CH" sz="1400" dirty="0" err="1"/>
+              <a:t>categorical</a:t>
+            </a:r>
+            <a:r>
+              <a:rPr lang="de-CH" sz="1400" dirty="0"/>
+              <a:t> </a:t>
+            </a:r>
+            <a:r>
+              <a:rPr lang="de-CH" sz="1400" i="1" dirty="0"/>
+              <a:t>Z</a:t>
+            </a:r>
+            <a:r>
+              <a:rPr lang="de-CH" sz="1400" dirty="0"/>
               <a:t>, </a:t>
             </a:r>
             <a:r>
-              <a:rPr lang="de-CH" sz="1600" dirty="0" err="1"/>
+              <a:rPr lang="de-CH" sz="1400" dirty="0" err="1"/>
               <a:t>effects</a:t>
             </a:r>
             <a:r>
-              <a:rPr lang="de-CH" sz="1600" dirty="0"/>
+              <a:rPr lang="de-CH" sz="1400" dirty="0"/>
               <a:t> </a:t>
             </a:r>
             <a:r>
-              <a:rPr lang="de-CH" sz="1600" dirty="0" err="1"/>
+              <a:rPr lang="de-CH" sz="1400" dirty="0" err="1"/>
               <a:t>of</a:t>
             </a:r>
             <a:r>
-              <a:rPr lang="de-CH" sz="1600" dirty="0"/>
+              <a:rPr lang="de-CH" sz="1400" dirty="0"/>
               <a:t> </a:t>
             </a:r>
             <a:r>
-              <a:rPr lang="de-CH" sz="1600" i="1" dirty="0"/>
+              <a:rPr lang="de-CH" sz="1400" i="1" dirty="0"/>
               <a:t>X</a:t>
             </a:r>
             <a:r>
-              <a:rPr lang="de-CH" sz="1600" dirty="0"/>
+              <a:rPr lang="de-CH" sz="1400" dirty="0"/>
               <a:t> </a:t>
             </a:r>
             <a:r>
-              <a:rPr lang="de-CH" sz="1600" dirty="0" err="1"/>
+              <a:rPr lang="de-CH" sz="1400" dirty="0" err="1"/>
               <a:t>are</a:t>
             </a:r>
             <a:r>
-              <a:rPr lang="de-CH" sz="1600" dirty="0"/>
+              <a:rPr lang="de-CH" sz="1400" dirty="0"/>
               <a:t> </a:t>
             </a:r>
             <a:r>
-              <a:rPr lang="de-CH" sz="1600" dirty="0" err="1"/>
+              <a:rPr lang="de-CH" sz="1400" dirty="0" err="1"/>
               <a:t>calculated</a:t>
             </a:r>
             <a:r>
-              <a:rPr lang="de-CH" sz="1600" dirty="0"/>
+              <a:rPr lang="de-CH" sz="1400" dirty="0"/>
               <a:t> </a:t>
             </a:r>
             <a:r>
-              <a:rPr lang="de-CH" sz="1600" dirty="0" err="1"/>
+              <a:rPr lang="de-CH" sz="1400" dirty="0" err="1"/>
               <a:t>by</a:t>
             </a:r>
             <a:r>
-              <a:rPr lang="de-CH" sz="1600" dirty="0"/>
+              <a:rPr lang="de-CH" sz="1400" dirty="0"/>
               <a:t> </a:t>
             </a:r>
             <a:r>
-              <a:rPr lang="de-CH" sz="1600" dirty="0" err="1"/>
+              <a:rPr lang="de-CH" sz="1400" dirty="0" err="1"/>
               <a:t>level</a:t>
             </a:r>
             <a:r>
-              <a:rPr lang="de-CH" sz="1600" dirty="0"/>
+              <a:rPr lang="de-CH" sz="1400" dirty="0"/>
               <a:t> </a:t>
             </a:r>
             <a:r>
-              <a:rPr lang="de-CH" sz="1600" dirty="0" err="1"/>
+              <a:rPr lang="de-CH" sz="1400" dirty="0" err="1"/>
               <a:t>of</a:t>
             </a:r>
             <a:r>
-              <a:rPr lang="de-CH" sz="1600" dirty="0"/>
+              <a:rPr lang="de-CH" sz="1400" dirty="0"/>
               <a:t> </a:t>
             </a:r>
             <a:r>
-              <a:rPr lang="de-CH" sz="1600" i="1" dirty="0"/>
+              <a:rPr lang="de-CH" sz="1400" i="1" dirty="0"/>
               <a:t>Z</a:t>
             </a:r>
           </a:p>
           <a:p>
             <a:pPr lvl="1"/>
             <a:r>
-              <a:rPr lang="de-CH" sz="1600" dirty="0"/>
+              <a:rPr lang="de-CH" sz="1400" dirty="0"/>
               <a:t>Like separate </a:t>
             </a:r>
             <a:r>
-              <a:rPr lang="de-CH" sz="1600" dirty="0" err="1"/>
+              <a:rPr lang="de-CH" sz="1400" dirty="0" err="1"/>
               <a:t>models</a:t>
             </a:r>
             <a:r>
-              <a:rPr lang="de-CH" sz="1600" dirty="0"/>
+              <a:rPr lang="de-CH" sz="1400" dirty="0"/>
               <a:t> per </a:t>
             </a:r>
             <a:r>
-              <a:rPr lang="de-CH" sz="1600" dirty="0" err="1"/>
+              <a:rPr lang="de-CH" sz="1400" dirty="0" err="1"/>
               <a:t>level</a:t>
             </a:r>
             <a:r>
-              <a:rPr lang="de-CH" sz="1600" dirty="0"/>
+              <a:rPr lang="de-CH" sz="1400" dirty="0"/>
               <a:t> </a:t>
             </a:r>
             <a:r>
-              <a:rPr lang="de-CH" sz="1600" dirty="0" err="1"/>
+              <a:rPr lang="de-CH" sz="1400" dirty="0" err="1"/>
               <a:t>of</a:t>
             </a:r>
             <a:r>
-              <a:rPr lang="de-CH" sz="1600" dirty="0"/>
+              <a:rPr lang="de-CH" sz="1400" dirty="0"/>
               <a:t> Z</a:t>
             </a:r>
           </a:p>
@@ -18859,8 +19085,8 @@
           </a:p>
         </p:txBody>
       </p:sp>
-      <mc:AlternateContent xmlns:mc="http://schemas.openxmlformats.org/markup-compatibility/2006" xmlns:a14="http://schemas.microsoft.com/office/drawing/2010/main">
-        <mc:Choice Requires="a14">
+      <mc:AlternateContent xmlns:mc="http://schemas.openxmlformats.org/markup-compatibility/2006">
+        <mc:Choice xmlns:a14="http://schemas.microsoft.com/office/drawing/2010/main" Requires="a14">
           <p:sp>
             <p:nvSpPr>
               <p:cNvPr id="203" name="Google Shape;203;p17"/>
@@ -18874,7 +19100,7 @@
             <p:spPr>
               <a:xfrm>
                 <a:off x="1357515" y="1973068"/>
-                <a:ext cx="6052028" cy="2504589"/>
+                <a:ext cx="5863556" cy="2504589"/>
               </a:xfrm>
               <a:prstGeom prst="rect">
                 <a:avLst/>
@@ -19165,7 +19391,14 @@
                 </a14:m>
                 <a:r>
                   <a:rPr lang="de-CH" sz="1600" dirty="0"/>
-                  <a:t>» (→ </a:t>
+                  <a:t>» </a:t>
+                </a:r>
+                <a:br>
+                  <a:rPr lang="de-CH" sz="1600" dirty="0"/>
+                </a:br>
+                <a:r>
+                  <a:rPr lang="de-CH" sz="1600" dirty="0"/>
+                  <a:t>(→ </a:t>
                 </a:r>
                 <a:r>
                   <a:rPr lang="de-CH" sz="1600" dirty="0" err="1"/>
@@ -19277,7 +19510,7 @@
             </p:txBody>
           </p:sp>
         </mc:Choice>
-        <mc:Fallback xmlns="">
+        <mc:Fallback>
           <p:sp>
             <p:nvSpPr>
               <p:cNvPr id="203" name="Google Shape;203;p17"/>
@@ -19291,7 +19524,7 @@
             <p:spPr>
               <a:xfrm>
                 <a:off x="1357515" y="1973068"/>
-                <a:ext cx="6052028" cy="2504589"/>
+                <a:ext cx="5863556" cy="2504589"/>
               </a:xfrm>
               <a:prstGeom prst="rect">
                 <a:avLst/>
@@ -19299,7 +19532,7 @@
               <a:blipFill>
                 <a:blip r:embed="rId3"/>
                 <a:stretch>
-                  <a:fillRect b="-4380"/>
+                  <a:fillRect b="-14112"/>
                 </a:stretch>
               </a:blipFill>
             </p:spPr>
@@ -19954,7 +20187,7 @@
         </p:blipFill>
         <p:spPr bwMode="auto">
           <a:xfrm>
-            <a:off x="3918856" y="2571750"/>
+            <a:off x="4300311" y="2571750"/>
             <a:ext cx="1647372" cy="1610587"/>
           </a:xfrm>
           <a:prstGeom prst="rect">
@@ -20051,8 +20284,8 @@
         </p:nvSpPr>
         <p:spPr>
           <a:xfrm>
-            <a:off x="1031424" y="2462925"/>
-            <a:ext cx="4462232" cy="1470446"/>
+            <a:off x="1031424" y="2462924"/>
+            <a:ext cx="4744088" cy="1610587"/>
           </a:xfrm>
           <a:prstGeom prst="rect">
             <a:avLst/>
@@ -21179,7 +21412,7 @@
         <p:spPr>
           <a:xfrm>
             <a:off x="6571613" y="1897898"/>
-            <a:ext cx="1927874" cy="2302117"/>
+            <a:ext cx="2182422" cy="2594944"/>
           </a:xfrm>
         </p:spPr>
         <p:style>
@@ -21477,7 +21710,7 @@
         <p:spPr>
           <a:xfrm>
             <a:off x="1357515" y="1973068"/>
-            <a:ext cx="6119050" cy="2666167"/>
+            <a:ext cx="5434210" cy="2666167"/>
           </a:xfrm>
           <a:prstGeom prst="rect">
             <a:avLst/>
@@ -21777,8 +22010,8 @@
           </a:p>
         </p:txBody>
       </p:sp>
-      <mc:AlternateContent xmlns:mc="http://schemas.openxmlformats.org/markup-compatibility/2006" xmlns:a14="http://schemas.microsoft.com/office/drawing/2010/main">
-        <mc:Choice Requires="a14">
+      <mc:AlternateContent xmlns:mc="http://schemas.openxmlformats.org/markup-compatibility/2006">
+        <mc:Choice xmlns:a14="http://schemas.microsoft.com/office/drawing/2010/main" Requires="a14">
           <p:sp>
             <p:nvSpPr>
               <p:cNvPr id="203" name="Google Shape;203;p17"/>
@@ -21791,8 +22024,8 @@
             </p:nvSpPr>
             <p:spPr>
               <a:xfrm>
-                <a:off x="1031425" y="1979992"/>
-                <a:ext cx="6119050" cy="2666167"/>
+                <a:off x="1031425" y="1986717"/>
+                <a:ext cx="6119050" cy="2309620"/>
               </a:xfrm>
               <a:prstGeom prst="rect">
                 <a:avLst/>
@@ -21806,13 +22039,26 @@
               <a:p>
                 <a:r>
                   <a:rPr lang="de-CH" dirty="0"/>
-                  <a:t>Identity link → linear Regression</a:t>
+                  <a:t>Identity link → linear </a:t>
                 </a:r>
+                <a:r>
+                  <a:rPr lang="de-CH" dirty="0" err="1"/>
+                  <a:t>regression</a:t>
+                </a:r>
+                <a:endParaRPr lang="de-CH" dirty="0"/>
               </a:p>
               <a:p>
                 <a:r>
                   <a:rPr lang="de-CH" dirty="0"/>
-                  <a:t>Log link → linear Regression </a:t>
+                  <a:t>Log link → linear </a:t>
+                </a:r>
+                <a:r>
+                  <a:rPr lang="de-CH" dirty="0" err="1"/>
+                  <a:t>regression</a:t>
+                </a:r>
+                <a:r>
+                  <a:rPr lang="de-CH" dirty="0"/>
+                  <a:t> </a:t>
                 </a:r>
                 <a:r>
                   <a:rPr lang="de-CH" dirty="0" err="1"/>
@@ -22129,23 +22375,45 @@
                 </a:r>
                 <a:r>
                   <a:rPr lang="de-CH" sz="1600" dirty="0"/>
+                  <a:t>. </a:t>
+                </a:r>
+                <a:r>
+                  <a:rPr lang="de-CH" sz="1600" dirty="0" err="1"/>
+                  <a:t>No</a:t>
+                </a:r>
+                <a:r>
+                  <a:rPr lang="de-CH" sz="1600" dirty="0"/>
+                  <a:t> simple </a:t>
+                </a:r>
+                <a:r>
+                  <a:rPr lang="de-CH" sz="1600" dirty="0" err="1"/>
+                  <a:t>interpretation</a:t>
+                </a:r>
+                <a:r>
+                  <a:rPr lang="de-CH" sz="1600" dirty="0"/>
+                  <a:t> on </a:t>
+                </a:r>
+                <a:r>
+                  <a:rPr lang="de-CH" sz="1600" dirty="0" err="1"/>
+                  <a:t>probability</a:t>
+                </a:r>
+                <a:r>
+                  <a:rPr lang="de-CH" sz="1600" dirty="0"/>
+                  <a:t> </a:t>
+                </a:r>
+                <a:r>
+                  <a:rPr lang="de-CH" sz="1600" dirty="0" err="1"/>
+                  <a:t>scale</a:t>
+                </a:r>
+                <a:r>
+                  <a:rPr lang="de-CH" sz="1600" dirty="0"/>
                   <a:t>.</a:t>
                 </a:r>
-              </a:p>
-              <a:p>
-                <a:pPr lvl="1"/>
-                <a:endParaRPr lang="de-CH" sz="1600" dirty="0"/>
-              </a:p>
-              <a:p>
-                <a:pPr marL="101600" indent="0">
-                  <a:buNone/>
-                </a:pPr>
-                <a:endParaRPr lang="de-CH" sz="1600" dirty="0"/>
               </a:p>
             </p:txBody>
           </p:sp>
         </mc:Choice>
-        <mc:Fallback xmlns="">
+        <mc:Fallback>
           <p:sp>
             <p:nvSpPr>
               <p:cNvPr id="203" name="Google Shape;203;p17"/>
@@ -22158,8 +22426,8 @@
             </p:nvSpPr>
             <p:spPr>
               <a:xfrm>
-                <a:off x="1031425" y="1979992"/>
-                <a:ext cx="6119050" cy="2666167"/>
+                <a:off x="1031425" y="1986717"/>
+                <a:ext cx="6119050" cy="2309620"/>
               </a:xfrm>
               <a:prstGeom prst="rect">
                 <a:avLst/>
@@ -22236,7 +22504,7 @@
         </p:nvCxnSpPr>
         <p:spPr>
           <a:xfrm flipH="1">
-            <a:off x="5800434" y="2281887"/>
+            <a:off x="5764845" y="2346512"/>
             <a:ext cx="188259" cy="225238"/>
           </a:xfrm>
           <a:prstGeom prst="straightConnector1">
@@ -22567,47 +22835,6 @@
           </p:sp>
         </mc:Fallback>
       </mc:AlternateContent>
-      <p:cxnSp>
-        <p:nvCxnSpPr>
-          <p:cNvPr id="11" name="Gerade Verbindung mit Pfeil 10">
-            <a:extLst>
-              <a:ext uri="{FF2B5EF4-FFF2-40B4-BE49-F238E27FC236}">
-                <a16:creationId xmlns:a16="http://schemas.microsoft.com/office/drawing/2014/main" id="{5D2292D6-51C1-4C30-9CE8-FCBAD855AC7F}"/>
-              </a:ext>
-            </a:extLst>
-          </p:cNvPr>
-          <p:cNvCxnSpPr>
-            <a:cxnSpLocks/>
-          </p:cNvCxnSpPr>
-          <p:nvPr/>
-        </p:nvCxnSpPr>
-        <p:spPr>
-          <a:xfrm flipH="1">
-            <a:off x="5415804" y="3391744"/>
-            <a:ext cx="384631" cy="0"/>
-          </a:xfrm>
-          <a:prstGeom prst="straightConnector1">
-            <a:avLst/>
-          </a:prstGeom>
-          <a:ln>
-            <a:tailEnd type="triangle"/>
-          </a:ln>
-        </p:spPr>
-        <p:style>
-          <a:lnRef idx="1">
-            <a:schemeClr val="accent4"/>
-          </a:lnRef>
-          <a:fillRef idx="0">
-            <a:schemeClr val="accent4"/>
-          </a:fillRef>
-          <a:effectRef idx="0">
-            <a:schemeClr val="accent4"/>
-          </a:effectRef>
-          <a:fontRef idx="minor">
-            <a:schemeClr val="tx1"/>
-          </a:fontRef>
-        </p:style>
-      </p:cxnSp>
     </p:spTree>
     <p:extLst>
       <p:ext uri="{BB962C8B-B14F-4D97-AF65-F5344CB8AC3E}">
@@ -22726,7 +22953,7 @@
         <p:spPr>
           <a:xfrm>
             <a:off x="1031425" y="2462925"/>
-            <a:ext cx="5322310" cy="1441418"/>
+            <a:ext cx="5577804" cy="952628"/>
           </a:xfrm>
           <a:prstGeom prst="rect">
             <a:avLst/>
@@ -23254,8 +23481,8 @@
         </p:nvSpPr>
         <p:spPr>
           <a:xfrm>
-            <a:off x="1031425" y="1777125"/>
-            <a:ext cx="5760300" cy="2521200"/>
+            <a:off x="1031424" y="1777125"/>
+            <a:ext cx="5947599" cy="2521200"/>
           </a:xfrm>
           <a:prstGeom prst="rect">
             <a:avLst/>
@@ -23988,7 +24215,7 @@
         <p:spPr>
           <a:xfrm>
             <a:off x="1031425" y="1777125"/>
-            <a:ext cx="5903332" cy="2861620"/>
+            <a:ext cx="5903332" cy="2445251"/>
           </a:xfrm>
           <a:prstGeom prst="rect">
             <a:avLst/>
@@ -24209,28 +24436,6 @@
               <a:buNone/>
             </a:pPr>
             <a:endParaRPr lang="de-CH" dirty="0"/>
-          </a:p>
-          <a:p>
-            <a:pPr marL="101600" lvl="0" indent="0">
-              <a:buNone/>
-            </a:pPr>
-            <a:r>
-              <a:rPr lang="de-CH" u="sng" dirty="0" err="1">
-                <a:solidFill>
-                  <a:schemeClr val="accent4">
-                    <a:lumMod val="75000"/>
-                  </a:schemeClr>
-                </a:solidFill>
-              </a:rPr>
-              <a:t>Example</a:t>
-            </a:r>
-            <a:endParaRPr lang="de-CH" u="sng" dirty="0">
-              <a:solidFill>
-                <a:schemeClr val="accent4">
-                  <a:lumMod val="75000"/>
-                </a:schemeClr>
-              </a:solidFill>
-            </a:endParaRPr>
           </a:p>
         </p:txBody>
       </p:sp>
@@ -24265,6 +24470,57 @@
               <a:t>32</a:t>
             </a:fld>
             <a:endParaRPr/>
+          </a:p>
+        </p:txBody>
+      </p:sp>
+      <p:sp>
+        <p:nvSpPr>
+          <p:cNvPr id="6" name="Textfeld 5">
+            <a:extLst>
+              <a:ext uri="{FF2B5EF4-FFF2-40B4-BE49-F238E27FC236}">
+                <a16:creationId xmlns:a16="http://schemas.microsoft.com/office/drawing/2014/main" id="{AE0E5CE0-1F4E-4ECC-B570-BB8BB65162EC}"/>
+              </a:ext>
+            </a:extLst>
+          </p:cNvPr>
+          <p:cNvSpPr txBox="1"/>
+          <p:nvPr/>
+        </p:nvSpPr>
+        <p:spPr>
+          <a:xfrm>
+            <a:off x="1808630" y="4145809"/>
+            <a:ext cx="1351429" cy="369332"/>
+          </a:xfrm>
+          <a:prstGeom prst="rect">
+            <a:avLst/>
+          </a:prstGeom>
+          <a:noFill/>
+        </p:spPr>
+        <p:txBody>
+          <a:bodyPr wrap="square">
+            <a:spAutoFit/>
+          </a:bodyPr>
+          <a:lstStyle/>
+          <a:p>
+            <a:pPr marL="101600" lvl="0" indent="0">
+              <a:buNone/>
+            </a:pPr>
+            <a:r>
+              <a:rPr lang="de-CH" sz="1800" u="sng" dirty="0" err="1">
+                <a:solidFill>
+                  <a:schemeClr val="accent4">
+                    <a:lumMod val="75000"/>
+                  </a:schemeClr>
+                </a:solidFill>
+              </a:rPr>
+              <a:t>Example</a:t>
+            </a:r>
+            <a:endParaRPr lang="de-CH" sz="1800" u="sng" dirty="0">
+              <a:solidFill>
+                <a:schemeClr val="accent4">
+                  <a:lumMod val="75000"/>
+                </a:schemeClr>
+              </a:solidFill>
+            </a:endParaRPr>
           </a:p>
         </p:txBody>
       </p:sp>
@@ -24343,8 +24599,8 @@
         </p:nvSpPr>
         <p:spPr>
           <a:xfrm>
-            <a:off x="1031425" y="1777125"/>
-            <a:ext cx="5903332" cy="2861620"/>
+            <a:off x="1031424" y="1777125"/>
+            <a:ext cx="6122411" cy="2861620"/>
           </a:xfrm>
           <a:prstGeom prst="rect">
             <a:avLst/>
@@ -24530,7 +24786,7 @@
         <p:spPr>
           <a:xfrm>
             <a:off x="5499204" y="3207935"/>
-            <a:ext cx="1435553" cy="615154"/>
+            <a:ext cx="1553778" cy="615154"/>
           </a:xfrm>
           <a:prstGeom prst="rect">
             <a:avLst/>
@@ -24958,8 +25214,8 @@
         </p:nvSpPr>
         <p:spPr>
           <a:xfrm>
-            <a:off x="1074487" y="2164100"/>
-            <a:ext cx="5760300" cy="1994243"/>
+            <a:off x="1074486" y="2170824"/>
+            <a:ext cx="5904537" cy="1994243"/>
           </a:xfrm>
           <a:prstGeom prst="rect">
             <a:avLst/>
@@ -27222,7 +27478,7 @@
         <p:spPr>
           <a:xfrm>
             <a:off x="1183825" y="1929525"/>
-            <a:ext cx="5903332" cy="2861620"/>
+            <a:ext cx="6292740" cy="2861620"/>
           </a:xfrm>
           <a:prstGeom prst="rect">
             <a:avLst/>
@@ -29612,77 +29868,70 @@
           </a:p>
           <a:p>
             <a:r>
-              <a:rPr lang="de-CH" dirty="0"/>
-              <a:t>Michael: </a:t>
+              <a:rPr lang="de-CH" sz="1600" dirty="0"/>
+              <a:t>«</a:t>
+            </a:r>
+            <a:r>
+              <a:rPr lang="de-CH" sz="1600" dirty="0" err="1"/>
+              <a:t>Decision</a:t>
+            </a:r>
+            <a:r>
+              <a:rPr lang="de-CH" sz="1600" dirty="0"/>
+              <a:t> </a:t>
+            </a:r>
+            <a:r>
+              <a:rPr lang="de-CH" sz="1600" dirty="0" err="1"/>
+              <a:t>trees</a:t>
+            </a:r>
+            <a:r>
+              <a:rPr lang="de-CH" sz="1600" dirty="0"/>
+              <a:t> </a:t>
+            </a:r>
+            <a:r>
+              <a:rPr lang="de-CH" sz="1600" dirty="0" err="1"/>
+              <a:t>are</a:t>
+            </a:r>
+            <a:r>
+              <a:rPr lang="de-CH" sz="1600" dirty="0"/>
+              <a:t> like </a:t>
+            </a:r>
+            <a:r>
+              <a:rPr lang="de-CH" sz="1600" dirty="0" err="1"/>
+              <a:t>wolves</a:t>
+            </a:r>
+            <a:r>
+              <a:rPr lang="de-CH" sz="1600" dirty="0"/>
+              <a:t>: </a:t>
             </a:r>
             <a:br>
-              <a:rPr lang="de-CH" dirty="0"/>
+              <a:rPr lang="de-CH" sz="1600" dirty="0"/>
             </a:br>
             <a:r>
-              <a:rPr lang="de-CH" dirty="0"/>
-              <a:t>«</a:t>
-            </a:r>
-            <a:r>
-              <a:rPr lang="de-CH" dirty="0" err="1"/>
-              <a:t>Decision</a:t>
-            </a:r>
-            <a:r>
-              <a:rPr lang="de-CH" dirty="0"/>
+              <a:rPr lang="de-CH" sz="1600" dirty="0"/>
               <a:t> </a:t>
             </a:r>
             <a:r>
-              <a:rPr lang="de-CH" dirty="0" err="1"/>
-              <a:t>trees</a:t>
-            </a:r>
-            <a:r>
-              <a:rPr lang="de-CH" dirty="0"/>
+              <a:rPr lang="de-CH" sz="1600" dirty="0" err="1"/>
+              <a:t>Weak</a:t>
+            </a:r>
+            <a:r>
+              <a:rPr lang="de-CH" sz="1600" dirty="0"/>
               <a:t> </a:t>
             </a:r>
             <a:r>
-              <a:rPr lang="de-CH" dirty="0" err="1"/>
-              <a:t>are</a:t>
-            </a:r>
-            <a:r>
-              <a:rPr lang="de-CH" dirty="0"/>
-              <a:t> like </a:t>
-            </a:r>
-            <a:r>
-              <a:rPr lang="de-CH" dirty="0" err="1"/>
-              <a:t>wolves</a:t>
-            </a:r>
-            <a:r>
-              <a:rPr lang="de-CH" dirty="0"/>
-              <a:t>: </a:t>
-            </a:r>
-            <a:br>
-              <a:rPr lang="de-CH" dirty="0"/>
-            </a:br>
-            <a:r>
-              <a:rPr lang="de-CH" dirty="0"/>
-              <a:t> </a:t>
-            </a:r>
-            <a:r>
-              <a:rPr lang="de-CH" dirty="0" err="1"/>
-              <a:t>Weak</a:t>
-            </a:r>
-            <a:r>
-              <a:rPr lang="de-CH" dirty="0"/>
-              <a:t> </a:t>
-            </a:r>
-            <a:r>
-              <a:rPr lang="de-CH" dirty="0" err="1"/>
+              <a:rPr lang="de-CH" sz="1600" dirty="0" err="1"/>
               <a:t>alone</a:t>
             </a:r>
             <a:r>
-              <a:rPr lang="de-CH" dirty="0"/>
+              <a:rPr lang="de-CH" sz="1600" dirty="0"/>
               <a:t>, strong </a:t>
             </a:r>
             <a:r>
-              <a:rPr lang="de-CH" dirty="0" err="1"/>
+              <a:rPr lang="de-CH" sz="1600" dirty="0" err="1"/>
               <a:t>together</a:t>
             </a:r>
             <a:r>
-              <a:rPr lang="de-CH" dirty="0"/>
+              <a:rPr lang="de-CH" sz="1600" dirty="0"/>
               <a:t>»</a:t>
             </a:r>
           </a:p>
@@ -29784,7 +30033,7 @@
         </p:blipFill>
         <p:spPr bwMode="auto">
           <a:xfrm>
-            <a:off x="4828697" y="882666"/>
+            <a:off x="4768185" y="942577"/>
             <a:ext cx="2755443" cy="3427116"/>
           </a:xfrm>
           <a:prstGeom prst="rect">
@@ -29816,7 +30065,7 @@
         </p:nvSpPr>
         <p:spPr>
           <a:xfrm>
-            <a:off x="4742091" y="4289597"/>
+            <a:off x="4674856" y="4366072"/>
             <a:ext cx="2649070" cy="184666"/>
           </a:xfrm>
           <a:prstGeom prst="rect">
@@ -29889,7 +30138,7 @@
         </p:blipFill>
         <p:spPr>
           <a:xfrm>
-            <a:off x="4081127" y="1762054"/>
+            <a:off x="4282833" y="1749215"/>
             <a:ext cx="4011185" cy="2970274"/>
           </a:xfrm>
           <a:prstGeom prst="rect">
@@ -30058,76 +30307,6 @@
             </a:r>
             <a:endParaRPr lang="de-CH" dirty="0"/>
           </a:p>
-          <a:p>
-            <a:r>
-              <a:rPr lang="de-CH" sz="1600" u="sng" dirty="0" err="1"/>
-              <a:t>Typical</a:t>
-            </a:r>
-            <a:r>
-              <a:rPr lang="de-CH" sz="1600" u="sng" dirty="0"/>
-              <a:t> </a:t>
-            </a:r>
-            <a:r>
-              <a:rPr lang="de-CH" sz="1600" u="sng" dirty="0" err="1"/>
-              <a:t>losses</a:t>
-            </a:r>
-            <a:r>
-              <a:rPr lang="de-CH" sz="1600" u="sng" dirty="0"/>
-              <a:t>: MSE, </a:t>
-            </a:r>
-            <a:br>
-              <a:rPr lang="de-CH" sz="1600" u="sng" dirty="0"/>
-            </a:br>
-            <a:r>
-              <a:rPr lang="de-CH" sz="1600" dirty="0"/>
-              <a:t>log </a:t>
-            </a:r>
-            <a:r>
-              <a:rPr lang="de-CH" sz="1600" dirty="0" err="1"/>
-              <a:t>loss</a:t>
-            </a:r>
-            <a:r>
-              <a:rPr lang="de-CH" sz="1600" dirty="0"/>
-              <a:t>/</a:t>
-            </a:r>
-            <a:r>
-              <a:rPr lang="de-CH" sz="1600" dirty="0" err="1"/>
-              <a:t>cross-entropy</a:t>
-            </a:r>
-            <a:r>
-              <a:rPr lang="de-CH" sz="1600" dirty="0"/>
-              <a:t>/ </a:t>
-            </a:r>
-            <a:br>
-              <a:rPr lang="de-CH" sz="1600" dirty="0"/>
-            </a:br>
-            <a:r>
-              <a:rPr lang="de-CH" sz="1600" dirty="0" err="1"/>
-              <a:t>information</a:t>
-            </a:r>
-            <a:r>
-              <a:rPr lang="de-CH" sz="1600" dirty="0"/>
-              <a:t> </a:t>
-            </a:r>
-            <a:r>
-              <a:rPr lang="de-CH" sz="1600" dirty="0" err="1"/>
-              <a:t>or</a:t>
-            </a:r>
-            <a:r>
-              <a:rPr lang="de-CH" sz="1600" dirty="0"/>
-              <a:t> Gini</a:t>
-            </a:r>
-          </a:p>
-          <a:p>
-            <a:r>
-              <a:rPr lang="de-CH" sz="1600" dirty="0" err="1"/>
-              <a:t>Predictions</a:t>
-            </a:r>
-            <a:r>
-              <a:rPr lang="de-CH" sz="1600" dirty="0"/>
-              <a:t>?</a:t>
-            </a:r>
-          </a:p>
         </p:txBody>
       </p:sp>
       <p:sp>
@@ -30180,7 +30359,7 @@
         </p:nvSpPr>
         <p:spPr>
           <a:xfrm>
-            <a:off x="5557450" y="2571750"/>
+            <a:off x="5733188" y="2508810"/>
             <a:ext cx="1058537" cy="440391"/>
           </a:xfrm>
           <a:prstGeom prst="rect">
@@ -30477,8 +30656,8 @@
         </p:nvSpPr>
         <p:spPr>
           <a:xfrm>
-            <a:off x="2779114" y="1951702"/>
-            <a:ext cx="2660221" cy="307777"/>
+            <a:off x="2924977" y="1814039"/>
+            <a:ext cx="1503719" cy="461665"/>
           </a:xfrm>
           <a:prstGeom prst="rect">
             <a:avLst/>
@@ -30492,7 +30671,7 @@
           <a:lstStyle/>
           <a:p>
             <a:r>
-              <a:rPr lang="de-CH" dirty="0" err="1">
+              <a:rPr lang="de-CH" sz="1200" dirty="0" err="1">
                 <a:solidFill>
                   <a:schemeClr val="accent4">
                     <a:lumMod val="75000"/>
@@ -30502,7 +30681,7 @@
               <a:t>Regarding</a:t>
             </a:r>
             <a:r>
-              <a:rPr lang="de-CH" dirty="0">
+              <a:rPr lang="de-CH" sz="1200" dirty="0">
                 <a:solidFill>
                   <a:schemeClr val="accent4">
                     <a:lumMod val="75000"/>
@@ -30512,7 +30691,7 @@
               <a:t> </a:t>
             </a:r>
             <a:r>
-              <a:rPr lang="de-CH" dirty="0" err="1">
+              <a:rPr lang="de-CH" sz="1200" dirty="0" err="1">
                 <a:solidFill>
                   <a:schemeClr val="accent4">
                     <a:lumMod val="75000"/>
@@ -30522,7 +30701,7 @@
               <a:t>loss</a:t>
             </a:r>
             <a:r>
-              <a:rPr lang="de-CH" dirty="0">
+              <a:rPr lang="de-CH" sz="1200" dirty="0">
                 <a:solidFill>
                   <a:schemeClr val="accent4">
                     <a:lumMod val="75000"/>
@@ -30531,17 +30710,26 @@
               </a:rPr>
               <a:t> </a:t>
             </a:r>
-            <a:r>
-              <a:rPr lang="de-CH" dirty="0" err="1">
+            <a:br>
+              <a:rPr lang="de-CH" sz="1200" dirty="0">
                 <a:solidFill>
                   <a:schemeClr val="accent4">
                     <a:lumMod val="75000"/>
                   </a:schemeClr>
                 </a:solidFill>
               </a:rPr>
+            </a:br>
+            <a:r>
+              <a:rPr lang="de-CH" sz="1200" dirty="0" err="1">
+                <a:solidFill>
+                  <a:schemeClr val="accent4">
+                    <a:lumMod val="75000"/>
+                  </a:schemeClr>
+                </a:solidFill>
+              </a:rPr>
               <a:t>improvement</a:t>
             </a:r>
-            <a:endParaRPr lang="de-CH" dirty="0">
+            <a:endParaRPr lang="de-CH" sz="1200" dirty="0">
               <a:solidFill>
                 <a:schemeClr val="accent4">
                   <a:lumMod val="75000"/>
@@ -30565,7 +30753,7 @@
         </p:nvCxnSpPr>
         <p:spPr>
           <a:xfrm flipH="1">
-            <a:off x="2862224" y="2238935"/>
+            <a:off x="2963801" y="2240372"/>
             <a:ext cx="129747" cy="147918"/>
           </a:xfrm>
           <a:prstGeom prst="straightConnector1">
@@ -30611,7 +30799,7 @@
         </p:nvCxnSpPr>
         <p:spPr>
           <a:xfrm>
-            <a:off x="3010383" y="2252756"/>
+            <a:off x="3195792" y="2238935"/>
             <a:ext cx="60457" cy="465044"/>
           </a:xfrm>
           <a:prstGeom prst="straightConnector1">
@@ -30641,6 +30829,370 @@
           </a:fontRef>
         </p:style>
       </p:cxnSp>
+      <p:sp>
+        <p:nvSpPr>
+          <p:cNvPr id="12" name="Google Shape;203;p17">
+            <a:extLst>
+              <a:ext uri="{FF2B5EF4-FFF2-40B4-BE49-F238E27FC236}">
+                <a16:creationId xmlns:a16="http://schemas.microsoft.com/office/drawing/2014/main" id="{5A9BEE0F-C185-466C-ADBE-4680574FC644}"/>
+              </a:ext>
+            </a:extLst>
+          </p:cNvPr>
+          <p:cNvSpPr txBox="1">
+            <a:spLocks/>
+          </p:cNvSpPr>
+          <p:nvPr/>
+        </p:nvSpPr>
+        <p:spPr>
+          <a:xfrm>
+            <a:off x="1185667" y="3531423"/>
+            <a:ext cx="2498827" cy="1200906"/>
+          </a:xfrm>
+          <a:prstGeom prst="rect">
+            <a:avLst/>
+          </a:prstGeom>
+          <a:noFill/>
+          <a:ln>
+            <a:noFill/>
+          </a:ln>
+        </p:spPr>
+        <p:style>
+          <a:lnRef idx="0">
+            <a:scrgbClr r="0" g="0" b="0"/>
+          </a:lnRef>
+          <a:fillRef idx="0">
+            <a:scrgbClr r="0" g="0" b="0"/>
+          </a:fillRef>
+          <a:effectRef idx="0">
+            <a:scrgbClr r="0" g="0" b="0"/>
+          </a:effectRef>
+          <a:fontRef idx="minor">
+            <a:schemeClr val="dk1"/>
+          </a:fontRef>
+        </p:style>
+        <p:txBody>
+          <a:bodyPr spcFirstLastPara="1" wrap="square" lIns="91425" tIns="91425" rIns="91425" bIns="91425" anchor="t" anchorCtr="0">
+            <a:noAutofit/>
+          </a:bodyPr>
+          <a:lstStyle>
+            <a:defPPr marR="0" lvl="0" algn="l" rtl="0">
+              <a:lnSpc>
+                <a:spcPct val="100000"/>
+              </a:lnSpc>
+              <a:spcBef>
+                <a:spcPts val="0"/>
+              </a:spcBef>
+              <a:spcAft>
+                <a:spcPts val="0"/>
+              </a:spcAft>
+            </a:defPPr>
+            <a:lvl1pPr marL="457200" marR="0" lvl="0" indent="-355600" algn="l" rtl="0">
+              <a:lnSpc>
+                <a:spcPct val="100000"/>
+              </a:lnSpc>
+              <a:spcBef>
+                <a:spcPts val="600"/>
+              </a:spcBef>
+              <a:spcAft>
+                <a:spcPts val="0"/>
+              </a:spcAft>
+              <a:buClr>
+                <a:srgbClr val="4BB5D9"/>
+              </a:buClr>
+              <a:buSzPts val="2000"/>
+              <a:buFont typeface="Roboto Condensed"/>
+              <a:buChar char="»"/>
+              <a:defRPr sz="2000" b="0" i="0" u="none" strike="noStrike" cap="none">
+                <a:solidFill>
+                  <a:srgbClr val="607896"/>
+                </a:solidFill>
+                <a:latin typeface="Roboto Condensed"/>
+                <a:ea typeface="Roboto Condensed"/>
+                <a:cs typeface="Roboto Condensed"/>
+                <a:sym typeface="Roboto Condensed"/>
+              </a:defRPr>
+            </a:lvl1pPr>
+            <a:lvl2pPr marL="914400" marR="0" lvl="1" indent="-355600" algn="l" rtl="0">
+              <a:lnSpc>
+                <a:spcPct val="100000"/>
+              </a:lnSpc>
+              <a:spcBef>
+                <a:spcPts val="0"/>
+              </a:spcBef>
+              <a:spcAft>
+                <a:spcPts val="0"/>
+              </a:spcAft>
+              <a:buClr>
+                <a:srgbClr val="4BB5D9"/>
+              </a:buClr>
+              <a:buSzPts val="2000"/>
+              <a:buFont typeface="Roboto Condensed"/>
+              <a:buChar char="⋄"/>
+              <a:defRPr sz="2000" b="0" i="0" u="none" strike="noStrike" cap="none">
+                <a:solidFill>
+                  <a:srgbClr val="607896"/>
+                </a:solidFill>
+                <a:latin typeface="Roboto Condensed"/>
+                <a:ea typeface="Roboto Condensed"/>
+                <a:cs typeface="Roboto Condensed"/>
+                <a:sym typeface="Roboto Condensed"/>
+              </a:defRPr>
+            </a:lvl2pPr>
+            <a:lvl3pPr marL="1371600" marR="0" lvl="2" indent="-355600" algn="l" rtl="0">
+              <a:lnSpc>
+                <a:spcPct val="100000"/>
+              </a:lnSpc>
+              <a:spcBef>
+                <a:spcPts val="0"/>
+              </a:spcBef>
+              <a:spcAft>
+                <a:spcPts val="0"/>
+              </a:spcAft>
+              <a:buClr>
+                <a:srgbClr val="607896"/>
+              </a:buClr>
+              <a:buSzPts val="2000"/>
+              <a:buFont typeface="Roboto Condensed"/>
+              <a:buChar char="⋄"/>
+              <a:defRPr sz="2000" b="0" i="0" u="none" strike="noStrike" cap="none">
+                <a:solidFill>
+                  <a:srgbClr val="607896"/>
+                </a:solidFill>
+                <a:latin typeface="Roboto Condensed"/>
+                <a:ea typeface="Roboto Condensed"/>
+                <a:cs typeface="Roboto Condensed"/>
+                <a:sym typeface="Roboto Condensed"/>
+              </a:defRPr>
+            </a:lvl3pPr>
+            <a:lvl4pPr marL="1828800" marR="0" lvl="3" indent="-355600" algn="l" rtl="0">
+              <a:lnSpc>
+                <a:spcPct val="100000"/>
+              </a:lnSpc>
+              <a:spcBef>
+                <a:spcPts val="0"/>
+              </a:spcBef>
+              <a:spcAft>
+                <a:spcPts val="0"/>
+              </a:spcAft>
+              <a:buClr>
+                <a:srgbClr val="607896"/>
+              </a:buClr>
+              <a:buSzPts val="2000"/>
+              <a:buFont typeface="Roboto Condensed"/>
+              <a:buChar char="⋄"/>
+              <a:defRPr sz="2000" b="0" i="0" u="none" strike="noStrike" cap="none">
+                <a:solidFill>
+                  <a:srgbClr val="607896"/>
+                </a:solidFill>
+                <a:latin typeface="Roboto Condensed"/>
+                <a:ea typeface="Roboto Condensed"/>
+                <a:cs typeface="Roboto Condensed"/>
+                <a:sym typeface="Roboto Condensed"/>
+              </a:defRPr>
+            </a:lvl4pPr>
+            <a:lvl5pPr marL="2286000" marR="0" lvl="4" indent="-355600" algn="l" rtl="0">
+              <a:lnSpc>
+                <a:spcPct val="100000"/>
+              </a:lnSpc>
+              <a:spcBef>
+                <a:spcPts val="0"/>
+              </a:spcBef>
+              <a:spcAft>
+                <a:spcPts val="0"/>
+              </a:spcAft>
+              <a:buClr>
+                <a:srgbClr val="607896"/>
+              </a:buClr>
+              <a:buSzPts val="2000"/>
+              <a:buFont typeface="Roboto Condensed"/>
+              <a:buChar char="⋄"/>
+              <a:defRPr sz="2000" b="0" i="0" u="none" strike="noStrike" cap="none">
+                <a:solidFill>
+                  <a:srgbClr val="607896"/>
+                </a:solidFill>
+                <a:latin typeface="Roboto Condensed"/>
+                <a:ea typeface="Roboto Condensed"/>
+                <a:cs typeface="Roboto Condensed"/>
+                <a:sym typeface="Roboto Condensed"/>
+              </a:defRPr>
+            </a:lvl5pPr>
+            <a:lvl6pPr marL="2743200" marR="0" lvl="5" indent="-355600" algn="l" rtl="0">
+              <a:lnSpc>
+                <a:spcPct val="100000"/>
+              </a:lnSpc>
+              <a:spcBef>
+                <a:spcPts val="0"/>
+              </a:spcBef>
+              <a:spcAft>
+                <a:spcPts val="0"/>
+              </a:spcAft>
+              <a:buClr>
+                <a:srgbClr val="607896"/>
+              </a:buClr>
+              <a:buSzPts val="2000"/>
+              <a:buFont typeface="Roboto Condensed"/>
+              <a:buChar char="⋄"/>
+              <a:defRPr sz="2000" b="0" i="0" u="none" strike="noStrike" cap="none">
+                <a:solidFill>
+                  <a:srgbClr val="607896"/>
+                </a:solidFill>
+                <a:latin typeface="Roboto Condensed"/>
+                <a:ea typeface="Roboto Condensed"/>
+                <a:cs typeface="Roboto Condensed"/>
+                <a:sym typeface="Roboto Condensed"/>
+              </a:defRPr>
+            </a:lvl6pPr>
+            <a:lvl7pPr marL="3200400" marR="0" lvl="6" indent="-355600" algn="l" rtl="0">
+              <a:lnSpc>
+                <a:spcPct val="100000"/>
+              </a:lnSpc>
+              <a:spcBef>
+                <a:spcPts val="0"/>
+              </a:spcBef>
+              <a:spcAft>
+                <a:spcPts val="0"/>
+              </a:spcAft>
+              <a:buClr>
+                <a:srgbClr val="607896"/>
+              </a:buClr>
+              <a:buSzPts val="2000"/>
+              <a:buFont typeface="Roboto Condensed"/>
+              <a:buChar char="●"/>
+              <a:defRPr sz="2000" b="0" i="0" u="none" strike="noStrike" cap="none">
+                <a:solidFill>
+                  <a:srgbClr val="607896"/>
+                </a:solidFill>
+                <a:latin typeface="Roboto Condensed"/>
+                <a:ea typeface="Roboto Condensed"/>
+                <a:cs typeface="Roboto Condensed"/>
+                <a:sym typeface="Roboto Condensed"/>
+              </a:defRPr>
+            </a:lvl7pPr>
+            <a:lvl8pPr marL="3657600" marR="0" lvl="7" indent="-355600" algn="l" rtl="0">
+              <a:lnSpc>
+                <a:spcPct val="100000"/>
+              </a:lnSpc>
+              <a:spcBef>
+                <a:spcPts val="0"/>
+              </a:spcBef>
+              <a:spcAft>
+                <a:spcPts val="0"/>
+              </a:spcAft>
+              <a:buClr>
+                <a:srgbClr val="607896"/>
+              </a:buClr>
+              <a:buSzPts val="2000"/>
+              <a:buFont typeface="Roboto Condensed"/>
+              <a:buChar char="○"/>
+              <a:defRPr sz="2000" b="0" i="0" u="none" strike="noStrike" cap="none">
+                <a:solidFill>
+                  <a:srgbClr val="607896"/>
+                </a:solidFill>
+                <a:latin typeface="Roboto Condensed"/>
+                <a:ea typeface="Roboto Condensed"/>
+                <a:cs typeface="Roboto Condensed"/>
+                <a:sym typeface="Roboto Condensed"/>
+              </a:defRPr>
+            </a:lvl8pPr>
+            <a:lvl9pPr marL="4114800" marR="0" lvl="8" indent="-355600" algn="l" rtl="0">
+              <a:lnSpc>
+                <a:spcPct val="100000"/>
+              </a:lnSpc>
+              <a:spcBef>
+                <a:spcPts val="0"/>
+              </a:spcBef>
+              <a:spcAft>
+                <a:spcPts val="0"/>
+              </a:spcAft>
+              <a:buClr>
+                <a:srgbClr val="607896"/>
+              </a:buClr>
+              <a:buSzPts val="2000"/>
+              <a:buFont typeface="Roboto Condensed"/>
+              <a:buChar char="■"/>
+              <a:defRPr sz="2000" b="0" i="0" u="none" strike="noStrike" cap="none">
+                <a:solidFill>
+                  <a:srgbClr val="607896"/>
+                </a:solidFill>
+                <a:latin typeface="Roboto Condensed"/>
+                <a:ea typeface="Roboto Condensed"/>
+                <a:cs typeface="Roboto Condensed"/>
+                <a:sym typeface="Roboto Condensed"/>
+              </a:defRPr>
+            </a:lvl9pPr>
+          </a:lstStyle>
+          <a:p>
+            <a:r>
+              <a:rPr lang="de-CH" sz="1400" dirty="0" err="1"/>
+              <a:t>Typical</a:t>
+            </a:r>
+            <a:r>
+              <a:rPr lang="de-CH" sz="1400" dirty="0"/>
+              <a:t> </a:t>
+            </a:r>
+            <a:r>
+              <a:rPr lang="de-CH" sz="1400" dirty="0" err="1"/>
+              <a:t>losses</a:t>
+            </a:r>
+            <a:r>
+              <a:rPr lang="de-CH" sz="1400" dirty="0"/>
+              <a:t>: MSE, </a:t>
+            </a:r>
+            <a:br>
+              <a:rPr lang="de-CH" sz="1400" u="sng" dirty="0"/>
+            </a:br>
+            <a:r>
+              <a:rPr lang="de-CH" sz="1400" dirty="0"/>
+              <a:t>log </a:t>
+            </a:r>
+            <a:r>
+              <a:rPr lang="de-CH" sz="1400" dirty="0" err="1"/>
+              <a:t>loss</a:t>
+            </a:r>
+            <a:r>
+              <a:rPr lang="de-CH" sz="1400" dirty="0"/>
+              <a:t>/</a:t>
+            </a:r>
+            <a:r>
+              <a:rPr lang="de-CH" sz="1400" dirty="0" err="1"/>
+              <a:t>cross-entropy</a:t>
+            </a:r>
+            <a:r>
+              <a:rPr lang="de-CH" sz="1400" dirty="0"/>
+              <a:t>/ </a:t>
+            </a:r>
+            <a:br>
+              <a:rPr lang="de-CH" sz="1400" dirty="0"/>
+            </a:br>
+            <a:r>
+              <a:rPr lang="de-CH" sz="1400" dirty="0" err="1"/>
+              <a:t>information</a:t>
+            </a:r>
+            <a:r>
+              <a:rPr lang="de-CH" sz="1400" dirty="0"/>
+              <a:t> </a:t>
+            </a:r>
+            <a:r>
+              <a:rPr lang="de-CH" sz="1400" dirty="0" err="1"/>
+              <a:t>or</a:t>
+            </a:r>
+            <a:r>
+              <a:rPr lang="de-CH" sz="1400" dirty="0"/>
+              <a:t> Gini</a:t>
+            </a:r>
+          </a:p>
+          <a:p>
+            <a:r>
+              <a:rPr lang="de-CH" sz="1400" dirty="0" err="1"/>
+              <a:t>Predictions</a:t>
+            </a:r>
+            <a:r>
+              <a:rPr lang="de-CH" sz="1400" dirty="0"/>
+              <a:t>?</a:t>
+            </a:r>
+          </a:p>
+        </p:txBody>
+      </p:sp>
     </p:spTree>
     <p:extLst>
       <p:ext uri="{BB962C8B-B14F-4D97-AF65-F5344CB8AC3E}">
@@ -32528,7 +33080,14 @@
           <a:p>
             <a:r>
               <a:rPr lang="en-US" dirty="0"/>
-              <a:t>Group of many decision trees</a:t>
+              <a:t>Group of many </a:t>
+            </a:r>
+            <a:br>
+              <a:rPr lang="en-US" dirty="0"/>
+            </a:br>
+            <a:r>
+              <a:rPr lang="en-US" dirty="0"/>
+              <a:t>decision trees</a:t>
             </a:r>
           </a:p>
           <a:p>
@@ -32558,7 +33117,14 @@
             </a:r>
             <a:r>
               <a:rPr lang="de-CH" dirty="0"/>
-              <a:t> 2001 (</a:t>
+              <a:t> 2001 </a:t>
+            </a:r>
+            <a:br>
+              <a:rPr lang="de-CH" dirty="0"/>
+            </a:br>
+            <a:r>
+              <a:rPr lang="de-CH" dirty="0"/>
+              <a:t>(</a:t>
             </a:r>
             <a:r>
               <a:rPr lang="de-CH" dirty="0" err="1"/>
@@ -32765,8 +33331,8 @@
         </p:nvSpPr>
         <p:spPr>
           <a:xfrm>
-            <a:off x="1031424" y="1777125"/>
-            <a:ext cx="6337563" cy="2861620"/>
+            <a:off x="1031425" y="1783849"/>
+            <a:ext cx="6882170" cy="2216650"/>
           </a:xfrm>
           <a:prstGeom prst="rect">
             <a:avLst/>
@@ -35887,72 +36453,72 @@
           <a:lstStyle/>
           <a:p>
             <a:r>
-              <a:rPr lang="en-US" dirty="0"/>
+              <a:rPr lang="en-US" sz="1800" dirty="0"/>
               <a:t>Group of many decision trees</a:t>
             </a:r>
           </a:p>
           <a:p>
             <a:r>
-              <a:rPr lang="en-US" dirty="0"/>
+              <a:rPr lang="en-US" sz="1800" dirty="0"/>
               <a:t>Perform very well</a:t>
             </a:r>
           </a:p>
           <a:p>
             <a:r>
-              <a:rPr lang="en-US" dirty="0"/>
+              <a:rPr lang="en-US" sz="1800" dirty="0"/>
               <a:t>“Black Box”</a:t>
             </a:r>
           </a:p>
           <a:p>
             <a:r>
-              <a:rPr lang="de-CH" dirty="0" err="1"/>
+              <a:rPr lang="de-CH" sz="1800" dirty="0" err="1"/>
               <a:t>Around</a:t>
             </a:r>
             <a:r>
-              <a:rPr lang="de-CH" dirty="0"/>
+              <a:rPr lang="de-CH" sz="1800" dirty="0"/>
               <a:t> </a:t>
             </a:r>
             <a:r>
-              <a:rPr lang="de-CH" dirty="0" err="1"/>
+              <a:rPr lang="de-CH" sz="1800" dirty="0" err="1"/>
               <a:t>since</a:t>
             </a:r>
             <a:r>
-              <a:rPr lang="de-CH" dirty="0"/>
+              <a:rPr lang="de-CH" sz="1800" dirty="0"/>
               <a:t> 2001 (Friedman)</a:t>
             </a:r>
           </a:p>
           <a:p>
             <a:r>
-              <a:rPr lang="de-CH" dirty="0" err="1">
+              <a:rPr lang="de-CH" sz="1800" dirty="0" err="1">
                 <a:hlinkClick r:id="rId3"/>
               </a:rPr>
               <a:t>XGBoost</a:t>
             </a:r>
             <a:r>
-              <a:rPr lang="de-CH" dirty="0">
+              <a:rPr lang="de-CH" sz="1800" dirty="0">
                 <a:hlinkClick r:id="rId3"/>
               </a:rPr>
               <a:t>, </a:t>
             </a:r>
             <a:r>
-              <a:rPr lang="de-CH" dirty="0" err="1">
+              <a:rPr lang="de-CH" sz="1800" dirty="0" err="1">
                 <a:hlinkClick r:id="rId3"/>
               </a:rPr>
               <a:t>LightGBM</a:t>
             </a:r>
             <a:r>
-              <a:rPr lang="de-CH" dirty="0">
+              <a:rPr lang="de-CH" sz="1800" dirty="0">
                 <a:hlinkClick r:id="rId3"/>
               </a:rPr>
               <a:t>, </a:t>
             </a:r>
             <a:r>
-              <a:rPr lang="de-CH" dirty="0" err="1">
+              <a:rPr lang="de-CH" sz="1800" dirty="0" err="1">
                 <a:hlinkClick r:id="rId3"/>
               </a:rPr>
               <a:t>CatBoost</a:t>
             </a:r>
-            <a:endParaRPr lang="de-CH" dirty="0"/>
+            <a:endParaRPr lang="de-CH" sz="1800" dirty="0"/>
           </a:p>
           <a:p>
             <a:endParaRPr lang="de-CH" dirty="0"/>
@@ -36090,7 +36656,7 @@
         <p:spPr>
           <a:xfrm>
             <a:off x="4242546" y="2233673"/>
-            <a:ext cx="472473" cy="1448330"/>
+            <a:ext cx="472473" cy="1376862"/>
           </a:xfrm>
           <a:prstGeom prst="rightBrace">
             <a:avLst>
@@ -36136,7 +36702,7 @@
         </p:nvSpPr>
         <p:spPr>
           <a:xfrm>
-            <a:off x="4749597" y="3056714"/>
+            <a:off x="4749597" y="3009658"/>
             <a:ext cx="1755609" cy="307777"/>
           </a:xfrm>
           <a:prstGeom prst="rect">
@@ -36266,7 +36832,7 @@
         <p:spPr>
           <a:xfrm>
             <a:off x="1031425" y="1830425"/>
-            <a:ext cx="5591251" cy="1678769"/>
+            <a:ext cx="6277051" cy="1678769"/>
           </a:xfrm>
           <a:prstGeom prst="rect">
             <a:avLst/>
@@ -37188,7 +37754,7 @@
         <p:spPr>
           <a:xfrm>
             <a:off x="1031424" y="1777125"/>
-            <a:ext cx="5947599" cy="2606616"/>
+            <a:ext cx="6156029" cy="2364569"/>
           </a:xfrm>
           <a:prstGeom prst="rect">
             <a:avLst/>
@@ -37543,8 +38109,8 @@
         </p:nvSpPr>
         <p:spPr>
           <a:xfrm>
-            <a:off x="5977178" y="2088492"/>
-            <a:ext cx="1345280" cy="1169551"/>
+            <a:off x="5977177" y="2088492"/>
+            <a:ext cx="2010375" cy="738664"/>
           </a:xfrm>
           <a:prstGeom prst="rect">
             <a:avLst/>
@@ -37574,24 +38140,14 @@
               <a:buNone/>
             </a:pPr>
             <a:r>
-              <a:rPr lang="de-CH">
+              <a:rPr lang="de-CH" dirty="0">
                 <a:solidFill>
                   <a:schemeClr val="accent4">
                     <a:lumMod val="75000"/>
                   </a:schemeClr>
                 </a:solidFill>
               </a:rPr>
-              <a:t>- Loss </a:t>
-            </a:r>
-            <a:r>
-              <a:rPr lang="de-CH" dirty="0">
-                <a:solidFill>
-                  <a:schemeClr val="accent4">
-                    <a:lumMod val="75000"/>
-                  </a:schemeClr>
-                </a:solidFill>
-              </a:rPr>
-              <a:t>versus </a:t>
+              <a:t>- Loss versus </a:t>
             </a:r>
             <a:r>
               <a:rPr lang="de-CH" dirty="0" err="1">
@@ -38631,8 +39187,8 @@
         </p:nvSpPr>
         <p:spPr>
           <a:xfrm>
-            <a:off x="939737" y="1929652"/>
-            <a:ext cx="4681134" cy="2440641"/>
+            <a:off x="939737" y="1936376"/>
+            <a:ext cx="5185398" cy="2111189"/>
           </a:xfrm>
           <a:prstGeom prst="rect">
             <a:avLst/>
@@ -38924,9 +39480,6 @@
               <a:rPr lang="de-CH" dirty="0" err="1"/>
               <a:t>PyTorch</a:t>
             </a:r>
-            <a:endParaRPr lang="de-CH" dirty="0"/>
-          </a:p>
-          <a:p>
             <a:endParaRPr lang="de-CH" dirty="0"/>
           </a:p>
         </p:txBody>
@@ -42660,8 +43213,8 @@
             </p:nvSpPr>
             <p:spPr>
               <a:xfrm>
-                <a:off x="939737" y="1768288"/>
-                <a:ext cx="4593727" cy="2602005"/>
+                <a:off x="939737" y="1768289"/>
+                <a:ext cx="5158504" cy="1321802"/>
               </a:xfrm>
               <a:prstGeom prst="rect">
                 <a:avLst/>
@@ -43097,8 +43650,8 @@
             </p:nvSpPr>
             <p:spPr>
               <a:xfrm>
-                <a:off x="939737" y="1768288"/>
-                <a:ext cx="4593727" cy="2602005"/>
+                <a:off x="939737" y="1768289"/>
+                <a:ext cx="5158504" cy="1321802"/>
               </a:xfrm>
               <a:prstGeom prst="rect">
                 <a:avLst/>
@@ -43106,7 +43659,7 @@
               <a:blipFill>
                 <a:blip r:embed="rId4"/>
                 <a:stretch>
-                  <a:fillRect/>
+                  <a:fillRect b="-6912"/>
                 </a:stretch>
               </a:blipFill>
               <a:ln>
@@ -43353,8 +43906,8 @@
         </p:nvCxnSpPr>
         <p:spPr>
           <a:xfrm flipH="1" flipV="1">
-            <a:off x="2478009" y="4316375"/>
-            <a:ext cx="1210150" cy="244332"/>
+            <a:off x="2640217" y="4346454"/>
+            <a:ext cx="1094448" cy="200753"/>
           </a:xfrm>
           <a:prstGeom prst="straightConnector1">
             <a:avLst/>
@@ -43394,8 +43947,8 @@
         </p:nvCxnSpPr>
         <p:spPr>
           <a:xfrm flipV="1">
-            <a:off x="3756988" y="4061012"/>
-            <a:ext cx="744845" cy="479503"/>
+            <a:off x="3756988" y="4155141"/>
+            <a:ext cx="532624" cy="385375"/>
           </a:xfrm>
           <a:prstGeom prst="straightConnector1">
             <a:avLst/>
@@ -43435,8 +43988,8 @@
         </p:nvCxnSpPr>
         <p:spPr>
           <a:xfrm flipH="1" flipV="1">
-            <a:off x="2444588" y="3789886"/>
-            <a:ext cx="1290076" cy="744070"/>
+            <a:off x="2640216" y="3854314"/>
+            <a:ext cx="1094449" cy="679642"/>
           </a:xfrm>
           <a:prstGeom prst="straightConnector1">
             <a:avLst/>
@@ -43522,7 +44075,7 @@
         </p:nvSpPr>
         <p:spPr>
           <a:xfrm>
-            <a:off x="1577354" y="4504398"/>
+            <a:off x="6498978" y="2299080"/>
             <a:ext cx="1183337" cy="400110"/>
           </a:xfrm>
           <a:prstGeom prst="rect">
@@ -43727,8 +44280,8 @@
         </p:nvSpPr>
         <p:spPr>
           <a:xfrm>
-            <a:off x="939737" y="1768288"/>
-            <a:ext cx="5851988" cy="2749924"/>
+            <a:off x="939736" y="1768288"/>
+            <a:ext cx="6523381" cy="2749924"/>
           </a:xfrm>
           <a:prstGeom prst="rect">
             <a:avLst/>
@@ -44118,8 +44671,8 @@
         </p:nvSpPr>
         <p:spPr>
           <a:xfrm>
-            <a:off x="5056396" y="3488291"/>
-            <a:ext cx="1735329" cy="1010967"/>
+            <a:off x="6159054" y="3313076"/>
+            <a:ext cx="1882286" cy="1010967"/>
           </a:xfrm>
           <a:prstGeom prst="rect">
             <a:avLst/>
@@ -50244,7 +50797,15 @@
           <a:p>
             <a:r>
               <a:rPr lang="en-US" dirty="0"/>
-              <a:t>Comparison of some ML Algorithms</a:t>
+              <a:t>Comparison </a:t>
+            </a:r>
+            <a:r>
+              <a:rPr lang="en-US"/>
+              <a:t>of ML </a:t>
+            </a:r>
+            <a:r>
+              <a:rPr lang="en-US" dirty="0"/>
+              <a:t>Algorithms</a:t>
             </a:r>
             <a:endParaRPr dirty="0"/>
           </a:p>
@@ -50414,7 +50975,7 @@
         </p:blipFill>
         <p:spPr bwMode="auto">
           <a:xfrm>
-            <a:off x="2048676" y="2826676"/>
+            <a:off x="2048676" y="2842309"/>
             <a:ext cx="2362200" cy="1933575"/>
           </a:xfrm>
           <a:prstGeom prst="rect">
@@ -50478,7 +51039,7 @@
         <p:spPr>
           <a:xfrm>
             <a:off x="1031425" y="1777125"/>
-            <a:ext cx="2989247" cy="2754534"/>
+            <a:ext cx="3088652" cy="2754534"/>
           </a:xfrm>
           <a:prstGeom prst="rect">
             <a:avLst/>
@@ -50727,8 +51288,8 @@
           </a:p>
         </p:txBody>
       </p:sp>
-      <mc:AlternateContent xmlns:mc="http://schemas.openxmlformats.org/markup-compatibility/2006" xmlns:a14="http://schemas.microsoft.com/office/drawing/2010/main">
-        <mc:Choice Requires="a14">
+      <mc:AlternateContent xmlns:mc="http://schemas.openxmlformats.org/markup-compatibility/2006">
+        <mc:Choice xmlns:a14="http://schemas.microsoft.com/office/drawing/2010/main" Requires="a14">
           <p:sp>
             <p:nvSpPr>
               <p:cNvPr id="203" name="Google Shape;203;p17"/>
@@ -50742,7 +51303,7 @@
             <p:spPr>
               <a:xfrm>
                 <a:off x="1031424" y="1777125"/>
-                <a:ext cx="5913981" cy="2521200"/>
+                <a:ext cx="6498929" cy="2521200"/>
               </a:xfrm>
               <a:prstGeom prst="rect">
                 <a:avLst/>
@@ -50769,16 +51330,16 @@
                   </a:rPr>
                   <a:t>response variable </a:t>
                 </a:r>
-                <a:r>
-                  <a:rPr lang="en-GB" i="1" dirty="0">
-                    <a:solidFill>
-                      <a:schemeClr val="accent1">
-                        <a:lumMod val="50000"/>
-                      </a:schemeClr>
-                    </a:solidFill>
-                  </a:rPr>
-                  <a:t>Y</a:t>
-                </a:r>
+                <a14:m>
+                  <m:oMath xmlns:m="http://schemas.openxmlformats.org/officeDocument/2006/math">
+                    <m:r>
+                      <a:rPr lang="en-GB" i="1">
+                        <a:latin typeface="Cambria Math" panose="02040503050406030204" pitchFamily="18" charset="0"/>
+                      </a:rPr>
+                      <m:t>𝑌</m:t>
+                    </m:r>
+                  </m:oMath>
+                </a14:m>
                 <a:r>
                   <a:rPr lang="en-GB" b="0" dirty="0"/>
                   <a:t> by </a:t>
@@ -51089,7 +51650,7 @@
             </p:txBody>
           </p:sp>
         </mc:Choice>
-        <mc:Fallback xmlns="">
+        <mc:Fallback>
           <p:sp>
             <p:nvSpPr>
               <p:cNvPr id="203" name="Google Shape;203;p17"/>
@@ -51103,7 +51664,7 @@
             <p:spPr>
               <a:xfrm>
                 <a:off x="1031424" y="1777125"/>
-                <a:ext cx="5913981" cy="2521200"/>
+                <a:ext cx="6498929" cy="2521200"/>
               </a:xfrm>
               <a:prstGeom prst="rect">
                 <a:avLst/>
@@ -51111,7 +51672,7 @@
               <a:blipFill>
                 <a:blip r:embed="rId3"/>
                 <a:stretch>
-                  <a:fillRect r="-1134"/>
+                  <a:fillRect r="-657"/>
                 </a:stretch>
               </a:blipFill>
             </p:spPr>
@@ -51180,7 +51741,7 @@
         </p:nvCxnSpPr>
         <p:spPr>
           <a:xfrm flipV="1">
-            <a:off x="2796988" y="4054288"/>
+            <a:off x="3065929" y="4036106"/>
             <a:ext cx="53788" cy="244037"/>
           </a:xfrm>
           <a:prstGeom prst="straightConnector1">
@@ -51219,7 +51780,7 @@
         </p:nvSpPr>
         <p:spPr>
           <a:xfrm>
-            <a:off x="1788459" y="4229100"/>
+            <a:off x="2057400" y="4210918"/>
             <a:ext cx="2282997" cy="523220"/>
           </a:xfrm>
           <a:prstGeom prst="rect">
@@ -51480,7 +52041,7 @@
         </p:nvCxnSpPr>
         <p:spPr>
           <a:xfrm>
-            <a:off x="5525742" y="1706715"/>
+            <a:off x="5756157" y="1717604"/>
             <a:ext cx="162563" cy="281617"/>
           </a:xfrm>
           <a:prstGeom prst="straightConnector1">

</xml_diff>

<commit_message>
improved explanation of embedding and encoding.
</commit_message>
<xml_diff>
--- a/slides/ML_Lecture.pptx
+++ b/slides/ML_Lecture.pptx
@@ -12457,8 +12457,8 @@
           </a:p>
         </p:txBody>
       </p:sp>
-      <mc:AlternateContent xmlns:mc="http://schemas.openxmlformats.org/markup-compatibility/2006">
-        <mc:Choice xmlns:a14="http://schemas.microsoft.com/office/drawing/2010/main" Requires="a14">
+      <mc:AlternateContent xmlns:mc="http://schemas.openxmlformats.org/markup-compatibility/2006" xmlns:a14="http://schemas.microsoft.com/office/drawing/2010/main">
+        <mc:Choice Requires="a14">
           <p:sp>
             <p:nvSpPr>
               <p:cNvPr id="203" name="Google Shape;203;p17"/>
@@ -13150,7 +13150,7 @@
             </p:txBody>
           </p:sp>
         </mc:Choice>
-        <mc:Fallback>
+        <mc:Fallback xmlns="">
           <p:sp>
             <p:nvSpPr>
               <p:cNvPr id="203" name="Google Shape;203;p17"/>
@@ -13313,8 +13313,8 @@
           </a:p>
         </p:txBody>
       </p:sp>
-      <mc:AlternateContent xmlns:mc="http://schemas.openxmlformats.org/markup-compatibility/2006">
-        <mc:Choice xmlns:a14="http://schemas.microsoft.com/office/drawing/2010/main" Requires="a14">
+      <mc:AlternateContent xmlns:mc="http://schemas.openxmlformats.org/markup-compatibility/2006" xmlns:a14="http://schemas.microsoft.com/office/drawing/2010/main">
+        <mc:Choice Requires="a14">
           <p:sp>
             <p:nvSpPr>
               <p:cNvPr id="4" name="Textfeld 3">
@@ -13489,7 +13489,7 @@
             </p:txBody>
           </p:sp>
         </mc:Choice>
-        <mc:Fallback>
+        <mc:Fallback xmlns="">
           <p:sp>
             <p:nvSpPr>
               <p:cNvPr id="4" name="Textfeld 3">
@@ -13597,8 +13597,8 @@
           </a:p>
         </p:txBody>
       </p:sp>
-      <mc:AlternateContent xmlns:mc="http://schemas.openxmlformats.org/markup-compatibility/2006">
-        <mc:Choice xmlns:a14="http://schemas.microsoft.com/office/drawing/2010/main" Requires="a14">
+      <mc:AlternateContent xmlns:mc="http://schemas.openxmlformats.org/markup-compatibility/2006" xmlns:a14="http://schemas.microsoft.com/office/drawing/2010/main">
+        <mc:Choice Requires="a14">
           <p:sp>
             <p:nvSpPr>
               <p:cNvPr id="203" name="Google Shape;203;p17"/>
@@ -14020,7 +14020,7 @@
             </p:txBody>
           </p:sp>
         </mc:Choice>
-        <mc:Fallback>
+        <mc:Fallback xmlns="">
           <p:sp>
             <p:nvSpPr>
               <p:cNvPr id="203" name="Google Shape;203;p17"/>
@@ -14635,19 +14635,7 @@
                       <a:rPr lang="de-CH" sz="1600" b="0" i="1" smtClean="0">
                         <a:latin typeface="Cambria Math" panose="02040503050406030204" pitchFamily="18" charset="0"/>
                       </a:rPr>
-                      <m:t>(</m:t>
-                    </m:r>
-                    <m:r>
-                      <a:rPr lang="de-CH" sz="1600" b="0" i="1" smtClean="0">
-                        <a:latin typeface="Cambria Math" panose="02040503050406030204" pitchFamily="18" charset="0"/>
-                      </a:rPr>
-                      <m:t>0</m:t>
-                    </m:r>
-                    <m:r>
-                      <a:rPr lang="de-CH" sz="1600" b="0" i="1" smtClean="0">
-                        <a:latin typeface="Cambria Math" panose="02040503050406030204" pitchFamily="18" charset="0"/>
-                      </a:rPr>
-                      <m:t>, </m:t>
+                      <m:t>(0, </m:t>
                     </m:r>
                     <m:sSup>
                       <m:sSupPr>
@@ -19085,8 +19073,8 @@
           </a:p>
         </p:txBody>
       </p:sp>
-      <mc:AlternateContent xmlns:mc="http://schemas.openxmlformats.org/markup-compatibility/2006">
-        <mc:Choice xmlns:a14="http://schemas.microsoft.com/office/drawing/2010/main" Requires="a14">
+      <mc:AlternateContent xmlns:mc="http://schemas.openxmlformats.org/markup-compatibility/2006" xmlns:a14="http://schemas.microsoft.com/office/drawing/2010/main">
+        <mc:Choice Requires="a14">
           <p:sp>
             <p:nvSpPr>
               <p:cNvPr id="203" name="Google Shape;203;p17"/>
@@ -19510,7 +19498,7 @@
             </p:txBody>
           </p:sp>
         </mc:Choice>
-        <mc:Fallback>
+        <mc:Fallback xmlns="">
           <p:sp>
             <p:nvSpPr>
               <p:cNvPr id="203" name="Google Shape;203;p17"/>
@@ -22010,8 +21998,8 @@
           </a:p>
         </p:txBody>
       </p:sp>
-      <mc:AlternateContent xmlns:mc="http://schemas.openxmlformats.org/markup-compatibility/2006">
-        <mc:Choice xmlns:a14="http://schemas.microsoft.com/office/drawing/2010/main" Requires="a14">
+      <mc:AlternateContent xmlns:mc="http://schemas.openxmlformats.org/markup-compatibility/2006" xmlns:a14="http://schemas.microsoft.com/office/drawing/2010/main">
+        <mc:Choice Requires="a14">
           <p:sp>
             <p:nvSpPr>
               <p:cNvPr id="203" name="Google Shape;203;p17"/>
@@ -22413,7 +22401,7 @@
             </p:txBody>
           </p:sp>
         </mc:Choice>
-        <mc:Fallback>
+        <mc:Fallback xmlns="">
           <p:sp>
             <p:nvSpPr>
               <p:cNvPr id="203" name="Google Shape;203;p17"/>
@@ -45527,17 +45515,7 @@
                   </a:schemeClr>
                 </a:solidFill>
               </a:rPr>
-              <a:t>Embedding/</a:t>
-            </a:r>
-            <a:r>
-              <a:rPr lang="de-CH" sz="1400" dirty="0" err="1">
-                <a:solidFill>
-                  <a:schemeClr val="accent4">
-                    <a:lumMod val="75000"/>
-                  </a:schemeClr>
-                </a:solidFill>
-              </a:rPr>
-              <a:t>encoding</a:t>
+              <a:t>Encoding</a:t>
             </a:r>
             <a:r>
               <a:rPr lang="de-CH" sz="1400" dirty="0"/>
@@ -51288,8 +51266,8 @@
           </a:p>
         </p:txBody>
       </p:sp>
-      <mc:AlternateContent xmlns:mc="http://schemas.openxmlformats.org/markup-compatibility/2006">
-        <mc:Choice xmlns:a14="http://schemas.microsoft.com/office/drawing/2010/main" Requires="a14">
+      <mc:AlternateContent xmlns:mc="http://schemas.openxmlformats.org/markup-compatibility/2006" xmlns:a14="http://schemas.microsoft.com/office/drawing/2010/main">
+        <mc:Choice Requires="a14">
           <p:sp>
             <p:nvSpPr>
               <p:cNvPr id="203" name="Google Shape;203;p17"/>
@@ -51650,7 +51628,7 @@
             </p:txBody>
           </p:sp>
         </mc:Choice>
-        <mc:Fallback>
+        <mc:Fallback xmlns="">
           <p:sp>
             <p:nvSpPr>
               <p:cNvPr id="203" name="Google Shape;203;p17"/>

</xml_diff>

<commit_message>
final review of linear regression part
</commit_message>
<xml_diff>
--- a/slides/ML_Lecture.pptx
+++ b/slides/ML_Lecture.pptx
@@ -84,6 +84,10 @@
       <p:font typeface="Oswald" panose="020B0604020202020204" charset="0"/>
       <p:regular r:id="rId68"/>
       <p:bold r:id="rId69"/>
+    </p:embeddedFont>
+    <p:embeddedFont>
+      <p:font typeface="Roboto Condensed" pitchFamily="2" charset="0"/>
+      <p:regular r:id="rId70"/>
     </p:embeddedFont>
   </p:embeddedFontLst>
   <p:defaultTextStyle>
@@ -12457,8 +12461,8 @@
           </a:p>
         </p:txBody>
       </p:sp>
-      <mc:AlternateContent xmlns:mc="http://schemas.openxmlformats.org/markup-compatibility/2006" xmlns:a14="http://schemas.microsoft.com/office/drawing/2010/main">
-        <mc:Choice Requires="a14">
+      <mc:AlternateContent xmlns:mc="http://schemas.openxmlformats.org/markup-compatibility/2006">
+        <mc:Choice xmlns:a14="http://schemas.microsoft.com/office/drawing/2010/main" Requires="a14">
           <p:sp>
             <p:nvSpPr>
               <p:cNvPr id="203" name="Google Shape;203;p17"/>
@@ -12471,8 +12475,8 @@
             </p:nvSpPr>
             <p:spPr>
               <a:xfrm>
-                <a:off x="1031425" y="1777125"/>
-                <a:ext cx="5903332" cy="2861620"/>
+                <a:off x="1031424" y="1777125"/>
+                <a:ext cx="6261829" cy="2861620"/>
               </a:xfrm>
               <a:prstGeom prst="rect">
                 <a:avLst/>
@@ -12801,7 +12805,7 @@
                 </a14:m>
                 <a:r>
                   <a:rPr lang="de-CH" dirty="0"/>
-                  <a:t>?</a:t>
+                  <a:t>? Ceteris Paribus!</a:t>
                 </a:r>
               </a:p>
               <a:p>
@@ -12886,6 +12890,14 @@
                 <a:r>
                   <a:rPr lang="de-CH" b="0" dirty="0" err="1"/>
                   <a:t>errors</a:t>
+                </a:r>
+                <a:r>
+                  <a:rPr lang="de-CH" b="0" dirty="0"/>
+                  <a:t>/</a:t>
+                </a:r>
+                <a:r>
+                  <a:rPr lang="de-CH" b="0" dirty="0" err="1"/>
+                  <a:t>residuals</a:t>
                 </a:r>
                 <a:br>
                   <a:rPr lang="de-CH" b="0" dirty="0"/>
@@ -13150,7 +13162,7 @@
             </p:txBody>
           </p:sp>
         </mc:Choice>
-        <mc:Fallback xmlns="">
+        <mc:Fallback>
           <p:sp>
             <p:nvSpPr>
               <p:cNvPr id="203" name="Google Shape;203;p17"/>
@@ -13163,8 +13175,8 @@
             </p:nvSpPr>
             <p:spPr>
               <a:xfrm>
-                <a:off x="1031425" y="1777125"/>
-                <a:ext cx="5903332" cy="2861620"/>
+                <a:off x="1031424" y="1777125"/>
+                <a:ext cx="6261829" cy="2861620"/>
               </a:xfrm>
               <a:prstGeom prst="rect">
                 <a:avLst/>
@@ -13172,7 +13184,7 @@
               <a:blipFill>
                 <a:blip r:embed="rId3"/>
                 <a:stretch>
-                  <a:fillRect b="-2772"/>
+                  <a:fillRect b="-2559"/>
                 </a:stretch>
               </a:blipFill>
             </p:spPr>
@@ -13239,7 +13251,7 @@
         </p:nvSpPr>
         <p:spPr>
           <a:xfrm>
-            <a:off x="3479214" y="3624720"/>
+            <a:off x="3676724" y="3661001"/>
             <a:ext cx="779381" cy="276999"/>
           </a:xfrm>
           <a:prstGeom prst="rect">
@@ -13280,7 +13292,7 @@
         </p:nvSpPr>
         <p:spPr>
           <a:xfrm rot="5400000">
-            <a:off x="3828759" y="3277220"/>
+            <a:off x="4020358" y="3317366"/>
             <a:ext cx="80292" cy="767562"/>
           </a:xfrm>
           <a:prstGeom prst="rightBrace">
@@ -14139,8 +14151,8 @@
           </a:p>
         </p:txBody>
       </p:sp>
-      <mc:AlternateContent xmlns:mc="http://schemas.openxmlformats.org/markup-compatibility/2006" xmlns:a14="http://schemas.microsoft.com/office/drawing/2010/main">
-        <mc:Choice Requires="a14">
+      <mc:AlternateContent xmlns:mc="http://schemas.openxmlformats.org/markup-compatibility/2006">
+        <mc:Choice xmlns:a14="http://schemas.microsoft.com/office/drawing/2010/main" Requires="a14">
           <p:sp>
             <p:nvSpPr>
               <p:cNvPr id="15" name="Google Shape;203;p17">
@@ -14532,11 +14544,11 @@
               <a:p>
                 <a:r>
                   <a:rPr lang="de-CH" sz="1600" b="0" i="1" dirty="0"/>
-                  <a:t>Normal</a:t>
+                  <a:t>Normal  </a:t>
                 </a:r>
                 <a:r>
                   <a:rPr lang="de-CH" sz="1600" b="0" dirty="0"/>
-                  <a:t> linear </a:t>
+                  <a:t>linear </a:t>
                 </a:r>
                 <a:r>
                   <a:rPr lang="de-CH" sz="1600" b="0" dirty="0" err="1"/>
@@ -14726,7 +14738,7 @@
             </p:txBody>
           </p:sp>
         </mc:Choice>
-        <mc:Fallback xmlns="">
+        <mc:Fallback>
           <p:sp>
             <p:nvSpPr>
               <p:cNvPr id="15" name="Google Shape;203;p17">
@@ -16414,7 +16426,7 @@
         </p:nvCxnSpPr>
         <p:spPr>
           <a:xfrm>
-            <a:off x="4100285" y="2422559"/>
+            <a:off x="4436784" y="2427362"/>
             <a:ext cx="0" cy="1423727"/>
           </a:xfrm>
           <a:prstGeom prst="line">
@@ -16795,8 +16807,8 @@
           </a:p>
         </p:txBody>
       </p:sp>
-      <mc:AlternateContent xmlns:mc="http://schemas.openxmlformats.org/markup-compatibility/2006" xmlns:a14="http://schemas.microsoft.com/office/drawing/2010/main">
-        <mc:Choice Requires="a14">
+      <mc:AlternateContent xmlns:mc="http://schemas.openxmlformats.org/markup-compatibility/2006">
+        <mc:Choice xmlns:a14="http://schemas.microsoft.com/office/drawing/2010/main" Requires="a14">
           <p:sp>
             <p:nvSpPr>
               <p:cNvPr id="203" name="Google Shape;203;p17"/>
@@ -16809,8 +16821,8 @@
             </p:nvSpPr>
             <p:spPr>
               <a:xfrm>
-                <a:off x="1057471" y="1980327"/>
-                <a:ext cx="3286576" cy="2112702"/>
+                <a:off x="1057470" y="1980326"/>
+                <a:ext cx="3514529" cy="2581713"/>
               </a:xfrm>
               <a:prstGeom prst="rect">
                 <a:avLst/>
@@ -16945,6 +16957,78 @@
                   </a:rPr>
                   <a:t>?</a:t>
                 </a:r>
+              </a:p>
+              <a:p>
+                <a:pPr marL="101600" indent="0">
+                  <a:buNone/>
+                </a:pPr>
+                <a:r>
+                  <a:rPr lang="de-CH" dirty="0">
+                    <a:solidFill>
+                      <a:schemeClr val="accent1">
+                        <a:lumMod val="75000"/>
+                      </a:schemeClr>
+                    </a:solidFill>
+                  </a:rPr>
+                  <a:t>→ </a:t>
+                </a:r>
+                <a:r>
+                  <a:rPr lang="de-CH" dirty="0" err="1">
+                    <a:solidFill>
+                      <a:schemeClr val="accent1">
+                        <a:lumMod val="75000"/>
+                      </a:schemeClr>
+                    </a:solidFill>
+                  </a:rPr>
+                  <a:t>use</a:t>
+                </a:r>
+                <a:r>
+                  <a:rPr lang="de-CH" dirty="0">
+                    <a:solidFill>
+                      <a:schemeClr val="accent1">
+                        <a:lumMod val="75000"/>
+                      </a:schemeClr>
+                    </a:solidFill>
+                  </a:rPr>
+                  <a:t> </a:t>
+                </a:r>
+                <a:r>
+                  <a:rPr lang="de-CH" dirty="0" err="1">
+                    <a:solidFill>
+                      <a:schemeClr val="accent1">
+                        <a:lumMod val="75000"/>
+                      </a:schemeClr>
+                    </a:solidFill>
+                  </a:rPr>
+                  <a:t>more</a:t>
+                </a:r>
+                <a:r>
+                  <a:rPr lang="de-CH" dirty="0">
+                    <a:solidFill>
+                      <a:schemeClr val="accent1">
+                        <a:lumMod val="75000"/>
+                      </a:schemeClr>
+                    </a:solidFill>
+                  </a:rPr>
+                  <a:t> </a:t>
+                </a:r>
+                <a:r>
+                  <a:rPr lang="de-CH" dirty="0" err="1">
+                    <a:solidFill>
+                      <a:schemeClr val="accent1">
+                        <a:lumMod val="75000"/>
+                      </a:schemeClr>
+                    </a:solidFill>
+                  </a:rPr>
+                  <a:t>parameters</a:t>
+                </a:r>
+                <a:endParaRPr lang="de-CH" dirty="0">
+                  <a:solidFill>
+                    <a:schemeClr val="accent1">
+                      <a:lumMod val="75000"/>
+                    </a:schemeClr>
+                  </a:solidFill>
+                </a:endParaRPr>
               </a:p>
               <a:p>
                 <a:pPr>
@@ -17238,7 +17322,7 @@
             </p:txBody>
           </p:sp>
         </mc:Choice>
-        <mc:Fallback xmlns="">
+        <mc:Fallback>
           <p:sp>
             <p:nvSpPr>
               <p:cNvPr id="203" name="Google Shape;203;p17"/>
@@ -17251,8 +17335,8 @@
             </p:nvSpPr>
             <p:spPr>
               <a:xfrm>
-                <a:off x="1057471" y="1980327"/>
-                <a:ext cx="3286576" cy="2112702"/>
+                <a:off x="1057470" y="1980326"/>
+                <a:ext cx="3514529" cy="2581713"/>
               </a:xfrm>
               <a:prstGeom prst="rect">
                 <a:avLst/>
@@ -17260,7 +17344,7 @@
               <a:blipFill>
                 <a:blip r:embed="rId3"/>
                 <a:stretch>
-                  <a:fillRect b="-7225"/>
+                  <a:fillRect b="-2600"/>
                 </a:stretch>
               </a:blipFill>
             </p:spPr>
@@ -17740,278 +17824,519 @@
           </a:p>
         </p:txBody>
       </p:sp>
-      <p:sp>
-        <p:nvSpPr>
-          <p:cNvPr id="203" name="Google Shape;203;p17"/>
-          <p:cNvSpPr txBox="1">
-            <a:spLocks noGrp="1"/>
-          </p:cNvSpPr>
-          <p:nvPr>
-            <p:ph type="body" idx="1"/>
-          </p:nvPr>
-        </p:nvSpPr>
-        <p:spPr>
-          <a:xfrm>
-            <a:off x="833401" y="2023514"/>
-            <a:ext cx="4150863" cy="2342049"/>
-          </a:xfrm>
-          <a:prstGeom prst="rect">
-            <a:avLst/>
-          </a:prstGeom>
-        </p:spPr>
-        <p:txBody>
-          <a:bodyPr spcFirstLastPara="1" wrap="square" lIns="91425" tIns="91425" rIns="91425" bIns="91425" anchor="t" anchorCtr="0">
-            <a:noAutofit/>
-          </a:bodyPr>
-          <a:lstStyle/>
-          <a:p>
-            <a:r>
-              <a:rPr lang="de-CH" sz="1600" dirty="0" err="1"/>
-              <a:t>Additivity</a:t>
-            </a:r>
-            <a:r>
-              <a:rPr lang="de-CH" sz="1600" dirty="0"/>
-              <a:t> </a:t>
-            </a:r>
-            <a:r>
-              <a:rPr lang="de-CH" sz="1600" dirty="0" err="1"/>
-              <a:t>of</a:t>
-            </a:r>
-            <a:r>
-              <a:rPr lang="de-CH" sz="1600" dirty="0"/>
-              <a:t> </a:t>
-            </a:r>
-            <a:r>
-              <a:rPr lang="de-CH" sz="1600" dirty="0" err="1"/>
-              <a:t>effects</a:t>
-            </a:r>
-            <a:r>
-              <a:rPr lang="de-CH" sz="1600" dirty="0"/>
-              <a:t> not </a:t>
-            </a:r>
-            <a:r>
-              <a:rPr lang="de-CH" sz="1600" dirty="0" err="1"/>
-              <a:t>always</a:t>
-            </a:r>
-            <a:r>
-              <a:rPr lang="de-CH" sz="1600" dirty="0"/>
-              <a:t> </a:t>
-            </a:r>
-            <a:r>
-              <a:rPr lang="de-CH" sz="1600" dirty="0" err="1"/>
-              <a:t>realistic</a:t>
-            </a:r>
-            <a:endParaRPr lang="de-CH" sz="1600" dirty="0"/>
-          </a:p>
-          <a:p>
-            <a:r>
-              <a:rPr lang="de-CH" sz="1600" dirty="0" err="1"/>
-              <a:t>Adding</a:t>
-            </a:r>
-            <a:r>
-              <a:rPr lang="de-CH" sz="1600" dirty="0"/>
-              <a:t> </a:t>
-            </a:r>
-            <a:r>
-              <a:rPr lang="de-CH" sz="1600" dirty="0" err="1"/>
-              <a:t>interaction</a:t>
-            </a:r>
-            <a:r>
-              <a:rPr lang="de-CH" sz="1600" dirty="0"/>
-              <a:t> </a:t>
-            </a:r>
-            <a:r>
-              <a:rPr lang="de-CH" sz="1600" dirty="0" err="1"/>
-              <a:t>terms</a:t>
-            </a:r>
-            <a:r>
-              <a:rPr lang="de-CH" sz="1600" dirty="0"/>
-              <a:t> </a:t>
-            </a:r>
-            <a:r>
-              <a:rPr lang="de-CH" sz="1600" dirty="0" err="1"/>
-              <a:t>brings</a:t>
-            </a:r>
-            <a:r>
-              <a:rPr lang="de-CH" sz="1600" dirty="0"/>
-              <a:t> </a:t>
-            </a:r>
-            <a:r>
-              <a:rPr lang="de-CH" sz="1600" dirty="0" err="1"/>
-              <a:t>necessary</a:t>
-            </a:r>
-            <a:r>
-              <a:rPr lang="de-CH" sz="1600" dirty="0"/>
-              <a:t> </a:t>
-            </a:r>
-            <a:r>
-              <a:rPr lang="de-CH" sz="1600" dirty="0" err="1"/>
-              <a:t>flexibility</a:t>
-            </a:r>
-            <a:endParaRPr lang="de-CH" sz="1600" dirty="0"/>
-          </a:p>
-          <a:p>
-            <a:r>
-              <a:rPr lang="de-CH" sz="1600" dirty="0"/>
-              <a:t>Interaction </a:t>
-            </a:r>
-            <a:r>
-              <a:rPr lang="de-CH" sz="1600" dirty="0" err="1"/>
-              <a:t>between</a:t>
-            </a:r>
-            <a:r>
-              <a:rPr lang="de-CH" sz="1600" dirty="0"/>
-              <a:t> </a:t>
-            </a:r>
-            <a:r>
-              <a:rPr lang="de-CH" sz="1600" dirty="0" err="1"/>
-              <a:t>features</a:t>
-            </a:r>
-            <a:r>
-              <a:rPr lang="de-CH" sz="1600" dirty="0"/>
-              <a:t> </a:t>
-            </a:r>
-            <a:r>
-              <a:rPr lang="de-CH" sz="1600" i="1" dirty="0"/>
-              <a:t>X</a:t>
-            </a:r>
-            <a:r>
-              <a:rPr lang="de-CH" sz="1600" dirty="0"/>
-              <a:t> and </a:t>
-            </a:r>
-            <a:r>
-              <a:rPr lang="de-CH" sz="1600" i="1" dirty="0"/>
-              <a:t>Z</a:t>
-            </a:r>
-          </a:p>
-          <a:p>
-            <a:pPr lvl="1"/>
-            <a:r>
-              <a:rPr lang="de-CH" sz="1400" dirty="0" err="1"/>
-              <a:t>For</a:t>
-            </a:r>
-            <a:r>
-              <a:rPr lang="de-CH" sz="1400" dirty="0"/>
-              <a:t> </a:t>
-            </a:r>
-            <a:r>
-              <a:rPr lang="de-CH" sz="1400" dirty="0" err="1"/>
-              <a:t>categorical</a:t>
-            </a:r>
-            <a:r>
-              <a:rPr lang="de-CH" sz="1400" dirty="0"/>
-              <a:t> </a:t>
-            </a:r>
-            <a:r>
-              <a:rPr lang="de-CH" sz="1400" i="1" dirty="0"/>
-              <a:t>Z</a:t>
-            </a:r>
-            <a:r>
-              <a:rPr lang="de-CH" sz="1400" dirty="0"/>
-              <a:t>, </a:t>
-            </a:r>
-            <a:r>
-              <a:rPr lang="de-CH" sz="1400" dirty="0" err="1"/>
-              <a:t>effects</a:t>
-            </a:r>
-            <a:r>
-              <a:rPr lang="de-CH" sz="1400" dirty="0"/>
-              <a:t> </a:t>
-            </a:r>
-            <a:r>
-              <a:rPr lang="de-CH" sz="1400" dirty="0" err="1"/>
-              <a:t>of</a:t>
-            </a:r>
-            <a:r>
-              <a:rPr lang="de-CH" sz="1400" dirty="0"/>
-              <a:t> </a:t>
-            </a:r>
-            <a:r>
-              <a:rPr lang="de-CH" sz="1400" i="1" dirty="0"/>
-              <a:t>X</a:t>
-            </a:r>
-            <a:r>
-              <a:rPr lang="de-CH" sz="1400" dirty="0"/>
-              <a:t> </a:t>
-            </a:r>
-            <a:r>
-              <a:rPr lang="de-CH" sz="1400" dirty="0" err="1"/>
-              <a:t>are</a:t>
-            </a:r>
-            <a:r>
-              <a:rPr lang="de-CH" sz="1400" dirty="0"/>
-              <a:t> </a:t>
-            </a:r>
-            <a:r>
-              <a:rPr lang="de-CH" sz="1400" dirty="0" err="1"/>
-              <a:t>calculated</a:t>
-            </a:r>
-            <a:r>
-              <a:rPr lang="de-CH" sz="1400" dirty="0"/>
-              <a:t> </a:t>
-            </a:r>
-            <a:r>
-              <a:rPr lang="de-CH" sz="1400" dirty="0" err="1"/>
-              <a:t>by</a:t>
-            </a:r>
-            <a:r>
-              <a:rPr lang="de-CH" sz="1400" dirty="0"/>
-              <a:t> </a:t>
-            </a:r>
-            <a:r>
-              <a:rPr lang="de-CH" sz="1400" dirty="0" err="1"/>
-              <a:t>level</a:t>
-            </a:r>
-            <a:r>
-              <a:rPr lang="de-CH" sz="1400" dirty="0"/>
-              <a:t> </a:t>
-            </a:r>
-            <a:r>
-              <a:rPr lang="de-CH" sz="1400" dirty="0" err="1"/>
-              <a:t>of</a:t>
-            </a:r>
-            <a:r>
-              <a:rPr lang="de-CH" sz="1400" dirty="0"/>
-              <a:t> </a:t>
-            </a:r>
-            <a:r>
-              <a:rPr lang="de-CH" sz="1400" i="1" dirty="0"/>
-              <a:t>Z</a:t>
-            </a:r>
-          </a:p>
-          <a:p>
-            <a:pPr lvl="1"/>
-            <a:r>
-              <a:rPr lang="de-CH" sz="1400" dirty="0"/>
-              <a:t>Like separate </a:t>
-            </a:r>
-            <a:r>
-              <a:rPr lang="de-CH" sz="1400" dirty="0" err="1"/>
-              <a:t>models</a:t>
-            </a:r>
-            <a:r>
-              <a:rPr lang="de-CH" sz="1400" dirty="0"/>
-              <a:t> per </a:t>
-            </a:r>
-            <a:r>
-              <a:rPr lang="de-CH" sz="1400" dirty="0" err="1"/>
-              <a:t>level</a:t>
-            </a:r>
-            <a:r>
-              <a:rPr lang="de-CH" sz="1400" dirty="0"/>
-              <a:t> </a:t>
-            </a:r>
-            <a:r>
-              <a:rPr lang="de-CH" sz="1400" dirty="0" err="1"/>
-              <a:t>of</a:t>
-            </a:r>
-            <a:r>
-              <a:rPr lang="de-CH" sz="1400" dirty="0"/>
-              <a:t> Z</a:t>
-            </a:r>
-          </a:p>
-        </p:txBody>
-      </p:sp>
+      <mc:AlternateContent xmlns:mc="http://schemas.openxmlformats.org/markup-compatibility/2006">
+        <mc:Choice xmlns:a14="http://schemas.microsoft.com/office/drawing/2010/main" Requires="a14">
+          <p:sp>
+            <p:nvSpPr>
+              <p:cNvPr id="203" name="Google Shape;203;p17"/>
+              <p:cNvSpPr txBox="1">
+                <a:spLocks noGrp="1"/>
+              </p:cNvSpPr>
+              <p:nvPr>
+                <p:ph type="body" idx="1"/>
+              </p:nvPr>
+            </p:nvSpPr>
+            <p:spPr>
+              <a:xfrm>
+                <a:off x="833401" y="2023514"/>
+                <a:ext cx="4150863" cy="2342049"/>
+              </a:xfrm>
+              <a:prstGeom prst="rect">
+                <a:avLst/>
+              </a:prstGeom>
+            </p:spPr>
+            <p:txBody>
+              <a:bodyPr spcFirstLastPara="1" wrap="square" lIns="91425" tIns="91425" rIns="91425" bIns="91425" anchor="t" anchorCtr="0">
+                <a:noAutofit/>
+              </a:bodyPr>
+              <a:lstStyle/>
+              <a:p>
+                <a:r>
+                  <a:rPr lang="de-CH" sz="1600" dirty="0" err="1"/>
+                  <a:t>Additivity</a:t>
+                </a:r>
+                <a:r>
+                  <a:rPr lang="de-CH" sz="1600" dirty="0"/>
+                  <a:t> </a:t>
+                </a:r>
+                <a:r>
+                  <a:rPr lang="de-CH" sz="1600" dirty="0" err="1"/>
+                  <a:t>of</a:t>
+                </a:r>
+                <a:r>
+                  <a:rPr lang="de-CH" sz="1600" dirty="0"/>
+                  <a:t> </a:t>
+                </a:r>
+                <a:r>
+                  <a:rPr lang="de-CH" sz="1600" dirty="0" err="1"/>
+                  <a:t>effects</a:t>
+                </a:r>
+                <a:r>
+                  <a:rPr lang="de-CH" sz="1600" dirty="0"/>
+                  <a:t> not </a:t>
+                </a:r>
+                <a:r>
+                  <a:rPr lang="de-CH" sz="1600" dirty="0" err="1"/>
+                  <a:t>always</a:t>
+                </a:r>
+                <a:r>
+                  <a:rPr lang="de-CH" sz="1600" dirty="0"/>
+                  <a:t> </a:t>
+                </a:r>
+                <a:r>
+                  <a:rPr lang="de-CH" sz="1600" dirty="0" err="1"/>
+                  <a:t>realistic</a:t>
+                </a:r>
+                <a:endParaRPr lang="de-CH" sz="1600" dirty="0"/>
+              </a:p>
+              <a:p>
+                <a:pPr marL="101600" indent="0">
+                  <a:buNone/>
+                </a:pPr>
+                <a14:m>
+                  <m:oMathPara xmlns:m="http://schemas.openxmlformats.org/officeDocument/2006/math">
+                    <m:oMathParaPr>
+                      <m:jc m:val="centerGroup"/>
+                    </m:oMathParaPr>
+                    <m:oMath xmlns:m="http://schemas.openxmlformats.org/officeDocument/2006/math">
+                      <m:r>
+                        <a:rPr lang="sv-SE" sz="1600" i="1" dirty="0" smtClean="0">
+                          <a:latin typeface="Cambria Math" panose="02040503050406030204" pitchFamily="18" charset="0"/>
+                        </a:rPr>
+                        <m:t>𝐸</m:t>
+                      </m:r>
+                      <m:d>
+                        <m:dPr>
+                          <m:ctrlPr>
+                            <a:rPr lang="sv-SE" sz="1600" i="1" dirty="0" smtClean="0">
+                              <a:latin typeface="Cambria Math" panose="02040503050406030204" pitchFamily="18" charset="0"/>
+                            </a:rPr>
+                          </m:ctrlPr>
+                        </m:dPr>
+                        <m:e>
+                          <m:r>
+                            <a:rPr lang="sv-SE" sz="1600" i="1" dirty="0" smtClean="0">
+                              <a:latin typeface="Cambria Math" panose="02040503050406030204" pitchFamily="18" charset="0"/>
+                            </a:rPr>
+                            <m:t>𝑌</m:t>
+                          </m:r>
+                        </m:e>
+                      </m:d>
+                      <m:r>
+                        <a:rPr lang="sv-SE" sz="1600" i="1" dirty="0" smtClean="0">
+                          <a:latin typeface="Cambria Math" panose="02040503050406030204" pitchFamily="18" charset="0"/>
+                        </a:rPr>
+                        <m:t>=</m:t>
+                      </m:r>
+                      <m:sSub>
+                        <m:sSubPr>
+                          <m:ctrlPr>
+                            <a:rPr lang="sv-SE" sz="1600" b="0" i="1" dirty="0" smtClean="0">
+                              <a:latin typeface="Cambria Math" panose="02040503050406030204" pitchFamily="18" charset="0"/>
+                            </a:rPr>
+                          </m:ctrlPr>
+                        </m:sSubPr>
+                        <m:e>
+                          <m:r>
+                            <a:rPr lang="sv-SE" sz="1600" i="1" dirty="0" smtClean="0">
+                              <a:latin typeface="Cambria Math" panose="02040503050406030204" pitchFamily="18" charset="0"/>
+                            </a:rPr>
+                            <m:t>𝛽</m:t>
+                          </m:r>
+                        </m:e>
+                        <m:sub>
+                          <m:r>
+                            <a:rPr lang="sv-SE" sz="1600" i="1" dirty="0" smtClean="0">
+                              <a:latin typeface="Cambria Math" panose="02040503050406030204" pitchFamily="18" charset="0"/>
+                            </a:rPr>
+                            <m:t>0</m:t>
+                          </m:r>
+                        </m:sub>
+                      </m:sSub>
+                      <m:r>
+                        <a:rPr lang="sv-SE" sz="1600" i="1" dirty="0" smtClean="0">
+                          <a:latin typeface="Cambria Math" panose="02040503050406030204" pitchFamily="18" charset="0"/>
+                        </a:rPr>
+                        <m:t>+</m:t>
+                      </m:r>
+                      <m:sSub>
+                        <m:sSubPr>
+                          <m:ctrlPr>
+                            <a:rPr lang="sv-SE" sz="1600" i="1" dirty="0" smtClean="0">
+                              <a:latin typeface="Cambria Math" panose="02040503050406030204" pitchFamily="18" charset="0"/>
+                            </a:rPr>
+                          </m:ctrlPr>
+                        </m:sSubPr>
+                        <m:e>
+                          <m:r>
+                            <a:rPr lang="sv-SE" sz="1600" i="1" dirty="0" smtClean="0">
+                              <a:latin typeface="Cambria Math" panose="02040503050406030204" pitchFamily="18" charset="0"/>
+                            </a:rPr>
+                            <m:t>𝛽</m:t>
+                          </m:r>
+                        </m:e>
+                        <m:sub>
+                          <m:r>
+                            <a:rPr lang="sv-SE" sz="1600" i="1" dirty="0" smtClean="0">
+                              <a:latin typeface="Cambria Math" panose="02040503050406030204" pitchFamily="18" charset="0"/>
+                            </a:rPr>
+                            <m:t>1</m:t>
+                          </m:r>
+                        </m:sub>
+                      </m:sSub>
+                      <m:sSub>
+                        <m:sSubPr>
+                          <m:ctrlPr>
+                            <a:rPr lang="sv-SE" sz="1600" i="1" dirty="0" smtClean="0">
+                              <a:latin typeface="Cambria Math" panose="02040503050406030204" pitchFamily="18" charset="0"/>
+                            </a:rPr>
+                          </m:ctrlPr>
+                        </m:sSubPr>
+                        <m:e>
+                          <m:r>
+                            <a:rPr lang="sv-SE" sz="1600" i="1" dirty="0" smtClean="0">
+                              <a:latin typeface="Cambria Math" panose="02040503050406030204" pitchFamily="18" charset="0"/>
+                            </a:rPr>
+                            <m:t>𝑋</m:t>
+                          </m:r>
+                        </m:e>
+                        <m:sub>
+                          <m:r>
+                            <a:rPr lang="sv-SE" sz="1600" i="1" dirty="0" smtClean="0">
+                              <a:latin typeface="Cambria Math" panose="02040503050406030204" pitchFamily="18" charset="0"/>
+                            </a:rPr>
+                            <m:t>1</m:t>
+                          </m:r>
+                        </m:sub>
+                      </m:sSub>
+                      <m:r>
+                        <a:rPr lang="sv-SE" sz="1600" i="1" dirty="0" smtClean="0">
+                          <a:latin typeface="Cambria Math" panose="02040503050406030204" pitchFamily="18" charset="0"/>
+                        </a:rPr>
+                        <m:t>+⋯+</m:t>
+                      </m:r>
+                      <m:sSub>
+                        <m:sSubPr>
+                          <m:ctrlPr>
+                            <a:rPr lang="sv-SE" sz="1600" i="1" dirty="0" smtClean="0">
+                              <a:latin typeface="Cambria Math" panose="02040503050406030204" pitchFamily="18" charset="0"/>
+                            </a:rPr>
+                          </m:ctrlPr>
+                        </m:sSubPr>
+                        <m:e>
+                          <m:r>
+                            <a:rPr lang="sv-SE" sz="1600" i="1" dirty="0" smtClean="0">
+                              <a:latin typeface="Cambria Math" panose="02040503050406030204" pitchFamily="18" charset="0"/>
+                            </a:rPr>
+                            <m:t>𝛽</m:t>
+                          </m:r>
+                        </m:e>
+                        <m:sub>
+                          <m:r>
+                            <a:rPr lang="sv-SE" sz="1600" i="1" dirty="0" smtClean="0">
+                              <a:latin typeface="Cambria Math" panose="02040503050406030204" pitchFamily="18" charset="0"/>
+                            </a:rPr>
+                            <m:t>𝑚</m:t>
+                          </m:r>
+                        </m:sub>
+                      </m:sSub>
+                      <m:sSub>
+                        <m:sSubPr>
+                          <m:ctrlPr>
+                            <a:rPr lang="sv-SE" sz="1600" i="1" dirty="0" smtClean="0">
+                              <a:latin typeface="Cambria Math" panose="02040503050406030204" pitchFamily="18" charset="0"/>
+                            </a:rPr>
+                          </m:ctrlPr>
+                        </m:sSubPr>
+                        <m:e>
+                          <m:r>
+                            <a:rPr lang="sv-SE" sz="1600" i="1" dirty="0" smtClean="0">
+                              <a:latin typeface="Cambria Math" panose="02040503050406030204" pitchFamily="18" charset="0"/>
+                            </a:rPr>
+                            <m:t>𝑋</m:t>
+                          </m:r>
+                        </m:e>
+                        <m:sub>
+                          <m:r>
+                            <a:rPr lang="sv-SE" sz="1600" i="1" dirty="0" smtClean="0">
+                              <a:latin typeface="Cambria Math" panose="02040503050406030204" pitchFamily="18" charset="0"/>
+                            </a:rPr>
+                            <m:t>𝑚</m:t>
+                          </m:r>
+                        </m:sub>
+                      </m:sSub>
+                    </m:oMath>
+                  </m:oMathPara>
+                </a14:m>
+                <a:endParaRPr lang="de-CH" sz="1600" dirty="0"/>
+              </a:p>
+              <a:p>
+                <a:r>
+                  <a:rPr lang="de-CH" sz="1600" dirty="0" err="1"/>
+                  <a:t>Adding</a:t>
+                </a:r>
+                <a:r>
+                  <a:rPr lang="de-CH" sz="1600" dirty="0"/>
+                  <a:t> </a:t>
+                </a:r>
+                <a:r>
+                  <a:rPr lang="de-CH" sz="1600" dirty="0" err="1"/>
+                  <a:t>interaction</a:t>
+                </a:r>
+                <a:r>
+                  <a:rPr lang="de-CH" sz="1600" dirty="0"/>
+                  <a:t> </a:t>
+                </a:r>
+                <a:r>
+                  <a:rPr lang="de-CH" sz="1600" dirty="0" err="1"/>
+                  <a:t>terms</a:t>
+                </a:r>
+                <a:r>
+                  <a:rPr lang="de-CH" sz="1600" dirty="0"/>
+                  <a:t> </a:t>
+                </a:r>
+                <a:r>
+                  <a:rPr lang="de-CH" sz="1600" dirty="0" err="1"/>
+                  <a:t>brings</a:t>
+                </a:r>
+                <a:r>
+                  <a:rPr lang="de-CH" sz="1600" dirty="0"/>
+                  <a:t> </a:t>
+                </a:r>
+                <a:r>
+                  <a:rPr lang="de-CH" sz="1600" dirty="0" err="1"/>
+                  <a:t>necessary</a:t>
+                </a:r>
+                <a:r>
+                  <a:rPr lang="de-CH" sz="1600" dirty="0"/>
+                  <a:t> </a:t>
+                </a:r>
+                <a:r>
+                  <a:rPr lang="de-CH" sz="1600" dirty="0" err="1"/>
+                  <a:t>flexibility</a:t>
+                </a:r>
+                <a:r>
+                  <a:rPr lang="de-CH" sz="1600" dirty="0"/>
+                  <a:t> → </a:t>
+                </a:r>
+                <a:r>
+                  <a:rPr lang="de-CH" sz="1600" dirty="0" err="1"/>
+                  <a:t>more</a:t>
+                </a:r>
+                <a:r>
+                  <a:rPr lang="de-CH" sz="1600" dirty="0"/>
+                  <a:t> </a:t>
+                </a:r>
+                <a:r>
+                  <a:rPr lang="de-CH" sz="1600" dirty="0" err="1"/>
+                  <a:t>parameters</a:t>
+                </a:r>
+                <a:endParaRPr lang="de-CH" sz="1600" dirty="0"/>
+              </a:p>
+              <a:p>
+                <a:r>
+                  <a:rPr lang="de-CH" sz="1600" dirty="0"/>
+                  <a:t>Interaction </a:t>
+                </a:r>
+                <a:r>
+                  <a:rPr lang="de-CH" sz="1600" dirty="0" err="1"/>
+                  <a:t>between</a:t>
+                </a:r>
+                <a:r>
+                  <a:rPr lang="de-CH" sz="1600" dirty="0"/>
+                  <a:t> </a:t>
+                </a:r>
+                <a:r>
+                  <a:rPr lang="de-CH" sz="1600" dirty="0" err="1"/>
+                  <a:t>features</a:t>
+                </a:r>
+                <a:r>
+                  <a:rPr lang="de-CH" sz="1600" dirty="0"/>
+                  <a:t> </a:t>
+                </a:r>
+                <a:r>
+                  <a:rPr lang="de-CH" sz="1600" i="1" dirty="0"/>
+                  <a:t>X</a:t>
+                </a:r>
+                <a:r>
+                  <a:rPr lang="de-CH" sz="1600" dirty="0"/>
+                  <a:t> and </a:t>
+                </a:r>
+                <a:r>
+                  <a:rPr lang="de-CH" sz="1600" i="1" dirty="0"/>
+                  <a:t>Z</a:t>
+                </a:r>
+              </a:p>
+              <a:p>
+                <a:pPr lvl="1"/>
+                <a:r>
+                  <a:rPr lang="de-CH" sz="1400" dirty="0" err="1"/>
+                  <a:t>For</a:t>
+                </a:r>
+                <a:r>
+                  <a:rPr lang="de-CH" sz="1400" dirty="0"/>
+                  <a:t> </a:t>
+                </a:r>
+                <a:r>
+                  <a:rPr lang="de-CH" sz="1400" dirty="0" err="1"/>
+                  <a:t>categorical</a:t>
+                </a:r>
+                <a:r>
+                  <a:rPr lang="de-CH" sz="1400" dirty="0"/>
+                  <a:t> </a:t>
+                </a:r>
+                <a:r>
+                  <a:rPr lang="de-CH" sz="1400" i="1" dirty="0"/>
+                  <a:t>Z</a:t>
+                </a:r>
+                <a:r>
+                  <a:rPr lang="de-CH" sz="1400" dirty="0"/>
+                  <a:t>, </a:t>
+                </a:r>
+                <a:r>
+                  <a:rPr lang="de-CH" sz="1400" dirty="0" err="1"/>
+                  <a:t>effects</a:t>
+                </a:r>
+                <a:r>
+                  <a:rPr lang="de-CH" sz="1400" dirty="0"/>
+                  <a:t> </a:t>
+                </a:r>
+                <a:r>
+                  <a:rPr lang="de-CH" sz="1400" dirty="0" err="1"/>
+                  <a:t>of</a:t>
+                </a:r>
+                <a:r>
+                  <a:rPr lang="de-CH" sz="1400" dirty="0"/>
+                  <a:t> </a:t>
+                </a:r>
+                <a:r>
+                  <a:rPr lang="de-CH" sz="1400" i="1" dirty="0"/>
+                  <a:t>X</a:t>
+                </a:r>
+                <a:r>
+                  <a:rPr lang="de-CH" sz="1400" dirty="0"/>
+                  <a:t> </a:t>
+                </a:r>
+                <a:r>
+                  <a:rPr lang="de-CH" sz="1400" dirty="0" err="1"/>
+                  <a:t>are</a:t>
+                </a:r>
+                <a:r>
+                  <a:rPr lang="de-CH" sz="1400" dirty="0"/>
+                  <a:t> </a:t>
+                </a:r>
+                <a:r>
+                  <a:rPr lang="de-CH" sz="1400" dirty="0" err="1"/>
+                  <a:t>calculated</a:t>
+                </a:r>
+                <a:r>
+                  <a:rPr lang="de-CH" sz="1400" dirty="0"/>
+                  <a:t> </a:t>
+                </a:r>
+                <a:r>
+                  <a:rPr lang="de-CH" sz="1400" dirty="0" err="1"/>
+                  <a:t>by</a:t>
+                </a:r>
+                <a:r>
+                  <a:rPr lang="de-CH" sz="1400" dirty="0"/>
+                  <a:t> </a:t>
+                </a:r>
+                <a:r>
+                  <a:rPr lang="de-CH" sz="1400" dirty="0" err="1"/>
+                  <a:t>level</a:t>
+                </a:r>
+                <a:r>
+                  <a:rPr lang="de-CH" sz="1400" dirty="0"/>
+                  <a:t> </a:t>
+                </a:r>
+                <a:r>
+                  <a:rPr lang="de-CH" sz="1400" dirty="0" err="1"/>
+                  <a:t>of</a:t>
+                </a:r>
+                <a:r>
+                  <a:rPr lang="de-CH" sz="1400" dirty="0"/>
+                  <a:t> </a:t>
+                </a:r>
+                <a:r>
+                  <a:rPr lang="de-CH" sz="1400" i="1" dirty="0"/>
+                  <a:t>Z</a:t>
+                </a:r>
+              </a:p>
+              <a:p>
+                <a:pPr lvl="1"/>
+                <a:r>
+                  <a:rPr lang="de-CH" sz="1400" dirty="0"/>
+                  <a:t>Like separate </a:t>
+                </a:r>
+                <a:r>
+                  <a:rPr lang="de-CH" sz="1400" dirty="0" err="1"/>
+                  <a:t>models</a:t>
+                </a:r>
+                <a:r>
+                  <a:rPr lang="de-CH" sz="1400" dirty="0"/>
+                  <a:t> per </a:t>
+                </a:r>
+                <a:r>
+                  <a:rPr lang="de-CH" sz="1400" dirty="0" err="1"/>
+                  <a:t>level</a:t>
+                </a:r>
+                <a:r>
+                  <a:rPr lang="de-CH" sz="1400" dirty="0"/>
+                  <a:t> </a:t>
+                </a:r>
+                <a:r>
+                  <a:rPr lang="de-CH" sz="1400" dirty="0" err="1"/>
+                  <a:t>of</a:t>
+                </a:r>
+                <a:r>
+                  <a:rPr lang="de-CH" sz="1400" dirty="0"/>
+                  <a:t> Z</a:t>
+                </a:r>
+              </a:p>
+            </p:txBody>
+          </p:sp>
+        </mc:Choice>
+        <mc:Fallback>
+          <p:sp>
+            <p:nvSpPr>
+              <p:cNvPr id="203" name="Google Shape;203;p17"/>
+              <p:cNvSpPr txBox="1">
+                <a:spLocks noGrp="1" noRot="1" noChangeAspect="1" noMove="1" noResize="1" noEditPoints="1" noAdjustHandles="1" noChangeArrowheads="1" noChangeShapeType="1" noTextEdit="1"/>
+              </p:cNvSpPr>
+              <p:nvPr>
+                <p:ph type="body" idx="1"/>
+              </p:nvPr>
+            </p:nvSpPr>
+            <p:spPr>
+              <a:xfrm>
+                <a:off x="833401" y="2023514"/>
+                <a:ext cx="4150863" cy="2342049"/>
+              </a:xfrm>
+              <a:prstGeom prst="rect">
+                <a:avLst/>
+              </a:prstGeom>
+              <a:blipFill>
+                <a:blip r:embed="rId4"/>
+                <a:stretch>
+                  <a:fillRect/>
+                </a:stretch>
+              </a:blipFill>
+            </p:spPr>
+            <p:txBody>
+              <a:bodyPr/>
+              <a:lstStyle/>
+              <a:p>
+                <a:r>
+                  <a:rPr lang="de-CH">
+                    <a:noFill/>
+                  </a:rPr>
+                  <a:t> </a:t>
+                </a:r>
+              </a:p>
+            </p:txBody>
+          </p:sp>
+        </mc:Fallback>
+      </mc:AlternateContent>
       <p:sp>
         <p:nvSpPr>
           <p:cNvPr id="204" name="Google Shape;204;p17"/>
@@ -18667,8 +18992,8 @@
           </a:p>
         </p:txBody>
       </p:sp>
-      <mc:AlternateContent xmlns:mc="http://schemas.openxmlformats.org/markup-compatibility/2006" xmlns:a14="http://schemas.microsoft.com/office/drawing/2010/main">
-        <mc:Choice Requires="a14">
+      <mc:AlternateContent xmlns:mc="http://schemas.openxmlformats.org/markup-compatibility/2006">
+        <mc:Choice xmlns:a14="http://schemas.microsoft.com/office/drawing/2010/main" Requires="a14">
           <p:sp>
             <p:nvSpPr>
               <p:cNvPr id="203" name="Google Shape;203;p17"/>
@@ -18859,7 +19184,7 @@
                 </a:r>
                 <a:r>
                   <a:rPr lang="en-US" dirty="0"/>
-                  <a:t> leads to an increase in </a:t>
+                  <a:t>  leads to an increase in </a:t>
                 </a:r>
                 <a:r>
                   <a:rPr lang="en-US" i="1" dirty="0"/>
@@ -18931,7 +19256,7 @@
             </p:txBody>
           </p:sp>
         </mc:Choice>
-        <mc:Fallback xmlns="">
+        <mc:Fallback>
           <p:sp>
             <p:nvSpPr>
               <p:cNvPr id="203" name="Google Shape;203;p17"/>
@@ -19073,8 +19398,8 @@
           </a:p>
         </p:txBody>
       </p:sp>
-      <mc:AlternateContent xmlns:mc="http://schemas.openxmlformats.org/markup-compatibility/2006" xmlns:a14="http://schemas.microsoft.com/office/drawing/2010/main">
-        <mc:Choice Requires="a14">
+      <mc:AlternateContent xmlns:mc="http://schemas.openxmlformats.org/markup-compatibility/2006">
+        <mc:Choice xmlns:a14="http://schemas.microsoft.com/office/drawing/2010/main" Requires="a14">
           <p:sp>
             <p:nvSpPr>
               <p:cNvPr id="203" name="Google Shape;203;p17"/>
@@ -19312,7 +19637,7 @@
                 </a:r>
                 <a:r>
                   <a:rPr lang="en-US" sz="1600" dirty="0"/>
-                  <a:t>A one point increase in </a:t>
+                  <a:t>A one-point increase in </a:t>
                 </a:r>
                 <a:r>
                   <a:rPr lang="en-US" sz="1600" i="1" dirty="0"/>
@@ -19320,7 +19645,7 @@
                 </a:r>
                 <a:r>
                   <a:rPr lang="en-US" sz="1600" dirty="0"/>
-                  <a:t> is associated with a relative increase in </a:t>
+                  <a:t>  is associated with a relative increase in </a:t>
                 </a:r>
                 <a:r>
                   <a:rPr lang="en-US" sz="1600" i="1" dirty="0"/>
@@ -19328,7 +19653,7 @@
                 </a:r>
                 <a:r>
                   <a:rPr lang="en-US" sz="1600" dirty="0"/>
-                  <a:t> of </a:t>
+                  <a:t>  of </a:t>
                 </a:r>
                 <a14:m>
                   <m:oMath xmlns:m="http://schemas.openxmlformats.org/officeDocument/2006/math">
@@ -19379,14 +19704,7 @@
                 </a14:m>
                 <a:r>
                   <a:rPr lang="de-CH" sz="1600" dirty="0"/>
-                  <a:t>» </a:t>
-                </a:r>
-                <a:br>
-                  <a:rPr lang="de-CH" sz="1600" dirty="0"/>
-                </a:br>
-                <a:r>
-                  <a:rPr lang="de-CH" sz="1600" dirty="0"/>
-                  <a:t>(→ </a:t>
+                  <a:t>» (→ </a:t>
                 </a:r>
                 <a:r>
                   <a:rPr lang="de-CH" sz="1600" dirty="0" err="1"/>
@@ -19444,7 +19762,7 @@
                       </a:schemeClr>
                     </a:solidFill>
                   </a:rPr>
-                  <a:t>Examples</a:t>
+                  <a:t>Two</a:t>
                 </a:r>
                 <a:r>
                   <a:rPr lang="de-CH" u="sng" dirty="0">
@@ -19454,8 +19772,25 @@
                       </a:schemeClr>
                     </a:solidFill>
                   </a:rPr>
-                  <a:t> 1 &amp; 2</a:t>
+                  <a:t> </a:t>
                 </a:r>
+                <a:r>
+                  <a:rPr lang="de-CH" u="sng" dirty="0" err="1">
+                    <a:solidFill>
+                      <a:schemeClr val="accent4">
+                        <a:lumMod val="75000"/>
+                      </a:schemeClr>
+                    </a:solidFill>
+                  </a:rPr>
+                  <a:t>Examples</a:t>
+                </a:r>
+                <a:endParaRPr lang="de-CH" u="sng" dirty="0">
+                  <a:solidFill>
+                    <a:schemeClr val="accent4">
+                      <a:lumMod val="75000"/>
+                    </a:schemeClr>
+                  </a:solidFill>
+                </a:endParaRPr>
               </a:p>
               <a:p>
                 <a:pPr marL="101600" indent="0">
@@ -19498,7 +19833,7 @@
             </p:txBody>
           </p:sp>
         </mc:Choice>
-        <mc:Fallback xmlns="">
+        <mc:Fallback>
           <p:sp>
             <p:nvSpPr>
               <p:cNvPr id="203" name="Google Shape;203;p17"/>
@@ -19520,7 +19855,7 @@
               <a:blipFill>
                 <a:blip r:embed="rId3"/>
                 <a:stretch>
-                  <a:fillRect b="-14112"/>
+                  <a:fillRect b="-4380"/>
                 </a:stretch>
               </a:blipFill>
             </p:spPr>
@@ -20606,8 +20941,8 @@
           </a:p>
         </p:txBody>
       </p:sp>
-      <mc:AlternateContent xmlns:mc="http://schemas.openxmlformats.org/markup-compatibility/2006" xmlns:a14="http://schemas.microsoft.com/office/drawing/2010/main">
-        <mc:Choice Requires="a14">
+      <mc:AlternateContent xmlns:mc="http://schemas.openxmlformats.org/markup-compatibility/2006">
+        <mc:Choice xmlns:a14="http://schemas.microsoft.com/office/drawing/2010/main" Requires="a14">
           <p:sp>
             <p:nvSpPr>
               <p:cNvPr id="203" name="Google Shape;203;p17"/>
@@ -20635,7 +20970,23 @@
               <a:p>
                 <a:r>
                   <a:rPr lang="de-CH" dirty="0"/>
-                  <a:t>Extension </a:t>
+                  <a:t>(</a:t>
+                </a:r>
+                <a:r>
+                  <a:rPr lang="de-CH" dirty="0" err="1"/>
+                  <a:t>One</a:t>
+                </a:r>
+                <a:r>
+                  <a:rPr lang="de-CH" dirty="0"/>
+                  <a:t>) </a:t>
+                </a:r>
+                <a:r>
+                  <a:rPr lang="de-CH" dirty="0" err="1"/>
+                  <a:t>extension</a:t>
+                </a:r>
+                <a:r>
+                  <a:rPr lang="de-CH" dirty="0"/>
+                  <a:t> </a:t>
                 </a:r>
                 <a:r>
                   <a:rPr lang="de-CH" dirty="0" err="1"/>
@@ -21205,7 +21556,7 @@
             </p:txBody>
           </p:sp>
         </mc:Choice>
-        <mc:Fallback xmlns="">
+        <mc:Fallback>
           <p:sp>
             <p:nvSpPr>
               <p:cNvPr id="203" name="Google Shape;203;p17"/>
@@ -21518,7 +21869,80 @@
                   </a:schemeClr>
                 </a:solidFill>
               </a:rPr>
-              <a:t>GLM minimizes deviance loss</a:t>
+              <a:t>GLM minimizes </a:t>
+            </a:r>
+            <a:r>
+              <a:rPr lang="es-ES" sz="1400" dirty="0" err="1">
+                <a:solidFill>
+                  <a:schemeClr val="accent4">
+                    <a:lumMod val="75000"/>
+                  </a:schemeClr>
+                </a:solidFill>
+              </a:rPr>
+              <a:t>deviance</a:t>
+            </a:r>
+            <a:r>
+              <a:rPr lang="es-ES" sz="1400" dirty="0">
+                <a:solidFill>
+                  <a:schemeClr val="accent4">
+                    <a:lumMod val="75000"/>
+                  </a:schemeClr>
+                </a:solidFill>
+              </a:rPr>
+              <a:t> </a:t>
+            </a:r>
+            <a:r>
+              <a:rPr lang="es-ES" sz="1400" dirty="0" err="1">
+                <a:solidFill>
+                  <a:schemeClr val="accent4">
+                    <a:lumMod val="75000"/>
+                  </a:schemeClr>
+                </a:solidFill>
+              </a:rPr>
+              <a:t>loss</a:t>
+            </a:r>
+            <a:endParaRPr lang="es-ES" sz="1400" dirty="0">
+              <a:solidFill>
+                <a:schemeClr val="accent4">
+                  <a:lumMod val="75000"/>
+                </a:schemeClr>
+              </a:solidFill>
+            </a:endParaRPr>
+          </a:p>
+          <a:p>
+            <a:r>
+              <a:rPr lang="es-ES" sz="1400" dirty="0">
+                <a:solidFill>
+                  <a:schemeClr val="accent4">
+                    <a:lumMod val="75000"/>
+                  </a:schemeClr>
+                </a:solidFill>
+              </a:rPr>
+              <a:t>MSE </a:t>
+            </a:r>
+            <a:r>
+              <a:rPr lang="es-ES" sz="1400" dirty="0">
+                <a:solidFill>
+                  <a:schemeClr val="accent4">
+                    <a:lumMod val="75000"/>
+                  </a:schemeClr>
+                </a:solidFill>
+                <a:latin typeface="Arial" panose="020B0604020202020204" pitchFamily="34" charset="0"/>
+                <a:cs typeface="Arial" panose="020B0604020202020204" pitchFamily="34" charset="0"/>
+              </a:rPr>
+              <a:t>→ </a:t>
+            </a:r>
+            <a:r>
+              <a:rPr lang="es-ES" sz="1400" dirty="0" err="1">
+                <a:solidFill>
+                  <a:schemeClr val="accent4">
+                    <a:lumMod val="75000"/>
+                  </a:schemeClr>
+                </a:solidFill>
+                <a:latin typeface="Arial" panose="020B0604020202020204" pitchFamily="34" charset="0"/>
+                <a:cs typeface="Arial" panose="020B0604020202020204" pitchFamily="34" charset="0"/>
+              </a:rPr>
+              <a:t>Deviance</a:t>
             </a:r>
             <a:endParaRPr lang="de-CH" sz="1400" dirty="0">
               <a:solidFill>
@@ -21618,6 +22042,165 @@
           </a:fontRef>
         </p:style>
       </p:pic>
+      <p:sp>
+        <p:nvSpPr>
+          <p:cNvPr id="2" name="Geschweifte Klammer rechts 1">
+            <a:extLst>
+              <a:ext uri="{FF2B5EF4-FFF2-40B4-BE49-F238E27FC236}">
+                <a16:creationId xmlns:a16="http://schemas.microsoft.com/office/drawing/2014/main" id="{AF2AB41C-EAD8-419E-B810-855373515D86}"/>
+              </a:ext>
+            </a:extLst>
+          </p:cNvPr>
+          <p:cNvSpPr/>
+          <p:nvPr/>
+        </p:nvSpPr>
+        <p:spPr>
+          <a:xfrm rot="16200000">
+            <a:off x="5100037" y="640208"/>
+            <a:ext cx="182880" cy="2082145"/>
+          </a:xfrm>
+          <a:prstGeom prst="rightBrace">
+            <a:avLst/>
+          </a:prstGeom>
+          <a:ln>
+            <a:solidFill>
+              <a:schemeClr val="accent4">
+                <a:lumMod val="75000"/>
+              </a:schemeClr>
+            </a:solidFill>
+          </a:ln>
+        </p:spPr>
+        <p:style>
+          <a:lnRef idx="1">
+            <a:schemeClr val="accent4"/>
+          </a:lnRef>
+          <a:fillRef idx="0">
+            <a:schemeClr val="accent4"/>
+          </a:fillRef>
+          <a:effectRef idx="0">
+            <a:schemeClr val="accent4"/>
+          </a:effectRef>
+          <a:fontRef idx="minor">
+            <a:schemeClr val="tx1"/>
+          </a:fontRef>
+        </p:style>
+        <p:txBody>
+          <a:bodyPr rtlCol="0" anchor="ctr"/>
+          <a:lstStyle/>
+          <a:p>
+            <a:pPr algn="ctr"/>
+            <a:endParaRPr lang="de-CH"/>
+          </a:p>
+        </p:txBody>
+      </p:sp>
+      <p:sp>
+        <p:nvSpPr>
+          <p:cNvPr id="4" name="Textfeld 3">
+            <a:extLst>
+              <a:ext uri="{FF2B5EF4-FFF2-40B4-BE49-F238E27FC236}">
+                <a16:creationId xmlns:a16="http://schemas.microsoft.com/office/drawing/2014/main" id="{7007ED4B-DDAE-4847-AB78-4D463B159C97}"/>
+              </a:ext>
+            </a:extLst>
+          </p:cNvPr>
+          <p:cNvSpPr txBox="1"/>
+          <p:nvPr/>
+        </p:nvSpPr>
+        <p:spPr>
+          <a:xfrm>
+            <a:off x="4021124" y="1366964"/>
+            <a:ext cx="2340705" cy="246221"/>
+          </a:xfrm>
+          <a:prstGeom prst="rect">
+            <a:avLst/>
+          </a:prstGeom>
+          <a:noFill/>
+        </p:spPr>
+        <p:txBody>
+          <a:bodyPr wrap="none" rtlCol="0">
+            <a:spAutoFit/>
+          </a:bodyPr>
+          <a:lstStyle/>
+          <a:p>
+            <a:r>
+              <a:rPr lang="de-CH" sz="1000" dirty="0" err="1">
+                <a:solidFill>
+                  <a:schemeClr val="accent4">
+                    <a:lumMod val="75000"/>
+                  </a:schemeClr>
+                </a:solidFill>
+              </a:rPr>
+              <a:t>Important</a:t>
+            </a:r>
+            <a:r>
+              <a:rPr lang="de-CH" sz="1000" dirty="0">
+                <a:solidFill>
+                  <a:schemeClr val="accent4">
+                    <a:lumMod val="75000"/>
+                  </a:schemeClr>
+                </a:solidFill>
+              </a:rPr>
+              <a:t> also </a:t>
+            </a:r>
+            <a:r>
+              <a:rPr lang="de-CH" sz="1000" dirty="0" err="1">
+                <a:solidFill>
+                  <a:schemeClr val="accent4">
+                    <a:lumMod val="75000"/>
+                  </a:schemeClr>
+                </a:solidFill>
+              </a:rPr>
+              <a:t>for</a:t>
+            </a:r>
+            <a:r>
+              <a:rPr lang="de-CH" sz="1000" dirty="0">
+                <a:solidFill>
+                  <a:schemeClr val="accent4">
+                    <a:lumMod val="75000"/>
+                  </a:schemeClr>
+                </a:solidFill>
+              </a:rPr>
+              <a:t> </a:t>
+            </a:r>
+            <a:r>
+              <a:rPr lang="de-CH" sz="1000" dirty="0" err="1">
+                <a:solidFill>
+                  <a:schemeClr val="accent4">
+                    <a:lumMod val="75000"/>
+                  </a:schemeClr>
+                </a:solidFill>
+              </a:rPr>
+              <a:t>other</a:t>
+            </a:r>
+            <a:r>
+              <a:rPr lang="de-CH" sz="1000" dirty="0">
+                <a:solidFill>
+                  <a:schemeClr val="accent4">
+                    <a:lumMod val="75000"/>
+                  </a:schemeClr>
+                </a:solidFill>
+              </a:rPr>
+              <a:t> ML </a:t>
+            </a:r>
+            <a:r>
+              <a:rPr lang="de-CH" sz="1000" dirty="0" err="1">
+                <a:solidFill>
+                  <a:schemeClr val="accent4">
+                    <a:lumMod val="75000"/>
+                  </a:schemeClr>
+                </a:solidFill>
+              </a:rPr>
+              <a:t>algorithms</a:t>
+            </a:r>
+            <a:endParaRPr lang="de-CH" sz="1000" dirty="0">
+              <a:solidFill>
+                <a:schemeClr val="accent4">
+                  <a:lumMod val="75000"/>
+                </a:schemeClr>
+              </a:solidFill>
+            </a:endParaRPr>
+          </a:p>
+        </p:txBody>
+      </p:sp>
     </p:spTree>
     <p:extLst>
       <p:ext uri="{BB962C8B-B14F-4D97-AF65-F5344CB8AC3E}">
@@ -21791,7 +22374,7 @@
             </a:pPr>
             <a:r>
               <a:rPr lang="en-US" sz="1400" dirty="0"/>
-              <a:t>Right-skewed Y: Jump from 1 Mio to 1.1 Mio seems larger than from 2 Mio to 2.1 Mio.</a:t>
+              <a:t>Right-skewed Y: Jump from 1 Mio to 1.1 Mio deemed larger than from 2 Mio to 2.1 Mio.</a:t>
             </a:r>
             <a:endParaRPr lang="de-CH" sz="1400" dirty="0"/>
           </a:p>
@@ -21900,6 +22483,137 @@
               <a:t>25</a:t>
             </a:fld>
             <a:endParaRPr/>
+          </a:p>
+        </p:txBody>
+      </p:sp>
+      <p:sp>
+        <p:nvSpPr>
+          <p:cNvPr id="3" name="Geschweifte Klammer rechts 2">
+            <a:extLst>
+              <a:ext uri="{FF2B5EF4-FFF2-40B4-BE49-F238E27FC236}">
+                <a16:creationId xmlns:a16="http://schemas.microsoft.com/office/drawing/2014/main" id="{66800882-84FD-4911-ADAA-8FF1E455F1E9}"/>
+              </a:ext>
+            </a:extLst>
+          </p:cNvPr>
+          <p:cNvSpPr/>
+          <p:nvPr/>
+        </p:nvSpPr>
+        <p:spPr>
+          <a:xfrm>
+            <a:off x="6634886" y="2479853"/>
+            <a:ext cx="212141" cy="753465"/>
+          </a:xfrm>
+          <a:prstGeom prst="rightBrace">
+            <a:avLst/>
+          </a:prstGeom>
+          <a:ln>
+            <a:solidFill>
+              <a:schemeClr val="accent4">
+                <a:lumMod val="75000"/>
+              </a:schemeClr>
+            </a:solidFill>
+          </a:ln>
+        </p:spPr>
+        <p:style>
+          <a:lnRef idx="1">
+            <a:schemeClr val="accent4"/>
+          </a:lnRef>
+          <a:fillRef idx="0">
+            <a:schemeClr val="accent4"/>
+          </a:fillRef>
+          <a:effectRef idx="0">
+            <a:schemeClr val="accent4"/>
+          </a:effectRef>
+          <a:fontRef idx="minor">
+            <a:schemeClr val="tx1"/>
+          </a:fontRef>
+        </p:style>
+        <p:txBody>
+          <a:bodyPr rtlCol="0" anchor="ctr"/>
+          <a:lstStyle/>
+          <a:p>
+            <a:pPr algn="ctr"/>
+            <a:endParaRPr lang="de-CH"/>
+          </a:p>
+        </p:txBody>
+      </p:sp>
+      <p:sp>
+        <p:nvSpPr>
+          <p:cNvPr id="4" name="Textfeld 3">
+            <a:extLst>
+              <a:ext uri="{FF2B5EF4-FFF2-40B4-BE49-F238E27FC236}">
+                <a16:creationId xmlns:a16="http://schemas.microsoft.com/office/drawing/2014/main" id="{5991D1C3-8999-4FBD-B9DB-F1B53C7C786C}"/>
+              </a:ext>
+            </a:extLst>
+          </p:cNvPr>
+          <p:cNvSpPr txBox="1"/>
+          <p:nvPr/>
+        </p:nvSpPr>
+        <p:spPr>
+          <a:xfrm>
+            <a:off x="6847027" y="2601010"/>
+            <a:ext cx="1317990" cy="523220"/>
+          </a:xfrm>
+          <a:prstGeom prst="rect">
+            <a:avLst/>
+          </a:prstGeom>
+          <a:noFill/>
+        </p:spPr>
+        <p:txBody>
+          <a:bodyPr wrap="none" rtlCol="0">
+            <a:spAutoFit/>
+          </a:bodyPr>
+          <a:lstStyle/>
+          <a:p>
+            <a:r>
+              <a:rPr lang="de-CH" dirty="0">
+                <a:solidFill>
+                  <a:schemeClr val="accent4">
+                    <a:lumMod val="75000"/>
+                  </a:schemeClr>
+                </a:solidFill>
+              </a:rPr>
+              <a:t>Log </a:t>
+            </a:r>
+            <a:r>
+              <a:rPr lang="de-CH" dirty="0" err="1">
+                <a:solidFill>
+                  <a:schemeClr val="accent4">
+                    <a:lumMod val="75000"/>
+                  </a:schemeClr>
+                </a:solidFill>
+              </a:rPr>
+              <a:t>response</a:t>
+            </a:r>
+            <a:r>
+              <a:rPr lang="de-CH" dirty="0">
+                <a:solidFill>
+                  <a:schemeClr val="accent4">
+                    <a:lumMod val="75000"/>
+                  </a:schemeClr>
+                </a:solidFill>
+              </a:rPr>
+              <a:t> </a:t>
+            </a:r>
+            <a:br>
+              <a:rPr lang="de-CH" dirty="0">
+                <a:solidFill>
+                  <a:schemeClr val="accent4">
+                    <a:lumMod val="75000"/>
+                  </a:schemeClr>
+                </a:solidFill>
+              </a:rPr>
+            </a:br>
+            <a:r>
+              <a:rPr lang="de-CH" dirty="0">
+                <a:solidFill>
+                  <a:schemeClr val="accent4">
+                    <a:lumMod val="75000"/>
+                  </a:schemeClr>
+                </a:solidFill>
+              </a:rPr>
+              <a:t>impossible</a:t>
+            </a:r>
           </a:p>
         </p:txBody>
       </p:sp>
@@ -21998,8 +22712,8 @@
           </a:p>
         </p:txBody>
       </p:sp>
-      <mc:AlternateContent xmlns:mc="http://schemas.openxmlformats.org/markup-compatibility/2006" xmlns:a14="http://schemas.microsoft.com/office/drawing/2010/main">
-        <mc:Choice Requires="a14">
+      <mc:AlternateContent xmlns:mc="http://schemas.openxmlformats.org/markup-compatibility/2006">
+        <mc:Choice xmlns:a14="http://schemas.microsoft.com/office/drawing/2010/main" Requires="a14">
           <p:sp>
             <p:nvSpPr>
               <p:cNvPr id="203" name="Google Shape;203;p17"/>
@@ -22013,7 +22727,7 @@
             <p:spPr>
               <a:xfrm>
                 <a:off x="1031425" y="1986717"/>
-                <a:ext cx="6119050" cy="2309620"/>
+                <a:ext cx="6217938" cy="2614544"/>
               </a:xfrm>
               <a:prstGeom prst="rect">
                 <a:avLst/>
@@ -22027,7 +22741,7 @@
               <a:p>
                 <a:r>
                   <a:rPr lang="de-CH" dirty="0"/>
-                  <a:t>Identity link → linear </a:t>
+                  <a:t>Identity link: like linear </a:t>
                 </a:r>
                 <a:r>
                   <a:rPr lang="de-CH" dirty="0" err="1"/>
@@ -22038,7 +22752,7 @@
               <a:p>
                 <a:r>
                   <a:rPr lang="de-CH" dirty="0"/>
-                  <a:t>Log link → linear </a:t>
+                  <a:t>Log link: like linear </a:t>
                 </a:r>
                 <a:r>
                   <a:rPr lang="de-CH" dirty="0" err="1"/>
@@ -22063,17 +22777,45 @@
                 <a:endParaRPr lang="de-CH" dirty="0"/>
               </a:p>
               <a:p>
+                <a:pPr lvl="1"/>
                 <a:r>
-                  <a:rPr lang="de-CH" dirty="0"/>
-                  <a:t>Logit link → </a:t>
+                  <a:rPr lang="de-CH" sz="1600" dirty="0"/>
+                  <a:t>→ </a:t>
                 </a:r>
                 <a:r>
-                  <a:rPr lang="de-CH" dirty="0" err="1"/>
+                  <a:rPr lang="de-CH" sz="1600" dirty="0" err="1"/>
                   <a:t>multiplicative</a:t>
                 </a:r>
                 <a:r>
+                  <a:rPr lang="de-CH" sz="1600" dirty="0"/>
+                  <a:t> </a:t>
+                </a:r>
+                <a:r>
+                  <a:rPr lang="de-CH" sz="1600" dirty="0" err="1"/>
+                  <a:t>model</a:t>
+                </a:r>
+                <a:r>
+                  <a:rPr lang="de-CH" sz="1600" dirty="0"/>
+                  <a:t> </a:t>
+                </a:r>
+                <a:r>
+                  <a:rPr lang="de-CH" sz="1600" dirty="0" err="1"/>
+                  <a:t>for</a:t>
+                </a:r>
+                <a:r>
+                  <a:rPr lang="de-CH" sz="1600" dirty="0"/>
+                  <a:t> </a:t>
+                </a:r>
+                <a:r>
+                  <a:rPr lang="de-CH" sz="1600" dirty="0" err="1"/>
+                  <a:t>response</a:t>
+                </a:r>
+                <a:endParaRPr lang="de-CH" sz="1600" dirty="0"/>
+              </a:p>
+              <a:p>
+                <a:r>
                   <a:rPr lang="de-CH" dirty="0"/>
-                  <a:t> </a:t>
+                  <a:t>Logit link → additive </a:t>
                 </a:r>
                 <a:r>
                   <a:rPr lang="de-CH" dirty="0" err="1"/>
@@ -22092,15 +22834,33 @@
                   <a:t> </a:t>
                 </a:r>
                 <a:r>
-                  <a:rPr lang="de-CH" dirty="0">
-                    <a:solidFill>
-                      <a:schemeClr val="accent4">
-                        <a:lumMod val="75000"/>
-                      </a:schemeClr>
-                    </a:solidFill>
-                  </a:rPr>
-                  <a:t>Odds</a:t>
+                  <a:rPr lang="de-CH" dirty="0" err="1"/>
+                  <a:t>logit</a:t>
                 </a:r>
+                <a:r>
+                  <a:rPr lang="de-CH" dirty="0"/>
+                  <a:t>(</a:t>
+                </a:r>
+                <a14:m>
+                  <m:oMath xmlns:m="http://schemas.openxmlformats.org/officeDocument/2006/math">
+                    <m:r>
+                      <a:rPr lang="de-CH" sz="2000" b="0" i="1" smtClean="0">
+                        <a:solidFill>
+                          <a:schemeClr val="bg2"/>
+                        </a:solidFill>
+                        <a:latin typeface="Cambria Math" panose="02040503050406030204" pitchFamily="18" charset="0"/>
+                      </a:rPr>
+                      <m:t>𝑝</m:t>
+                    </m:r>
+                  </m:oMath>
+                </a14:m>
+                <a:r>
+                  <a:rPr lang="de-CH" dirty="0"/>
+                  <a:t>) </a:t>
+                </a:r>
+                <a:endParaRPr lang="de-CH" sz="1600" i="0" dirty="0">
+                  <a:latin typeface="Cambria Math" panose="02040503050406030204" pitchFamily="18" charset="0"/>
+                </a:endParaRPr>
               </a:p>
               <a:p>
                 <a:pPr lvl="1"/>
@@ -22143,6 +22903,11 @@
                         <m:sty m:val="p"/>
                       </m:rPr>
                       <a:rPr lang="de-CH" sz="1600" i="1" dirty="0" smtClean="0">
+                        <a:solidFill>
+                          <a:schemeClr val="accent4">
+                            <a:lumMod val="75000"/>
+                          </a:schemeClr>
+                        </a:solidFill>
                         <a:latin typeface="Cambria Math" panose="02040503050406030204" pitchFamily="18" charset="0"/>
                       </a:rPr>
                       <m:t>log</m:t>
@@ -22195,6 +22960,11 @@
                         <m:sty m:val="p"/>
                       </m:rPr>
                       <a:rPr lang="de-CH" sz="1600" i="1" dirty="0" smtClean="0">
+                        <a:solidFill>
+                          <a:schemeClr val="accent4">
+                            <a:lumMod val="75000"/>
+                          </a:schemeClr>
+                        </a:solidFill>
                         <a:latin typeface="Cambria Math" panose="02040503050406030204" pitchFamily="18" charset="0"/>
                       </a:rPr>
                       <m:t>log</m:t>
@@ -22239,6 +23009,68 @@
                             </m:r>
                           </m:den>
                         </m:f>
+                      </m:e>
+                    </m:d>
+                  </m:oMath>
+                </a14:m>
+                <a:endParaRPr lang="de-CH" sz="1600" b="0" dirty="0"/>
+              </a:p>
+              <a:p>
+                <a:pPr lvl="1"/>
+                <a:r>
+                  <a:rPr lang="de-CH" sz="1600" dirty="0"/>
+                  <a:t>→ </a:t>
+                </a:r>
+                <a:r>
+                  <a:rPr lang="de-CH" sz="1600" dirty="0" err="1"/>
+                  <a:t>multiplicative</a:t>
+                </a:r>
+                <a:r>
+                  <a:rPr lang="de-CH" sz="1600" dirty="0"/>
+                  <a:t> </a:t>
+                </a:r>
+                <a:r>
+                  <a:rPr lang="de-CH" sz="1600" dirty="0" err="1"/>
+                  <a:t>model</a:t>
+                </a:r>
+                <a:r>
+                  <a:rPr lang="de-CH" sz="1600" dirty="0"/>
+                  <a:t> </a:t>
+                </a:r>
+                <a:r>
+                  <a:rPr lang="de-CH" sz="1600" dirty="0" err="1"/>
+                  <a:t>for</a:t>
+                </a:r>
+                <a:r>
+                  <a:rPr lang="de-CH" sz="1600" dirty="0"/>
+                  <a:t> </a:t>
+                </a:r>
+                <a14:m>
+                  <m:oMath xmlns:m="http://schemas.openxmlformats.org/officeDocument/2006/math">
+                    <m:r>
+                      <m:rPr>
+                        <m:sty m:val="p"/>
+                      </m:rPr>
+                      <a:rPr lang="de-CH" sz="1600" i="0" dirty="0" smtClean="0">
+                        <a:latin typeface="Cambria Math" panose="02040503050406030204" pitchFamily="18" charset="0"/>
+                      </a:rPr>
+                      <m:t>odds</m:t>
+                    </m:r>
+                    <m:d>
+                      <m:dPr>
+                        <m:ctrlPr>
+                          <a:rPr lang="de-CH" sz="1600" i="1" dirty="0" smtClean="0">
+                            <a:latin typeface="Cambria Math" panose="02040503050406030204" pitchFamily="18" charset="0"/>
+                          </a:rPr>
+                        </m:ctrlPr>
+                      </m:dPr>
+                      <m:e>
+                        <m:r>
+                          <a:rPr lang="de-CH" sz="1600" i="1" dirty="0" smtClean="0">
+                            <a:latin typeface="Cambria Math" panose="02040503050406030204" pitchFamily="18" charset="0"/>
+                          </a:rPr>
+                          <m:t>𝑝</m:t>
+                        </m:r>
                       </m:e>
                     </m:d>
                   </m:oMath>
@@ -22323,23 +23155,7 @@
                 </a14:m>
                 <a:r>
                   <a:rPr lang="de-CH" sz="1600" dirty="0"/>
-                  <a:t> </a:t>
-                </a:r>
-                <a:r>
-                  <a:rPr lang="de-CH" sz="1600" dirty="0" err="1"/>
-                  <a:t>are</a:t>
-                </a:r>
-                <a:r>
-                  <a:rPr lang="de-CH" sz="1600" dirty="0"/>
-                  <a:t> </a:t>
-                </a:r>
-                <a:r>
-                  <a:rPr lang="de-CH" sz="1600" dirty="0" err="1"/>
-                  <a:t>interpreted</a:t>
-                </a:r>
-                <a:r>
-                  <a:rPr lang="de-CH" sz="1600" dirty="0"/>
-                  <a:t> </a:t>
+                  <a:t> interpreted </a:t>
                 </a:r>
                 <a:r>
                   <a:rPr lang="de-CH" sz="1600" dirty="0" err="1"/>
@@ -22365,43 +23181,11 @@
                   <a:rPr lang="de-CH" sz="1600" dirty="0"/>
                   <a:t>. </a:t>
                 </a:r>
-                <a:r>
-                  <a:rPr lang="de-CH" sz="1600" dirty="0" err="1"/>
-                  <a:t>No</a:t>
-                </a:r>
-                <a:r>
-                  <a:rPr lang="de-CH" sz="1600" dirty="0"/>
-                  <a:t> simple </a:t>
-                </a:r>
-                <a:r>
-                  <a:rPr lang="de-CH" sz="1600" dirty="0" err="1"/>
-                  <a:t>interpretation</a:t>
-                </a:r>
-                <a:r>
-                  <a:rPr lang="de-CH" sz="1600" dirty="0"/>
-                  <a:t> on </a:t>
-                </a:r>
-                <a:r>
-                  <a:rPr lang="de-CH" sz="1600" dirty="0" err="1"/>
-                  <a:t>probability</a:t>
-                </a:r>
-                <a:r>
-                  <a:rPr lang="de-CH" sz="1600" dirty="0"/>
-                  <a:t> </a:t>
-                </a:r>
-                <a:r>
-                  <a:rPr lang="de-CH" sz="1600" dirty="0" err="1"/>
-                  <a:t>scale</a:t>
-                </a:r>
-                <a:r>
-                  <a:rPr lang="de-CH" sz="1600" dirty="0"/>
-                  <a:t>.</a:t>
-                </a:r>
               </a:p>
             </p:txBody>
           </p:sp>
         </mc:Choice>
-        <mc:Fallback xmlns="">
+        <mc:Fallback>
           <p:sp>
             <p:nvSpPr>
               <p:cNvPr id="203" name="Google Shape;203;p17"/>
@@ -22415,7 +23199,7 @@
             <p:spPr>
               <a:xfrm>
                 <a:off x="1031425" y="1986717"/>
-                <a:ext cx="6119050" cy="2309620"/>
+                <a:ext cx="6217938" cy="2614544"/>
               </a:xfrm>
               <a:prstGeom prst="rect">
                 <a:avLst/>
@@ -22585,8 +23369,8 @@
           </a:p>
         </p:txBody>
       </p:sp>
-      <mc:AlternateContent xmlns:mc="http://schemas.openxmlformats.org/markup-compatibility/2006" xmlns:a14="http://schemas.microsoft.com/office/drawing/2010/main">
-        <mc:Choice Requires="a14">
+      <mc:AlternateContent xmlns:mc="http://schemas.openxmlformats.org/markup-compatibility/2006">
+        <mc:Choice xmlns:a14="http://schemas.microsoft.com/office/drawing/2010/main" Requires="a14">
           <p:sp>
             <p:nvSpPr>
               <p:cNvPr id="10" name="Textfeld 9">
@@ -22601,7 +23385,7 @@
             </p:nvSpPr>
             <p:spPr>
               <a:xfrm>
-                <a:off x="5800434" y="3237856"/>
+                <a:off x="5606091" y="3140100"/>
                 <a:ext cx="1867751" cy="307777"/>
               </a:xfrm>
               <a:prstGeom prst="rect">
@@ -22778,7 +23562,7 @@
             </p:txBody>
           </p:sp>
         </mc:Choice>
-        <mc:Fallback xmlns="">
+        <mc:Fallback>
           <p:sp>
             <p:nvSpPr>
               <p:cNvPr id="10" name="Textfeld 9">
@@ -22795,7 +23579,7 @@
             </p:nvSpPr>
             <p:spPr>
               <a:xfrm>
-                <a:off x="5800434" y="3237856"/>
+                <a:off x="5606091" y="3140100"/>
                 <a:ext cx="1867751" cy="307777"/>
               </a:xfrm>
               <a:prstGeom prst="rect">

</xml_diff>

<commit_message>
reviewed Chapter 2 and added problematic part of repeated diamonds.
</commit_message>
<xml_diff>
--- a/slides/ML_Lecture.pptx
+++ b/slides/ML_Lecture.pptx
@@ -12461,8 +12461,8 @@
           </a:p>
         </p:txBody>
       </p:sp>
-      <mc:AlternateContent xmlns:mc="http://schemas.openxmlformats.org/markup-compatibility/2006">
-        <mc:Choice xmlns:a14="http://schemas.microsoft.com/office/drawing/2010/main" Requires="a14">
+      <mc:AlternateContent xmlns:mc="http://schemas.openxmlformats.org/markup-compatibility/2006" xmlns:a14="http://schemas.microsoft.com/office/drawing/2010/main">
+        <mc:Choice Requires="a14">
           <p:sp>
             <p:nvSpPr>
               <p:cNvPr id="203" name="Google Shape;203;p17"/>
@@ -13162,7 +13162,7 @@
             </p:txBody>
           </p:sp>
         </mc:Choice>
-        <mc:Fallback>
+        <mc:Fallback xmlns="">
           <p:sp>
             <p:nvSpPr>
               <p:cNvPr id="203" name="Google Shape;203;p17"/>
@@ -14151,8 +14151,8 @@
           </a:p>
         </p:txBody>
       </p:sp>
-      <mc:AlternateContent xmlns:mc="http://schemas.openxmlformats.org/markup-compatibility/2006">
-        <mc:Choice xmlns:a14="http://schemas.microsoft.com/office/drawing/2010/main" Requires="a14">
+      <mc:AlternateContent xmlns:mc="http://schemas.openxmlformats.org/markup-compatibility/2006" xmlns:a14="http://schemas.microsoft.com/office/drawing/2010/main">
+        <mc:Choice Requires="a14">
           <p:sp>
             <p:nvSpPr>
               <p:cNvPr id="15" name="Google Shape;203;p17">
@@ -14738,7 +14738,7 @@
             </p:txBody>
           </p:sp>
         </mc:Choice>
-        <mc:Fallback>
+        <mc:Fallback xmlns="">
           <p:sp>
             <p:nvSpPr>
               <p:cNvPr id="15" name="Google Shape;203;p17">
@@ -16807,8 +16807,8 @@
           </a:p>
         </p:txBody>
       </p:sp>
-      <mc:AlternateContent xmlns:mc="http://schemas.openxmlformats.org/markup-compatibility/2006">
-        <mc:Choice xmlns:a14="http://schemas.microsoft.com/office/drawing/2010/main" Requires="a14">
+      <mc:AlternateContent xmlns:mc="http://schemas.openxmlformats.org/markup-compatibility/2006" xmlns:a14="http://schemas.microsoft.com/office/drawing/2010/main">
+        <mc:Choice Requires="a14">
           <p:sp>
             <p:nvSpPr>
               <p:cNvPr id="203" name="Google Shape;203;p17"/>
@@ -17322,7 +17322,7 @@
             </p:txBody>
           </p:sp>
         </mc:Choice>
-        <mc:Fallback>
+        <mc:Fallback xmlns="">
           <p:sp>
             <p:nvSpPr>
               <p:cNvPr id="203" name="Google Shape;203;p17"/>
@@ -17824,8 +17824,8 @@
           </a:p>
         </p:txBody>
       </p:sp>
-      <mc:AlternateContent xmlns:mc="http://schemas.openxmlformats.org/markup-compatibility/2006">
-        <mc:Choice xmlns:a14="http://schemas.microsoft.com/office/drawing/2010/main" Requires="a14">
+      <mc:AlternateContent xmlns:mc="http://schemas.openxmlformats.org/markup-compatibility/2006" xmlns:a14="http://schemas.microsoft.com/office/drawing/2010/main">
+        <mc:Choice Requires="a14">
           <p:sp>
             <p:nvSpPr>
               <p:cNvPr id="203" name="Google Shape;203;p17"/>
@@ -18296,7 +18296,7 @@
             </p:txBody>
           </p:sp>
         </mc:Choice>
-        <mc:Fallback>
+        <mc:Fallback xmlns="">
           <p:sp>
             <p:nvSpPr>
               <p:cNvPr id="203" name="Google Shape;203;p17"/>
@@ -18992,8 +18992,8 @@
           </a:p>
         </p:txBody>
       </p:sp>
-      <mc:AlternateContent xmlns:mc="http://schemas.openxmlformats.org/markup-compatibility/2006">
-        <mc:Choice xmlns:a14="http://schemas.microsoft.com/office/drawing/2010/main" Requires="a14">
+      <mc:AlternateContent xmlns:mc="http://schemas.openxmlformats.org/markup-compatibility/2006" xmlns:a14="http://schemas.microsoft.com/office/drawing/2010/main">
+        <mc:Choice Requires="a14">
           <p:sp>
             <p:nvSpPr>
               <p:cNvPr id="203" name="Google Shape;203;p17"/>
@@ -19256,7 +19256,7 @@
             </p:txBody>
           </p:sp>
         </mc:Choice>
-        <mc:Fallback>
+        <mc:Fallback xmlns="">
           <p:sp>
             <p:nvSpPr>
               <p:cNvPr id="203" name="Google Shape;203;p17"/>
@@ -19398,8 +19398,8 @@
           </a:p>
         </p:txBody>
       </p:sp>
-      <mc:AlternateContent xmlns:mc="http://schemas.openxmlformats.org/markup-compatibility/2006">
-        <mc:Choice xmlns:a14="http://schemas.microsoft.com/office/drawing/2010/main" Requires="a14">
+      <mc:AlternateContent xmlns:mc="http://schemas.openxmlformats.org/markup-compatibility/2006" xmlns:a14="http://schemas.microsoft.com/office/drawing/2010/main">
+        <mc:Choice Requires="a14">
           <p:sp>
             <p:nvSpPr>
               <p:cNvPr id="203" name="Google Shape;203;p17"/>
@@ -19833,7 +19833,7 @@
             </p:txBody>
           </p:sp>
         </mc:Choice>
-        <mc:Fallback>
+        <mc:Fallback xmlns="">
           <p:sp>
             <p:nvSpPr>
               <p:cNvPr id="203" name="Google Shape;203;p17"/>
@@ -20941,8 +20941,8 @@
           </a:p>
         </p:txBody>
       </p:sp>
-      <mc:AlternateContent xmlns:mc="http://schemas.openxmlformats.org/markup-compatibility/2006">
-        <mc:Choice xmlns:a14="http://schemas.microsoft.com/office/drawing/2010/main" Requires="a14">
+      <mc:AlternateContent xmlns:mc="http://schemas.openxmlformats.org/markup-compatibility/2006" xmlns:a14="http://schemas.microsoft.com/office/drawing/2010/main">
+        <mc:Choice Requires="a14">
           <p:sp>
             <p:nvSpPr>
               <p:cNvPr id="203" name="Google Shape;203;p17"/>
@@ -21556,7 +21556,7 @@
             </p:txBody>
           </p:sp>
         </mc:Choice>
-        <mc:Fallback>
+        <mc:Fallback xmlns="">
           <p:sp>
             <p:nvSpPr>
               <p:cNvPr id="203" name="Google Shape;203;p17"/>
@@ -22712,8 +22712,8 @@
           </a:p>
         </p:txBody>
       </p:sp>
-      <mc:AlternateContent xmlns:mc="http://schemas.openxmlformats.org/markup-compatibility/2006">
-        <mc:Choice xmlns:a14="http://schemas.microsoft.com/office/drawing/2010/main" Requires="a14">
+      <mc:AlternateContent xmlns:mc="http://schemas.openxmlformats.org/markup-compatibility/2006" xmlns:a14="http://schemas.microsoft.com/office/drawing/2010/main">
+        <mc:Choice Requires="a14">
           <p:sp>
             <p:nvSpPr>
               <p:cNvPr id="203" name="Google Shape;203;p17"/>
@@ -23185,7 +23185,7 @@
             </p:txBody>
           </p:sp>
         </mc:Choice>
-        <mc:Fallback>
+        <mc:Fallback xmlns="">
           <p:sp>
             <p:nvSpPr>
               <p:cNvPr id="203" name="Google Shape;203;p17"/>
@@ -23369,8 +23369,8 @@
           </a:p>
         </p:txBody>
       </p:sp>
-      <mc:AlternateContent xmlns:mc="http://schemas.openxmlformats.org/markup-compatibility/2006">
-        <mc:Choice xmlns:a14="http://schemas.microsoft.com/office/drawing/2010/main" Requires="a14">
+      <mc:AlternateContent xmlns:mc="http://schemas.openxmlformats.org/markup-compatibility/2006" xmlns:a14="http://schemas.microsoft.com/office/drawing/2010/main">
+        <mc:Choice Requires="a14">
           <p:sp>
             <p:nvSpPr>
               <p:cNvPr id="10" name="Textfeld 9">
@@ -23562,7 +23562,7 @@
             </p:txBody>
           </p:sp>
         </mc:Choice>
-        <mc:Fallback>
+        <mc:Fallback xmlns="">
           <p:sp>
             <p:nvSpPr>
               <p:cNvPr id="10" name="Textfeld 9">
@@ -24986,8 +24986,8 @@
         </p:nvSpPr>
         <p:spPr>
           <a:xfrm>
-            <a:off x="1031425" y="1777125"/>
-            <a:ext cx="5903332" cy="2445251"/>
+            <a:off x="1031424" y="1777125"/>
+            <a:ext cx="6210623" cy="2445251"/>
           </a:xfrm>
           <a:prstGeom prst="rect">
             <a:avLst/>
@@ -25081,7 +25081,10 @@
               <a:rPr lang="de-CH" dirty="0" err="1"/>
               <a:t>set</a:t>
             </a:r>
-            <a:endParaRPr lang="de-CH" dirty="0"/>
+            <a:r>
+              <a:rPr lang="de-CH" dirty="0"/>
+              <a:t>, e.g. 80%/20%</a:t>
+            </a:r>
           </a:p>
           <a:p>
             <a:r>
@@ -25162,7 +25165,7 @@
             </a:r>
             <a:r>
               <a:rPr lang="de-CH" dirty="0" err="1"/>
-              <a:t>hyperparameters</a:t>
+              <a:t>parameters</a:t>
             </a:r>
             <a:r>
               <a:rPr lang="de-CH" dirty="0"/>
@@ -25259,7 +25262,7 @@
         </p:nvSpPr>
         <p:spPr>
           <a:xfrm>
-            <a:off x="1808630" y="4145809"/>
+            <a:off x="1901953" y="3926353"/>
             <a:ext cx="1351429" cy="369332"/>
           </a:xfrm>
           <a:prstGeom prst="rect">
@@ -25372,7 +25375,7 @@
         <p:spPr>
           <a:xfrm>
             <a:off x="1031424" y="1777125"/>
-            <a:ext cx="6122411" cy="2861620"/>
+            <a:ext cx="7454208" cy="3021646"/>
           </a:xfrm>
           <a:prstGeom prst="rect">
             <a:avLst/>
@@ -25385,73 +25388,94 @@
           <a:lstStyle/>
           <a:p>
             <a:r>
-              <a:rPr lang="de-CH" dirty="0"/>
+              <a:rPr lang="de-CH" sz="1800" dirty="0"/>
               <a:t>Simple </a:t>
             </a:r>
             <a:r>
-              <a:rPr lang="de-CH" dirty="0" err="1"/>
+              <a:rPr lang="de-CH" sz="1800" dirty="0" err="1"/>
               <a:t>validation</a:t>
             </a:r>
             <a:r>
-              <a:rPr lang="de-CH" dirty="0"/>
+              <a:rPr lang="de-CH" sz="1800" dirty="0"/>
               <a:t> </a:t>
             </a:r>
             <a:r>
-              <a:rPr lang="de-CH" dirty="0" err="1"/>
+              <a:rPr lang="de-CH" sz="1800" dirty="0" err="1"/>
               <a:t>is</a:t>
             </a:r>
             <a:r>
-              <a:rPr lang="de-CH" dirty="0"/>
+              <a:rPr lang="de-CH" sz="1800" dirty="0"/>
               <a:t> </a:t>
             </a:r>
             <a:r>
-              <a:rPr lang="de-CH" dirty="0" err="1"/>
+              <a:rPr lang="de-CH" sz="1800" dirty="0" err="1"/>
               <a:t>neither</a:t>
             </a:r>
             <a:r>
-              <a:rPr lang="de-CH" dirty="0"/>
+              <a:rPr lang="de-CH" sz="1800" dirty="0"/>
               <a:t> </a:t>
             </a:r>
             <a:r>
-              <a:rPr lang="de-CH" dirty="0" err="1"/>
+              <a:rPr lang="de-CH" sz="1800" dirty="0" err="1"/>
               <a:t>economic</a:t>
             </a:r>
             <a:r>
-              <a:rPr lang="de-CH" dirty="0"/>
+              <a:rPr lang="de-CH" sz="1800" dirty="0"/>
               <a:t> </a:t>
             </a:r>
             <a:r>
-              <a:rPr lang="de-CH" dirty="0" err="1"/>
+              <a:rPr lang="de-CH" sz="1800" dirty="0" err="1"/>
               <a:t>nor</a:t>
             </a:r>
             <a:r>
-              <a:rPr lang="de-CH" dirty="0"/>
-              <a:t> robust</a:t>
-            </a:r>
+              <a:rPr lang="de-CH" sz="1800" dirty="0"/>
+              <a:t> robust, </a:t>
+            </a:r>
+            <a:r>
+              <a:rPr lang="de-CH" sz="1800" dirty="0" err="1"/>
+              <a:t>except</a:t>
+            </a:r>
+            <a:r>
+              <a:rPr lang="de-CH" sz="1800" dirty="0"/>
+              <a:t> </a:t>
+            </a:r>
+            <a:r>
+              <a:rPr lang="de-CH" sz="1800" dirty="0" err="1"/>
+              <a:t>for</a:t>
+            </a:r>
+            <a:r>
+              <a:rPr lang="de-CH" sz="1800" dirty="0"/>
+              <a:t> large </a:t>
+            </a:r>
+            <a:r>
+              <a:rPr lang="de-CH" sz="1800" dirty="0" err="1"/>
+              <a:t>data</a:t>
+            </a:r>
+            <a:endParaRPr lang="de-CH" sz="1800" dirty="0"/>
           </a:p>
           <a:p>
             <a:r>
-              <a:rPr lang="de-CH" dirty="0" err="1"/>
+              <a:rPr lang="de-CH" sz="1800" dirty="0" err="1"/>
               <a:t>Better</a:t>
             </a:r>
             <a:r>
-              <a:rPr lang="de-CH" dirty="0"/>
+              <a:rPr lang="de-CH" sz="1800" dirty="0"/>
               <a:t>: k-</a:t>
             </a:r>
             <a:r>
-              <a:rPr lang="de-CH" dirty="0" err="1"/>
+              <a:rPr lang="de-CH" sz="1800" dirty="0" err="1"/>
               <a:t>fold</a:t>
             </a:r>
             <a:r>
-              <a:rPr lang="de-CH" dirty="0"/>
+              <a:rPr lang="de-CH" sz="1800" dirty="0"/>
               <a:t> </a:t>
             </a:r>
             <a:r>
-              <a:rPr lang="de-CH" dirty="0" err="1"/>
+              <a:rPr lang="de-CH" sz="1800" dirty="0" err="1"/>
               <a:t>cross</a:t>
             </a:r>
             <a:r>
-              <a:rPr lang="de-CH" dirty="0"/>
+              <a:rPr lang="de-CH" sz="1800" dirty="0"/>
               <a:t>-validation</a:t>
             </a:r>
           </a:p>
@@ -25472,16 +25496,24 @@
           </a:p>
           <a:p>
             <a:r>
-              <a:rPr lang="de-CH" dirty="0"/>
+              <a:rPr lang="de-CH" sz="1800" dirty="0"/>
               <a:t>Final </a:t>
             </a:r>
             <a:r>
-              <a:rPr lang="de-CH" dirty="0" err="1"/>
+              <a:rPr lang="de-CH" sz="1800" dirty="0" err="1"/>
               <a:t>model</a:t>
             </a:r>
             <a:r>
-              <a:rPr lang="de-CH" dirty="0"/>
-              <a:t>?</a:t>
+              <a:rPr lang="de-CH" sz="1800" dirty="0"/>
+              <a:t>? </a:t>
+            </a:r>
+            <a:r>
+              <a:rPr lang="de-CH" sz="1800" dirty="0" err="1"/>
+              <a:t>Repeated</a:t>
+            </a:r>
+            <a:r>
+              <a:rPr lang="de-CH" sz="1800" dirty="0"/>
+              <a:t> CV?</a:t>
             </a:r>
           </a:p>
           <a:p>
@@ -25889,7 +25921,7 @@
         </p:blipFill>
         <p:spPr>
           <a:xfrm>
-            <a:off x="1490684" y="2672997"/>
+            <a:off x="1563156" y="2629106"/>
             <a:ext cx="3835195" cy="1504950"/>
           </a:xfrm>
           <a:prstGeom prst="rect">
@@ -25987,7 +26019,7 @@
         <p:spPr>
           <a:xfrm>
             <a:off x="1074486" y="2170824"/>
-            <a:ext cx="5904537" cy="1994243"/>
+            <a:ext cx="6716202" cy="1994243"/>
           </a:xfrm>
           <a:prstGeom prst="rect">
             <a:avLst/>
@@ -26031,9 +26063,6 @@
               <a:rPr lang="de-CH" dirty="0"/>
               <a:t> </a:t>
             </a:r>
-            <a:br>
-              <a:rPr lang="de-CH" dirty="0"/>
-            </a:br>
             <a:r>
               <a:rPr lang="de-CH" dirty="0">
                 <a:solidFill>
@@ -26146,9 +26175,6 @@
               <a:rPr lang="de-CH" dirty="0"/>
               <a:t> Search CV</a:t>
             </a:r>
-          </a:p>
-          <a:p>
-            <a:endParaRPr lang="de-CH" dirty="0"/>
           </a:p>
           <a:p>
             <a:pPr marL="101600" indent="0">
@@ -26255,7 +26281,7 @@
           <a:p>
             <a:r>
               <a:rPr lang="en-US" dirty="0"/>
-              <a:t>Test Data</a:t>
+              <a:t>Test Data and Final Workflow</a:t>
             </a:r>
             <a:endParaRPr dirty="0"/>
           </a:p>
@@ -26367,7 +26393,7 @@
             </a:r>
             <a:r>
               <a:rPr lang="de-CH" dirty="0"/>
-              <a:t> CV!</a:t>
+              <a:t> on CV!</a:t>
             </a:r>
           </a:p>
           <a:p>
@@ -26424,63 +26450,6 @@
           </a:p>
           <a:p>
             <a:endParaRPr lang="de-CH" dirty="0"/>
-          </a:p>
-          <a:p>
-            <a:pPr marL="101600" indent="0">
-              <a:buNone/>
-            </a:pPr>
-            <a:endParaRPr lang="de-CH" u="sng" dirty="0">
-              <a:solidFill>
-                <a:schemeClr val="accent4">
-                  <a:lumMod val="75000"/>
-                </a:schemeClr>
-              </a:solidFill>
-            </a:endParaRPr>
-          </a:p>
-          <a:p>
-            <a:pPr marL="101600" indent="0">
-              <a:buNone/>
-            </a:pPr>
-            <a:r>
-              <a:rPr lang="de-CH" u="sng" dirty="0" err="1">
-                <a:solidFill>
-                  <a:schemeClr val="accent4">
-                    <a:lumMod val="75000"/>
-                  </a:schemeClr>
-                </a:solidFill>
-              </a:rPr>
-              <a:t>Example</a:t>
-            </a:r>
-            <a:r>
-              <a:rPr lang="de-CH" u="sng" dirty="0">
-                <a:solidFill>
-                  <a:schemeClr val="accent4">
-                    <a:lumMod val="75000"/>
-                  </a:schemeClr>
-                </a:solidFill>
-              </a:rPr>
-              <a:t> </a:t>
-            </a:r>
-            <a:r>
-              <a:rPr lang="de-CH" u="sng" dirty="0" err="1">
-                <a:solidFill>
-                  <a:schemeClr val="accent4">
-                    <a:lumMod val="75000"/>
-                  </a:schemeClr>
-                </a:solidFill>
-              </a:rPr>
-              <a:t>of</a:t>
-            </a:r>
-            <a:r>
-              <a:rPr lang="de-CH" u="sng" dirty="0">
-                <a:solidFill>
-                  <a:schemeClr val="accent4">
-                    <a:lumMod val="75000"/>
-                  </a:schemeClr>
-                </a:solidFill>
-              </a:rPr>
-              <a:t> Workflow B</a:t>
-            </a:r>
           </a:p>
           <a:p>
             <a:pPr marL="101600" indent="0">
@@ -26588,12 +26557,19 @@
         </p:nvSpPr>
         <p:spPr>
           <a:xfrm>
-            <a:off x="3983091" y="4227408"/>
-            <a:ext cx="2319866" cy="307777"/>
+            <a:off x="1502501" y="4330968"/>
+            <a:ext cx="2180405" cy="307777"/>
           </a:xfrm>
           <a:prstGeom prst="rect">
             <a:avLst/>
           </a:prstGeom>
+          <a:ln>
+            <a:solidFill>
+              <a:schemeClr val="accent4">
+                <a:lumMod val="75000"/>
+              </a:schemeClr>
+            </a:solidFill>
+          </a:ln>
         </p:spPr>
         <p:style>
           <a:lnRef idx="2">
@@ -26624,26 +26600,6 @@
                 </a:solidFill>
               </a:rPr>
               <a:t>When</a:t>
-            </a:r>
-            <a:r>
-              <a:rPr lang="de-CH" dirty="0">
-                <a:solidFill>
-                  <a:schemeClr val="accent4">
-                    <a:lumMod val="75000"/>
-                  </a:schemeClr>
-                </a:solidFill>
-              </a:rPr>
-              <a:t> </a:t>
-            </a:r>
-            <a:r>
-              <a:rPr lang="de-CH" dirty="0" err="1">
-                <a:solidFill>
-                  <a:schemeClr val="accent4">
-                    <a:lumMod val="75000"/>
-                  </a:schemeClr>
-                </a:solidFill>
-              </a:rPr>
-              <a:t>is</a:t>
             </a:r>
             <a:r>
               <a:rPr lang="de-CH" dirty="0">
@@ -26706,6 +26662,80 @@
           </a:fontRef>
         </p:style>
       </p:pic>
+      <p:sp>
+        <p:nvSpPr>
+          <p:cNvPr id="9" name="Textfeld 8">
+            <a:extLst>
+              <a:ext uri="{FF2B5EF4-FFF2-40B4-BE49-F238E27FC236}">
+                <a16:creationId xmlns:a16="http://schemas.microsoft.com/office/drawing/2014/main" id="{10BA9225-C810-43BF-931F-0F84E2D05F62}"/>
+              </a:ext>
+            </a:extLst>
+          </p:cNvPr>
+          <p:cNvSpPr txBox="1"/>
+          <p:nvPr/>
+        </p:nvSpPr>
+        <p:spPr>
+          <a:xfrm>
+            <a:off x="4295300" y="4162874"/>
+            <a:ext cx="2498141" cy="307777"/>
+          </a:xfrm>
+          <a:prstGeom prst="rect">
+            <a:avLst/>
+          </a:prstGeom>
+          <a:noFill/>
+        </p:spPr>
+        <p:txBody>
+          <a:bodyPr wrap="square">
+            <a:spAutoFit/>
+          </a:bodyPr>
+          <a:lstStyle/>
+          <a:p>
+            <a:pPr marL="101600" indent="0">
+              <a:buNone/>
+            </a:pPr>
+            <a:r>
+              <a:rPr lang="de-CH" u="sng" dirty="0" err="1">
+                <a:solidFill>
+                  <a:schemeClr val="accent4">
+                    <a:lumMod val="75000"/>
+                  </a:schemeClr>
+                </a:solidFill>
+              </a:rPr>
+              <a:t>Example</a:t>
+            </a:r>
+            <a:r>
+              <a:rPr lang="de-CH" u="sng" dirty="0">
+                <a:solidFill>
+                  <a:schemeClr val="accent4">
+                    <a:lumMod val="75000"/>
+                  </a:schemeClr>
+                </a:solidFill>
+              </a:rPr>
+              <a:t> </a:t>
+            </a:r>
+            <a:r>
+              <a:rPr lang="de-CH" u="sng" dirty="0" err="1">
+                <a:solidFill>
+                  <a:schemeClr val="accent4">
+                    <a:lumMod val="75000"/>
+                  </a:schemeClr>
+                </a:solidFill>
+              </a:rPr>
+              <a:t>of</a:t>
+            </a:r>
+            <a:r>
+              <a:rPr lang="de-CH" u="sng" dirty="0">
+                <a:solidFill>
+                  <a:schemeClr val="accent4">
+                    <a:lumMod val="75000"/>
+                  </a:schemeClr>
+                </a:solidFill>
+              </a:rPr>
+              <a:t> Workflow B</a:t>
+            </a:r>
+          </a:p>
+        </p:txBody>
+      </p:sp>
     </p:spTree>
     <p:extLst>
       <p:ext uri="{BB962C8B-B14F-4D97-AF65-F5344CB8AC3E}">
@@ -27484,7 +27514,7 @@
         <p:spPr>
           <a:xfrm>
             <a:off x="1351771" y="2942250"/>
-            <a:ext cx="1589639" cy="499338"/>
+            <a:ext cx="1823026" cy="499338"/>
           </a:xfrm>
           <a:prstGeom prst="rect">
             <a:avLst/>
@@ -27747,7 +27777,7 @@
           </a:lstStyle>
           <a:p>
             <a:r>
-              <a:rPr lang="de-CH" sz="2000" dirty="0" err="1">
+              <a:rPr lang="de-CH" sz="2400" dirty="0" err="1">
                 <a:solidFill>
                   <a:schemeClr val="tx2">
                     <a:lumMod val="50000"/>
@@ -27757,7 +27787,7 @@
               <a:t>Grouped</a:t>
             </a:r>
             <a:r>
-              <a:rPr lang="de-CH" sz="2000" dirty="0">
+              <a:rPr lang="de-CH" sz="2400" dirty="0">
                 <a:solidFill>
                   <a:schemeClr val="tx2">
                     <a:lumMod val="50000"/>
@@ -27767,7 +27797,7 @@
               <a:t> </a:t>
             </a:r>
             <a:r>
-              <a:rPr lang="de-CH" sz="2000" dirty="0" err="1">
+              <a:rPr lang="de-CH" sz="2400" dirty="0" err="1">
                 <a:solidFill>
                   <a:schemeClr val="tx2">
                     <a:lumMod val="50000"/>
@@ -27776,7 +27806,7 @@
               </a:rPr>
               <a:t>splits</a:t>
             </a:r>
-            <a:endParaRPr lang="de-CH" sz="2000" dirty="0">
+            <a:endParaRPr lang="de-CH" sz="2400" dirty="0">
               <a:solidFill>
                 <a:schemeClr val="tx2">
                   <a:lumMod val="50000"/>
@@ -28518,7 +28548,14 @@
             </a:pPr>
             <a:r>
               <a:rPr lang="en-US" sz="1600" dirty="0"/>
-              <a:t>Apply stratified splitting on “price” throughout the last example. Do the results change?</a:t>
+              <a:t>Apply stratified splitting on “price” throughout the last example. </a:t>
+            </a:r>
+            <a:br>
+              <a:rPr lang="en-US" sz="1600" dirty="0"/>
+            </a:br>
+            <a:r>
+              <a:rPr lang="en-US" sz="1600" dirty="0"/>
+              <a:t>Do the results change?</a:t>
             </a:r>
           </a:p>
           <a:p>
@@ -28528,7 +28565,7 @@
             </a:pPr>
             <a:r>
               <a:rPr lang="en-US" sz="1600" dirty="0"/>
-              <a:t>Use CV to select the best polynomial degree of log(carat) in the Gamma GLM with log-link (with additional covariables color, cut, clarity). Evaluate on a test data.</a:t>
+              <a:t>As alternative to grouped splitting, deduplicate (why?) the diamonds data on "price" and covariables and repeat the last example. Do the results change? Why should we trust these results more?</a:t>
             </a:r>
           </a:p>
           <a:p>
@@ -28538,23 +28575,8 @@
             </a:pPr>
             <a:r>
               <a:rPr lang="en-US" sz="1600" dirty="0"/>
-              <a:t>Compare by simple validation the linear regression for “price” to a Gamma GLM with log-link. Once use (R)MSE for comparison and once Gamma deviance. What do you observe? </a:t>
-            </a:r>
-            <a:br>
-              <a:rPr lang="en-US" sz="1600" dirty="0"/>
-            </a:br>
-            <a:r>
-              <a:rPr lang="en-US" sz="1600" dirty="0"/>
-              <a:t>As covariables, use log(carat), color, cut, clarity.</a:t>
-            </a:r>
-            <a:endParaRPr lang="de-CH" sz="1600" dirty="0"/>
-          </a:p>
-          <a:p>
-            <a:pPr marL="558800" indent="-457200">
-              <a:buFont typeface="+mj-lt"/>
-              <a:buAutoNum type="arabicPeriod"/>
-            </a:pPr>
-            <a:endParaRPr lang="de-CH" dirty="0"/>
+              <a:t>Use CV to select the best polynomial degree of log(carat) in the Gamma GLM with log-link (with additional covariables color, cut, clarity). Evaluate on a test data.</a:t>
+            </a:r>
           </a:p>
         </p:txBody>
       </p:sp>

</xml_diff>

<commit_message>
final review Chapter 3
</commit_message>
<xml_diff>
--- a/slides/ML_Lecture.pptx
+++ b/slides/ML_Lecture.pptx
@@ -28565,7 +28565,7 @@
             </a:pPr>
             <a:r>
               <a:rPr lang="en-US" sz="1600" dirty="0"/>
-              <a:t>As alternative to grouped splitting, deduplicate (why?) the diamonds data on "price" and covariables and repeat the last example. Do the results change? Why should we trust these results more?</a:t>
+              <a:t>As alternative to grouped splitting, deduplicate (why?) the diamonds data on "price" and all covariables and repeat the last example. Do the results change? Why should we trust these results more?</a:t>
             </a:r>
           </a:p>
           <a:p>
@@ -28832,602 +28832,6 @@
       </p:sp>
       <p:sp>
         <p:nvSpPr>
-          <p:cNvPr id="2" name="Google Shape;301;p27">
-            <a:extLst>
-              <a:ext uri="{FF2B5EF4-FFF2-40B4-BE49-F238E27FC236}">
-                <a16:creationId xmlns:a16="http://schemas.microsoft.com/office/drawing/2014/main" id="{2A9F0F4E-EF58-48CC-80BE-1413D7BD1EDA}"/>
-              </a:ext>
-            </a:extLst>
-          </p:cNvPr>
-          <p:cNvSpPr txBox="1">
-            <a:spLocks/>
-          </p:cNvSpPr>
-          <p:nvPr/>
-        </p:nvSpPr>
-        <p:spPr>
-          <a:xfrm>
-            <a:off x="2772843" y="3192833"/>
-            <a:ext cx="1242979" cy="495060"/>
-          </a:xfrm>
-          <a:prstGeom prst="rect">
-            <a:avLst/>
-          </a:prstGeom>
-          <a:noFill/>
-          <a:ln>
-            <a:noFill/>
-          </a:ln>
-        </p:spPr>
-        <p:txBody>
-          <a:bodyPr spcFirstLastPara="1" wrap="square" lIns="91425" tIns="91425" rIns="91425" bIns="91425" anchor="b" anchorCtr="0">
-            <a:noAutofit/>
-          </a:bodyPr>
-          <a:lstStyle>
-            <a:defPPr marR="0" lvl="0" algn="l" rtl="0">
-              <a:lnSpc>
-                <a:spcPct val="100000"/>
-              </a:lnSpc>
-              <a:spcBef>
-                <a:spcPts val="0"/>
-              </a:spcBef>
-              <a:spcAft>
-                <a:spcPts val="0"/>
-              </a:spcAft>
-            </a:defPPr>
-            <a:lvl1pPr marR="0" lvl="0" algn="l" rtl="0">
-              <a:lnSpc>
-                <a:spcPct val="100000"/>
-              </a:lnSpc>
-              <a:spcBef>
-                <a:spcPts val="0"/>
-              </a:spcBef>
-              <a:spcAft>
-                <a:spcPts val="0"/>
-              </a:spcAft>
-              <a:buClr>
-                <a:srgbClr val="3796BF"/>
-              </a:buClr>
-              <a:buSzPts val="3000"/>
-              <a:buFont typeface="Oswald"/>
-              <a:buNone/>
-              <a:defRPr sz="3000" b="1" i="0" u="none" strike="noStrike" cap="none">
-                <a:solidFill>
-                  <a:srgbClr val="3796BF"/>
-                </a:solidFill>
-                <a:latin typeface="Oswald"/>
-                <a:ea typeface="Oswald"/>
-                <a:cs typeface="Oswald"/>
-                <a:sym typeface="Oswald"/>
-              </a:defRPr>
-            </a:lvl1pPr>
-            <a:lvl2pPr marR="0" lvl="1" algn="l" rtl="0">
-              <a:lnSpc>
-                <a:spcPct val="100000"/>
-              </a:lnSpc>
-              <a:spcBef>
-                <a:spcPts val="0"/>
-              </a:spcBef>
-              <a:spcAft>
-                <a:spcPts val="0"/>
-              </a:spcAft>
-              <a:buClr>
-                <a:srgbClr val="3796BF"/>
-              </a:buClr>
-              <a:buSzPts val="3000"/>
-              <a:buFont typeface="Oswald"/>
-              <a:buNone/>
-              <a:defRPr sz="3000" b="1" i="0" u="none" strike="noStrike" cap="none">
-                <a:solidFill>
-                  <a:srgbClr val="3796BF"/>
-                </a:solidFill>
-                <a:latin typeface="Oswald"/>
-                <a:ea typeface="Oswald"/>
-                <a:cs typeface="Oswald"/>
-                <a:sym typeface="Oswald"/>
-              </a:defRPr>
-            </a:lvl2pPr>
-            <a:lvl3pPr marR="0" lvl="2" algn="l" rtl="0">
-              <a:lnSpc>
-                <a:spcPct val="100000"/>
-              </a:lnSpc>
-              <a:spcBef>
-                <a:spcPts val="0"/>
-              </a:spcBef>
-              <a:spcAft>
-                <a:spcPts val="0"/>
-              </a:spcAft>
-              <a:buClr>
-                <a:srgbClr val="3796BF"/>
-              </a:buClr>
-              <a:buSzPts val="3000"/>
-              <a:buFont typeface="Oswald"/>
-              <a:buNone/>
-              <a:defRPr sz="3000" b="1" i="0" u="none" strike="noStrike" cap="none">
-                <a:solidFill>
-                  <a:srgbClr val="3796BF"/>
-                </a:solidFill>
-                <a:latin typeface="Oswald"/>
-                <a:ea typeface="Oswald"/>
-                <a:cs typeface="Oswald"/>
-                <a:sym typeface="Oswald"/>
-              </a:defRPr>
-            </a:lvl3pPr>
-            <a:lvl4pPr marR="0" lvl="3" algn="l" rtl="0">
-              <a:lnSpc>
-                <a:spcPct val="100000"/>
-              </a:lnSpc>
-              <a:spcBef>
-                <a:spcPts val="0"/>
-              </a:spcBef>
-              <a:spcAft>
-                <a:spcPts val="0"/>
-              </a:spcAft>
-              <a:buClr>
-                <a:srgbClr val="3796BF"/>
-              </a:buClr>
-              <a:buSzPts val="3000"/>
-              <a:buFont typeface="Oswald"/>
-              <a:buNone/>
-              <a:defRPr sz="3000" b="1" i="0" u="none" strike="noStrike" cap="none">
-                <a:solidFill>
-                  <a:srgbClr val="3796BF"/>
-                </a:solidFill>
-                <a:latin typeface="Oswald"/>
-                <a:ea typeface="Oswald"/>
-                <a:cs typeface="Oswald"/>
-                <a:sym typeface="Oswald"/>
-              </a:defRPr>
-            </a:lvl4pPr>
-            <a:lvl5pPr marR="0" lvl="4" algn="l" rtl="0">
-              <a:lnSpc>
-                <a:spcPct val="100000"/>
-              </a:lnSpc>
-              <a:spcBef>
-                <a:spcPts val="0"/>
-              </a:spcBef>
-              <a:spcAft>
-                <a:spcPts val="0"/>
-              </a:spcAft>
-              <a:buClr>
-                <a:srgbClr val="3796BF"/>
-              </a:buClr>
-              <a:buSzPts val="3000"/>
-              <a:buFont typeface="Oswald"/>
-              <a:buNone/>
-              <a:defRPr sz="3000" b="1" i="0" u="none" strike="noStrike" cap="none">
-                <a:solidFill>
-                  <a:srgbClr val="3796BF"/>
-                </a:solidFill>
-                <a:latin typeface="Oswald"/>
-                <a:ea typeface="Oswald"/>
-                <a:cs typeface="Oswald"/>
-                <a:sym typeface="Oswald"/>
-              </a:defRPr>
-            </a:lvl5pPr>
-            <a:lvl6pPr marR="0" lvl="5" algn="l" rtl="0">
-              <a:lnSpc>
-                <a:spcPct val="100000"/>
-              </a:lnSpc>
-              <a:spcBef>
-                <a:spcPts val="0"/>
-              </a:spcBef>
-              <a:spcAft>
-                <a:spcPts val="0"/>
-              </a:spcAft>
-              <a:buClr>
-                <a:srgbClr val="3796BF"/>
-              </a:buClr>
-              <a:buSzPts val="3000"/>
-              <a:buFont typeface="Oswald"/>
-              <a:buNone/>
-              <a:defRPr sz="3000" b="1" i="0" u="none" strike="noStrike" cap="none">
-                <a:solidFill>
-                  <a:srgbClr val="3796BF"/>
-                </a:solidFill>
-                <a:latin typeface="Oswald"/>
-                <a:ea typeface="Oswald"/>
-                <a:cs typeface="Oswald"/>
-                <a:sym typeface="Oswald"/>
-              </a:defRPr>
-            </a:lvl6pPr>
-            <a:lvl7pPr marR="0" lvl="6" algn="l" rtl="0">
-              <a:lnSpc>
-                <a:spcPct val="100000"/>
-              </a:lnSpc>
-              <a:spcBef>
-                <a:spcPts val="0"/>
-              </a:spcBef>
-              <a:spcAft>
-                <a:spcPts val="0"/>
-              </a:spcAft>
-              <a:buClr>
-                <a:srgbClr val="3796BF"/>
-              </a:buClr>
-              <a:buSzPts val="3000"/>
-              <a:buFont typeface="Oswald"/>
-              <a:buNone/>
-              <a:defRPr sz="3000" b="1" i="0" u="none" strike="noStrike" cap="none">
-                <a:solidFill>
-                  <a:srgbClr val="3796BF"/>
-                </a:solidFill>
-                <a:latin typeface="Oswald"/>
-                <a:ea typeface="Oswald"/>
-                <a:cs typeface="Oswald"/>
-                <a:sym typeface="Oswald"/>
-              </a:defRPr>
-            </a:lvl7pPr>
-            <a:lvl8pPr marR="0" lvl="7" algn="l" rtl="0">
-              <a:lnSpc>
-                <a:spcPct val="100000"/>
-              </a:lnSpc>
-              <a:spcBef>
-                <a:spcPts val="0"/>
-              </a:spcBef>
-              <a:spcAft>
-                <a:spcPts val="0"/>
-              </a:spcAft>
-              <a:buClr>
-                <a:srgbClr val="3796BF"/>
-              </a:buClr>
-              <a:buSzPts val="3000"/>
-              <a:buFont typeface="Oswald"/>
-              <a:buNone/>
-              <a:defRPr sz="3000" b="1" i="0" u="none" strike="noStrike" cap="none">
-                <a:solidFill>
-                  <a:srgbClr val="3796BF"/>
-                </a:solidFill>
-                <a:latin typeface="Oswald"/>
-                <a:ea typeface="Oswald"/>
-                <a:cs typeface="Oswald"/>
-                <a:sym typeface="Oswald"/>
-              </a:defRPr>
-            </a:lvl8pPr>
-            <a:lvl9pPr marR="0" lvl="8" algn="l" rtl="0">
-              <a:lnSpc>
-                <a:spcPct val="100000"/>
-              </a:lnSpc>
-              <a:spcBef>
-                <a:spcPts val="0"/>
-              </a:spcBef>
-              <a:spcAft>
-                <a:spcPts val="0"/>
-              </a:spcAft>
-              <a:buClr>
-                <a:srgbClr val="3796BF"/>
-              </a:buClr>
-              <a:buSzPts val="3000"/>
-              <a:buFont typeface="Oswald"/>
-              <a:buNone/>
-              <a:defRPr sz="3000" b="1" i="0" u="none" strike="noStrike" cap="none">
-                <a:solidFill>
-                  <a:srgbClr val="3796BF"/>
-                </a:solidFill>
-                <a:latin typeface="Oswald"/>
-                <a:ea typeface="Oswald"/>
-                <a:cs typeface="Oswald"/>
-                <a:sym typeface="Oswald"/>
-              </a:defRPr>
-            </a:lvl9pPr>
-          </a:lstStyle>
-          <a:p>
-            <a:r>
-              <a:rPr lang="de-CH" sz="2000" dirty="0" err="1">
-                <a:solidFill>
-                  <a:schemeClr val="accent4">
-                    <a:lumMod val="60000"/>
-                    <a:lumOff val="40000"/>
-                  </a:schemeClr>
-                </a:solidFill>
-              </a:rPr>
-              <a:t>XGBoost</a:t>
-            </a:r>
-            <a:endParaRPr lang="de-CH" sz="2000" dirty="0">
-              <a:solidFill>
-                <a:schemeClr val="accent4">
-                  <a:lumMod val="60000"/>
-                  <a:lumOff val="40000"/>
-                </a:schemeClr>
-              </a:solidFill>
-            </a:endParaRPr>
-          </a:p>
-        </p:txBody>
-      </p:sp>
-      <p:sp>
-        <p:nvSpPr>
-          <p:cNvPr id="3" name="Google Shape;301;p27">
-            <a:extLst>
-              <a:ext uri="{FF2B5EF4-FFF2-40B4-BE49-F238E27FC236}">
-                <a16:creationId xmlns:a16="http://schemas.microsoft.com/office/drawing/2014/main" id="{00FE1F6B-EFB3-4196-90A7-B581B09E4488}"/>
-              </a:ext>
-            </a:extLst>
-          </p:cNvPr>
-          <p:cNvSpPr txBox="1">
-            <a:spLocks/>
-          </p:cNvSpPr>
-          <p:nvPr/>
-        </p:nvSpPr>
-        <p:spPr>
-          <a:xfrm>
-            <a:off x="1537651" y="3122855"/>
-            <a:ext cx="1099824" cy="518347"/>
-          </a:xfrm>
-          <a:prstGeom prst="rect">
-            <a:avLst/>
-          </a:prstGeom>
-          <a:noFill/>
-          <a:ln>
-            <a:noFill/>
-          </a:ln>
-        </p:spPr>
-        <p:txBody>
-          <a:bodyPr spcFirstLastPara="1" wrap="square" lIns="91425" tIns="91425" rIns="91425" bIns="91425" anchor="b" anchorCtr="0">
-            <a:noAutofit/>
-          </a:bodyPr>
-          <a:lstStyle>
-            <a:defPPr marR="0" lvl="0" algn="l" rtl="0">
-              <a:lnSpc>
-                <a:spcPct val="100000"/>
-              </a:lnSpc>
-              <a:spcBef>
-                <a:spcPts val="0"/>
-              </a:spcBef>
-              <a:spcAft>
-                <a:spcPts val="0"/>
-              </a:spcAft>
-            </a:defPPr>
-            <a:lvl1pPr marR="0" lvl="0" algn="l" rtl="0">
-              <a:lnSpc>
-                <a:spcPct val="100000"/>
-              </a:lnSpc>
-              <a:spcBef>
-                <a:spcPts val="0"/>
-              </a:spcBef>
-              <a:spcAft>
-                <a:spcPts val="0"/>
-              </a:spcAft>
-              <a:buClr>
-                <a:srgbClr val="3796BF"/>
-              </a:buClr>
-              <a:buSzPts val="3000"/>
-              <a:buFont typeface="Oswald"/>
-              <a:buNone/>
-              <a:defRPr sz="3000" b="1" i="0" u="none" strike="noStrike" cap="none">
-                <a:solidFill>
-                  <a:srgbClr val="3796BF"/>
-                </a:solidFill>
-                <a:latin typeface="Oswald"/>
-                <a:ea typeface="Oswald"/>
-                <a:cs typeface="Oswald"/>
-                <a:sym typeface="Oswald"/>
-              </a:defRPr>
-            </a:lvl1pPr>
-            <a:lvl2pPr marR="0" lvl="1" algn="l" rtl="0">
-              <a:lnSpc>
-                <a:spcPct val="100000"/>
-              </a:lnSpc>
-              <a:spcBef>
-                <a:spcPts val="0"/>
-              </a:spcBef>
-              <a:spcAft>
-                <a:spcPts val="0"/>
-              </a:spcAft>
-              <a:buClr>
-                <a:srgbClr val="3796BF"/>
-              </a:buClr>
-              <a:buSzPts val="3000"/>
-              <a:buFont typeface="Oswald"/>
-              <a:buNone/>
-              <a:defRPr sz="3000" b="1" i="0" u="none" strike="noStrike" cap="none">
-                <a:solidFill>
-                  <a:srgbClr val="3796BF"/>
-                </a:solidFill>
-                <a:latin typeface="Oswald"/>
-                <a:ea typeface="Oswald"/>
-                <a:cs typeface="Oswald"/>
-                <a:sym typeface="Oswald"/>
-              </a:defRPr>
-            </a:lvl2pPr>
-            <a:lvl3pPr marR="0" lvl="2" algn="l" rtl="0">
-              <a:lnSpc>
-                <a:spcPct val="100000"/>
-              </a:lnSpc>
-              <a:spcBef>
-                <a:spcPts val="0"/>
-              </a:spcBef>
-              <a:spcAft>
-                <a:spcPts val="0"/>
-              </a:spcAft>
-              <a:buClr>
-                <a:srgbClr val="3796BF"/>
-              </a:buClr>
-              <a:buSzPts val="3000"/>
-              <a:buFont typeface="Oswald"/>
-              <a:buNone/>
-              <a:defRPr sz="3000" b="1" i="0" u="none" strike="noStrike" cap="none">
-                <a:solidFill>
-                  <a:srgbClr val="3796BF"/>
-                </a:solidFill>
-                <a:latin typeface="Oswald"/>
-                <a:ea typeface="Oswald"/>
-                <a:cs typeface="Oswald"/>
-                <a:sym typeface="Oswald"/>
-              </a:defRPr>
-            </a:lvl3pPr>
-            <a:lvl4pPr marR="0" lvl="3" algn="l" rtl="0">
-              <a:lnSpc>
-                <a:spcPct val="100000"/>
-              </a:lnSpc>
-              <a:spcBef>
-                <a:spcPts val="0"/>
-              </a:spcBef>
-              <a:spcAft>
-                <a:spcPts val="0"/>
-              </a:spcAft>
-              <a:buClr>
-                <a:srgbClr val="3796BF"/>
-              </a:buClr>
-              <a:buSzPts val="3000"/>
-              <a:buFont typeface="Oswald"/>
-              <a:buNone/>
-              <a:defRPr sz="3000" b="1" i="0" u="none" strike="noStrike" cap="none">
-                <a:solidFill>
-                  <a:srgbClr val="3796BF"/>
-                </a:solidFill>
-                <a:latin typeface="Oswald"/>
-                <a:ea typeface="Oswald"/>
-                <a:cs typeface="Oswald"/>
-                <a:sym typeface="Oswald"/>
-              </a:defRPr>
-            </a:lvl4pPr>
-            <a:lvl5pPr marR="0" lvl="4" algn="l" rtl="0">
-              <a:lnSpc>
-                <a:spcPct val="100000"/>
-              </a:lnSpc>
-              <a:spcBef>
-                <a:spcPts val="0"/>
-              </a:spcBef>
-              <a:spcAft>
-                <a:spcPts val="0"/>
-              </a:spcAft>
-              <a:buClr>
-                <a:srgbClr val="3796BF"/>
-              </a:buClr>
-              <a:buSzPts val="3000"/>
-              <a:buFont typeface="Oswald"/>
-              <a:buNone/>
-              <a:defRPr sz="3000" b="1" i="0" u="none" strike="noStrike" cap="none">
-                <a:solidFill>
-                  <a:srgbClr val="3796BF"/>
-                </a:solidFill>
-                <a:latin typeface="Oswald"/>
-                <a:ea typeface="Oswald"/>
-                <a:cs typeface="Oswald"/>
-                <a:sym typeface="Oswald"/>
-              </a:defRPr>
-            </a:lvl5pPr>
-            <a:lvl6pPr marR="0" lvl="5" algn="l" rtl="0">
-              <a:lnSpc>
-                <a:spcPct val="100000"/>
-              </a:lnSpc>
-              <a:spcBef>
-                <a:spcPts val="0"/>
-              </a:spcBef>
-              <a:spcAft>
-                <a:spcPts val="0"/>
-              </a:spcAft>
-              <a:buClr>
-                <a:srgbClr val="3796BF"/>
-              </a:buClr>
-              <a:buSzPts val="3000"/>
-              <a:buFont typeface="Oswald"/>
-              <a:buNone/>
-              <a:defRPr sz="3000" b="1" i="0" u="none" strike="noStrike" cap="none">
-                <a:solidFill>
-                  <a:srgbClr val="3796BF"/>
-                </a:solidFill>
-                <a:latin typeface="Oswald"/>
-                <a:ea typeface="Oswald"/>
-                <a:cs typeface="Oswald"/>
-                <a:sym typeface="Oswald"/>
-              </a:defRPr>
-            </a:lvl6pPr>
-            <a:lvl7pPr marR="0" lvl="6" algn="l" rtl="0">
-              <a:lnSpc>
-                <a:spcPct val="100000"/>
-              </a:lnSpc>
-              <a:spcBef>
-                <a:spcPts val="0"/>
-              </a:spcBef>
-              <a:spcAft>
-                <a:spcPts val="0"/>
-              </a:spcAft>
-              <a:buClr>
-                <a:srgbClr val="3796BF"/>
-              </a:buClr>
-              <a:buSzPts val="3000"/>
-              <a:buFont typeface="Oswald"/>
-              <a:buNone/>
-              <a:defRPr sz="3000" b="1" i="0" u="none" strike="noStrike" cap="none">
-                <a:solidFill>
-                  <a:srgbClr val="3796BF"/>
-                </a:solidFill>
-                <a:latin typeface="Oswald"/>
-                <a:ea typeface="Oswald"/>
-                <a:cs typeface="Oswald"/>
-                <a:sym typeface="Oswald"/>
-              </a:defRPr>
-            </a:lvl7pPr>
-            <a:lvl8pPr marR="0" lvl="7" algn="l" rtl="0">
-              <a:lnSpc>
-                <a:spcPct val="100000"/>
-              </a:lnSpc>
-              <a:spcBef>
-                <a:spcPts val="0"/>
-              </a:spcBef>
-              <a:spcAft>
-                <a:spcPts val="0"/>
-              </a:spcAft>
-              <a:buClr>
-                <a:srgbClr val="3796BF"/>
-              </a:buClr>
-              <a:buSzPts val="3000"/>
-              <a:buFont typeface="Oswald"/>
-              <a:buNone/>
-              <a:defRPr sz="3000" b="1" i="0" u="none" strike="noStrike" cap="none">
-                <a:solidFill>
-                  <a:srgbClr val="3796BF"/>
-                </a:solidFill>
-                <a:latin typeface="Oswald"/>
-                <a:ea typeface="Oswald"/>
-                <a:cs typeface="Oswald"/>
-                <a:sym typeface="Oswald"/>
-              </a:defRPr>
-            </a:lvl8pPr>
-            <a:lvl9pPr marR="0" lvl="8" algn="l" rtl="0">
-              <a:lnSpc>
-                <a:spcPct val="100000"/>
-              </a:lnSpc>
-              <a:spcBef>
-                <a:spcPts val="0"/>
-              </a:spcBef>
-              <a:spcAft>
-                <a:spcPts val="0"/>
-              </a:spcAft>
-              <a:buClr>
-                <a:srgbClr val="3796BF"/>
-              </a:buClr>
-              <a:buSzPts val="3000"/>
-              <a:buFont typeface="Oswald"/>
-              <a:buNone/>
-              <a:defRPr sz="3000" b="1" i="0" u="none" strike="noStrike" cap="none">
-                <a:solidFill>
-                  <a:srgbClr val="3796BF"/>
-                </a:solidFill>
-                <a:latin typeface="Oswald"/>
-                <a:ea typeface="Oswald"/>
-                <a:cs typeface="Oswald"/>
-                <a:sym typeface="Oswald"/>
-              </a:defRPr>
-            </a:lvl9pPr>
-          </a:lstStyle>
-          <a:p>
-            <a:r>
-              <a:rPr lang="de-CH" sz="2000" dirty="0" err="1">
-                <a:solidFill>
-                  <a:srgbClr val="4BB5D9"/>
-                </a:solidFill>
-              </a:rPr>
-              <a:t>LightGBM</a:t>
-            </a:r>
-            <a:endParaRPr lang="de-CH" sz="2000" dirty="0">
-              <a:solidFill>
-                <a:srgbClr val="4BB5D9"/>
-              </a:solidFill>
-            </a:endParaRPr>
-          </a:p>
-        </p:txBody>
-      </p:sp>
-      <p:sp>
-        <p:nvSpPr>
           <p:cNvPr id="4" name="Google Shape;301;p27">
             <a:extLst>
               <a:ext uri="{FF2B5EF4-FFF2-40B4-BE49-F238E27FC236}">
@@ -30024,305 +29428,6 @@
               </a:rPr>
               <a:t>Random Forests</a:t>
             </a:r>
-          </a:p>
-        </p:txBody>
-      </p:sp>
-      <p:sp>
-        <p:nvSpPr>
-          <p:cNvPr id="5" name="Google Shape;301;p27">
-            <a:extLst>
-              <a:ext uri="{FF2B5EF4-FFF2-40B4-BE49-F238E27FC236}">
-                <a16:creationId xmlns:a16="http://schemas.microsoft.com/office/drawing/2014/main" id="{9A6EA1EA-2DB0-4081-9D2A-5E755226E49B}"/>
-              </a:ext>
-            </a:extLst>
-          </p:cNvPr>
-          <p:cNvSpPr txBox="1">
-            <a:spLocks/>
-          </p:cNvSpPr>
-          <p:nvPr/>
-        </p:nvSpPr>
-        <p:spPr>
-          <a:xfrm>
-            <a:off x="3802377" y="2875325"/>
-            <a:ext cx="1168660" cy="495059"/>
-          </a:xfrm>
-          <a:prstGeom prst="rect">
-            <a:avLst/>
-          </a:prstGeom>
-          <a:noFill/>
-          <a:ln>
-            <a:noFill/>
-          </a:ln>
-        </p:spPr>
-        <p:txBody>
-          <a:bodyPr spcFirstLastPara="1" wrap="square" lIns="91425" tIns="91425" rIns="91425" bIns="91425" anchor="b" anchorCtr="0">
-            <a:noAutofit/>
-          </a:bodyPr>
-          <a:lstStyle>
-            <a:defPPr marR="0" lvl="0" algn="l" rtl="0">
-              <a:lnSpc>
-                <a:spcPct val="100000"/>
-              </a:lnSpc>
-              <a:spcBef>
-                <a:spcPts val="0"/>
-              </a:spcBef>
-              <a:spcAft>
-                <a:spcPts val="0"/>
-              </a:spcAft>
-            </a:defPPr>
-            <a:lvl1pPr marR="0" lvl="0" algn="l" rtl="0">
-              <a:lnSpc>
-                <a:spcPct val="100000"/>
-              </a:lnSpc>
-              <a:spcBef>
-                <a:spcPts val="0"/>
-              </a:spcBef>
-              <a:spcAft>
-                <a:spcPts val="0"/>
-              </a:spcAft>
-              <a:buClr>
-                <a:srgbClr val="3796BF"/>
-              </a:buClr>
-              <a:buSzPts val="3000"/>
-              <a:buFont typeface="Oswald"/>
-              <a:buNone/>
-              <a:defRPr sz="3000" b="1" i="0" u="none" strike="noStrike" cap="none">
-                <a:solidFill>
-                  <a:srgbClr val="3796BF"/>
-                </a:solidFill>
-                <a:latin typeface="Oswald"/>
-                <a:ea typeface="Oswald"/>
-                <a:cs typeface="Oswald"/>
-                <a:sym typeface="Oswald"/>
-              </a:defRPr>
-            </a:lvl1pPr>
-            <a:lvl2pPr marR="0" lvl="1" algn="l" rtl="0">
-              <a:lnSpc>
-                <a:spcPct val="100000"/>
-              </a:lnSpc>
-              <a:spcBef>
-                <a:spcPts val="0"/>
-              </a:spcBef>
-              <a:spcAft>
-                <a:spcPts val="0"/>
-              </a:spcAft>
-              <a:buClr>
-                <a:srgbClr val="3796BF"/>
-              </a:buClr>
-              <a:buSzPts val="3000"/>
-              <a:buFont typeface="Oswald"/>
-              <a:buNone/>
-              <a:defRPr sz="3000" b="1" i="0" u="none" strike="noStrike" cap="none">
-                <a:solidFill>
-                  <a:srgbClr val="3796BF"/>
-                </a:solidFill>
-                <a:latin typeface="Oswald"/>
-                <a:ea typeface="Oswald"/>
-                <a:cs typeface="Oswald"/>
-                <a:sym typeface="Oswald"/>
-              </a:defRPr>
-            </a:lvl2pPr>
-            <a:lvl3pPr marR="0" lvl="2" algn="l" rtl="0">
-              <a:lnSpc>
-                <a:spcPct val="100000"/>
-              </a:lnSpc>
-              <a:spcBef>
-                <a:spcPts val="0"/>
-              </a:spcBef>
-              <a:spcAft>
-                <a:spcPts val="0"/>
-              </a:spcAft>
-              <a:buClr>
-                <a:srgbClr val="3796BF"/>
-              </a:buClr>
-              <a:buSzPts val="3000"/>
-              <a:buFont typeface="Oswald"/>
-              <a:buNone/>
-              <a:defRPr sz="3000" b="1" i="0" u="none" strike="noStrike" cap="none">
-                <a:solidFill>
-                  <a:srgbClr val="3796BF"/>
-                </a:solidFill>
-                <a:latin typeface="Oswald"/>
-                <a:ea typeface="Oswald"/>
-                <a:cs typeface="Oswald"/>
-                <a:sym typeface="Oswald"/>
-              </a:defRPr>
-            </a:lvl3pPr>
-            <a:lvl4pPr marR="0" lvl="3" algn="l" rtl="0">
-              <a:lnSpc>
-                <a:spcPct val="100000"/>
-              </a:lnSpc>
-              <a:spcBef>
-                <a:spcPts val="0"/>
-              </a:spcBef>
-              <a:spcAft>
-                <a:spcPts val="0"/>
-              </a:spcAft>
-              <a:buClr>
-                <a:srgbClr val="3796BF"/>
-              </a:buClr>
-              <a:buSzPts val="3000"/>
-              <a:buFont typeface="Oswald"/>
-              <a:buNone/>
-              <a:defRPr sz="3000" b="1" i="0" u="none" strike="noStrike" cap="none">
-                <a:solidFill>
-                  <a:srgbClr val="3796BF"/>
-                </a:solidFill>
-                <a:latin typeface="Oswald"/>
-                <a:ea typeface="Oswald"/>
-                <a:cs typeface="Oswald"/>
-                <a:sym typeface="Oswald"/>
-              </a:defRPr>
-            </a:lvl4pPr>
-            <a:lvl5pPr marR="0" lvl="4" algn="l" rtl="0">
-              <a:lnSpc>
-                <a:spcPct val="100000"/>
-              </a:lnSpc>
-              <a:spcBef>
-                <a:spcPts val="0"/>
-              </a:spcBef>
-              <a:spcAft>
-                <a:spcPts val="0"/>
-              </a:spcAft>
-              <a:buClr>
-                <a:srgbClr val="3796BF"/>
-              </a:buClr>
-              <a:buSzPts val="3000"/>
-              <a:buFont typeface="Oswald"/>
-              <a:buNone/>
-              <a:defRPr sz="3000" b="1" i="0" u="none" strike="noStrike" cap="none">
-                <a:solidFill>
-                  <a:srgbClr val="3796BF"/>
-                </a:solidFill>
-                <a:latin typeface="Oswald"/>
-                <a:ea typeface="Oswald"/>
-                <a:cs typeface="Oswald"/>
-                <a:sym typeface="Oswald"/>
-              </a:defRPr>
-            </a:lvl5pPr>
-            <a:lvl6pPr marR="0" lvl="5" algn="l" rtl="0">
-              <a:lnSpc>
-                <a:spcPct val="100000"/>
-              </a:lnSpc>
-              <a:spcBef>
-                <a:spcPts val="0"/>
-              </a:spcBef>
-              <a:spcAft>
-                <a:spcPts val="0"/>
-              </a:spcAft>
-              <a:buClr>
-                <a:srgbClr val="3796BF"/>
-              </a:buClr>
-              <a:buSzPts val="3000"/>
-              <a:buFont typeface="Oswald"/>
-              <a:buNone/>
-              <a:defRPr sz="3000" b="1" i="0" u="none" strike="noStrike" cap="none">
-                <a:solidFill>
-                  <a:srgbClr val="3796BF"/>
-                </a:solidFill>
-                <a:latin typeface="Oswald"/>
-                <a:ea typeface="Oswald"/>
-                <a:cs typeface="Oswald"/>
-                <a:sym typeface="Oswald"/>
-              </a:defRPr>
-            </a:lvl6pPr>
-            <a:lvl7pPr marR="0" lvl="6" algn="l" rtl="0">
-              <a:lnSpc>
-                <a:spcPct val="100000"/>
-              </a:lnSpc>
-              <a:spcBef>
-                <a:spcPts val="0"/>
-              </a:spcBef>
-              <a:spcAft>
-                <a:spcPts val="0"/>
-              </a:spcAft>
-              <a:buClr>
-                <a:srgbClr val="3796BF"/>
-              </a:buClr>
-              <a:buSzPts val="3000"/>
-              <a:buFont typeface="Oswald"/>
-              <a:buNone/>
-              <a:defRPr sz="3000" b="1" i="0" u="none" strike="noStrike" cap="none">
-                <a:solidFill>
-                  <a:srgbClr val="3796BF"/>
-                </a:solidFill>
-                <a:latin typeface="Oswald"/>
-                <a:ea typeface="Oswald"/>
-                <a:cs typeface="Oswald"/>
-                <a:sym typeface="Oswald"/>
-              </a:defRPr>
-            </a:lvl7pPr>
-            <a:lvl8pPr marR="0" lvl="7" algn="l" rtl="0">
-              <a:lnSpc>
-                <a:spcPct val="100000"/>
-              </a:lnSpc>
-              <a:spcBef>
-                <a:spcPts val="0"/>
-              </a:spcBef>
-              <a:spcAft>
-                <a:spcPts val="0"/>
-              </a:spcAft>
-              <a:buClr>
-                <a:srgbClr val="3796BF"/>
-              </a:buClr>
-              <a:buSzPts val="3000"/>
-              <a:buFont typeface="Oswald"/>
-              <a:buNone/>
-              <a:defRPr sz="3000" b="1" i="0" u="none" strike="noStrike" cap="none">
-                <a:solidFill>
-                  <a:srgbClr val="3796BF"/>
-                </a:solidFill>
-                <a:latin typeface="Oswald"/>
-                <a:ea typeface="Oswald"/>
-                <a:cs typeface="Oswald"/>
-                <a:sym typeface="Oswald"/>
-              </a:defRPr>
-            </a:lvl8pPr>
-            <a:lvl9pPr marR="0" lvl="8" algn="l" rtl="0">
-              <a:lnSpc>
-                <a:spcPct val="100000"/>
-              </a:lnSpc>
-              <a:spcBef>
-                <a:spcPts val="0"/>
-              </a:spcBef>
-              <a:spcAft>
-                <a:spcPts val="0"/>
-              </a:spcAft>
-              <a:buClr>
-                <a:srgbClr val="3796BF"/>
-              </a:buClr>
-              <a:buSzPts val="3000"/>
-              <a:buFont typeface="Oswald"/>
-              <a:buNone/>
-              <a:defRPr sz="3000" b="1" i="0" u="none" strike="noStrike" cap="none">
-                <a:solidFill>
-                  <a:srgbClr val="3796BF"/>
-                </a:solidFill>
-                <a:latin typeface="Oswald"/>
-                <a:ea typeface="Oswald"/>
-                <a:cs typeface="Oswald"/>
-                <a:sym typeface="Oswald"/>
-              </a:defRPr>
-            </a:lvl9pPr>
-          </a:lstStyle>
-          <a:p>
-            <a:r>
-              <a:rPr lang="de-CH" sz="2000" dirty="0" err="1">
-                <a:solidFill>
-                  <a:schemeClr val="accent2">
-                    <a:lumMod val="75000"/>
-                  </a:schemeClr>
-                </a:solidFill>
-              </a:rPr>
-              <a:t>CatBoost</a:t>
-            </a:r>
-            <a:endParaRPr lang="de-CH" sz="2000" dirty="0">
-              <a:solidFill>
-                <a:schemeClr val="accent2">
-                  <a:lumMod val="75000"/>
-                </a:schemeClr>
-              </a:solidFill>
-            </a:endParaRPr>
           </a:p>
         </p:txBody>
       </p:sp>
@@ -30932,8 +30037,8 @@
         </p:blipFill>
         <p:spPr>
           <a:xfrm>
-            <a:off x="4282833" y="1749215"/>
-            <a:ext cx="4011185" cy="2970274"/>
+            <a:off x="3851757" y="1149725"/>
+            <a:ext cx="4940980" cy="3658785"/>
           </a:xfrm>
           <a:prstGeom prst="rect">
             <a:avLst/>
@@ -31987,6 +31092,54 @@
           </a:p>
         </p:txBody>
       </p:sp>
+      <p:sp>
+        <p:nvSpPr>
+          <p:cNvPr id="2" name="Textfeld 1">
+            <a:extLst>
+              <a:ext uri="{FF2B5EF4-FFF2-40B4-BE49-F238E27FC236}">
+                <a16:creationId xmlns:a16="http://schemas.microsoft.com/office/drawing/2014/main" id="{2784EB69-61F6-4DAF-9126-4066CD9E6A3B}"/>
+              </a:ext>
+            </a:extLst>
+          </p:cNvPr>
+          <p:cNvSpPr txBox="1"/>
+          <p:nvPr/>
+        </p:nvSpPr>
+        <p:spPr>
+          <a:xfrm>
+            <a:off x="6791725" y="4306229"/>
+            <a:ext cx="761747" cy="307777"/>
+          </a:xfrm>
+          <a:prstGeom prst="rect">
+            <a:avLst/>
+          </a:prstGeom>
+          <a:noFill/>
+        </p:spPr>
+        <p:txBody>
+          <a:bodyPr wrap="none" rtlCol="0">
+            <a:spAutoFit/>
+          </a:bodyPr>
+          <a:lstStyle/>
+          <a:p>
+            <a:r>
+              <a:rPr lang="de-CH" dirty="0" err="1">
+                <a:solidFill>
+                  <a:schemeClr val="accent4">
+                    <a:lumMod val="75000"/>
+                  </a:schemeClr>
+                </a:solidFill>
+              </a:rPr>
+              <a:t>Leaves</a:t>
+            </a:r>
+            <a:endParaRPr lang="de-CH" dirty="0">
+              <a:solidFill>
+                <a:schemeClr val="accent4">
+                  <a:lumMod val="75000"/>
+                </a:schemeClr>
+              </a:solidFill>
+            </a:endParaRPr>
+          </a:p>
+        </p:txBody>
+      </p:sp>
     </p:spTree>
     <p:extLst>
       <p:ext uri="{BB962C8B-B14F-4D97-AF65-F5344CB8AC3E}">
@@ -34227,7 +33380,14 @@
             </a:r>
             <a:r>
               <a:rPr lang="de-CH" dirty="0"/>
-              <a:t> different? → </a:t>
+              <a:t> different? </a:t>
+            </a:r>
+            <a:br>
+              <a:rPr lang="de-CH" dirty="0"/>
+            </a:br>
+            <a:r>
+              <a:rPr lang="de-CH" dirty="0"/>
+              <a:t>→ </a:t>
             </a:r>
             <a:r>
               <a:rPr lang="de-CH" dirty="0" err="1"/>
@@ -37056,7 +36216,7 @@
             </a:r>
             <a:r>
               <a:rPr lang="de-CH" sz="1600" dirty="0"/>
-              <a:t>.</a:t>
+              <a:t>, not CV.</a:t>
             </a:r>
           </a:p>
           <a:p>
@@ -37859,7 +37019,14 @@
             </a:r>
             <a:r>
               <a:rPr lang="de-CH" sz="1600" dirty="0"/>
-              <a:t> (like </a:t>
+              <a:t> </a:t>
+            </a:r>
+            <a:br>
+              <a:rPr lang="de-CH" sz="1600" dirty="0"/>
+            </a:br>
+            <a:r>
+              <a:rPr lang="de-CH" sz="1600" dirty="0"/>
+              <a:t>(like </a:t>
             </a:r>
             <a:r>
               <a:rPr lang="de-CH" sz="1600" dirty="0" err="1"/>
@@ -38903,8 +38070,8 @@
         </p:nvSpPr>
         <p:spPr>
           <a:xfrm>
-            <a:off x="5977177" y="2088492"/>
-            <a:ext cx="2010375" cy="738664"/>
+            <a:off x="6035698" y="1830425"/>
+            <a:ext cx="2010375" cy="1384995"/>
           </a:xfrm>
           <a:prstGeom prst="rect">
             <a:avLst/>
@@ -38929,6 +38096,121 @@
             <a:spAutoFit/>
           </a:bodyPr>
           <a:lstStyle/>
+          <a:p>
+            <a:pPr marL="101600" indent="0">
+              <a:buNone/>
+            </a:pPr>
+            <a:r>
+              <a:rPr lang="de-CH" dirty="0">
+                <a:solidFill>
+                  <a:schemeClr val="accent4">
+                    <a:lumMod val="75000"/>
+                  </a:schemeClr>
+                </a:solidFill>
+              </a:rPr>
+              <a:t>- </a:t>
+            </a:r>
+            <a:r>
+              <a:rPr lang="de-CH" dirty="0" err="1">
+                <a:solidFill>
+                  <a:schemeClr val="accent4">
+                    <a:lumMod val="75000"/>
+                  </a:schemeClr>
+                </a:solidFill>
+              </a:rPr>
+              <a:t>Why</a:t>
+            </a:r>
+            <a:r>
+              <a:rPr lang="de-CH" dirty="0">
+                <a:solidFill>
+                  <a:schemeClr val="accent4">
+                    <a:lumMod val="75000"/>
+                  </a:schemeClr>
+                </a:solidFill>
+              </a:rPr>
+              <a:t> not </a:t>
+            </a:r>
+            <a:r>
+              <a:rPr lang="de-CH" dirty="0" err="1">
+                <a:solidFill>
+                  <a:schemeClr val="accent4">
+                    <a:lumMod val="75000"/>
+                  </a:schemeClr>
+                </a:solidFill>
+              </a:rPr>
+              <a:t>one</a:t>
+            </a:r>
+            <a:r>
+              <a:rPr lang="de-CH" dirty="0">
+                <a:solidFill>
+                  <a:schemeClr val="accent4">
+                    <a:lumMod val="75000"/>
+                  </a:schemeClr>
+                </a:solidFill>
+              </a:rPr>
+              <a:t> </a:t>
+            </a:r>
+            <a:r>
+              <a:rPr lang="de-CH" dirty="0" err="1">
+                <a:solidFill>
+                  <a:schemeClr val="accent4">
+                    <a:lumMod val="75000"/>
+                  </a:schemeClr>
+                </a:solidFill>
+              </a:rPr>
+              <a:t>big</a:t>
+            </a:r>
+            <a:r>
+              <a:rPr lang="de-CH" dirty="0">
+                <a:solidFill>
+                  <a:schemeClr val="accent4">
+                    <a:lumMod val="75000"/>
+                  </a:schemeClr>
+                </a:solidFill>
+              </a:rPr>
+              <a:t> </a:t>
+            </a:r>
+            <a:r>
+              <a:rPr lang="de-CH" dirty="0" err="1">
+                <a:solidFill>
+                  <a:schemeClr val="accent4">
+                    <a:lumMod val="75000"/>
+                  </a:schemeClr>
+                </a:solidFill>
+              </a:rPr>
+              <a:t>Grid</a:t>
+            </a:r>
+            <a:r>
+              <a:rPr lang="de-CH" dirty="0">
+                <a:solidFill>
+                  <a:schemeClr val="accent4">
+                    <a:lumMod val="75000"/>
+                  </a:schemeClr>
+                </a:solidFill>
+              </a:rPr>
+              <a:t> Search on all </a:t>
+            </a:r>
+            <a:r>
+              <a:rPr lang="de-CH" dirty="0" err="1">
+                <a:solidFill>
+                  <a:schemeClr val="accent4">
+                    <a:lumMod val="75000"/>
+                  </a:schemeClr>
+                </a:solidFill>
+              </a:rPr>
+              <a:t>parameters</a:t>
+            </a:r>
+            <a:r>
+              <a:rPr lang="de-CH" dirty="0">
+                <a:solidFill>
+                  <a:schemeClr val="accent4">
+                    <a:lumMod val="75000"/>
+                  </a:schemeClr>
+                </a:solidFill>
+              </a:rPr>
+              <a:t>?</a:t>
+            </a:r>
+          </a:p>
           <a:p>
             <a:pPr marL="101600" indent="0">
               <a:buNone/>

</xml_diff>

<commit_message>
slight improvement of wording for the deduplication aspect
</commit_message>
<xml_diff>
--- a/slides/ML_Lecture.pptx
+++ b/slides/ML_Lecture.pptx
@@ -28565,8 +28565,13 @@
             </a:pPr>
             <a:r>
               <a:rPr lang="en-US" sz="1600" dirty="0"/>
-              <a:t>As alternative to grouped splitting, deduplicate (why?) the diamonds data on "price" and all covariables and repeat the last example. Do the results change? Why should we trust these results more?</a:t>
-            </a:r>
+              <a:t>As alternative to grouped splitting, deduplicate (why?) the diamonds data on "price" and all covariables and repeat the last example. Do the results change? Are these results </a:t>
+            </a:r>
+            <a:r>
+              <a:rPr lang="en-US" sz="1600"/>
+              <a:t>overly pessimistic?</a:t>
+            </a:r>
+            <a:endParaRPr lang="en-US" sz="1600" dirty="0"/>
           </a:p>
           <a:p>
             <a:pPr marL="558800" indent="-457200">

</xml_diff>

<commit_message>
solved casting problem with tensorflow (exercise)
</commit_message>
<xml_diff>
--- a/slides/ML_Lecture.pptx
+++ b/slides/ML_Lecture.pptx
@@ -45824,8 +45824,8 @@
           </a:p>
         </p:txBody>
       </p:sp>
-      <mc:AlternateContent xmlns:mc="http://schemas.openxmlformats.org/markup-compatibility/2006" xmlns:a14="http://schemas.microsoft.com/office/drawing/2010/main">
-        <mc:Choice Requires="a14">
+      <mc:AlternateContent xmlns:mc="http://schemas.openxmlformats.org/markup-compatibility/2006">
+        <mc:Choice xmlns:a14="http://schemas.microsoft.com/office/drawing/2010/main" Requires="a14">
           <p:sp>
             <p:nvSpPr>
               <p:cNvPr id="7" name="Google Shape;203;p17">
@@ -46127,7 +46127,7 @@
                 </a:br>
                 <a:r>
                   <a:rPr lang="en-US" sz="1800" dirty="0"/>
-                  <a:t>of node values</a:t>
+                  <a:t>of node values necessary!</a:t>
                 </a:r>
               </a:p>
               <a:p>
@@ -46176,7 +46176,7 @@
             </p:txBody>
           </p:sp>
         </mc:Choice>
-        <mc:Fallback xmlns="">
+        <mc:Fallback>
           <p:sp>
             <p:nvSpPr>
               <p:cNvPr id="7" name="Google Shape;203;p17">
@@ -50395,7 +50395,7 @@
         <p:spPr>
           <a:xfrm>
             <a:off x="1183825" y="1929525"/>
-            <a:ext cx="5903332" cy="2861620"/>
+            <a:ext cx="6160636" cy="2861620"/>
           </a:xfrm>
           <a:prstGeom prst="rect">
             <a:avLst/>
@@ -50670,7 +50670,7 @@
             </a:br>
             <a:r>
               <a:rPr lang="en-US" sz="1600" dirty="0"/>
-              <a:t>(custom loss as in lecture notes; log-link means exponential output activation)</a:t>
+              <a:t>(custom loss as in lecture notes; log-link means "exponential" output activation)</a:t>
             </a:r>
           </a:p>
           <a:p>
@@ -50692,6 +50692,23 @@
             <a:r>
               <a:rPr lang="en-US" sz="1600" dirty="0"/>
               <a:t>Interpret final model.</a:t>
+            </a:r>
+          </a:p>
+          <a:p>
+            <a:pPr marL="558800" lvl="1" indent="0">
+              <a:buNone/>
+            </a:pPr>
+            <a:r>
+              <a:rPr lang="en-US" sz="1600" dirty="0"/>
+              <a:t>Hint: Use smaller learning rate (~0.03) and replace "</a:t>
+            </a:r>
+            <a:r>
+              <a:rPr lang="en-US" sz="1600" dirty="0" err="1"/>
+              <a:t>relu</a:t>
+            </a:r>
+            <a:r>
+              <a:rPr lang="en-US" sz="1600" dirty="0"/>
+              <a:t>" by "tanh".</a:t>
             </a:r>
           </a:p>
           <a:p>

</xml_diff>

<commit_message>
removed number in slides
</commit_message>
<xml_diff>
--- a/slides/ML_Lecture.pptx
+++ b/slides/ML_Lecture.pptx
@@ -45824,8 +45824,8 @@
           </a:p>
         </p:txBody>
       </p:sp>
-      <mc:AlternateContent xmlns:mc="http://schemas.openxmlformats.org/markup-compatibility/2006">
-        <mc:Choice xmlns:a14="http://schemas.microsoft.com/office/drawing/2010/main" Requires="a14">
+      <mc:AlternateContent xmlns:mc="http://schemas.openxmlformats.org/markup-compatibility/2006" xmlns:a14="http://schemas.microsoft.com/office/drawing/2010/main">
+        <mc:Choice Requires="a14">
           <p:sp>
             <p:nvSpPr>
               <p:cNvPr id="7" name="Google Shape;203;p17">
@@ -46176,7 +46176,7 @@
             </p:txBody>
           </p:sp>
         </mc:Choice>
-        <mc:Fallback>
+        <mc:Fallback xmlns="">
           <p:sp>
             <p:nvSpPr>
               <p:cNvPr id="7" name="Google Shape;203;p17">
@@ -50700,7 +50700,15 @@
             </a:pPr>
             <a:r>
               <a:rPr lang="en-US" sz="1600" dirty="0"/>
-              <a:t>Hint: Use smaller learning rate (~0.03) and replace "</a:t>
+              <a:t>Hint: Use smaller learning </a:t>
+            </a:r>
+            <a:r>
+              <a:rPr lang="en-US" sz="1600"/>
+              <a:t>rate and </a:t>
+            </a:r>
+            <a:r>
+              <a:rPr lang="en-US" sz="1600" dirty="0"/>
+              <a:t>replace "</a:t>
             </a:r>
             <a:r>
               <a:rPr lang="en-US" sz="1600" dirty="0" err="1"/>

</xml_diff>

<commit_message>
added simple XGBoost example
</commit_message>
<xml_diff>
--- a/slides/ML_Lecture.pptx
+++ b/slides/ML_Lecture.pptx
@@ -29772,10 +29772,6 @@
           </a:p>
           <a:p>
             <a:r>
-              <a:rPr lang="de-CH" sz="1600" dirty="0"/>
-              <a:t>«</a:t>
-            </a:r>
-            <a:r>
               <a:rPr lang="de-CH" sz="1600" dirty="0" err="1"/>
               <a:t>Decision</a:t>
             </a:r>
@@ -29834,10 +29830,7 @@
               <a:rPr lang="de-CH" sz="1600" dirty="0" err="1"/>
               <a:t>together</a:t>
             </a:r>
-            <a:r>
-              <a:rPr lang="de-CH" sz="1600" dirty="0"/>
-              <a:t>»</a:t>
-            </a:r>
+            <a:endParaRPr lang="de-CH" sz="1600" dirty="0"/>
           </a:p>
           <a:p>
             <a:r>
@@ -36791,7 +36784,7 @@
         <p:spPr>
           <a:xfrm>
             <a:off x="1031425" y="1830425"/>
-            <a:ext cx="6277051" cy="1678769"/>
+            <a:ext cx="6277051" cy="1482651"/>
           </a:xfrm>
           <a:prstGeom prst="rect">
             <a:avLst/>
@@ -36821,10 +36814,10 @@
               <a:buNone/>
             </a:pPr>
             <a:r>
-              <a:rPr lang="de-CH" dirty="0" err="1"/>
+              <a:rPr lang="de-CH" sz="1800" dirty="0" err="1"/>
               <a:t>Algorithm</a:t>
             </a:r>
-            <a:endParaRPr lang="de-CH" dirty="0"/>
+            <a:endParaRPr lang="de-CH" sz="1800" dirty="0"/>
           </a:p>
           <a:p>
             <a:pPr marL="558800" indent="-457200">
@@ -36832,47 +36825,47 @@
               <a:buAutoNum type="arabicPeriod"/>
             </a:pPr>
             <a:r>
-              <a:rPr lang="de-CH" dirty="0"/>
+              <a:rPr lang="de-CH" sz="1800" dirty="0"/>
               <a:t>Fit simple </a:t>
             </a:r>
             <a:r>
-              <a:rPr lang="de-CH" dirty="0" err="1"/>
+              <a:rPr lang="de-CH" sz="1800" dirty="0" err="1"/>
               <a:t>model</a:t>
             </a:r>
             <a:r>
-              <a:rPr lang="de-CH" dirty="0"/>
+              <a:rPr lang="de-CH" sz="1800" dirty="0"/>
               <a:t> (</a:t>
             </a:r>
             <a:r>
-              <a:rPr lang="de-CH" dirty="0" err="1"/>
+              <a:rPr lang="de-CH" sz="1800" dirty="0" err="1"/>
               <a:t>often</a:t>
             </a:r>
             <a:r>
-              <a:rPr lang="de-CH" dirty="0"/>
+              <a:rPr lang="de-CH" sz="1800" dirty="0"/>
               <a:t> a </a:t>
             </a:r>
             <a:r>
-              <a:rPr lang="de-CH" dirty="0" err="1"/>
+              <a:rPr lang="de-CH" sz="1800" dirty="0" err="1"/>
               <a:t>small</a:t>
             </a:r>
             <a:r>
-              <a:rPr lang="de-CH" dirty="0"/>
+              <a:rPr lang="de-CH" sz="1800" dirty="0"/>
               <a:t> </a:t>
             </a:r>
             <a:r>
-              <a:rPr lang="de-CH" dirty="0" err="1"/>
+              <a:rPr lang="de-CH" sz="1800" dirty="0" err="1"/>
               <a:t>decision</a:t>
             </a:r>
             <a:r>
-              <a:rPr lang="de-CH" dirty="0"/>
+              <a:rPr lang="de-CH" sz="1800" dirty="0"/>
               <a:t> </a:t>
             </a:r>
             <a:r>
-              <a:rPr lang="de-CH" dirty="0" err="1"/>
+              <a:rPr lang="de-CH" sz="1800" dirty="0" err="1"/>
               <a:t>tree</a:t>
             </a:r>
             <a:r>
-              <a:rPr lang="de-CH" dirty="0"/>
+              <a:rPr lang="de-CH" sz="1800" dirty="0"/>
               <a:t>)</a:t>
             </a:r>
           </a:p>
@@ -36882,91 +36875,89 @@
               <a:buAutoNum type="arabicPeriod"/>
             </a:pPr>
             <a:r>
-              <a:rPr lang="de-CH" dirty="0"/>
+              <a:rPr lang="de-CH" sz="1800" dirty="0"/>
               <a:t>Repeat </a:t>
             </a:r>
             <a:r>
-              <a:rPr lang="de-CH" dirty="0" err="1"/>
+              <a:rPr lang="de-CH" sz="1800" dirty="0" err="1"/>
               <a:t>Step</a:t>
             </a:r>
             <a:r>
-              <a:rPr lang="de-CH" dirty="0"/>
+              <a:rPr lang="de-CH" sz="1800" dirty="0"/>
               <a:t> 1 on </a:t>
             </a:r>
             <a:r>
-              <a:rPr lang="de-CH" dirty="0" err="1"/>
+              <a:rPr lang="de-CH" sz="1800" dirty="0" err="1"/>
               <a:t>the</a:t>
             </a:r>
             <a:r>
-              <a:rPr lang="de-CH" dirty="0"/>
+              <a:rPr lang="de-CH" sz="1800" dirty="0"/>
               <a:t> </a:t>
             </a:r>
             <a:r>
-              <a:rPr lang="de-CH" dirty="0" err="1"/>
+              <a:rPr lang="de-CH" sz="1800" dirty="0" err="1"/>
               <a:t>model</a:t>
             </a:r>
             <a:r>
-              <a:rPr lang="de-CH" dirty="0"/>
+              <a:rPr lang="de-CH" sz="1800" dirty="0"/>
               <a:t> </a:t>
             </a:r>
             <a:r>
-              <a:rPr lang="de-CH" dirty="0" err="1"/>
+              <a:rPr lang="de-CH" sz="1800" dirty="0" err="1"/>
               <a:t>errors</a:t>
             </a:r>
             <a:r>
-              <a:rPr lang="de-CH" dirty="0"/>
+              <a:rPr lang="de-CH" sz="1800" dirty="0"/>
               <a:t> (~</a:t>
             </a:r>
             <a:r>
-              <a:rPr lang="de-CH" dirty="0" err="1"/>
+              <a:rPr lang="de-CH" sz="1800" dirty="0" err="1"/>
               <a:t>gradients</a:t>
             </a:r>
             <a:r>
-              <a:rPr lang="de-CH" dirty="0"/>
+              <a:rPr lang="de-CH" sz="1800" dirty="0"/>
               <a:t>) </a:t>
             </a:r>
             <a:r>
-              <a:rPr lang="de-CH" dirty="0" err="1"/>
+              <a:rPr lang="de-CH" sz="1800" dirty="0" err="1"/>
               <a:t>until</a:t>
             </a:r>
             <a:r>
-              <a:rPr lang="de-CH" dirty="0"/>
+              <a:rPr lang="de-CH" sz="1800" dirty="0"/>
               <a:t> </a:t>
             </a:r>
             <a:r>
-              <a:rPr lang="de-CH" dirty="0" err="1"/>
+              <a:rPr lang="de-CH" sz="1800" dirty="0" err="1"/>
               <a:t>validation</a:t>
             </a:r>
             <a:r>
-              <a:rPr lang="de-CH" dirty="0"/>
+              <a:rPr lang="de-CH" sz="1800" dirty="0"/>
               <a:t> </a:t>
             </a:r>
             <a:r>
-              <a:rPr lang="de-CH" dirty="0" err="1"/>
+              <a:rPr lang="de-CH" sz="1800" dirty="0" err="1"/>
               <a:t>performance</a:t>
             </a:r>
             <a:r>
-              <a:rPr lang="de-CH" dirty="0"/>
+              <a:rPr lang="de-CH" sz="1800" dirty="0"/>
               <a:t> </a:t>
             </a:r>
             <a:r>
-              <a:rPr lang="de-CH" dirty="0" err="1"/>
+              <a:rPr lang="de-CH" sz="1800" dirty="0" err="1"/>
               <a:t>stops</a:t>
             </a:r>
             <a:r>
-              <a:rPr lang="de-CH" dirty="0"/>
+              <a:rPr lang="de-CH" sz="1800" dirty="0"/>
               <a:t> </a:t>
             </a:r>
             <a:r>
-              <a:rPr lang="de-CH" dirty="0" err="1"/>
+              <a:rPr lang="de-CH" sz="1800" dirty="0" err="1"/>
               <a:t>improving</a:t>
             </a:r>
             <a:r>
-              <a:rPr lang="de-CH" dirty="0"/>
+              <a:rPr lang="de-CH" sz="1800" dirty="0"/>
               <a:t>.</a:t>
             </a:r>
-          </a:p>
-          <a:p>
             <a:endParaRPr lang="de-CH" sz="1600" dirty="0"/>
           </a:p>
           <a:p>
@@ -37249,6 +37240,68 @@
           </a:p>
         </p:txBody>
       </p:sp>
+      <p:sp>
+        <p:nvSpPr>
+          <p:cNvPr id="3" name="Textfeld 2">
+            <a:extLst>
+              <a:ext uri="{FF2B5EF4-FFF2-40B4-BE49-F238E27FC236}">
+                <a16:creationId xmlns:a16="http://schemas.microsoft.com/office/drawing/2014/main" id="{AB5FCB9C-CF5D-4608-A391-CAB75C69871E}"/>
+              </a:ext>
+            </a:extLst>
+          </p:cNvPr>
+          <p:cNvSpPr txBox="1"/>
+          <p:nvPr/>
+        </p:nvSpPr>
+        <p:spPr>
+          <a:xfrm>
+            <a:off x="2017142" y="4206573"/>
+            <a:ext cx="3556664" cy="400110"/>
+          </a:xfrm>
+          <a:prstGeom prst="rect">
+            <a:avLst/>
+          </a:prstGeom>
+          <a:noFill/>
+        </p:spPr>
+        <p:txBody>
+          <a:bodyPr wrap="square">
+            <a:spAutoFit/>
+          </a:bodyPr>
+          <a:lstStyle/>
+          <a:p>
+            <a:r>
+              <a:rPr lang="de-CH" sz="2000" u="sng" dirty="0" err="1">
+                <a:solidFill>
+                  <a:schemeClr val="accent4">
+                    <a:lumMod val="75000"/>
+                  </a:schemeClr>
+                </a:solidFill>
+              </a:rPr>
+              <a:t>Example</a:t>
+            </a:r>
+            <a:r>
+              <a:rPr lang="de-CH" sz="2000" u="sng" dirty="0">
+                <a:solidFill>
+                  <a:schemeClr val="accent4">
+                    <a:lumMod val="75000"/>
+                  </a:schemeClr>
+                </a:solidFill>
+              </a:rPr>
+              <a:t>: </a:t>
+            </a:r>
+            <a:r>
+              <a:rPr lang="de-CH" sz="2000" u="sng" dirty="0" err="1">
+                <a:solidFill>
+                  <a:schemeClr val="accent4">
+                    <a:lumMod val="75000"/>
+                  </a:schemeClr>
+                </a:solidFill>
+              </a:rPr>
+              <a:t>XGBoost</a:t>
+            </a:r>
+            <a:endParaRPr lang="de-CH" sz="2000" u="sng" dirty="0"/>
+          </a:p>
+        </p:txBody>
+      </p:sp>
     </p:spTree>
     <p:extLst>
       <p:ext uri="{BB962C8B-B14F-4D97-AF65-F5344CB8AC3E}">
@@ -38033,8 +38086,8 @@
         </p:nvSpPr>
         <p:spPr>
           <a:xfrm>
-            <a:off x="1175894" y="4089530"/>
-            <a:ext cx="1348631" cy="400110"/>
+            <a:off x="1322198" y="4164930"/>
+            <a:ext cx="2467076" cy="400110"/>
           </a:xfrm>
           <a:prstGeom prst="rect">
             <a:avLst/>
@@ -38056,6 +38109,26 @@
                 </a:solidFill>
               </a:rPr>
               <a:t>Example</a:t>
+            </a:r>
+            <a:r>
+              <a:rPr lang="de-CH" sz="2000" u="sng" dirty="0">
+                <a:solidFill>
+                  <a:schemeClr val="accent4">
+                    <a:lumMod val="75000"/>
+                  </a:schemeClr>
+                </a:solidFill>
+              </a:rPr>
+              <a:t>: </a:t>
+            </a:r>
+            <a:r>
+              <a:rPr lang="de-CH" sz="2000" u="sng" dirty="0" err="1">
+                <a:solidFill>
+                  <a:schemeClr val="accent4">
+                    <a:lumMod val="75000"/>
+                  </a:schemeClr>
+                </a:solidFill>
+              </a:rPr>
+              <a:t>XGBoost</a:t>
             </a:r>
             <a:endParaRPr lang="de-CH" sz="2000" u="sng" dirty="0"/>
           </a:p>
@@ -38075,7 +38148,7 @@
         </p:nvSpPr>
         <p:spPr>
           <a:xfrm>
-            <a:off x="6035698" y="1830425"/>
+            <a:off x="6460243" y="2058345"/>
             <a:ext cx="2010375" cy="1384995"/>
           </a:xfrm>
           <a:prstGeom prst="rect">
@@ -38183,7 +38256,7 @@
                   </a:schemeClr>
                 </a:solidFill>
               </a:rPr>
-              <a:t>Grid</a:t>
+              <a:t>grid</a:t>
             </a:r>
             <a:r>
               <a:rPr lang="de-CH" dirty="0">
@@ -38193,7 +38266,27 @@
                   </a:schemeClr>
                 </a:solidFill>
               </a:rPr>
-              <a:t> Search on all </a:t>
+              <a:t> </a:t>
+            </a:r>
+            <a:r>
+              <a:rPr lang="de-CH" dirty="0" err="1">
+                <a:solidFill>
+                  <a:schemeClr val="accent4">
+                    <a:lumMod val="75000"/>
+                  </a:schemeClr>
+                </a:solidFill>
+              </a:rPr>
+              <a:t>search</a:t>
+            </a:r>
+            <a:r>
+              <a:rPr lang="de-CH" dirty="0">
+                <a:solidFill>
+                  <a:schemeClr val="accent4">
+                    <a:lumMod val="75000"/>
+                  </a:schemeClr>
+                </a:solidFill>
+              </a:rPr>
+              <a:t> on all </a:t>
             </a:r>
             <a:r>
               <a:rPr lang="de-CH" dirty="0" err="1">
@@ -38750,8 +38843,12 @@
               <a:buAutoNum type="arabicPeriod"/>
             </a:pPr>
             <a:r>
+              <a:rPr lang="en-US" sz="1600"/>
+              <a:t>Study online documentation </a:t>
+            </a:r>
+            <a:r>
               <a:rPr lang="en-US" sz="1600" dirty="0"/>
-              <a:t>Study documentation of </a:t>
+              <a:t>of </a:t>
             </a:r>
             <a:r>
               <a:rPr lang="en-US" sz="1600" dirty="0" err="1"/>

</xml_diff>

<commit_message>
added comment on extrapolation
</commit_message>
<xml_diff>
--- a/slides/ML_Lecture.pptx
+++ b/slides/ML_Lecture.pptx
@@ -32465,7 +32465,7 @@
         </p:nvSpPr>
         <p:spPr>
           <a:xfrm>
-            <a:off x="3957764" y="2571750"/>
+            <a:off x="3831844" y="2419402"/>
             <a:ext cx="990753" cy="459650"/>
           </a:xfrm>
           <a:prstGeom prst="rect">
@@ -32932,6 +32932,296 @@
                 <a:schemeClr val="accent1"/>
               </a:solidFill>
             </a:endParaRPr>
+          </a:p>
+        </p:txBody>
+      </p:sp>
+      <p:sp>
+        <p:nvSpPr>
+          <p:cNvPr id="2" name="Google Shape;301;p27">
+            <a:extLst>
+              <a:ext uri="{FF2B5EF4-FFF2-40B4-BE49-F238E27FC236}">
+                <a16:creationId xmlns:a16="http://schemas.microsoft.com/office/drawing/2014/main" id="{EE884FFE-22F1-43CE-9160-F52679AB7F46}"/>
+              </a:ext>
+            </a:extLst>
+          </p:cNvPr>
+          <p:cNvSpPr txBox="1">
+            <a:spLocks/>
+          </p:cNvSpPr>
+          <p:nvPr/>
+        </p:nvSpPr>
+        <p:spPr>
+          <a:xfrm>
+            <a:off x="4919022" y="2595359"/>
+            <a:ext cx="2436314" cy="580473"/>
+          </a:xfrm>
+          <a:prstGeom prst="rect">
+            <a:avLst/>
+          </a:prstGeom>
+          <a:noFill/>
+          <a:ln>
+            <a:noFill/>
+          </a:ln>
+        </p:spPr>
+        <p:txBody>
+          <a:bodyPr spcFirstLastPara="1" wrap="square" lIns="91425" tIns="91425" rIns="91425" bIns="91425" anchor="b" anchorCtr="0">
+            <a:noAutofit/>
+          </a:bodyPr>
+          <a:lstStyle>
+            <a:defPPr marR="0" lvl="0" algn="l" rtl="0">
+              <a:lnSpc>
+                <a:spcPct val="100000"/>
+              </a:lnSpc>
+              <a:spcBef>
+                <a:spcPts val="0"/>
+              </a:spcBef>
+              <a:spcAft>
+                <a:spcPts val="0"/>
+              </a:spcAft>
+            </a:defPPr>
+            <a:lvl1pPr marR="0" lvl="0" algn="l" rtl="0">
+              <a:lnSpc>
+                <a:spcPct val="100000"/>
+              </a:lnSpc>
+              <a:spcBef>
+                <a:spcPts val="0"/>
+              </a:spcBef>
+              <a:spcAft>
+                <a:spcPts val="0"/>
+              </a:spcAft>
+              <a:buClr>
+                <a:srgbClr val="3796BF"/>
+              </a:buClr>
+              <a:buSzPts val="3000"/>
+              <a:buFont typeface="Oswald"/>
+              <a:buNone/>
+              <a:defRPr sz="3000" b="1" i="0" u="none" strike="noStrike" cap="none">
+                <a:solidFill>
+                  <a:srgbClr val="3796BF"/>
+                </a:solidFill>
+                <a:latin typeface="Oswald"/>
+                <a:ea typeface="Oswald"/>
+                <a:cs typeface="Oswald"/>
+                <a:sym typeface="Oswald"/>
+              </a:defRPr>
+            </a:lvl1pPr>
+            <a:lvl2pPr marR="0" lvl="1" algn="l" rtl="0">
+              <a:lnSpc>
+                <a:spcPct val="100000"/>
+              </a:lnSpc>
+              <a:spcBef>
+                <a:spcPts val="0"/>
+              </a:spcBef>
+              <a:spcAft>
+                <a:spcPts val="0"/>
+              </a:spcAft>
+              <a:buClr>
+                <a:srgbClr val="3796BF"/>
+              </a:buClr>
+              <a:buSzPts val="3000"/>
+              <a:buFont typeface="Oswald"/>
+              <a:buNone/>
+              <a:defRPr sz="3000" b="1" i="0" u="none" strike="noStrike" cap="none">
+                <a:solidFill>
+                  <a:srgbClr val="3796BF"/>
+                </a:solidFill>
+                <a:latin typeface="Oswald"/>
+                <a:ea typeface="Oswald"/>
+                <a:cs typeface="Oswald"/>
+                <a:sym typeface="Oswald"/>
+              </a:defRPr>
+            </a:lvl2pPr>
+            <a:lvl3pPr marR="0" lvl="2" algn="l" rtl="0">
+              <a:lnSpc>
+                <a:spcPct val="100000"/>
+              </a:lnSpc>
+              <a:spcBef>
+                <a:spcPts val="0"/>
+              </a:spcBef>
+              <a:spcAft>
+                <a:spcPts val="0"/>
+              </a:spcAft>
+              <a:buClr>
+                <a:srgbClr val="3796BF"/>
+              </a:buClr>
+              <a:buSzPts val="3000"/>
+              <a:buFont typeface="Oswald"/>
+              <a:buNone/>
+              <a:defRPr sz="3000" b="1" i="0" u="none" strike="noStrike" cap="none">
+                <a:solidFill>
+                  <a:srgbClr val="3796BF"/>
+                </a:solidFill>
+                <a:latin typeface="Oswald"/>
+                <a:ea typeface="Oswald"/>
+                <a:cs typeface="Oswald"/>
+                <a:sym typeface="Oswald"/>
+              </a:defRPr>
+            </a:lvl3pPr>
+            <a:lvl4pPr marR="0" lvl="3" algn="l" rtl="0">
+              <a:lnSpc>
+                <a:spcPct val="100000"/>
+              </a:lnSpc>
+              <a:spcBef>
+                <a:spcPts val="0"/>
+              </a:spcBef>
+              <a:spcAft>
+                <a:spcPts val="0"/>
+              </a:spcAft>
+              <a:buClr>
+                <a:srgbClr val="3796BF"/>
+              </a:buClr>
+              <a:buSzPts val="3000"/>
+              <a:buFont typeface="Oswald"/>
+              <a:buNone/>
+              <a:defRPr sz="3000" b="1" i="0" u="none" strike="noStrike" cap="none">
+                <a:solidFill>
+                  <a:srgbClr val="3796BF"/>
+                </a:solidFill>
+                <a:latin typeface="Oswald"/>
+                <a:ea typeface="Oswald"/>
+                <a:cs typeface="Oswald"/>
+                <a:sym typeface="Oswald"/>
+              </a:defRPr>
+            </a:lvl4pPr>
+            <a:lvl5pPr marR="0" lvl="4" algn="l" rtl="0">
+              <a:lnSpc>
+                <a:spcPct val="100000"/>
+              </a:lnSpc>
+              <a:spcBef>
+                <a:spcPts val="0"/>
+              </a:spcBef>
+              <a:spcAft>
+                <a:spcPts val="0"/>
+              </a:spcAft>
+              <a:buClr>
+                <a:srgbClr val="3796BF"/>
+              </a:buClr>
+              <a:buSzPts val="3000"/>
+              <a:buFont typeface="Oswald"/>
+              <a:buNone/>
+              <a:defRPr sz="3000" b="1" i="0" u="none" strike="noStrike" cap="none">
+                <a:solidFill>
+                  <a:srgbClr val="3796BF"/>
+                </a:solidFill>
+                <a:latin typeface="Oswald"/>
+                <a:ea typeface="Oswald"/>
+                <a:cs typeface="Oswald"/>
+                <a:sym typeface="Oswald"/>
+              </a:defRPr>
+            </a:lvl5pPr>
+            <a:lvl6pPr marR="0" lvl="5" algn="l" rtl="0">
+              <a:lnSpc>
+                <a:spcPct val="100000"/>
+              </a:lnSpc>
+              <a:spcBef>
+                <a:spcPts val="0"/>
+              </a:spcBef>
+              <a:spcAft>
+                <a:spcPts val="0"/>
+              </a:spcAft>
+              <a:buClr>
+                <a:srgbClr val="3796BF"/>
+              </a:buClr>
+              <a:buSzPts val="3000"/>
+              <a:buFont typeface="Oswald"/>
+              <a:buNone/>
+              <a:defRPr sz="3000" b="1" i="0" u="none" strike="noStrike" cap="none">
+                <a:solidFill>
+                  <a:srgbClr val="3796BF"/>
+                </a:solidFill>
+                <a:latin typeface="Oswald"/>
+                <a:ea typeface="Oswald"/>
+                <a:cs typeface="Oswald"/>
+                <a:sym typeface="Oswald"/>
+              </a:defRPr>
+            </a:lvl6pPr>
+            <a:lvl7pPr marR="0" lvl="6" algn="l" rtl="0">
+              <a:lnSpc>
+                <a:spcPct val="100000"/>
+              </a:lnSpc>
+              <a:spcBef>
+                <a:spcPts val="0"/>
+              </a:spcBef>
+              <a:spcAft>
+                <a:spcPts val="0"/>
+              </a:spcAft>
+              <a:buClr>
+                <a:srgbClr val="3796BF"/>
+              </a:buClr>
+              <a:buSzPts val="3000"/>
+              <a:buFont typeface="Oswald"/>
+              <a:buNone/>
+              <a:defRPr sz="3000" b="1" i="0" u="none" strike="noStrike" cap="none">
+                <a:solidFill>
+                  <a:srgbClr val="3796BF"/>
+                </a:solidFill>
+                <a:latin typeface="Oswald"/>
+                <a:ea typeface="Oswald"/>
+                <a:cs typeface="Oswald"/>
+                <a:sym typeface="Oswald"/>
+              </a:defRPr>
+            </a:lvl7pPr>
+            <a:lvl8pPr marR="0" lvl="7" algn="l" rtl="0">
+              <a:lnSpc>
+                <a:spcPct val="100000"/>
+              </a:lnSpc>
+              <a:spcBef>
+                <a:spcPts val="0"/>
+              </a:spcBef>
+              <a:spcAft>
+                <a:spcPts val="0"/>
+              </a:spcAft>
+              <a:buClr>
+                <a:srgbClr val="3796BF"/>
+              </a:buClr>
+              <a:buSzPts val="3000"/>
+              <a:buFont typeface="Oswald"/>
+              <a:buNone/>
+              <a:defRPr sz="3000" b="1" i="0" u="none" strike="noStrike" cap="none">
+                <a:solidFill>
+                  <a:srgbClr val="3796BF"/>
+                </a:solidFill>
+                <a:latin typeface="Oswald"/>
+                <a:ea typeface="Oswald"/>
+                <a:cs typeface="Oswald"/>
+                <a:sym typeface="Oswald"/>
+              </a:defRPr>
+            </a:lvl8pPr>
+            <a:lvl9pPr marR="0" lvl="8" algn="l" rtl="0">
+              <a:lnSpc>
+                <a:spcPct val="100000"/>
+              </a:lnSpc>
+              <a:spcBef>
+                <a:spcPts val="0"/>
+              </a:spcBef>
+              <a:spcAft>
+                <a:spcPts val="0"/>
+              </a:spcAft>
+              <a:buClr>
+                <a:srgbClr val="3796BF"/>
+              </a:buClr>
+              <a:buSzPts val="3000"/>
+              <a:buFont typeface="Oswald"/>
+              <a:buNone/>
+              <a:defRPr sz="3000" b="1" i="0" u="none" strike="noStrike" cap="none">
+                <a:solidFill>
+                  <a:srgbClr val="3796BF"/>
+                </a:solidFill>
+                <a:latin typeface="Oswald"/>
+                <a:ea typeface="Oswald"/>
+                <a:cs typeface="Oswald"/>
+                <a:sym typeface="Oswald"/>
+              </a:defRPr>
+            </a:lvl9pPr>
+          </a:lstStyle>
+          <a:p>
+            <a:r>
+              <a:rPr lang="de-CH" sz="2000" dirty="0">
+                <a:solidFill>
+                  <a:schemeClr val="accent6"/>
+                </a:solidFill>
+              </a:rPr>
+              <a:t>Extrapolation</a:t>
+            </a:r>
           </a:p>
         </p:txBody>
       </p:sp>

</xml_diff>

<commit_message>
simplified first example on neural nets
</commit_message>
<xml_diff>
--- a/slides/ML_Lecture.pptx
+++ b/slides/ML_Lecture.pptx
@@ -39133,12 +39133,8 @@
               <a:buAutoNum type="arabicPeriod"/>
             </a:pPr>
             <a:r>
-              <a:rPr lang="en-US" sz="1600"/>
-              <a:t>Study online documentation </a:t>
-            </a:r>
-            <a:r>
               <a:rPr lang="en-US" sz="1600" dirty="0"/>
-              <a:t>of </a:t>
+              <a:t>Study online documentation of </a:t>
             </a:r>
             <a:r>
               <a:rPr lang="en-US" sz="1600" dirty="0" err="1"/>
@@ -45502,7 +45498,7 @@
         </p:blipFill>
         <p:spPr>
           <a:xfrm>
-            <a:off x="3960158" y="1272414"/>
+            <a:off x="3960158" y="1278764"/>
             <a:ext cx="4475602" cy="3286839"/>
           </a:xfrm>
           <a:prstGeom prst="rect">
@@ -51071,7 +51067,7 @@
             <a:pPr lvl="1"/>
             <a:r>
               <a:rPr lang="en-US" sz="1600" dirty="0"/>
-              <a:t>Evaluate final model on test data. </a:t>
+              <a:t>Evaluate final model (for simplicity) on validation data. </a:t>
             </a:r>
           </a:p>
           <a:p>
@@ -51087,15 +51083,7 @@
             </a:pPr>
             <a:r>
               <a:rPr lang="en-US" sz="1600" dirty="0"/>
-              <a:t>Hint: Use smaller learning </a:t>
-            </a:r>
-            <a:r>
-              <a:rPr lang="en-US" sz="1600"/>
-              <a:t>rate and </a:t>
-            </a:r>
-            <a:r>
-              <a:rPr lang="en-US" sz="1600" dirty="0"/>
-              <a:t>replace "</a:t>
+              <a:t>Hint: Use smaller learning rate and replace "</a:t>
             </a:r>
             <a:r>
               <a:rPr lang="en-US" sz="1600" dirty="0" err="1"/>

</xml_diff>

<commit_message>
fixed missing negative sign in neural net slides
</commit_message>
<xml_diff>
--- a/slides/ML_Lecture.pptx
+++ b/slides/ML_Lecture.pptx
@@ -43696,8 +43696,8 @@
           </a:p>
         </p:txBody>
       </p:sp>
-      <mc:AlternateContent xmlns:mc="http://schemas.openxmlformats.org/markup-compatibility/2006" xmlns:a14="http://schemas.microsoft.com/office/drawing/2010/main">
-        <mc:Choice Requires="a14">
+      <mc:AlternateContent xmlns:mc="http://schemas.openxmlformats.org/markup-compatibility/2006">
+        <mc:Choice xmlns:a14="http://schemas.microsoft.com/office/drawing/2010/main" Requires="a14">
           <p:sp>
             <p:nvSpPr>
               <p:cNvPr id="7" name="Google Shape;203;p17">
@@ -44080,6 +44080,12 @@
                       <m:t>≈</m:t>
                     </m:r>
                     <m:r>
+                      <a:rPr lang="de-CH" b="0" i="1" dirty="0" smtClean="0">
+                        <a:latin typeface="Cambria Math" panose="02040503050406030204" pitchFamily="18" charset="0"/>
+                      </a:rPr>
+                      <m:t>−</m:t>
+                    </m:r>
+                    <m:r>
                       <a:rPr lang="de-CH" i="1" dirty="0" smtClean="0">
                         <a:latin typeface="Cambria Math" panose="02040503050406030204" pitchFamily="18" charset="0"/>
                       </a:rPr>
@@ -44134,7 +44140,7 @@
             </p:txBody>
           </p:sp>
         </mc:Choice>
-        <mc:Fallback xmlns="">
+        <mc:Fallback>
           <p:sp>
             <p:nvSpPr>
               <p:cNvPr id="7" name="Google Shape;203;p17">

</xml_diff>

<commit_message>
added info on bias to log(lm) and GLM
</commit_message>
<xml_diff>
--- a/slides/ML_Lecture.pptx
+++ b/slides/ML_Lecture.pptx
@@ -24162,8 +24162,8 @@
         </p:nvSpPr>
         <p:spPr>
           <a:xfrm>
-            <a:off x="1031423" y="2462925"/>
-            <a:ext cx="4549105" cy="1470446"/>
+            <a:off x="1031423" y="2462924"/>
+            <a:ext cx="4549105" cy="1684793"/>
           </a:xfrm>
           <a:prstGeom prst="rect">
             <a:avLst/>
@@ -24185,7 +24185,50 @@
             <a:pPr marL="285750" indent="-285750"/>
             <a:r>
               <a:rPr lang="en-US" sz="1600" dirty="0"/>
-              <a:t>Compare the coefficients with corresponding linear regression for log(price)</a:t>
+              <a:t>Compare the coefficients with corresponding linear regression for log(price).</a:t>
+            </a:r>
+          </a:p>
+          <a:p>
+            <a:pPr marL="285750" indent="-285750"/>
+            <a:r>
+              <a:rPr lang="de-CH" sz="1600" dirty="0" err="1"/>
+              <a:t>Evaluate</a:t>
+            </a:r>
+            <a:r>
+              <a:rPr lang="de-CH" sz="1600" dirty="0"/>
+              <a:t> </a:t>
+            </a:r>
+            <a:r>
+              <a:rPr lang="de-CH" sz="1600" dirty="0" err="1"/>
+              <a:t>the</a:t>
+            </a:r>
+            <a:r>
+              <a:rPr lang="de-CH" sz="1600" dirty="0"/>
+              <a:t> </a:t>
+            </a:r>
+            <a:r>
+              <a:rPr lang="de-CH" sz="1600" dirty="0" err="1"/>
+              <a:t>prediction</a:t>
+            </a:r>
+            <a:r>
+              <a:rPr lang="de-CH" sz="1600" dirty="0"/>
+              <a:t> </a:t>
+            </a:r>
+            <a:r>
+              <a:rPr lang="de-CH" sz="1600" dirty="0" err="1"/>
+              <a:t>bias</a:t>
+            </a:r>
+            <a:r>
+              <a:rPr lang="de-CH" sz="1600" dirty="0"/>
+              <a:t> on USD </a:t>
+            </a:r>
+            <a:r>
+              <a:rPr lang="de-CH" sz="1600" dirty="0" err="1"/>
+              <a:t>scale</a:t>
+            </a:r>
+            <a:r>
+              <a:rPr lang="de-CH" sz="1600"/>
+              <a:t>.</a:t>
             </a:r>
             <a:endParaRPr lang="de-CH" sz="1600" dirty="0"/>
           </a:p>
@@ -43696,8 +43739,8 @@
           </a:p>
         </p:txBody>
       </p:sp>
-      <mc:AlternateContent xmlns:mc="http://schemas.openxmlformats.org/markup-compatibility/2006">
-        <mc:Choice xmlns:a14="http://schemas.microsoft.com/office/drawing/2010/main" Requires="a14">
+      <mc:AlternateContent xmlns:mc="http://schemas.openxmlformats.org/markup-compatibility/2006" xmlns:a14="http://schemas.microsoft.com/office/drawing/2010/main">
+        <mc:Choice Requires="a14">
           <p:sp>
             <p:nvSpPr>
               <p:cNvPr id="7" name="Google Shape;203;p17">
@@ -44077,13 +44120,7 @@
                       <a:rPr lang="de-CH" b="0" i="1" dirty="0" smtClean="0">
                         <a:latin typeface="Cambria Math" panose="02040503050406030204" pitchFamily="18" charset="0"/>
                       </a:rPr>
-                      <m:t>≈</m:t>
-                    </m:r>
-                    <m:r>
-                      <a:rPr lang="de-CH" b="0" i="1" dirty="0" smtClean="0">
-                        <a:latin typeface="Cambria Math" panose="02040503050406030204" pitchFamily="18" charset="0"/>
-                      </a:rPr>
-                      <m:t>−</m:t>
+                      <m:t>≈−</m:t>
                     </m:r>
                     <m:r>
                       <a:rPr lang="de-CH" i="1" dirty="0" smtClean="0">
@@ -44140,7 +44177,7 @@
             </p:txBody>
           </p:sp>
         </mc:Choice>
-        <mc:Fallback>
+        <mc:Fallback xmlns="">
           <p:sp>
             <p:nvSpPr>
               <p:cNvPr id="7" name="Google Shape;203;p17">

</xml_diff>

<commit_message>
slight rewording of tree boosting section
</commit_message>
<xml_diff>
--- a/slides/ML_Lecture.pptx
+++ b/slides/ML_Lecture.pptx
@@ -87,8 +87,11 @@
       <p:bold r:id="rId70"/>
     </p:embeddedFont>
     <p:embeddedFont>
-      <p:font typeface="Roboto Condensed" pitchFamily="2" charset="0"/>
+      <p:font typeface="Roboto Condensed" panose="02000000000000000000" pitchFamily="2" charset="0"/>
       <p:regular r:id="rId71"/>
+      <p:bold r:id="rId72"/>
+      <p:italic r:id="rId73"/>
+      <p:boldItalic r:id="rId74"/>
     </p:embeddedFont>
   </p:embeddedFontLst>
   <p:defaultTextStyle>
@@ -37673,7 +37676,7 @@
             </a:r>
             <a:r>
               <a:rPr lang="de-CH" sz="1800" dirty="0"/>
-              <a:t> (~</a:t>
+              <a:t> (~negative </a:t>
             </a:r>
             <a:r>
               <a:rPr lang="de-CH" sz="1800" dirty="0" err="1"/>

</xml_diff>

<commit_message>
deal with i.e., e.g., resp.
</commit_message>
<xml_diff>
--- a/slides/ML_Lecture.pptx
+++ b/slides/ML_Lecture.pptx
@@ -17024,8 +17024,8 @@
           </a:p>
         </p:txBody>
       </p:sp>
-      <mc:AlternateContent xmlns:mc="http://schemas.openxmlformats.org/markup-compatibility/2006" xmlns:a14="http://schemas.microsoft.com/office/drawing/2010/main">
-        <mc:Choice Requires="a14">
+      <mc:AlternateContent xmlns:mc="http://schemas.openxmlformats.org/markup-compatibility/2006">
+        <mc:Choice xmlns:a14="http://schemas.microsoft.com/office/drawing/2010/main" Requires="a14">
           <p:sp>
             <p:nvSpPr>
               <p:cNvPr id="203" name="Google Shape;203;p17"/>
@@ -17539,7 +17539,7 @@
             </p:txBody>
           </p:sp>
         </mc:Choice>
-        <mc:Fallback xmlns="">
+        <mc:Fallback>
           <p:sp>
             <p:nvSpPr>
               <p:cNvPr id="203" name="Google Shape;203;p17"/>
@@ -19209,8 +19209,8 @@
           </a:p>
         </p:txBody>
       </p:sp>
-      <mc:AlternateContent xmlns:mc="http://schemas.openxmlformats.org/markup-compatibility/2006">
-        <mc:Choice xmlns:a14="http://schemas.microsoft.com/office/drawing/2010/main" Requires="a14">
+      <mc:AlternateContent xmlns:mc="http://schemas.openxmlformats.org/markup-compatibility/2006" xmlns:a14="http://schemas.microsoft.com/office/drawing/2010/main">
+        <mc:Choice Requires="a14">
           <p:sp>
             <p:nvSpPr>
               <p:cNvPr id="203" name="Google Shape;203;p17"/>
@@ -19473,7 +19473,7 @@
             </p:txBody>
           </p:sp>
         </mc:Choice>
-        <mc:Fallback>
+        <mc:Fallback xmlns="">
           <p:sp>
             <p:nvSpPr>
               <p:cNvPr id="203" name="Google Shape;203;p17"/>
@@ -19611,7 +19611,20 @@
                 <a:latin typeface="Arial" panose="020B0604020202020204" pitchFamily="34" charset="0"/>
                 <a:cs typeface="Arial" panose="020B0604020202020204" pitchFamily="34" charset="0"/>
               </a:rPr>
-              <a:t>Data Science is 90% data preparation. This lecture is about the remaining 10%.</a:t>
+              <a:t>Data Science is 90% data preparation. </a:t>
+            </a:r>
+            <a:br>
+              <a:rPr lang="en" dirty="0">
+                <a:latin typeface="Arial" panose="020B0604020202020204" pitchFamily="34" charset="0"/>
+                <a:cs typeface="Arial" panose="020B0604020202020204" pitchFamily="34" charset="0"/>
+              </a:rPr>
+            </a:br>
+            <a:r>
+              <a:rPr lang="en" dirty="0">
+                <a:latin typeface="Arial" panose="020B0604020202020204" pitchFamily="34" charset="0"/>
+                <a:cs typeface="Arial" panose="020B0604020202020204" pitchFamily="34" charset="0"/>
+              </a:rPr>
+              <a:t>This lecture is about the remaining 10%.</a:t>
             </a:r>
             <a:endParaRPr dirty="0">
               <a:latin typeface="Arial" panose="020B0604020202020204" pitchFamily="34" charset="0"/>
@@ -19721,8 +19734,8 @@
           </a:p>
         </p:txBody>
       </p:sp>
-      <mc:AlternateContent xmlns:mc="http://schemas.openxmlformats.org/markup-compatibility/2006" xmlns:a14="http://schemas.microsoft.com/office/drawing/2010/main">
-        <mc:Choice Requires="a14">
+      <mc:AlternateContent xmlns:mc="http://schemas.openxmlformats.org/markup-compatibility/2006">
+        <mc:Choice xmlns:a14="http://schemas.microsoft.com/office/drawing/2010/main" Requires="a14">
           <p:sp>
             <p:nvSpPr>
               <p:cNvPr id="203" name="Google Shape;203;p17"/>
@@ -20057,7 +20070,7 @@
                 </a:r>
                 <a:r>
                   <a:rPr lang="de-CH" dirty="0"/>
-                  <a:t> resp. </a:t>
+                  <a:t> / </a:t>
                 </a:r>
                 <a:r>
                   <a:rPr lang="de-CH" dirty="0" err="1"/>
@@ -20156,7 +20169,7 @@
             </p:txBody>
           </p:sp>
         </mc:Choice>
-        <mc:Fallback xmlns="">
+        <mc:Fallback>
           <p:sp>
             <p:nvSpPr>
               <p:cNvPr id="203" name="Google Shape;203;p17"/>
@@ -21164,8 +21177,8 @@
           </a:p>
         </p:txBody>
       </p:sp>
-      <mc:AlternateContent xmlns:mc="http://schemas.openxmlformats.org/markup-compatibility/2006">
-        <mc:Choice xmlns:a14="http://schemas.microsoft.com/office/drawing/2010/main" Requires="a14">
+      <mc:AlternateContent xmlns:mc="http://schemas.openxmlformats.org/markup-compatibility/2006" xmlns:a14="http://schemas.microsoft.com/office/drawing/2010/main">
+        <mc:Choice Requires="a14">
           <p:sp>
             <p:nvSpPr>
               <p:cNvPr id="203" name="Google Shape;203;p17"/>
@@ -21779,7 +21792,7 @@
             </p:txBody>
           </p:sp>
         </mc:Choice>
-        <mc:Fallback>
+        <mc:Fallback xmlns="">
           <p:sp>
             <p:nvSpPr>
               <p:cNvPr id="203" name="Google Shape;203;p17"/>
@@ -25388,7 +25401,7 @@
             </a:r>
             <a:r>
               <a:rPr lang="de-CH" dirty="0"/>
-              <a:t>, e.g. 80%/20%</a:t>
+              <a:t>, e.g., 80%/20%</a:t>
             </a:r>
           </a:p>
           <a:p>
@@ -40014,7 +40027,7 @@
           <a:p>
             <a:r>
               <a:rPr lang="en-US" dirty="0"/>
-              <a:t>Underwent different development steps, e.g. use of backpropagation, GPUs</a:t>
+              <a:t>Underwent different development steps, e.g., use of backpropagation, GPUs</a:t>
             </a:r>
           </a:p>
           <a:p>
@@ -52246,8 +52259,8 @@
           </a:p>
         </p:txBody>
       </p:sp>
-      <mc:AlternateContent xmlns:mc="http://schemas.openxmlformats.org/markup-compatibility/2006">
-        <mc:Choice xmlns:a14="http://schemas.microsoft.com/office/drawing/2010/main" Requires="a14">
+      <mc:AlternateContent xmlns:mc="http://schemas.openxmlformats.org/markup-compatibility/2006" xmlns:a14="http://schemas.microsoft.com/office/drawing/2010/main">
+        <mc:Choice Requires="a14">
           <p:sp>
             <p:nvSpPr>
               <p:cNvPr id="203" name="Google Shape;203;p17"/>
@@ -52608,7 +52621,7 @@
             </p:txBody>
           </p:sp>
         </mc:Choice>
-        <mc:Fallback>
+        <mc:Fallback xmlns="">
           <p:sp>
             <p:nvSpPr>
               <p:cNvPr id="203" name="Google Shape;203;p17"/>

</xml_diff>

<commit_message>
finished with random forest examples in python
</commit_message>
<xml_diff>
--- a/slides/ML_Lecture.pptx
+++ b/slides/ML_Lecture.pptx
@@ -36589,7 +36589,15 @@
             </a:pPr>
             <a:r>
               <a:rPr lang="de-CH" sz="1600" dirty="0"/>
-              <a:t>Fit a </a:t>
+              <a:t>Fit a (</a:t>
+            </a:r>
+            <a:r>
+              <a:rPr lang="de-CH" sz="1600" dirty="0" err="1"/>
+              <a:t>probability</a:t>
+            </a:r>
+            <a:r>
+              <a:rPr lang="de-CH" sz="1600" dirty="0"/>
+              <a:t>) </a:t>
             </a:r>
             <a:r>
               <a:rPr lang="de-CH" sz="1600" dirty="0" err="1"/>
@@ -36753,7 +36761,7 @@
             </a:r>
             <a:r>
               <a:rPr lang="de-CH" sz="1600" dirty="0" err="1"/>
-              <a:t>tree-depth</a:t>
+              <a:t>tree</a:t>
             </a:r>
             <a:r>
               <a:rPr lang="de-CH" sz="1600" dirty="0"/>
@@ -36761,6 +36769,14 @@
             </a:r>
             <a:r>
               <a:rPr lang="de-CH" sz="1600" dirty="0" err="1"/>
+              <a:t>depth</a:t>
+            </a:r>
+            <a:r>
+              <a:rPr lang="de-CH" sz="1600" dirty="0"/>
+              <a:t> </a:t>
+            </a:r>
+            <a:r>
+              <a:rPr lang="de-CH" sz="1600" dirty="0" err="1"/>
               <a:t>by</a:t>
             </a:r>
             <a:r>
@@ -36773,22 +36789,50 @@
             </a:r>
             <a:r>
               <a:rPr lang="de-CH" sz="1600" dirty="0"/>
-              <a:t>, not CV.</a:t>
+              <a:t> </a:t>
+            </a:r>
+            <a:r>
+              <a:rPr lang="de-CH" sz="1600" dirty="0" err="1"/>
+              <a:t>or</a:t>
+            </a:r>
+            <a:r>
+              <a:rPr lang="de-CH" sz="1600" dirty="0"/>
+              <a:t> CV.</a:t>
             </a:r>
           </a:p>
           <a:p>
             <a:pPr lvl="1"/>
             <a:r>
+              <a:rPr lang="de-CH" sz="1600" dirty="0" err="1"/>
+              <a:t>Evaluate</a:t>
+            </a:r>
+            <a:r>
               <a:rPr lang="de-CH" sz="1600" dirty="0"/>
-              <a:t>Use a simple </a:t>
+              <a:t> </a:t>
             </a:r>
             <a:r>
               <a:rPr lang="de-CH" sz="1600" dirty="0" err="1"/>
-              <a:t>train</a:t>
+              <a:t>the</a:t>
             </a:r>
             <a:r>
               <a:rPr lang="de-CH" sz="1600" dirty="0"/>
-              <a:t>/</a:t>
+              <a:t> </a:t>
+            </a:r>
+            <a:r>
+              <a:rPr lang="de-CH" sz="1600" dirty="0" err="1"/>
+              <a:t>model</a:t>
+            </a:r>
+            <a:r>
+              <a:rPr lang="de-CH" sz="1600" dirty="0"/>
+              <a:t> on an </a:t>
+            </a:r>
+            <a:r>
+              <a:rPr lang="de-CH" sz="1600" dirty="0" err="1"/>
+              <a:t>independent</a:t>
+            </a:r>
+            <a:r>
+              <a:rPr lang="de-CH" sz="1600" dirty="0"/>
+              <a:t> </a:t>
             </a:r>
             <a:r>
               <a:rPr lang="de-CH" sz="1600" dirty="0" err="1"/>
@@ -36800,7 +36844,7 @@
             </a:r>
             <a:r>
               <a:rPr lang="de-CH" sz="1600" dirty="0" err="1"/>
-              <a:t>split</a:t>
+              <a:t>dataset</a:t>
             </a:r>
             <a:r>
               <a:rPr lang="de-CH" sz="1600" dirty="0"/>
@@ -36810,50 +36854,7 @@
           <a:p>
             <a:pPr lvl="1"/>
             <a:r>
-              <a:rPr lang="de-CH" sz="1600" dirty="0" err="1"/>
-              <a:t>Make</a:t>
-            </a:r>
-            <a:r>
-              <a:rPr lang="de-CH" sz="1600" dirty="0"/>
-              <a:t> </a:t>
-            </a:r>
-            <a:r>
-              <a:rPr lang="de-CH" sz="1600" dirty="0" err="1"/>
-              <a:t>sure</a:t>
-            </a:r>
-            <a:r>
-              <a:rPr lang="de-CH" sz="1600" dirty="0"/>
-              <a:t> </a:t>
-            </a:r>
-            <a:r>
-              <a:rPr lang="de-CH" sz="1600" dirty="0" err="1"/>
-              <a:t>to</a:t>
-            </a:r>
-            <a:r>
-              <a:rPr lang="de-CH" sz="1600" dirty="0"/>
-              <a:t> fit a </a:t>
-            </a:r>
-            <a:r>
-              <a:rPr lang="de-CH" sz="1600" dirty="0" err="1"/>
-              <a:t>probability</a:t>
-            </a:r>
-            <a:r>
-              <a:rPr lang="de-CH" sz="1600" dirty="0"/>
-              <a:t> </a:t>
-            </a:r>
-            <a:r>
-              <a:rPr lang="de-CH" sz="1600" dirty="0" err="1"/>
-              <a:t>random</a:t>
-            </a:r>
-            <a:r>
-              <a:rPr lang="de-CH" sz="1600" dirty="0"/>
-              <a:t> forest.</a:t>
-            </a:r>
-          </a:p>
-          <a:p>
-            <a:pPr lvl="1"/>
-            <a:r>
-              <a:rPr lang="de-CH" sz="1600" dirty="0"/>
+              <a:rPr lang="de-CH" sz="1600"/>
               <a:t>Interpret </a:t>
             </a:r>
             <a:r>

</xml_diff>

<commit_message>
more trees in XGBoost code
</commit_message>
<xml_diff>
--- a/slides/ML_Lecture.pptx
+++ b/slides/ML_Lecture.pptx
@@ -82,16 +82,23 @@
       <p:regular r:id="rId68"/>
     </p:embeddedFont>
     <p:embeddedFont>
-      <p:font typeface="Oswald" panose="00000500000000000000" pitchFamily="2" charset="0"/>
+      <p:font typeface="Consolas" panose="020B0609020204030204" pitchFamily="49" charset="0"/>
       <p:regular r:id="rId69"/>
       <p:bold r:id="rId70"/>
+      <p:italic r:id="rId71"/>
+      <p:boldItalic r:id="rId72"/>
+    </p:embeddedFont>
+    <p:embeddedFont>
+      <p:font typeface="Oswald" panose="00000500000000000000" pitchFamily="2" charset="0"/>
+      <p:regular r:id="rId73"/>
+      <p:bold r:id="rId74"/>
     </p:embeddedFont>
     <p:embeddedFont>
       <p:font typeface="Roboto Condensed" panose="02000000000000000000" pitchFamily="2" charset="0"/>
-      <p:regular r:id="rId71"/>
-      <p:bold r:id="rId72"/>
-      <p:italic r:id="rId73"/>
-      <p:boldItalic r:id="rId74"/>
+      <p:regular r:id="rId75"/>
+      <p:bold r:id="rId76"/>
+      <p:italic r:id="rId77"/>
+      <p:boldItalic r:id="rId78"/>
     </p:embeddedFont>
   </p:embeddedFontLst>
   <p:defaultTextStyle>
@@ -39446,11 +39453,41 @@
             <a:pPr lvl="1"/>
             <a:r>
               <a:rPr lang="de-CH" sz="1600" dirty="0"/>
-              <a:t>Use log-</a:t>
+              <a:t>Use </a:t>
+            </a:r>
+            <a:r>
+              <a:rPr lang="de-CH" sz="1400" b="0" dirty="0">
+                <a:solidFill>
+                  <a:srgbClr val="A31515"/>
+                </a:solidFill>
+                <a:effectLst/>
+                <a:latin typeface="Consolas" panose="020B0609020204030204" pitchFamily="49" charset="0"/>
+              </a:rPr>
+              <a:t>"</a:t>
+            </a:r>
+            <a:r>
+              <a:rPr lang="de-CH" sz="1400" b="0" dirty="0" err="1">
+                <a:solidFill>
+                  <a:srgbClr val="A31515"/>
+                </a:solidFill>
+                <a:effectLst/>
+                <a:latin typeface="Consolas" panose="020B0609020204030204" pitchFamily="49" charset="0"/>
+              </a:rPr>
+              <a:t>binary:logistic</a:t>
+            </a:r>
+            <a:r>
+              <a:rPr lang="de-CH" sz="1400" b="0" dirty="0">
+                <a:solidFill>
+                  <a:srgbClr val="A31515"/>
+                </a:solidFill>
+                <a:effectLst/>
+                <a:latin typeface="Consolas" panose="020B0609020204030204" pitchFamily="49" charset="0"/>
+              </a:rPr>
+              <a:t>" </a:t>
             </a:r>
             <a:r>
               <a:rPr lang="de-CH" sz="1600" dirty="0" err="1"/>
-              <a:t>loss</a:t>
+              <a:t>as</a:t>
             </a:r>
             <a:r>
               <a:rPr lang="de-CH" sz="1600" dirty="0"/>
@@ -39458,7 +39495,49 @@
             </a:r>
             <a:r>
               <a:rPr lang="de-CH" sz="1600" dirty="0" err="1"/>
-              <a:t>as</a:t>
+              <a:t>objective</a:t>
+            </a:r>
+            <a:r>
+              <a:rPr lang="de-CH" sz="1600"/>
+              <a:t>.</a:t>
+            </a:r>
+            <a:endParaRPr lang="de-CH" sz="1600" dirty="0"/>
+          </a:p>
+          <a:p>
+            <a:pPr lvl="1"/>
+            <a:r>
+              <a:rPr lang="de-CH" sz="1600" dirty="0"/>
+              <a:t>Use </a:t>
+            </a:r>
+            <a:r>
+              <a:rPr lang="de-CH" sz="1400" b="0" dirty="0">
+                <a:solidFill>
+                  <a:srgbClr val="A31515"/>
+                </a:solidFill>
+                <a:effectLst/>
+                <a:latin typeface="Consolas" panose="020B0609020204030204" pitchFamily="49" charset="0"/>
+              </a:rPr>
+              <a:t>"</a:t>
+            </a:r>
+            <a:r>
+              <a:rPr lang="de-CH" sz="1400" b="0" dirty="0" err="1">
+                <a:solidFill>
+                  <a:srgbClr val="A31515"/>
+                </a:solidFill>
+                <a:effectLst/>
+                <a:latin typeface="Consolas" panose="020B0609020204030204" pitchFamily="49" charset="0"/>
+              </a:rPr>
+              <a:t>logloss</a:t>
+            </a:r>
+            <a:r>
+              <a:rPr lang="de-CH" sz="1400" b="0" dirty="0">
+                <a:solidFill>
+                  <a:srgbClr val="A31515"/>
+                </a:solidFill>
+                <a:effectLst/>
+                <a:latin typeface="Consolas" panose="020B0609020204030204" pitchFamily="49" charset="0"/>
+              </a:rPr>
+              <a:t>"</a:t>
             </a:r>
             <a:r>
               <a:rPr lang="de-CH" sz="1600" dirty="0"/>
@@ -39466,19 +39545,11 @@
             </a:r>
             <a:r>
               <a:rPr lang="de-CH" sz="1600" dirty="0" err="1"/>
-              <a:t>both</a:t>
+              <a:t>as</a:t>
             </a:r>
             <a:r>
               <a:rPr lang="de-CH" sz="1600" dirty="0"/>
               <a:t> </a:t>
-            </a:r>
-            <a:r>
-              <a:rPr lang="de-CH" sz="1600" dirty="0" err="1"/>
-              <a:t>objective</a:t>
-            </a:r>
-            <a:r>
-              <a:rPr lang="de-CH" sz="1600" dirty="0"/>
-              <a:t> and </a:t>
             </a:r>
             <a:r>
               <a:rPr lang="de-CH" sz="1600" dirty="0" err="1"/>

</xml_diff>

<commit_message>
added training performance to XGB/LGB grid search
</commit_message>
<xml_diff>
--- a/slides/ML_Lecture.pptx
+++ b/slides/ML_Lecture.pptx
@@ -24434,13 +24434,29 @@
             </a:r>
             <a:r>
               <a:rPr lang="de-CH" dirty="0"/>
-              <a:t> at Mobiliar</a:t>
+              <a:t> </a:t>
+            </a:r>
+            <a:r>
+              <a:rPr lang="de-CH"/>
+              <a:t>at Swiss Mobiliar </a:t>
+            </a:r>
+            <a:r>
+              <a:rPr lang="de-CH" dirty="0"/>
+              <a:t>(</a:t>
+            </a:r>
+            <a:r>
+              <a:rPr lang="de-CH" dirty="0" err="1"/>
+              <a:t>since</a:t>
+            </a:r>
+            <a:r>
+              <a:rPr lang="de-CH" dirty="0"/>
+              <a:t> 2018)</a:t>
             </a:r>
           </a:p>
           <a:p>
             <a:r>
               <a:rPr lang="de-CH" dirty="0"/>
-              <a:t>Classic </a:t>
+              <a:t>PhD in </a:t>
             </a:r>
             <a:r>
               <a:rPr lang="de-CH" dirty="0" err="1"/>
@@ -24448,56 +24464,44 @@
             </a:r>
             <a:r>
               <a:rPr lang="de-CH" dirty="0"/>
+              <a:t> (2008)</a:t>
+            </a:r>
+          </a:p>
+          <a:p>
+            <a:r>
+              <a:rPr lang="de-CH" dirty="0">
+                <a:hlinkClick r:id="rId3"/>
+              </a:rPr>
+              <a:t>On-topic </a:t>
+            </a:r>
+            <a:r>
+              <a:rPr lang="de-CH" dirty="0" err="1">
+                <a:hlinkClick r:id="rId3"/>
+              </a:rPr>
+              <a:t>blog</a:t>
+            </a:r>
+            <a:r>
+              <a:rPr lang="de-CH" dirty="0"/>
               <a:t> </a:t>
             </a:r>
             <a:r>
               <a:rPr lang="de-CH" dirty="0" err="1"/>
-              <a:t>background</a:t>
+              <a:t>with</a:t>
+            </a:r>
+            <a:r>
+              <a:rPr lang="de-CH" dirty="0"/>
+              <a:t> Christian </a:t>
+            </a:r>
+            <a:r>
+              <a:rPr lang="de-CH" dirty="0" err="1"/>
+              <a:t>Lorentzen</a:t>
             </a:r>
             <a:endParaRPr lang="de-CH" dirty="0"/>
           </a:p>
           <a:p>
             <a:r>
               <a:rPr lang="de-CH" dirty="0"/>
-              <a:t>Strong </a:t>
-            </a:r>
-            <a:r>
-              <a:rPr lang="de-CH" dirty="0" err="1"/>
-              <a:t>interest</a:t>
-            </a:r>
-            <a:r>
-              <a:rPr lang="de-CH" dirty="0"/>
-              <a:t> in ML</a:t>
-            </a:r>
-          </a:p>
-          <a:p>
-            <a:r>
-              <a:rPr lang="de-CH" dirty="0"/>
-              <a:t>R </a:t>
-            </a:r>
-            <a:r>
-              <a:rPr lang="de-CH" dirty="0" err="1"/>
-              <a:t>programmer</a:t>
-            </a:r>
-            <a:endParaRPr lang="de-CH" dirty="0">
-              <a:hlinkClick r:id="rId3"/>
-            </a:endParaRPr>
-          </a:p>
-          <a:p>
-            <a:pPr marL="101600" indent="0">
-              <a:buNone/>
-            </a:pPr>
-            <a:endParaRPr lang="de-CH" u="sng" dirty="0">
-              <a:hlinkClick r:id="rId3"/>
-            </a:endParaRPr>
-          </a:p>
-          <a:p>
-            <a:pPr marL="101600" indent="0">
-              <a:buNone/>
-            </a:pPr>
-            <a:r>
-              <a:rPr lang="de-CH" dirty="0"/>
-              <a:t>Further </a:t>
+              <a:t>More </a:t>
             </a:r>
             <a:r>
               <a:rPr lang="de-CH" dirty="0" err="1"/>
@@ -24505,13 +24509,37 @@
             </a:r>
             <a:r>
               <a:rPr lang="de-CH" dirty="0"/>
-              <a:t>: </a:t>
+              <a:t> on </a:t>
+            </a:r>
+            <a:r>
+              <a:rPr lang="de-CH" dirty="0" err="1">
+                <a:hlinkClick r:id="rId4"/>
+              </a:rPr>
+              <a:t>my</a:t>
             </a:r>
             <a:r>
               <a:rPr lang="de-CH" dirty="0">
-                <a:hlinkClick r:id="rId3"/>
+                <a:hlinkClick r:id="rId4"/>
               </a:rPr>
-              <a:t>https://github.com/mayer79</a:t>
+              <a:t> </a:t>
+            </a:r>
+            <a:r>
+              <a:rPr lang="de-CH" dirty="0" err="1">
+                <a:hlinkClick r:id="rId4"/>
+              </a:rPr>
+              <a:t>github</a:t>
+            </a:r>
+            <a:r>
+              <a:rPr lang="de-CH" dirty="0">
+                <a:hlinkClick r:id="rId4"/>
+              </a:rPr>
+              <a:t> </a:t>
+            </a:r>
+            <a:r>
+              <a:rPr lang="de-CH" dirty="0" err="1">
+                <a:hlinkClick r:id="rId4"/>
+              </a:rPr>
+              <a:t>page</a:t>
             </a:r>
             <a:endParaRPr lang="de-CH" dirty="0"/>
           </a:p>

</xml_diff>

<commit_message>
be less specific about what the "best" model is
</commit_message>
<xml_diff>
--- a/slides/ML_Lecture.pptx
+++ b/slides/ML_Lecture.pptx
@@ -25841,8 +25841,36 @@
           </a:p>
           <a:p>
             <a:r>
+              <a:rPr lang="de-CH" sz="1800" dirty="0" err="1"/>
+              <a:t>How</a:t>
+            </a:r>
+            <a:r>
               <a:rPr lang="de-CH" sz="1800" dirty="0"/>
-              <a:t>Final </a:t>
+              <a:t> </a:t>
+            </a:r>
+            <a:r>
+              <a:rPr lang="de-CH" sz="1800" dirty="0" err="1"/>
+              <a:t>to</a:t>
+            </a:r>
+            <a:r>
+              <a:rPr lang="de-CH" sz="1800" dirty="0"/>
+              <a:t> </a:t>
+            </a:r>
+            <a:r>
+              <a:rPr lang="de-CH" sz="1800" dirty="0" err="1"/>
+              <a:t>choose</a:t>
+            </a:r>
+            <a:r>
+              <a:rPr lang="de-CH" sz="1800" dirty="0"/>
+              <a:t> and fit </a:t>
+            </a:r>
+            <a:r>
+              <a:rPr lang="de-CH" sz="1800" dirty="0" err="1"/>
+              <a:t>best</a:t>
+            </a:r>
+            <a:r>
+              <a:rPr lang="de-CH" sz="1800" dirty="0"/>
+              <a:t>/final </a:t>
             </a:r>
             <a:r>
               <a:rPr lang="de-CH" sz="1800" dirty="0" err="1"/>
@@ -25854,10 +25882,37 @@
             </a:r>
             <a:r>
               <a:rPr lang="de-CH" sz="1800" dirty="0" err="1"/>
+              <a:t>What</a:t>
+            </a:r>
+            <a:r>
+              <a:rPr lang="de-CH" sz="1800" dirty="0"/>
+              <a:t> </a:t>
+            </a:r>
+            <a:r>
+              <a:rPr lang="de-CH" sz="1800" dirty="0" err="1"/>
+              <a:t>means</a:t>
+            </a:r>
+            <a:r>
+              <a:rPr lang="de-CH" sz="1800" dirty="0"/>
+              <a:t> «</a:t>
+            </a:r>
+            <a:r>
+              <a:rPr lang="de-CH" sz="1800" dirty="0" err="1"/>
+              <a:t>best</a:t>
+            </a:r>
+            <a:r>
+              <a:rPr lang="de-CH" sz="1800"/>
+              <a:t>»?</a:t>
+            </a:r>
+            <a:endParaRPr lang="de-CH" sz="1800" dirty="0"/>
+          </a:p>
+          <a:p>
+            <a:r>
+              <a:rPr lang="de-CH" sz="1400" dirty="0" err="1"/>
               <a:t>Repeated</a:t>
             </a:r>
             <a:r>
-              <a:rPr lang="de-CH" sz="1800" dirty="0"/>
+              <a:rPr lang="de-CH" sz="1400" dirty="0"/>
               <a:t> CV?</a:t>
             </a:r>
           </a:p>

</xml_diff>

<commit_message>
fixed shifted arrow in ppt
</commit_message>
<xml_diff>
--- a/slides/ML_Lecture.pptx
+++ b/slides/ML_Lecture.pptx
@@ -13833,8 +13833,8 @@
           </a:p>
         </p:txBody>
       </p:sp>
-      <mc:AlternateContent xmlns:mc="http://schemas.openxmlformats.org/markup-compatibility/2006">
-        <mc:Choice xmlns:a14="http://schemas.microsoft.com/office/drawing/2010/main" Requires="a14">
+      <mc:AlternateContent xmlns:mc="http://schemas.openxmlformats.org/markup-compatibility/2006" xmlns:a14="http://schemas.microsoft.com/office/drawing/2010/main">
+        <mc:Choice Requires="a14">
           <p:sp>
             <p:nvSpPr>
               <p:cNvPr id="203" name="Google Shape;203;p17"/>
@@ -14271,7 +14271,7 @@
             </p:txBody>
           </p:sp>
         </mc:Choice>
-        <mc:Fallback>
+        <mc:Fallback xmlns="">
           <p:sp>
             <p:nvSpPr>
               <p:cNvPr id="203" name="Google Shape;203;p17"/>
@@ -17046,8 +17046,8 @@
           </a:p>
         </p:txBody>
       </p:sp>
-      <mc:AlternateContent xmlns:mc="http://schemas.openxmlformats.org/markup-compatibility/2006" xmlns:a14="http://schemas.microsoft.com/office/drawing/2010/main">
-        <mc:Choice Requires="a14">
+      <mc:AlternateContent xmlns:mc="http://schemas.openxmlformats.org/markup-compatibility/2006">
+        <mc:Choice xmlns:a14="http://schemas.microsoft.com/office/drawing/2010/main" Requires="a14">
           <p:sp>
             <p:nvSpPr>
               <p:cNvPr id="203" name="Google Shape;203;p17"/>
@@ -17288,7 +17288,7 @@
                 <a:pPr lvl="1"/>
                 <a:r>
                   <a:rPr lang="de-CH" sz="1600" dirty="0"/>
-                  <a:t>E.g. </a:t>
+                  <a:t>E.g., </a:t>
                 </a:r>
                 <a:r>
                   <a:rPr lang="de-CH" sz="1600" dirty="0" err="1"/>
@@ -17561,7 +17561,7 @@
             </p:txBody>
           </p:sp>
         </mc:Choice>
-        <mc:Fallback xmlns="">
+        <mc:Fallback>
           <p:sp>
             <p:nvSpPr>
               <p:cNvPr id="203" name="Google Shape;203;p17"/>
@@ -24449,15 +24449,7 @@
             </a:r>
             <a:r>
               <a:rPr lang="de-CH" dirty="0"/>
-              <a:t> </a:t>
-            </a:r>
-            <a:r>
-              <a:rPr lang="de-CH"/>
-              <a:t>at Swiss Mobiliar </a:t>
-            </a:r>
-            <a:r>
-              <a:rPr lang="de-CH" dirty="0"/>
-              <a:t>(</a:t>
+              <a:t> at Swiss Mobiliar (</a:t>
             </a:r>
             <a:r>
               <a:rPr lang="de-CH" dirty="0" err="1"/>
@@ -24483,82 +24475,25 @@
             </a:r>
           </a:p>
           <a:p>
+            <a:r>
+              <a:rPr lang="de-CH" dirty="0"/>
+              <a:t>(M+C)² Blog: </a:t>
+            </a:r>
             <a:r>
               <a:rPr lang="de-CH" dirty="0">
                 <a:hlinkClick r:id="rId3"/>
               </a:rPr>
-              <a:t>On-topic </a:t>
-            </a:r>
-            <a:r>
-              <a:rPr lang="de-CH" dirty="0" err="1">
-                <a:hlinkClick r:id="rId3"/>
-              </a:rPr>
-              <a:t>blog</a:t>
-            </a:r>
-            <a:r>
-              <a:rPr lang="de-CH" dirty="0"/>
-              <a:t> </a:t>
-            </a:r>
-            <a:r>
-              <a:rPr lang="de-CH" dirty="0" err="1"/>
-              <a:t>with</a:t>
-            </a:r>
-            <a:r>
-              <a:rPr lang="de-CH" dirty="0"/>
-              <a:t> Christian </a:t>
-            </a:r>
-            <a:r>
-              <a:rPr lang="de-CH" dirty="0" err="1"/>
-              <a:t>Lorentzen</a:t>
+              <a:t>lorentzen.ch</a:t>
             </a:r>
             <a:endParaRPr lang="de-CH" dirty="0"/>
           </a:p>
           <a:p>
             <a:r>
-              <a:rPr lang="de-CH" dirty="0"/>
-              <a:t>More </a:t>
-            </a:r>
-            <a:r>
-              <a:rPr lang="de-CH" dirty="0" err="1"/>
-              <a:t>stuff</a:t>
-            </a:r>
-            <a:r>
-              <a:rPr lang="de-CH" dirty="0"/>
-              <a:t> on </a:t>
-            </a:r>
-            <a:r>
-              <a:rPr lang="de-CH" dirty="0" err="1">
-                <a:hlinkClick r:id="rId4"/>
-              </a:rPr>
-              <a:t>my</a:t>
-            </a:r>
-            <a:r>
               <a:rPr lang="de-CH" dirty="0">
                 <a:hlinkClick r:id="rId4"/>
               </a:rPr>
-              <a:t> </a:t>
-            </a:r>
-            <a:r>
-              <a:rPr lang="de-CH" dirty="0" err="1">
-                <a:hlinkClick r:id="rId4"/>
-              </a:rPr>
-              <a:t>github</a:t>
-            </a:r>
-            <a:r>
-              <a:rPr lang="de-CH" dirty="0">
-                <a:hlinkClick r:id="rId4"/>
-              </a:rPr>
-              <a:t> </a:t>
-            </a:r>
-            <a:r>
-              <a:rPr lang="de-CH" dirty="0" err="1">
-                <a:hlinkClick r:id="rId4"/>
-              </a:rPr>
-              <a:t>page</a:t>
-            </a:r>
-            <a:endParaRPr lang="de-CH" dirty="0"/>
-          </a:p>
-          <a:p>
+              <a:t>github.com/mayer79</a:t>
+            </a:r>
             <a:endParaRPr lang="de-CH" dirty="0"/>
           </a:p>
         </p:txBody>
@@ -52450,8 +52385,8 @@
           </a:p>
         </p:txBody>
       </p:sp>
-      <mc:AlternateContent xmlns:mc="http://schemas.openxmlformats.org/markup-compatibility/2006">
-        <mc:Choice xmlns:a14="http://schemas.microsoft.com/office/drawing/2010/main" Requires="a14">
+      <mc:AlternateContent xmlns:mc="http://schemas.openxmlformats.org/markup-compatibility/2006" xmlns:a14="http://schemas.microsoft.com/office/drawing/2010/main">
+        <mc:Choice Requires="a14">
           <p:sp>
             <p:nvSpPr>
               <p:cNvPr id="203" name="Google Shape;203;p17"/>
@@ -52812,7 +52747,7 @@
             </p:txBody>
           </p:sp>
         </mc:Choice>
-        <mc:Fallback>
+        <mc:Fallback xmlns="">
           <p:sp>
             <p:nvSpPr>
               <p:cNvPr id="203" name="Google Shape;203;p17"/>
@@ -53203,8 +53138,8 @@
         </p:nvCxnSpPr>
         <p:spPr>
           <a:xfrm>
-            <a:off x="5756157" y="1717604"/>
-            <a:ext cx="162563" cy="281617"/>
+            <a:off x="5829300" y="1685819"/>
+            <a:ext cx="671812" cy="259845"/>
           </a:xfrm>
           <a:prstGeom prst="straightConnector1">
             <a:avLst/>

</xml_diff>

<commit_message>
removed the "with R or Python"
</commit_message>
<xml_diff>
--- a/slides/ML_Lecture.pptx
+++ b/slides/ML_Lecture.pptx
@@ -12489,8 +12489,8 @@
         </p:nvSpPr>
         <p:spPr>
           <a:xfrm>
-            <a:off x="685800" y="2753825"/>
-            <a:ext cx="5671500" cy="1159800"/>
+            <a:off x="685800" y="1456841"/>
+            <a:ext cx="5671500" cy="2456784"/>
           </a:xfrm>
           <a:prstGeom prst="rect">
             <a:avLst/>
@@ -12510,7 +12510,7 @@
               <a:rPr lang="en-US" dirty="0"/>
             </a:br>
             <a:r>
-              <a:rPr lang="en-US" dirty="0"/>
+              <a:rPr lang="en-US"/>
               <a:t>Machine Learning</a:t>
             </a:r>
             <a:br>
@@ -12523,6 +12523,36 @@
           </a:p>
         </p:txBody>
       </p:sp>
+      <p:pic>
+        <p:nvPicPr>
+          <p:cNvPr id="3" name="Grafik 2">
+            <a:extLst>
+              <a:ext uri="{FF2B5EF4-FFF2-40B4-BE49-F238E27FC236}">
+                <a16:creationId xmlns:a16="http://schemas.microsoft.com/office/drawing/2014/main" id="{FEF31FD2-BEA9-4894-8C3B-2AF870C53862}"/>
+              </a:ext>
+            </a:extLst>
+          </p:cNvPr>
+          <p:cNvPicPr>
+            <a:picLocks noChangeAspect="1"/>
+          </p:cNvPicPr>
+          <p:nvPr/>
+        </p:nvPicPr>
+        <p:blipFill>
+          <a:blip r:embed="rId3"/>
+          <a:stretch>
+            <a:fillRect/>
+          </a:stretch>
+        </p:blipFill>
+        <p:spPr>
+          <a:xfrm>
+            <a:off x="5610386" y="550363"/>
+            <a:ext cx="2177512" cy="2522214"/>
+          </a:xfrm>
+          <a:prstGeom prst="rect">
+            <a:avLst/>
+          </a:prstGeom>
+        </p:spPr>
+      </p:pic>
     </p:spTree>
   </p:cSld>
   <p:clrMapOvr>
@@ -17046,8 +17076,8 @@
           </a:p>
         </p:txBody>
       </p:sp>
-      <mc:AlternateContent xmlns:mc="http://schemas.openxmlformats.org/markup-compatibility/2006">
-        <mc:Choice xmlns:a14="http://schemas.microsoft.com/office/drawing/2010/main" Requires="a14">
+      <mc:AlternateContent xmlns:mc="http://schemas.openxmlformats.org/markup-compatibility/2006" xmlns:a14="http://schemas.microsoft.com/office/drawing/2010/main">
+        <mc:Choice Requires="a14">
           <p:sp>
             <p:nvSpPr>
               <p:cNvPr id="203" name="Google Shape;203;p17"/>
@@ -17561,7 +17591,7 @@
             </p:txBody>
           </p:sp>
         </mc:Choice>
-        <mc:Fallback>
+        <mc:Fallback xmlns="">
           <p:sp>
             <p:nvSpPr>
               <p:cNvPr id="203" name="Google Shape;203;p17"/>

</xml_diff>

<commit_message>
update first slide on validation
</commit_message>
<xml_diff>
--- a/slides/ML_Lecture.pptx
+++ b/slides/ML_Lecture.pptx
@@ -24738,8 +24738,12 @@
           <a:lstStyle/>
           <a:p>
             <a:r>
-              <a:rPr lang="en-US" dirty="0"/>
-              <a:t>Overfitting should not be rewarded</a:t>
+              <a:rPr lang="de-CH" dirty="0" err="1"/>
+              <a:t>Two</a:t>
+            </a:r>
+            <a:r>
+              <a:rPr lang="de-CH" dirty="0"/>
+              <a:t> Questions</a:t>
             </a:r>
             <a:endParaRPr dirty="0"/>
           </a:p>
@@ -24879,52 +24883,30 @@
             </a:pPr>
             <a:r>
               <a:rPr lang="de-CH" dirty="0"/>
-              <a:t>Approach</a:t>
-            </a:r>
-          </a:p>
-          <a:p>
-            <a:r>
-              <a:rPr lang="de-CH" dirty="0"/>
-              <a:t>«</a:t>
-            </a:r>
-            <a:r>
-              <a:rPr lang="de-CH" dirty="0" err="1"/>
-              <a:t>Insample</a:t>
-            </a:r>
-            <a:r>
-              <a:rPr lang="de-CH" dirty="0"/>
-              <a:t>» </a:t>
-            </a:r>
-            <a:r>
-              <a:rPr lang="de-CH" dirty="0" err="1"/>
-              <a:t>performance</a:t>
-            </a:r>
-            <a:r>
-              <a:rPr lang="de-CH" dirty="0"/>
-              <a:t> </a:t>
-            </a:r>
-            <a:r>
-              <a:rPr lang="de-CH" dirty="0" err="1"/>
-              <a:t>is</a:t>
-            </a:r>
-            <a:r>
-              <a:rPr lang="de-CH" dirty="0"/>
-              <a:t> </a:t>
-            </a:r>
-            <a:r>
-              <a:rPr lang="de-CH" dirty="0" err="1"/>
-              <a:t>biased</a:t>
+              <a:t>Problem and </a:t>
+            </a:r>
+            <a:r>
+              <a:rPr lang="de-CH"/>
+              <a:t>solution</a:t>
             </a:r>
             <a:endParaRPr lang="de-CH" dirty="0"/>
           </a:p>
           <a:p>
             <a:r>
               <a:rPr lang="de-CH" dirty="0"/>
-              <a:t>Use </a:t>
+              <a:t>«</a:t>
             </a:r>
             <a:r>
               <a:rPr lang="de-CH" dirty="0" err="1"/>
-              <a:t>data</a:t>
+              <a:t>Insample</a:t>
+            </a:r>
+            <a:r>
+              <a:rPr lang="de-CH" dirty="0"/>
+              <a:t>» </a:t>
+            </a:r>
+            <a:r>
+              <a:rPr lang="de-CH" dirty="0" err="1"/>
+              <a:t>performance</a:t>
             </a:r>
             <a:r>
               <a:rPr lang="de-CH" dirty="0"/>
@@ -24932,7 +24914,7 @@
             </a:r>
             <a:r>
               <a:rPr lang="de-CH" dirty="0" err="1"/>
-              <a:t>splitting</a:t>
+              <a:t>is</a:t>
             </a:r>
             <a:r>
               <a:rPr lang="de-CH" dirty="0"/>
@@ -24940,30 +24922,58 @@
             </a:r>
             <a:r>
               <a:rPr lang="de-CH" dirty="0" err="1"/>
-              <a:t>to</a:t>
-            </a:r>
-            <a:r>
-              <a:rPr lang="de-CH" dirty="0"/>
-              <a:t> </a:t>
-            </a:r>
-            <a:r>
-              <a:rPr lang="de-CH" dirty="0" err="1"/>
-              <a:t>get</a:t>
-            </a:r>
-            <a:r>
-              <a:rPr lang="de-CH" dirty="0"/>
-              <a:t> fair </a:t>
-            </a:r>
-            <a:r>
-              <a:rPr lang="de-CH" dirty="0" err="1"/>
-              <a:t>results</a:t>
+              <a:t>biased</a:t>
             </a:r>
             <a:endParaRPr lang="de-CH" dirty="0"/>
           </a:p>
           <a:p>
-            <a:pPr marL="101600" lvl="0" indent="0">
-              <a:buNone/>
-            </a:pPr>
+            <a:r>
+              <a:rPr lang="en-US" dirty="0"/>
+              <a:t>Overfitting should not be rewarded</a:t>
+            </a:r>
+            <a:endParaRPr lang="de-CH" dirty="0"/>
+          </a:p>
+          <a:p>
+            <a:r>
+              <a:rPr lang="de-CH" dirty="0"/>
+              <a:t>Use </a:t>
+            </a:r>
+            <a:r>
+              <a:rPr lang="de-CH" dirty="0" err="1"/>
+              <a:t>data</a:t>
+            </a:r>
+            <a:r>
+              <a:rPr lang="de-CH" dirty="0"/>
+              <a:t> </a:t>
+            </a:r>
+            <a:r>
+              <a:rPr lang="de-CH" dirty="0" err="1"/>
+              <a:t>splitting</a:t>
+            </a:r>
+            <a:r>
+              <a:rPr lang="de-CH" dirty="0"/>
+              <a:t> </a:t>
+            </a:r>
+            <a:r>
+              <a:rPr lang="de-CH" dirty="0" err="1"/>
+              <a:t>to</a:t>
+            </a:r>
+            <a:r>
+              <a:rPr lang="de-CH" dirty="0"/>
+              <a:t> </a:t>
+            </a:r>
+            <a:r>
+              <a:rPr lang="de-CH" dirty="0" err="1"/>
+              <a:t>get</a:t>
+            </a:r>
+            <a:r>
+              <a:rPr lang="de-CH" dirty="0"/>
+              <a:t> fair </a:t>
+            </a:r>
+            <a:r>
+              <a:rPr lang="de-CH" dirty="0" err="1"/>
+              <a:t>results</a:t>
+            </a:r>
             <a:endParaRPr lang="de-CH" dirty="0"/>
           </a:p>
           <a:p>

</xml_diff>

<commit_message>
fix slides regarding loss, add rmse to solution
</commit_message>
<xml_diff>
--- a/slides/ML_Lecture.pptx
+++ b/slides/ML_Lecture.pptx
@@ -22194,7 +22194,7 @@
                   </a:schemeClr>
                 </a:solidFill>
               </a:rPr>
-              <a:t>GLM minimizes </a:t>
+              <a:t>GLM </a:t>
             </a:r>
             <a:r>
               <a:rPr lang="es-ES" sz="1400" dirty="0" err="1">
@@ -22204,7 +22204,7 @@
                   </a:schemeClr>
                 </a:solidFill>
               </a:rPr>
-              <a:t>deviance</a:t>
+              <a:t>minimizes</a:t>
             </a:r>
             <a:r>
               <a:rPr lang="es-ES" sz="1400" dirty="0">
@@ -22214,7 +22214,7 @@
                   </a:schemeClr>
                 </a:solidFill>
               </a:rPr>
-              <a:t> </a:t>
+              <a:t> total </a:t>
             </a:r>
             <a:r>
               <a:rPr lang="es-ES" sz="1400" dirty="0" err="1">
@@ -22224,7 +22224,7 @@
                   </a:schemeClr>
                 </a:solidFill>
               </a:rPr>
-              <a:t>loss</a:t>
+              <a:t>deviance</a:t>
             </a:r>
             <a:endParaRPr lang="es-ES" sz="1400" dirty="0">
               <a:solidFill>
@@ -30915,7 +30915,7 @@
                   </a:schemeClr>
                 </a:solidFill>
               </a:rPr>
-              <a:t> </a:t>
+              <a:t> total </a:t>
             </a:r>
             <a:r>
               <a:rPr lang="de-CH" sz="1200" dirty="0" err="1">
@@ -30937,15 +30937,6 @@
               </a:rPr>
               <a:t> </a:t>
             </a:r>
-            <a:br>
-              <a:rPr lang="de-CH" sz="1200" dirty="0">
-                <a:solidFill>
-                  <a:schemeClr val="accent4">
-                    <a:lumMod val="75000"/>
-                  </a:schemeClr>
-                </a:solidFill>
-              </a:rPr>
-            </a:br>
             <a:r>
               <a:rPr lang="de-CH" sz="1200" dirty="0" err="1">
                 <a:solidFill>
@@ -31073,7 +31064,7 @@
         <p:spPr>
           <a:xfrm>
             <a:off x="1185667" y="3531423"/>
-            <a:ext cx="2498827" cy="1200906"/>
+            <a:ext cx="2666090" cy="1200906"/>
           </a:xfrm>
           <a:prstGeom prst="rect">
             <a:avLst/>
@@ -31363,14 +31354,23 @@
             </a:r>
             <a:r>
               <a:rPr lang="de-CH" sz="1400" dirty="0"/>
-              <a:t>: MSE, </a:t>
-            </a:r>
-            <a:br>
-              <a:rPr lang="de-CH" sz="1400" u="sng" dirty="0"/>
-            </a:br>
+              <a:t>: </a:t>
+            </a:r>
+            <a:r>
+              <a:rPr lang="de-CH" sz="1400" dirty="0" err="1"/>
+              <a:t>squared</a:t>
+            </a:r>
             <a:r>
               <a:rPr lang="de-CH" sz="1400" dirty="0"/>
-              <a:t>log </a:t>
+              <a:t> </a:t>
+            </a:r>
+            <a:r>
+              <a:rPr lang="de-CH" sz="1400" dirty="0" err="1"/>
+              <a:t>error</a:t>
+            </a:r>
+            <a:r>
+              <a:rPr lang="de-CH" sz="1400" dirty="0"/>
+              <a:t>, log </a:t>
             </a:r>
             <a:r>
               <a:rPr lang="de-CH" sz="1400" dirty="0" err="1"/>
@@ -31386,11 +31386,8 @@
             </a:r>
             <a:r>
               <a:rPr lang="de-CH" sz="1400" dirty="0"/>
-              <a:t>/ </a:t>
-            </a:r>
-            <a:br>
-              <a:rPr lang="de-CH" sz="1400" dirty="0"/>
-            </a:br>
+              <a:t>/</a:t>
+            </a:r>
             <a:r>
               <a:rPr lang="de-CH" sz="1400" dirty="0" err="1"/>
               <a:t>information</a:t>
@@ -37891,11 +37888,7 @@
             </a:r>
             <a:r>
               <a:rPr lang="de-CH" sz="1600" dirty="0"/>
-              <a:t> </a:t>
-            </a:r>
-            <a:r>
-              <a:rPr lang="de-CH" sz="1600"/>
-              <a:t>all simple </a:t>
+              <a:t> all simple </a:t>
             </a:r>
             <a:r>
               <a:rPr lang="de-CH" sz="1600" dirty="0" err="1"/>
@@ -39571,10 +39564,9 @@
               <a:t>objective</a:t>
             </a:r>
             <a:r>
-              <a:rPr lang="de-CH" sz="1600"/>
+              <a:rPr lang="de-CH" sz="1600" dirty="0"/>
               <a:t>.</a:t>
             </a:r>
-            <a:endParaRPr lang="de-CH" sz="1600" dirty="0"/>
           </a:p>
           <a:p>
             <a:pPr lvl="1"/>
@@ -45333,7 +45325,7 @@
             </a:pPr>
             <a:r>
               <a:rPr lang="en-US" sz="1600" dirty="0"/>
-              <a:t>Backprop step: Evaluate </a:t>
+              <a:t>Backprop step: Evaluate average </a:t>
             </a:r>
             <a:r>
               <a:rPr lang="en-US" sz="1600" dirty="0">
@@ -45347,7 +45339,7 @@
             </a:r>
             <a:r>
               <a:rPr lang="en-US" sz="1600" dirty="0"/>
-              <a:t> (e.g. MSE) of batch. Change parameters systematically to make loss smaller.</a:t>
+              <a:t> (e.g. MSE) of batch. Change parameters systematically to make average loss smaller.</a:t>
             </a:r>
           </a:p>
           <a:p>
@@ -45381,7 +45373,7 @@
             </a:pPr>
             <a:r>
               <a:rPr lang="en-US" sz="1600" dirty="0"/>
-              <a:t>Repeat Step 4 until loss stabilizes.</a:t>
+              <a:t>Repeat Step 4 until average loss stabilizes.</a:t>
             </a:r>
           </a:p>
         </p:txBody>
@@ -51640,12 +51632,8 @@
               <a:buNone/>
             </a:pPr>
             <a:r>
-              <a:rPr lang="en-US" sz="1600"/>
-              <a:t>Hints: </a:t>
-            </a:r>
-            <a:r>
               <a:rPr lang="en-US" sz="1600" dirty="0"/>
-              <a:t>Use smaller learning rate and replace "</a:t>
+              <a:t>Hints: Use smaller learning rate and replace "</a:t>
             </a:r>
             <a:r>
               <a:rPr lang="en-US" sz="1600" dirty="0" err="1"/>

</xml_diff>

<commit_message>
consistent use of loss in Ch1
</commit_message>
<xml_diff>
--- a/slides/ML_Lecture.pptx
+++ b/slides/ML_Lecture.pptx
@@ -13877,8 +13877,8 @@
             </p:nvSpPr>
             <p:spPr>
               <a:xfrm>
-                <a:off x="1031425" y="2000466"/>
-                <a:ext cx="3199489" cy="1993309"/>
+                <a:off x="1031425" y="1830425"/>
+                <a:ext cx="3199489" cy="2212333"/>
               </a:xfrm>
               <a:prstGeom prst="rect">
                 <a:avLst/>
@@ -14212,6 +14212,21 @@
                 </a:r>
               </a:p>
               <a:p>
+                <a:pPr lvl="1"/>
+                <a:r>
+                  <a:rPr lang="de-CH" sz="1400" dirty="0"/>
+                  <a:t>Loss </a:t>
+                </a:r>
+                <a:r>
+                  <a:rPr lang="de-CH" sz="1400" dirty="0" err="1"/>
+                  <a:t>function</a:t>
+                </a:r>
+                <a:r>
+                  <a:rPr lang="de-CH" sz="1400" dirty="0"/>
+                  <a:t>?</a:t>
+                </a:r>
+              </a:p>
+              <a:p>
                 <a:pPr lvl="0"/>
                 <a:r>
                   <a:rPr lang="de-CH" sz="1600" dirty="0"/>
@@ -14314,8 +14329,8 @@
             </p:nvSpPr>
             <p:spPr>
               <a:xfrm>
-                <a:off x="1031425" y="2000466"/>
-                <a:ext cx="3199489" cy="1993309"/>
+                <a:off x="1031425" y="1830425"/>
+                <a:ext cx="3199489" cy="2212333"/>
               </a:xfrm>
               <a:prstGeom prst="rect">
                 <a:avLst/>
@@ -14323,7 +14338,7 @@
               <a:blipFill>
                 <a:blip r:embed="rId3"/>
                 <a:stretch>
-                  <a:fillRect b="-1208"/>
+                  <a:fillRect b="-817"/>
                 </a:stretch>
               </a:blipFill>
             </p:spPr>
@@ -14390,7 +14405,7 @@
         </p:nvSpPr>
         <p:spPr>
           <a:xfrm>
-            <a:off x="3376615" y="4042758"/>
+            <a:off x="3523849" y="4112501"/>
             <a:ext cx="1536473" cy="400110"/>
           </a:xfrm>
           <a:prstGeom prst="rect">
@@ -14438,8 +14453,8 @@
             </p:nvSpPr>
             <p:spPr>
               <a:xfrm>
-                <a:off x="4399870" y="2000466"/>
-                <a:ext cx="3199489" cy="1993309"/>
+                <a:off x="4399870" y="1830425"/>
+                <a:ext cx="3199489" cy="2212333"/>
               </a:xfrm>
               <a:prstGeom prst="rect">
                 <a:avLst/>
@@ -15024,8 +15039,8 @@
             </p:nvSpPr>
             <p:spPr>
               <a:xfrm>
-                <a:off x="4399870" y="2000466"/>
-                <a:ext cx="3199489" cy="1993309"/>
+                <a:off x="4399870" y="1830425"/>
+                <a:ext cx="3199489" cy="2212333"/>
               </a:xfrm>
               <a:prstGeom prst="rect">
                 <a:avLst/>
@@ -21951,10 +21966,10 @@
       </p:grpSpPr>
       <p:pic>
         <p:nvPicPr>
-          <p:cNvPr id="6" name="Grafik 5">
+          <p:cNvPr id="8" name="Grafik 7">
             <a:extLst>
               <a:ext uri="{FF2B5EF4-FFF2-40B4-BE49-F238E27FC236}">
-                <a16:creationId xmlns:a16="http://schemas.microsoft.com/office/drawing/2014/main" id="{97311F27-2821-44A0-A1FF-E5251D026E32}"/>
+                <a16:creationId xmlns:a16="http://schemas.microsoft.com/office/drawing/2014/main" id="{664A2D68-5560-49D0-9AED-840226450CCF}"/>
               </a:ext>
             </a:extLst>
           </p:cNvPr>
@@ -21971,17 +21986,15 @@
         </p:blipFill>
         <p:spPr>
           <a:xfrm>
-            <a:off x="1031424" y="1845633"/>
-            <a:ext cx="5472000" cy="1827521"/>
+            <a:off x="1031424" y="1920823"/>
+            <a:ext cx="5470115" cy="1744287"/>
           </a:xfrm>
           <a:prstGeom prst="rect">
             <a:avLst/>
           </a:prstGeom>
           <a:ln w="25400">
             <a:solidFill>
-              <a:schemeClr val="accent2">
-                <a:lumMod val="75000"/>
-              </a:schemeClr>
+              <a:schemeClr val="accent1"/>
             </a:solidFill>
           </a:ln>
         </p:spPr>
@@ -22194,45 +22207,8 @@
                   </a:schemeClr>
                 </a:solidFill>
               </a:rPr>
-              <a:t>GLM </a:t>
-            </a:r>
-            <a:r>
-              <a:rPr lang="es-ES" sz="1400" dirty="0" err="1">
-                <a:solidFill>
-                  <a:schemeClr val="accent4">
-                    <a:lumMod val="75000"/>
-                  </a:schemeClr>
-                </a:solidFill>
-              </a:rPr>
-              <a:t>minimizes</a:t>
-            </a:r>
-            <a:r>
-              <a:rPr lang="es-ES" sz="1400" dirty="0">
-                <a:solidFill>
-                  <a:schemeClr val="accent4">
-                    <a:lumMod val="75000"/>
-                  </a:schemeClr>
-                </a:solidFill>
-              </a:rPr>
-              <a:t> total </a:t>
-            </a:r>
-            <a:r>
-              <a:rPr lang="es-ES" sz="1400" dirty="0" err="1">
-                <a:solidFill>
-                  <a:schemeClr val="accent4">
-                    <a:lumMod val="75000"/>
-                  </a:schemeClr>
-                </a:solidFill>
-              </a:rPr>
-              <a:t>deviance</a:t>
-            </a:r>
-            <a:endParaRPr lang="es-ES" sz="1400" dirty="0">
-              <a:solidFill>
-                <a:schemeClr val="accent4">
-                  <a:lumMod val="75000"/>
-                </a:schemeClr>
-              </a:solidFill>
-            </a:endParaRPr>
+              <a:t>GLM minimizes deviance</a:t>
+            </a:r>
           </a:p>
           <a:p>
             <a:r>
@@ -22337,8 +22313,8 @@
         </p:nvSpPr>
         <p:spPr>
           <a:xfrm rot="16200000">
-            <a:off x="5117816" y="706388"/>
-            <a:ext cx="288000" cy="2088000"/>
+            <a:off x="5632145" y="1172816"/>
+            <a:ext cx="246221" cy="1353825"/>
           </a:xfrm>
           <a:prstGeom prst="rightBrace">
             <a:avLst/>
@@ -22388,7 +22364,7 @@
         </p:nvSpPr>
         <p:spPr>
           <a:xfrm>
-            <a:off x="4091463" y="1360166"/>
+            <a:off x="4572000" y="1435198"/>
             <a:ext cx="2340705" cy="246221"/>
           </a:xfrm>
           <a:prstGeom prst="rect">

</xml_diff>

<commit_message>
fix term loss in Chapter Tree
</commit_message>
<xml_diff>
--- a/slides/ML_Lecture.pptx
+++ b/slides/ML_Lecture.pptx
@@ -38793,7 +38793,7 @@
                   </a:schemeClr>
                 </a:solidFill>
               </a:rPr>
-              <a:t>performance</a:t>
+              <a:t>evaluation</a:t>
             </a:r>
             <a:r>
               <a:rPr lang="de-CH" dirty="0">
@@ -51572,7 +51572,7 @@
             </a:pPr>
             <a:r>
               <a:rPr lang="en-US" sz="1600" dirty="0"/>
-              <a:t>Fit diamond prices by gamma deviance loss with log-link</a:t>
+              <a:t>Fit diamond prices by minimizing Gamma deviance with log-link</a:t>
             </a:r>
             <a:br>
               <a:rPr lang="en-US" sz="1600" dirty="0"/>

</xml_diff>

<commit_message>
add venn diagram to slides
</commit_message>
<xml_diff>
--- a/slides/ML_Lecture.pptx
+++ b/slides/ML_Lecture.pptx
@@ -89,7 +89,7 @@
       <p:boldItalic r:id="rId72"/>
     </p:embeddedFont>
     <p:embeddedFont>
-      <p:font typeface="Oswald" panose="00000800000000000000" pitchFamily="2" charset="0"/>
+      <p:font typeface="Oswald" panose="00000500000000000000" pitchFamily="2" charset="0"/>
       <p:regular r:id="rId73"/>
       <p:bold r:id="rId74"/>
     </p:embeddedFont>
@@ -336,6 +336,2973 @@
     </p:ext>
   </p:extLst>
 </p:presentation>
+</file>
+
+<file path=ppt/diagrams/colors1.xml><?xml version="1.0" encoding="utf-8"?>
+<dgm:colorsDef xmlns:dgm="http://schemas.openxmlformats.org/drawingml/2006/diagram" xmlns:a="http://schemas.openxmlformats.org/drawingml/2006/main" uniqueId="urn:microsoft.com/office/officeart/2005/8/colors/accent1_2">
+  <dgm:title val=""/>
+  <dgm:desc val=""/>
+  <dgm:catLst>
+    <dgm:cat type="accent1" pri="11200"/>
+  </dgm:catLst>
+  <dgm:styleLbl name="node0">
+    <dgm:fillClrLst meth="repeat">
+      <a:schemeClr val="accent1"/>
+    </dgm:fillClrLst>
+    <dgm:linClrLst meth="repeat">
+      <a:schemeClr val="lt1"/>
+    </dgm:linClrLst>
+    <dgm:effectClrLst/>
+    <dgm:txLinClrLst/>
+    <dgm:txFillClrLst/>
+    <dgm:txEffectClrLst/>
+  </dgm:styleLbl>
+  <dgm:styleLbl name="alignNode1">
+    <dgm:fillClrLst meth="repeat">
+      <a:schemeClr val="accent1"/>
+    </dgm:fillClrLst>
+    <dgm:linClrLst meth="repeat">
+      <a:schemeClr val="accent1"/>
+    </dgm:linClrLst>
+    <dgm:effectClrLst/>
+    <dgm:txLinClrLst/>
+    <dgm:txFillClrLst/>
+    <dgm:txEffectClrLst/>
+  </dgm:styleLbl>
+  <dgm:styleLbl name="node1">
+    <dgm:fillClrLst meth="repeat">
+      <a:schemeClr val="accent1"/>
+    </dgm:fillClrLst>
+    <dgm:linClrLst meth="repeat">
+      <a:schemeClr val="lt1"/>
+    </dgm:linClrLst>
+    <dgm:effectClrLst/>
+    <dgm:txLinClrLst/>
+    <dgm:txFillClrLst/>
+    <dgm:txEffectClrLst/>
+  </dgm:styleLbl>
+  <dgm:styleLbl name="lnNode1">
+    <dgm:fillClrLst meth="repeat">
+      <a:schemeClr val="accent1"/>
+    </dgm:fillClrLst>
+    <dgm:linClrLst meth="repeat">
+      <a:schemeClr val="lt1"/>
+    </dgm:linClrLst>
+    <dgm:effectClrLst/>
+    <dgm:txLinClrLst/>
+    <dgm:txFillClrLst/>
+    <dgm:txEffectClrLst/>
+  </dgm:styleLbl>
+  <dgm:styleLbl name="vennNode1">
+    <dgm:fillClrLst meth="repeat">
+      <a:schemeClr val="accent1">
+        <a:alpha val="50000"/>
+      </a:schemeClr>
+    </dgm:fillClrLst>
+    <dgm:linClrLst meth="repeat">
+      <a:schemeClr val="lt1"/>
+    </dgm:linClrLst>
+    <dgm:effectClrLst/>
+    <dgm:txLinClrLst/>
+    <dgm:txFillClrLst/>
+    <dgm:txEffectClrLst/>
+  </dgm:styleLbl>
+  <dgm:styleLbl name="node2">
+    <dgm:fillClrLst meth="repeat">
+      <a:schemeClr val="accent1"/>
+    </dgm:fillClrLst>
+    <dgm:linClrLst meth="repeat">
+      <a:schemeClr val="lt1"/>
+    </dgm:linClrLst>
+    <dgm:effectClrLst/>
+    <dgm:txLinClrLst/>
+    <dgm:txFillClrLst/>
+    <dgm:txEffectClrLst/>
+  </dgm:styleLbl>
+  <dgm:styleLbl name="node3">
+    <dgm:fillClrLst meth="repeat">
+      <a:schemeClr val="accent1"/>
+    </dgm:fillClrLst>
+    <dgm:linClrLst meth="repeat">
+      <a:schemeClr val="lt1"/>
+    </dgm:linClrLst>
+    <dgm:effectClrLst/>
+    <dgm:txLinClrLst/>
+    <dgm:txFillClrLst/>
+    <dgm:txEffectClrLst/>
+  </dgm:styleLbl>
+  <dgm:styleLbl name="node4">
+    <dgm:fillClrLst meth="repeat">
+      <a:schemeClr val="accent1"/>
+    </dgm:fillClrLst>
+    <dgm:linClrLst meth="repeat">
+      <a:schemeClr val="lt1"/>
+    </dgm:linClrLst>
+    <dgm:effectClrLst/>
+    <dgm:txLinClrLst/>
+    <dgm:txFillClrLst/>
+    <dgm:txEffectClrLst/>
+  </dgm:styleLbl>
+  <dgm:styleLbl name="fgImgPlace1">
+    <dgm:fillClrLst meth="repeat">
+      <a:schemeClr val="accent1">
+        <a:tint val="50000"/>
+      </a:schemeClr>
+    </dgm:fillClrLst>
+    <dgm:linClrLst meth="repeat">
+      <a:schemeClr val="lt1"/>
+    </dgm:linClrLst>
+    <dgm:effectClrLst/>
+    <dgm:txLinClrLst/>
+    <dgm:txFillClrLst meth="repeat">
+      <a:schemeClr val="lt1"/>
+    </dgm:txFillClrLst>
+    <dgm:txEffectClrLst/>
+  </dgm:styleLbl>
+  <dgm:styleLbl name="alignImgPlace1">
+    <dgm:fillClrLst meth="repeat">
+      <a:schemeClr val="accent1">
+        <a:tint val="50000"/>
+      </a:schemeClr>
+    </dgm:fillClrLst>
+    <dgm:linClrLst meth="repeat">
+      <a:schemeClr val="lt1"/>
+    </dgm:linClrLst>
+    <dgm:effectClrLst/>
+    <dgm:txLinClrLst/>
+    <dgm:txFillClrLst meth="repeat">
+      <a:schemeClr val="lt1"/>
+    </dgm:txFillClrLst>
+    <dgm:txEffectClrLst/>
+  </dgm:styleLbl>
+  <dgm:styleLbl name="bgImgPlace1">
+    <dgm:fillClrLst meth="repeat">
+      <a:schemeClr val="accent1">
+        <a:tint val="50000"/>
+      </a:schemeClr>
+    </dgm:fillClrLst>
+    <dgm:linClrLst meth="repeat">
+      <a:schemeClr val="lt1"/>
+    </dgm:linClrLst>
+    <dgm:effectClrLst/>
+    <dgm:txLinClrLst/>
+    <dgm:txFillClrLst meth="repeat">
+      <a:schemeClr val="lt1"/>
+    </dgm:txFillClrLst>
+    <dgm:txEffectClrLst/>
+  </dgm:styleLbl>
+  <dgm:styleLbl name="sibTrans2D1">
+    <dgm:fillClrLst meth="repeat">
+      <a:schemeClr val="accent1">
+        <a:tint val="60000"/>
+      </a:schemeClr>
+    </dgm:fillClrLst>
+    <dgm:linClrLst meth="repeat">
+      <a:schemeClr val="accent1">
+        <a:tint val="60000"/>
+      </a:schemeClr>
+    </dgm:linClrLst>
+    <dgm:effectClrLst/>
+    <dgm:txLinClrLst/>
+    <dgm:txFillClrLst/>
+    <dgm:txEffectClrLst/>
+  </dgm:styleLbl>
+  <dgm:styleLbl name="fgSibTrans2D1">
+    <dgm:fillClrLst meth="repeat">
+      <a:schemeClr val="accent1">
+        <a:tint val="60000"/>
+      </a:schemeClr>
+    </dgm:fillClrLst>
+    <dgm:linClrLst meth="repeat">
+      <a:schemeClr val="accent1">
+        <a:tint val="60000"/>
+      </a:schemeClr>
+    </dgm:linClrLst>
+    <dgm:effectClrLst/>
+    <dgm:txLinClrLst/>
+    <dgm:txFillClrLst/>
+    <dgm:txEffectClrLst/>
+  </dgm:styleLbl>
+  <dgm:styleLbl name="bgSibTrans2D1">
+    <dgm:fillClrLst meth="repeat">
+      <a:schemeClr val="accent1">
+        <a:tint val="60000"/>
+      </a:schemeClr>
+    </dgm:fillClrLst>
+    <dgm:linClrLst meth="repeat">
+      <a:schemeClr val="accent1">
+        <a:tint val="60000"/>
+      </a:schemeClr>
+    </dgm:linClrLst>
+    <dgm:effectClrLst/>
+    <dgm:txLinClrLst/>
+    <dgm:txFillClrLst/>
+    <dgm:txEffectClrLst/>
+  </dgm:styleLbl>
+  <dgm:styleLbl name="sibTrans1D1">
+    <dgm:fillClrLst meth="repeat">
+      <a:schemeClr val="accent1"/>
+    </dgm:fillClrLst>
+    <dgm:linClrLst meth="repeat">
+      <a:schemeClr val="accent1"/>
+    </dgm:linClrLst>
+    <dgm:effectClrLst/>
+    <dgm:txLinClrLst/>
+    <dgm:txFillClrLst meth="repeat">
+      <a:schemeClr val="tx1"/>
+    </dgm:txFillClrLst>
+    <dgm:txEffectClrLst/>
+  </dgm:styleLbl>
+  <dgm:styleLbl name="callout">
+    <dgm:fillClrLst meth="repeat">
+      <a:schemeClr val="accent1"/>
+    </dgm:fillClrLst>
+    <dgm:linClrLst meth="repeat">
+      <a:schemeClr val="accent1">
+        <a:tint val="50000"/>
+      </a:schemeClr>
+    </dgm:linClrLst>
+    <dgm:effectClrLst/>
+    <dgm:txLinClrLst/>
+    <dgm:txFillClrLst meth="repeat">
+      <a:schemeClr val="tx1"/>
+    </dgm:txFillClrLst>
+    <dgm:txEffectClrLst/>
+  </dgm:styleLbl>
+  <dgm:styleLbl name="asst0">
+    <dgm:fillClrLst meth="repeat">
+      <a:schemeClr val="accent1"/>
+    </dgm:fillClrLst>
+    <dgm:linClrLst meth="repeat">
+      <a:schemeClr val="lt1"/>
+    </dgm:linClrLst>
+    <dgm:effectClrLst/>
+    <dgm:txLinClrLst/>
+    <dgm:txFillClrLst/>
+    <dgm:txEffectClrLst/>
+  </dgm:styleLbl>
+  <dgm:styleLbl name="asst1">
+    <dgm:fillClrLst meth="repeat">
+      <a:schemeClr val="accent1"/>
+    </dgm:fillClrLst>
+    <dgm:linClrLst meth="repeat">
+      <a:schemeClr val="lt1"/>
+    </dgm:linClrLst>
+    <dgm:effectClrLst/>
+    <dgm:txLinClrLst/>
+    <dgm:txFillClrLst/>
+    <dgm:txEffectClrLst/>
+  </dgm:styleLbl>
+  <dgm:styleLbl name="asst2">
+    <dgm:fillClrLst meth="repeat">
+      <a:schemeClr val="accent1"/>
+    </dgm:fillClrLst>
+    <dgm:linClrLst meth="repeat">
+      <a:schemeClr val="lt1"/>
+    </dgm:linClrLst>
+    <dgm:effectClrLst/>
+    <dgm:txLinClrLst/>
+    <dgm:txFillClrLst/>
+    <dgm:txEffectClrLst/>
+  </dgm:styleLbl>
+  <dgm:styleLbl name="asst3">
+    <dgm:fillClrLst meth="repeat">
+      <a:schemeClr val="accent1"/>
+    </dgm:fillClrLst>
+    <dgm:linClrLst meth="repeat">
+      <a:schemeClr val="lt1"/>
+    </dgm:linClrLst>
+    <dgm:effectClrLst/>
+    <dgm:txLinClrLst/>
+    <dgm:txFillClrLst/>
+    <dgm:txEffectClrLst/>
+  </dgm:styleLbl>
+  <dgm:styleLbl name="asst4">
+    <dgm:fillClrLst meth="repeat">
+      <a:schemeClr val="accent1"/>
+    </dgm:fillClrLst>
+    <dgm:linClrLst meth="repeat">
+      <a:schemeClr val="lt1"/>
+    </dgm:linClrLst>
+    <dgm:effectClrLst/>
+    <dgm:txLinClrLst/>
+    <dgm:txFillClrLst/>
+    <dgm:txEffectClrLst/>
+  </dgm:styleLbl>
+  <dgm:styleLbl name="parChTrans2D1">
+    <dgm:fillClrLst meth="repeat">
+      <a:schemeClr val="accent1">
+        <a:tint val="60000"/>
+      </a:schemeClr>
+    </dgm:fillClrLst>
+    <dgm:linClrLst meth="repeat">
+      <a:schemeClr val="accent1">
+        <a:tint val="60000"/>
+      </a:schemeClr>
+    </dgm:linClrLst>
+    <dgm:effectClrLst/>
+    <dgm:txLinClrLst/>
+    <dgm:txFillClrLst meth="repeat">
+      <a:schemeClr val="lt1"/>
+    </dgm:txFillClrLst>
+    <dgm:txEffectClrLst/>
+  </dgm:styleLbl>
+  <dgm:styleLbl name="parChTrans2D2">
+    <dgm:fillClrLst meth="repeat">
+      <a:schemeClr val="accent1"/>
+    </dgm:fillClrLst>
+    <dgm:linClrLst meth="repeat">
+      <a:schemeClr val="accent1"/>
+    </dgm:linClrLst>
+    <dgm:effectClrLst/>
+    <dgm:txLinClrLst/>
+    <dgm:txFillClrLst meth="repeat">
+      <a:schemeClr val="lt1"/>
+    </dgm:txFillClrLst>
+    <dgm:txEffectClrLst/>
+  </dgm:styleLbl>
+  <dgm:styleLbl name="parChTrans2D3">
+    <dgm:fillClrLst meth="repeat">
+      <a:schemeClr val="accent1"/>
+    </dgm:fillClrLst>
+    <dgm:linClrLst meth="repeat">
+      <a:schemeClr val="accent1"/>
+    </dgm:linClrLst>
+    <dgm:effectClrLst/>
+    <dgm:txLinClrLst/>
+    <dgm:txFillClrLst meth="repeat">
+      <a:schemeClr val="lt1"/>
+    </dgm:txFillClrLst>
+    <dgm:txEffectClrLst/>
+  </dgm:styleLbl>
+  <dgm:styleLbl name="parChTrans2D4">
+    <dgm:fillClrLst meth="repeat">
+      <a:schemeClr val="accent1"/>
+    </dgm:fillClrLst>
+    <dgm:linClrLst meth="repeat">
+      <a:schemeClr val="accent1"/>
+    </dgm:linClrLst>
+    <dgm:effectClrLst/>
+    <dgm:txLinClrLst/>
+    <dgm:txFillClrLst meth="repeat">
+      <a:schemeClr val="lt1"/>
+    </dgm:txFillClrLst>
+    <dgm:txEffectClrLst/>
+  </dgm:styleLbl>
+  <dgm:styleLbl name="parChTrans1D1">
+    <dgm:fillClrLst meth="repeat">
+      <a:schemeClr val="accent1"/>
+    </dgm:fillClrLst>
+    <dgm:linClrLst meth="repeat">
+      <a:schemeClr val="accent1">
+        <a:shade val="60000"/>
+      </a:schemeClr>
+    </dgm:linClrLst>
+    <dgm:effectClrLst/>
+    <dgm:txLinClrLst/>
+    <dgm:txFillClrLst meth="repeat">
+      <a:schemeClr val="tx1"/>
+    </dgm:txFillClrLst>
+    <dgm:txEffectClrLst/>
+  </dgm:styleLbl>
+  <dgm:styleLbl name="parChTrans1D2">
+    <dgm:fillClrLst meth="repeat">
+      <a:schemeClr val="accent1"/>
+    </dgm:fillClrLst>
+    <dgm:linClrLst meth="repeat">
+      <a:schemeClr val="accent1">
+        <a:shade val="60000"/>
+      </a:schemeClr>
+    </dgm:linClrLst>
+    <dgm:effectClrLst/>
+    <dgm:txLinClrLst/>
+    <dgm:txFillClrLst meth="repeat">
+      <a:schemeClr val="tx1"/>
+    </dgm:txFillClrLst>
+    <dgm:txEffectClrLst/>
+  </dgm:styleLbl>
+  <dgm:styleLbl name="parChTrans1D3">
+    <dgm:fillClrLst meth="repeat">
+      <a:schemeClr val="accent1"/>
+    </dgm:fillClrLst>
+    <dgm:linClrLst meth="repeat">
+      <a:schemeClr val="accent1">
+        <a:shade val="80000"/>
+      </a:schemeClr>
+    </dgm:linClrLst>
+    <dgm:effectClrLst/>
+    <dgm:txLinClrLst/>
+    <dgm:txFillClrLst meth="repeat">
+      <a:schemeClr val="tx1"/>
+    </dgm:txFillClrLst>
+    <dgm:txEffectClrLst/>
+  </dgm:styleLbl>
+  <dgm:styleLbl name="parChTrans1D4">
+    <dgm:fillClrLst meth="repeat">
+      <a:schemeClr val="accent1"/>
+    </dgm:fillClrLst>
+    <dgm:linClrLst meth="repeat">
+      <a:schemeClr val="accent1">
+        <a:shade val="80000"/>
+      </a:schemeClr>
+    </dgm:linClrLst>
+    <dgm:effectClrLst/>
+    <dgm:txLinClrLst/>
+    <dgm:txFillClrLst meth="repeat">
+      <a:schemeClr val="tx1"/>
+    </dgm:txFillClrLst>
+    <dgm:txEffectClrLst/>
+  </dgm:styleLbl>
+  <dgm:styleLbl name="fgAcc1">
+    <dgm:fillClrLst meth="repeat">
+      <a:schemeClr val="lt1">
+        <a:alpha val="90000"/>
+      </a:schemeClr>
+    </dgm:fillClrLst>
+    <dgm:linClrLst meth="repeat">
+      <a:schemeClr val="accent1"/>
+    </dgm:linClrLst>
+    <dgm:effectClrLst/>
+    <dgm:txLinClrLst/>
+    <dgm:txFillClrLst meth="repeat">
+      <a:schemeClr val="dk1"/>
+    </dgm:txFillClrLst>
+    <dgm:txEffectClrLst/>
+  </dgm:styleLbl>
+  <dgm:styleLbl name="conFgAcc1">
+    <dgm:fillClrLst meth="repeat">
+      <a:schemeClr val="lt1">
+        <a:alpha val="90000"/>
+      </a:schemeClr>
+    </dgm:fillClrLst>
+    <dgm:linClrLst meth="repeat">
+      <a:schemeClr val="accent1"/>
+    </dgm:linClrLst>
+    <dgm:effectClrLst/>
+    <dgm:txLinClrLst/>
+    <dgm:txFillClrLst meth="repeat">
+      <a:schemeClr val="dk1"/>
+    </dgm:txFillClrLst>
+    <dgm:txEffectClrLst/>
+  </dgm:styleLbl>
+  <dgm:styleLbl name="alignAcc1">
+    <dgm:fillClrLst meth="repeat">
+      <a:schemeClr val="lt1">
+        <a:alpha val="90000"/>
+      </a:schemeClr>
+    </dgm:fillClrLst>
+    <dgm:linClrLst meth="repeat">
+      <a:schemeClr val="accent1"/>
+    </dgm:linClrLst>
+    <dgm:effectClrLst/>
+    <dgm:txLinClrLst/>
+    <dgm:txFillClrLst meth="repeat">
+      <a:schemeClr val="dk1"/>
+    </dgm:txFillClrLst>
+    <dgm:txEffectClrLst/>
+  </dgm:styleLbl>
+  <dgm:styleLbl name="trAlignAcc1">
+    <dgm:fillClrLst meth="repeat">
+      <a:schemeClr val="lt1">
+        <a:alpha val="40000"/>
+      </a:schemeClr>
+    </dgm:fillClrLst>
+    <dgm:linClrLst meth="repeat">
+      <a:schemeClr val="accent1"/>
+    </dgm:linClrLst>
+    <dgm:effectClrLst/>
+    <dgm:txLinClrLst/>
+    <dgm:txFillClrLst meth="repeat">
+      <a:schemeClr val="dk1"/>
+    </dgm:txFillClrLst>
+    <dgm:txEffectClrLst/>
+  </dgm:styleLbl>
+  <dgm:styleLbl name="bgAcc1">
+    <dgm:fillClrLst meth="repeat">
+      <a:schemeClr val="lt1">
+        <a:alpha val="90000"/>
+      </a:schemeClr>
+    </dgm:fillClrLst>
+    <dgm:linClrLst meth="repeat">
+      <a:schemeClr val="accent1"/>
+    </dgm:linClrLst>
+    <dgm:effectClrLst/>
+    <dgm:txLinClrLst/>
+    <dgm:txFillClrLst meth="repeat">
+      <a:schemeClr val="dk1"/>
+    </dgm:txFillClrLst>
+    <dgm:txEffectClrLst/>
+  </dgm:styleLbl>
+  <dgm:styleLbl name="solidFgAcc1">
+    <dgm:fillClrLst meth="repeat">
+      <a:schemeClr val="lt1"/>
+    </dgm:fillClrLst>
+    <dgm:linClrLst meth="repeat">
+      <a:schemeClr val="accent1"/>
+    </dgm:linClrLst>
+    <dgm:effectClrLst/>
+    <dgm:txLinClrLst/>
+    <dgm:txFillClrLst meth="repeat">
+      <a:schemeClr val="dk1"/>
+    </dgm:txFillClrLst>
+    <dgm:txEffectClrLst/>
+  </dgm:styleLbl>
+  <dgm:styleLbl name="solidAlignAcc1">
+    <dgm:fillClrLst meth="repeat">
+      <a:schemeClr val="lt1"/>
+    </dgm:fillClrLst>
+    <dgm:linClrLst meth="repeat">
+      <a:schemeClr val="accent1"/>
+    </dgm:linClrLst>
+    <dgm:effectClrLst/>
+    <dgm:txLinClrLst/>
+    <dgm:txFillClrLst meth="repeat">
+      <a:schemeClr val="dk1"/>
+    </dgm:txFillClrLst>
+    <dgm:txEffectClrLst/>
+  </dgm:styleLbl>
+  <dgm:styleLbl name="solidBgAcc1">
+    <dgm:fillClrLst meth="repeat">
+      <a:schemeClr val="lt1"/>
+    </dgm:fillClrLst>
+    <dgm:linClrLst meth="repeat">
+      <a:schemeClr val="accent1"/>
+    </dgm:linClrLst>
+    <dgm:effectClrLst/>
+    <dgm:txLinClrLst/>
+    <dgm:txFillClrLst meth="repeat">
+      <a:schemeClr val="dk1"/>
+    </dgm:txFillClrLst>
+    <dgm:txEffectClrLst/>
+  </dgm:styleLbl>
+  <dgm:styleLbl name="fgAccFollowNode1">
+    <dgm:fillClrLst meth="repeat">
+      <a:schemeClr val="accent1">
+        <a:alpha val="90000"/>
+        <a:tint val="40000"/>
+      </a:schemeClr>
+    </dgm:fillClrLst>
+    <dgm:linClrLst meth="repeat">
+      <a:schemeClr val="accent1">
+        <a:alpha val="90000"/>
+        <a:tint val="40000"/>
+      </a:schemeClr>
+    </dgm:linClrLst>
+    <dgm:effectClrLst/>
+    <dgm:txLinClrLst/>
+    <dgm:txFillClrLst meth="repeat">
+      <a:schemeClr val="dk1"/>
+    </dgm:txFillClrLst>
+    <dgm:txEffectClrLst/>
+  </dgm:styleLbl>
+  <dgm:styleLbl name="alignAccFollowNode1">
+    <dgm:fillClrLst meth="repeat">
+      <a:schemeClr val="accent1">
+        <a:alpha val="90000"/>
+        <a:tint val="40000"/>
+      </a:schemeClr>
+    </dgm:fillClrLst>
+    <dgm:linClrLst meth="repeat">
+      <a:schemeClr val="accent1">
+        <a:alpha val="90000"/>
+        <a:tint val="40000"/>
+      </a:schemeClr>
+    </dgm:linClrLst>
+    <dgm:effectClrLst/>
+    <dgm:txLinClrLst/>
+    <dgm:txFillClrLst meth="repeat">
+      <a:schemeClr val="dk1"/>
+    </dgm:txFillClrLst>
+    <dgm:txEffectClrLst/>
+  </dgm:styleLbl>
+  <dgm:styleLbl name="bgAccFollowNode1">
+    <dgm:fillClrLst meth="repeat">
+      <a:schemeClr val="accent1">
+        <a:alpha val="90000"/>
+        <a:tint val="40000"/>
+      </a:schemeClr>
+    </dgm:fillClrLst>
+    <dgm:linClrLst meth="repeat">
+      <a:schemeClr val="accent1">
+        <a:alpha val="90000"/>
+        <a:tint val="40000"/>
+      </a:schemeClr>
+    </dgm:linClrLst>
+    <dgm:effectClrLst/>
+    <dgm:txLinClrLst/>
+    <dgm:txFillClrLst meth="repeat">
+      <a:schemeClr val="dk1"/>
+    </dgm:txFillClrLst>
+    <dgm:txEffectClrLst/>
+  </dgm:styleLbl>
+  <dgm:styleLbl name="fgAcc0">
+    <dgm:fillClrLst meth="repeat">
+      <a:schemeClr val="lt1">
+        <a:alpha val="90000"/>
+      </a:schemeClr>
+    </dgm:fillClrLst>
+    <dgm:linClrLst meth="repeat">
+      <a:schemeClr val="accent1"/>
+    </dgm:linClrLst>
+    <dgm:effectClrLst/>
+    <dgm:txLinClrLst/>
+    <dgm:txFillClrLst meth="repeat">
+      <a:schemeClr val="dk1"/>
+    </dgm:txFillClrLst>
+    <dgm:txEffectClrLst/>
+  </dgm:styleLbl>
+  <dgm:styleLbl name="fgAcc2">
+    <dgm:fillClrLst meth="repeat">
+      <a:schemeClr val="lt1">
+        <a:alpha val="90000"/>
+      </a:schemeClr>
+    </dgm:fillClrLst>
+    <dgm:linClrLst meth="repeat">
+      <a:schemeClr val="accent1"/>
+    </dgm:linClrLst>
+    <dgm:effectClrLst/>
+    <dgm:txLinClrLst/>
+    <dgm:txFillClrLst meth="repeat">
+      <a:schemeClr val="dk1"/>
+    </dgm:txFillClrLst>
+    <dgm:txEffectClrLst/>
+  </dgm:styleLbl>
+  <dgm:styleLbl name="fgAcc3">
+    <dgm:fillClrLst meth="repeat">
+      <a:schemeClr val="lt1">
+        <a:alpha val="90000"/>
+      </a:schemeClr>
+    </dgm:fillClrLst>
+    <dgm:linClrLst meth="repeat">
+      <a:schemeClr val="accent1"/>
+    </dgm:linClrLst>
+    <dgm:effectClrLst/>
+    <dgm:txLinClrLst/>
+    <dgm:txFillClrLst meth="repeat">
+      <a:schemeClr val="dk1"/>
+    </dgm:txFillClrLst>
+    <dgm:txEffectClrLst/>
+  </dgm:styleLbl>
+  <dgm:styleLbl name="fgAcc4">
+    <dgm:fillClrLst meth="repeat">
+      <a:schemeClr val="lt1">
+        <a:alpha val="90000"/>
+      </a:schemeClr>
+    </dgm:fillClrLst>
+    <dgm:linClrLst meth="repeat">
+      <a:schemeClr val="accent1"/>
+    </dgm:linClrLst>
+    <dgm:effectClrLst/>
+    <dgm:txLinClrLst/>
+    <dgm:txFillClrLst meth="repeat">
+      <a:schemeClr val="dk1"/>
+    </dgm:txFillClrLst>
+    <dgm:txEffectClrLst/>
+  </dgm:styleLbl>
+  <dgm:styleLbl name="bgShp">
+    <dgm:fillClrLst meth="repeat">
+      <a:schemeClr val="accent1">
+        <a:tint val="40000"/>
+      </a:schemeClr>
+    </dgm:fillClrLst>
+    <dgm:linClrLst meth="repeat">
+      <a:schemeClr val="accent1"/>
+    </dgm:linClrLst>
+    <dgm:effectClrLst/>
+    <dgm:txLinClrLst/>
+    <dgm:txFillClrLst meth="repeat">
+      <a:schemeClr val="dk1"/>
+    </dgm:txFillClrLst>
+    <dgm:txEffectClrLst/>
+  </dgm:styleLbl>
+  <dgm:styleLbl name="dkBgShp">
+    <dgm:fillClrLst meth="repeat">
+      <a:schemeClr val="accent1">
+        <a:shade val="80000"/>
+      </a:schemeClr>
+    </dgm:fillClrLst>
+    <dgm:linClrLst meth="repeat">
+      <a:schemeClr val="accent1"/>
+    </dgm:linClrLst>
+    <dgm:effectClrLst/>
+    <dgm:txLinClrLst/>
+    <dgm:txFillClrLst meth="repeat">
+      <a:schemeClr val="lt1"/>
+    </dgm:txFillClrLst>
+    <dgm:txEffectClrLst/>
+  </dgm:styleLbl>
+  <dgm:styleLbl name="trBgShp">
+    <dgm:fillClrLst meth="repeat">
+      <a:schemeClr val="accent1">
+        <a:tint val="50000"/>
+        <a:alpha val="40000"/>
+      </a:schemeClr>
+    </dgm:fillClrLst>
+    <dgm:linClrLst meth="repeat">
+      <a:schemeClr val="accent1"/>
+    </dgm:linClrLst>
+    <dgm:effectClrLst/>
+    <dgm:txLinClrLst/>
+    <dgm:txFillClrLst meth="repeat">
+      <a:schemeClr val="lt1"/>
+    </dgm:txFillClrLst>
+    <dgm:txEffectClrLst/>
+  </dgm:styleLbl>
+  <dgm:styleLbl name="fgShp">
+    <dgm:fillClrLst meth="repeat">
+      <a:schemeClr val="accent1">
+        <a:tint val="60000"/>
+      </a:schemeClr>
+    </dgm:fillClrLst>
+    <dgm:linClrLst meth="repeat">
+      <a:schemeClr val="lt1"/>
+    </dgm:linClrLst>
+    <dgm:effectClrLst/>
+    <dgm:txLinClrLst/>
+    <dgm:txFillClrLst meth="repeat">
+      <a:schemeClr val="dk1"/>
+    </dgm:txFillClrLst>
+    <dgm:txEffectClrLst/>
+  </dgm:styleLbl>
+  <dgm:styleLbl name="revTx">
+    <dgm:fillClrLst meth="repeat">
+      <a:schemeClr val="lt1">
+        <a:alpha val="0"/>
+      </a:schemeClr>
+    </dgm:fillClrLst>
+    <dgm:linClrLst meth="repeat">
+      <a:schemeClr val="dk1">
+        <a:alpha val="0"/>
+      </a:schemeClr>
+    </dgm:linClrLst>
+    <dgm:effectClrLst/>
+    <dgm:txLinClrLst/>
+    <dgm:txFillClrLst meth="repeat">
+      <a:schemeClr val="tx1"/>
+    </dgm:txFillClrLst>
+    <dgm:txEffectClrLst/>
+  </dgm:styleLbl>
+</dgm:colorsDef>
+</file>
+
+<file path=ppt/diagrams/data1.xml><?xml version="1.0" encoding="utf-8"?>
+<dgm:dataModel xmlns:dgm="http://schemas.openxmlformats.org/drawingml/2006/diagram" xmlns:a="http://schemas.openxmlformats.org/drawingml/2006/main">
+  <dgm:ptLst>
+    <dgm:pt modelId="{03F28FB2-E91C-4B82-8A80-820E2C03B682}" type="doc">
+      <dgm:prSet loTypeId="urn:microsoft.com/office/officeart/2005/8/layout/venn1" loCatId="relationship" qsTypeId="urn:microsoft.com/office/officeart/2005/8/quickstyle/simple1" qsCatId="simple" csTypeId="urn:microsoft.com/office/officeart/2005/8/colors/accent1_2" csCatId="accent1" phldr="1"/>
+      <dgm:spPr/>
+    </dgm:pt>
+    <dgm:pt modelId="{B17845B7-5E3B-4324-A0E7-1B17F60B332F}">
+      <dgm:prSet phldrT="[Text]"/>
+      <dgm:spPr/>
+      <dgm:t>
+        <a:bodyPr rIns="180000" bIns="720000"/>
+        <a:lstStyle/>
+        <a:p>
+          <a:r>
+            <a:rPr lang="de-CH" dirty="0" err="1"/>
+            <a:t>Statistics</a:t>
+          </a:r>
+          <a:endParaRPr lang="de-CH" dirty="0"/>
+        </a:p>
+      </dgm:t>
+    </dgm:pt>
+    <dgm:pt modelId="{9B1FEAFB-255A-41A0-90EC-43512AD8EBA6}" type="parTrans" cxnId="{FEAF9E6E-37F9-4ED8-A64A-DF01DD8FB9C2}">
+      <dgm:prSet/>
+      <dgm:spPr/>
+      <dgm:t>
+        <a:bodyPr/>
+        <a:lstStyle/>
+        <a:p>
+          <a:endParaRPr lang="de-CH"/>
+        </a:p>
+      </dgm:t>
+    </dgm:pt>
+    <dgm:pt modelId="{0323E83D-A7D4-4865-BB4F-04D8D7D583D1}" type="sibTrans" cxnId="{FEAF9E6E-37F9-4ED8-A64A-DF01DD8FB9C2}">
+      <dgm:prSet/>
+      <dgm:spPr/>
+      <dgm:t>
+        <a:bodyPr/>
+        <a:lstStyle/>
+        <a:p>
+          <a:endParaRPr lang="de-CH"/>
+        </a:p>
+      </dgm:t>
+    </dgm:pt>
+    <dgm:pt modelId="{F5FFFCA5-DE3B-4569-B8E4-6549528396A0}">
+      <dgm:prSet phldrT="[Text]"/>
+      <dgm:spPr/>
+      <dgm:t>
+        <a:bodyPr lIns="180000" tIns="0" rIns="36000" bIns="324000"/>
+        <a:lstStyle/>
+        <a:p>
+          <a:r>
+            <a:rPr lang="de-CH" dirty="0"/>
+            <a:t>AI</a:t>
+          </a:r>
+        </a:p>
+      </dgm:t>
+    </dgm:pt>
+    <dgm:pt modelId="{BE82437A-A1FF-44CE-8FB0-F2830903CCFE}" type="parTrans" cxnId="{1BBAF12D-8520-4A45-9ED9-222A523F3A98}">
+      <dgm:prSet/>
+      <dgm:spPr/>
+      <dgm:t>
+        <a:bodyPr/>
+        <a:lstStyle/>
+        <a:p>
+          <a:endParaRPr lang="de-CH"/>
+        </a:p>
+      </dgm:t>
+    </dgm:pt>
+    <dgm:pt modelId="{021A05DE-197B-4CF4-96F8-4724B882659B}" type="sibTrans" cxnId="{1BBAF12D-8520-4A45-9ED9-222A523F3A98}">
+      <dgm:prSet/>
+      <dgm:spPr/>
+      <dgm:t>
+        <a:bodyPr/>
+        <a:lstStyle/>
+        <a:p>
+          <a:endParaRPr lang="de-CH"/>
+        </a:p>
+      </dgm:t>
+    </dgm:pt>
+    <dgm:pt modelId="{10196642-5ADD-4997-87C3-8C16A7B7E344}" type="pres">
+      <dgm:prSet presAssocID="{03F28FB2-E91C-4B82-8A80-820E2C03B682}" presName="compositeShape" presStyleCnt="0">
+        <dgm:presLayoutVars>
+          <dgm:chMax val="7"/>
+          <dgm:dir/>
+          <dgm:resizeHandles val="exact"/>
+        </dgm:presLayoutVars>
+      </dgm:prSet>
+      <dgm:spPr/>
+    </dgm:pt>
+    <dgm:pt modelId="{EF07D5A4-7022-4DE6-BF0B-8880026026FE}" type="pres">
+      <dgm:prSet presAssocID="{B17845B7-5E3B-4324-A0E7-1B17F60B332F}" presName="circ1" presStyleLbl="vennNode1" presStyleIdx="0" presStyleCnt="2"/>
+      <dgm:spPr/>
+    </dgm:pt>
+    <dgm:pt modelId="{C82B0556-76D5-4A04-B0AC-18791E20FF88}" type="pres">
+      <dgm:prSet presAssocID="{B17845B7-5E3B-4324-A0E7-1B17F60B332F}" presName="circ1Tx" presStyleLbl="revTx" presStyleIdx="0" presStyleCnt="0">
+        <dgm:presLayoutVars>
+          <dgm:chMax val="0"/>
+          <dgm:chPref val="0"/>
+          <dgm:bulletEnabled val="1"/>
+        </dgm:presLayoutVars>
+      </dgm:prSet>
+      <dgm:spPr/>
+    </dgm:pt>
+    <dgm:pt modelId="{2B3F419A-B47A-4331-87E4-D72EF60B45FE}" type="pres">
+      <dgm:prSet presAssocID="{F5FFFCA5-DE3B-4569-B8E4-6549528396A0}" presName="circ2" presStyleLbl="vennNode1" presStyleIdx="1" presStyleCnt="2" custLinFactNeighborX="-14390" custLinFactNeighborY="-601"/>
+      <dgm:spPr/>
+    </dgm:pt>
+    <dgm:pt modelId="{F62431F2-5859-417D-A44D-6D9D54A8EE72}" type="pres">
+      <dgm:prSet presAssocID="{F5FFFCA5-DE3B-4569-B8E4-6549528396A0}" presName="circ2Tx" presStyleLbl="revTx" presStyleIdx="0" presStyleCnt="0">
+        <dgm:presLayoutVars>
+          <dgm:chMax val="0"/>
+          <dgm:chPref val="0"/>
+          <dgm:bulletEnabled val="1"/>
+        </dgm:presLayoutVars>
+      </dgm:prSet>
+      <dgm:spPr/>
+    </dgm:pt>
+  </dgm:ptLst>
+  <dgm:cxnLst>
+    <dgm:cxn modelId="{1BBAF12D-8520-4A45-9ED9-222A523F3A98}" srcId="{03F28FB2-E91C-4B82-8A80-820E2C03B682}" destId="{F5FFFCA5-DE3B-4569-B8E4-6549528396A0}" srcOrd="1" destOrd="0" parTransId="{BE82437A-A1FF-44CE-8FB0-F2830903CCFE}" sibTransId="{021A05DE-197B-4CF4-96F8-4724B882659B}"/>
+    <dgm:cxn modelId="{F8007C44-5D68-4811-81AD-D2CFE6088F38}" type="presOf" srcId="{F5FFFCA5-DE3B-4569-B8E4-6549528396A0}" destId="{F62431F2-5859-417D-A44D-6D9D54A8EE72}" srcOrd="1" destOrd="0" presId="urn:microsoft.com/office/officeart/2005/8/layout/venn1"/>
+    <dgm:cxn modelId="{FEAF9E6E-37F9-4ED8-A64A-DF01DD8FB9C2}" srcId="{03F28FB2-E91C-4B82-8A80-820E2C03B682}" destId="{B17845B7-5E3B-4324-A0E7-1B17F60B332F}" srcOrd="0" destOrd="0" parTransId="{9B1FEAFB-255A-41A0-90EC-43512AD8EBA6}" sibTransId="{0323E83D-A7D4-4865-BB4F-04D8D7D583D1}"/>
+    <dgm:cxn modelId="{666CDE58-8A09-4103-B88E-8FF671CB01EF}" type="presOf" srcId="{03F28FB2-E91C-4B82-8A80-820E2C03B682}" destId="{10196642-5ADD-4997-87C3-8C16A7B7E344}" srcOrd="0" destOrd="0" presId="urn:microsoft.com/office/officeart/2005/8/layout/venn1"/>
+    <dgm:cxn modelId="{FF544E96-5943-46BF-AE93-3C364797BC64}" type="presOf" srcId="{F5FFFCA5-DE3B-4569-B8E4-6549528396A0}" destId="{2B3F419A-B47A-4331-87E4-D72EF60B45FE}" srcOrd="0" destOrd="0" presId="urn:microsoft.com/office/officeart/2005/8/layout/venn1"/>
+    <dgm:cxn modelId="{6687CEB7-2318-438B-A445-FDC995F96D4D}" type="presOf" srcId="{B17845B7-5E3B-4324-A0E7-1B17F60B332F}" destId="{EF07D5A4-7022-4DE6-BF0B-8880026026FE}" srcOrd="0" destOrd="0" presId="urn:microsoft.com/office/officeart/2005/8/layout/venn1"/>
+    <dgm:cxn modelId="{634097E2-B33D-4F11-B2D5-84102B30BF05}" type="presOf" srcId="{B17845B7-5E3B-4324-A0E7-1B17F60B332F}" destId="{C82B0556-76D5-4A04-B0AC-18791E20FF88}" srcOrd="1" destOrd="0" presId="urn:microsoft.com/office/officeart/2005/8/layout/venn1"/>
+    <dgm:cxn modelId="{47EB16C8-35F4-41B6-B636-FDEDE3FBA5D8}" type="presParOf" srcId="{10196642-5ADD-4997-87C3-8C16A7B7E344}" destId="{EF07D5A4-7022-4DE6-BF0B-8880026026FE}" srcOrd="0" destOrd="0" presId="urn:microsoft.com/office/officeart/2005/8/layout/venn1"/>
+    <dgm:cxn modelId="{07517F17-A698-4C27-81BF-7CC901E60D24}" type="presParOf" srcId="{10196642-5ADD-4997-87C3-8C16A7B7E344}" destId="{C82B0556-76D5-4A04-B0AC-18791E20FF88}" srcOrd="1" destOrd="0" presId="urn:microsoft.com/office/officeart/2005/8/layout/venn1"/>
+    <dgm:cxn modelId="{E7A6F33E-DA6F-4BB7-BE98-DD198B78060A}" type="presParOf" srcId="{10196642-5ADD-4997-87C3-8C16A7B7E344}" destId="{2B3F419A-B47A-4331-87E4-D72EF60B45FE}" srcOrd="2" destOrd="0" presId="urn:microsoft.com/office/officeart/2005/8/layout/venn1"/>
+    <dgm:cxn modelId="{6BB548F2-1FE6-4ED0-A7FC-E2A54C23CC5C}" type="presParOf" srcId="{10196642-5ADD-4997-87C3-8C16A7B7E344}" destId="{F62431F2-5859-417D-A44D-6D9D54A8EE72}" srcOrd="3" destOrd="0" presId="urn:microsoft.com/office/officeart/2005/8/layout/venn1"/>
+  </dgm:cxnLst>
+  <dgm:bg/>
+  <dgm:whole/>
+  <dgm:extLst>
+    <a:ext uri="http://schemas.microsoft.com/office/drawing/2008/diagram">
+      <dsp:dataModelExt xmlns:dsp="http://schemas.microsoft.com/office/drawing/2008/diagram" relId="rId7" minVer="http://schemas.openxmlformats.org/drawingml/2006/diagram"/>
+    </a:ext>
+  </dgm:extLst>
+</dgm:dataModel>
+</file>
+
+<file path=ppt/diagrams/drawing1.xml><?xml version="1.0" encoding="utf-8"?>
+<dsp:drawing xmlns:dgm="http://schemas.openxmlformats.org/drawingml/2006/diagram" xmlns:dsp="http://schemas.microsoft.com/office/drawing/2008/diagram" xmlns:a="http://schemas.openxmlformats.org/drawingml/2006/main">
+  <dsp:spTree>
+    <dsp:nvGrpSpPr>
+      <dsp:cNvPr id="0" name=""/>
+      <dsp:cNvGrpSpPr/>
+    </dsp:nvGrpSpPr>
+    <dsp:grpSpPr/>
+    <dsp:sp modelId="{EF07D5A4-7022-4DE6-BF0B-8880026026FE}">
+      <dsp:nvSpPr>
+        <dsp:cNvPr id="0" name=""/>
+        <dsp:cNvSpPr/>
+      </dsp:nvSpPr>
+      <dsp:spPr>
+        <a:xfrm>
+          <a:off x="56255" y="220125"/>
+          <a:ext cx="1387642" cy="1387642"/>
+        </a:xfrm>
+        <a:prstGeom prst="ellipse">
+          <a:avLst/>
+        </a:prstGeom>
+        <a:solidFill>
+          <a:schemeClr val="accent1">
+            <a:alpha val="50000"/>
+            <a:hueOff val="0"/>
+            <a:satOff val="0"/>
+            <a:lumOff val="0"/>
+            <a:alphaOff val="0"/>
+          </a:schemeClr>
+        </a:solidFill>
+        <a:ln w="25400" cap="flat" cmpd="sng" algn="ctr">
+          <a:solidFill>
+            <a:schemeClr val="lt1">
+              <a:hueOff val="0"/>
+              <a:satOff val="0"/>
+              <a:lumOff val="0"/>
+              <a:alphaOff val="0"/>
+            </a:schemeClr>
+          </a:solidFill>
+          <a:prstDash val="solid"/>
+        </a:ln>
+        <a:effectLst/>
+      </dsp:spPr>
+      <dsp:style>
+        <a:lnRef idx="2">
+          <a:scrgbClr r="0" g="0" b="0"/>
+        </a:lnRef>
+        <a:fillRef idx="1">
+          <a:scrgbClr r="0" g="0" b="0"/>
+        </a:fillRef>
+        <a:effectRef idx="0">
+          <a:scrgbClr r="0" g="0" b="0"/>
+        </a:effectRef>
+        <a:fontRef idx="minor">
+          <a:schemeClr val="tx1"/>
+        </a:fontRef>
+      </dsp:style>
+      <dsp:txBody>
+        <a:bodyPr spcFirstLastPara="0" vert="horz" wrap="square" lIns="0" tIns="0" rIns="180000" bIns="720000" numCol="1" spcCol="1270" anchor="ctr" anchorCtr="0">
+          <a:noAutofit/>
+        </a:bodyPr>
+        <a:lstStyle/>
+        <a:p>
+          <a:pPr marL="0" lvl="0" indent="0" algn="ctr" defTabSz="533400">
+            <a:lnSpc>
+              <a:spcPct val="90000"/>
+            </a:lnSpc>
+            <a:spcBef>
+              <a:spcPct val="0"/>
+            </a:spcBef>
+            <a:spcAft>
+              <a:spcPct val="35000"/>
+            </a:spcAft>
+            <a:buNone/>
+          </a:pPr>
+          <a:r>
+            <a:rPr lang="de-CH" sz="1200" kern="1200" dirty="0" err="1"/>
+            <a:t>Statistics</a:t>
+          </a:r>
+          <a:endParaRPr lang="de-CH" sz="1200" kern="1200" dirty="0"/>
+        </a:p>
+      </dsp:txBody>
+      <dsp:txXfrm>
+        <a:off x="250025" y="383758"/>
+        <a:ext cx="800082" cy="1060376"/>
+      </dsp:txXfrm>
+    </dsp:sp>
+    <dsp:sp modelId="{2B3F419A-B47A-4331-87E4-D72EF60B45FE}">
+      <dsp:nvSpPr>
+        <dsp:cNvPr id="0" name=""/>
+        <dsp:cNvSpPr/>
+      </dsp:nvSpPr>
+      <dsp:spPr>
+        <a:xfrm>
+          <a:off x="856676" y="211785"/>
+          <a:ext cx="1387642" cy="1387642"/>
+        </a:xfrm>
+        <a:prstGeom prst="ellipse">
+          <a:avLst/>
+        </a:prstGeom>
+        <a:solidFill>
+          <a:schemeClr val="accent1">
+            <a:alpha val="50000"/>
+            <a:hueOff val="0"/>
+            <a:satOff val="0"/>
+            <a:lumOff val="0"/>
+            <a:alphaOff val="0"/>
+          </a:schemeClr>
+        </a:solidFill>
+        <a:ln w="25400" cap="flat" cmpd="sng" algn="ctr">
+          <a:solidFill>
+            <a:schemeClr val="lt1">
+              <a:hueOff val="0"/>
+              <a:satOff val="0"/>
+              <a:lumOff val="0"/>
+              <a:alphaOff val="0"/>
+            </a:schemeClr>
+          </a:solidFill>
+          <a:prstDash val="solid"/>
+        </a:ln>
+        <a:effectLst/>
+      </dsp:spPr>
+      <dsp:style>
+        <a:lnRef idx="2">
+          <a:scrgbClr r="0" g="0" b="0"/>
+        </a:lnRef>
+        <a:fillRef idx="1">
+          <a:scrgbClr r="0" g="0" b="0"/>
+        </a:fillRef>
+        <a:effectRef idx="0">
+          <a:scrgbClr r="0" g="0" b="0"/>
+        </a:effectRef>
+        <a:fontRef idx="minor">
+          <a:schemeClr val="tx1"/>
+        </a:fontRef>
+      </dsp:style>
+      <dsp:txBody>
+        <a:bodyPr spcFirstLastPara="0" vert="horz" wrap="square" lIns="180000" tIns="0" rIns="36000" bIns="324000" numCol="1" spcCol="1270" anchor="ctr" anchorCtr="0">
+          <a:noAutofit/>
+        </a:bodyPr>
+        <a:lstStyle/>
+        <a:p>
+          <a:pPr marL="0" lvl="0" indent="0" algn="ctr" defTabSz="533400">
+            <a:lnSpc>
+              <a:spcPct val="90000"/>
+            </a:lnSpc>
+            <a:spcBef>
+              <a:spcPct val="0"/>
+            </a:spcBef>
+            <a:spcAft>
+              <a:spcPct val="35000"/>
+            </a:spcAft>
+            <a:buNone/>
+          </a:pPr>
+          <a:r>
+            <a:rPr lang="de-CH" sz="1200" kern="1200" dirty="0"/>
+            <a:t>AI</a:t>
+          </a:r>
+        </a:p>
+      </dsp:txBody>
+      <dsp:txXfrm>
+        <a:off x="1250467" y="375418"/>
+        <a:ext cx="800082" cy="1060376"/>
+      </dsp:txXfrm>
+    </dsp:sp>
+  </dsp:spTree>
+</dsp:drawing>
+</file>
+
+<file path=ppt/diagrams/layout1.xml><?xml version="1.0" encoding="utf-8"?>
+<dgm:layoutDef xmlns:dgm="http://schemas.openxmlformats.org/drawingml/2006/diagram" xmlns:a="http://schemas.openxmlformats.org/drawingml/2006/main" uniqueId="urn:microsoft.com/office/officeart/2005/8/layout/venn1">
+  <dgm:title val=""/>
+  <dgm:desc val=""/>
+  <dgm:catLst>
+    <dgm:cat type="relationship" pri="28000"/>
+    <dgm:cat type="convert" pri="19000"/>
+  </dgm:catLst>
+  <dgm:sampData useDef="1">
+    <dgm:dataModel>
+      <dgm:ptLst/>
+      <dgm:bg/>
+      <dgm:whole/>
+    </dgm:dataModel>
+  </dgm:sampData>
+  <dgm:styleData useDef="1">
+    <dgm:dataModel>
+      <dgm:ptLst/>
+      <dgm:bg/>
+      <dgm:whole/>
+    </dgm:dataModel>
+  </dgm:styleData>
+  <dgm:clrData>
+    <dgm:dataModel>
+      <dgm:ptLst>
+        <dgm:pt modelId="0" type="doc"/>
+        <dgm:pt modelId="1"/>
+        <dgm:pt modelId="2"/>
+        <dgm:pt modelId="3"/>
+        <dgm:pt modelId="4"/>
+      </dgm:ptLst>
+      <dgm:cxnLst>
+        <dgm:cxn modelId="7" srcId="0" destId="1" srcOrd="0" destOrd="0"/>
+        <dgm:cxn modelId="8" srcId="0" destId="2" srcOrd="1" destOrd="0"/>
+        <dgm:cxn modelId="9" srcId="0" destId="3" srcOrd="2" destOrd="0"/>
+        <dgm:cxn modelId="10" srcId="0" destId="4" srcOrd="3" destOrd="0"/>
+      </dgm:cxnLst>
+      <dgm:bg/>
+      <dgm:whole/>
+    </dgm:dataModel>
+  </dgm:clrData>
+  <dgm:layoutNode name="compositeShape">
+    <dgm:varLst>
+      <dgm:chMax val="7"/>
+      <dgm:dir/>
+      <dgm:resizeHandles val="exact"/>
+    </dgm:varLst>
+    <dgm:choose name="Name0">
+      <dgm:if name="Name1" axis="ch" ptType="node" func="cnt" op="equ" val="1">
+        <dgm:alg type="composite">
+          <dgm:param type="ar" val="1"/>
+        </dgm:alg>
+      </dgm:if>
+      <dgm:if name="Name2" axis="ch" ptType="node" func="cnt" op="equ" val="2">
+        <dgm:alg type="composite">
+          <dgm:param type="ar" val="1.792"/>
+        </dgm:alg>
+      </dgm:if>
+      <dgm:if name="Name3" axis="ch" ptType="node" func="cnt" op="equ" val="3">
+        <dgm:alg type="composite">
+          <dgm:param type="ar" val="1"/>
+        </dgm:alg>
+      </dgm:if>
+      <dgm:if name="Name4" axis="ch" ptType="node" func="cnt" op="equ" val="4">
+        <dgm:alg type="composite">
+          <dgm:param type="ar" val="1"/>
+        </dgm:alg>
+      </dgm:if>
+      <dgm:if name="Name5" axis="ch" ptType="node" func="cnt" op="equ" val="5">
+        <dgm:alg type="composite">
+          <dgm:param type="ar" val="1.4"/>
+        </dgm:alg>
+      </dgm:if>
+      <dgm:if name="Name6" axis="ch" ptType="node" func="cnt" op="equ" val="6">
+        <dgm:alg type="composite">
+          <dgm:param type="ar" val="1.285"/>
+        </dgm:alg>
+      </dgm:if>
+      <dgm:if name="Name7" axis="ch" ptType="node" func="cnt" op="equ" val="7">
+        <dgm:alg type="composite">
+          <dgm:param type="ar" val="1.359"/>
+        </dgm:alg>
+      </dgm:if>
+      <dgm:else name="Name8">
+        <dgm:alg type="composite">
+          <dgm:param type="ar" val="1.359"/>
+        </dgm:alg>
+      </dgm:else>
+    </dgm:choose>
+    <dgm:shape xmlns:r="http://schemas.openxmlformats.org/officeDocument/2006/relationships" r:blip="">
+      <dgm:adjLst/>
+    </dgm:shape>
+    <dgm:presOf/>
+    <dgm:choose name="Name9">
+      <dgm:if name="Name10" axis="ch" ptType="node" func="cnt" op="equ" val="1">
+        <dgm:constrLst>
+          <dgm:constr type="ctrX" for="ch" forName="circ1TxSh" refType="w" fact="0.5"/>
+          <dgm:constr type="ctrY" for="ch" forName="circ1TxSh" refType="h" fact="0.5"/>
+          <dgm:constr type="w" for="ch" forName="circ1TxSh" refType="w"/>
+          <dgm:constr type="h" for="ch" forName="circ1TxSh" refType="h"/>
+          <dgm:constr type="primFontSz" for="ch" ptType="node" op="equ"/>
+        </dgm:constrLst>
+      </dgm:if>
+      <dgm:if name="Name11" axis="ch" ptType="node" func="cnt" op="equ" val="2">
+        <dgm:constrLst>
+          <dgm:constr type="ctrX" for="ch" forName="circ1" refType="w" fact="0.3"/>
+          <dgm:constr type="ctrY" for="ch" forName="circ1" refType="h" fact="0.5"/>
+          <dgm:constr type="w" for="ch" forName="circ1" refType="w" fact="0.555"/>
+          <dgm:constr type="h" for="ch" forName="circ1" refType="h" fact="0.99456"/>
+          <dgm:constr type="l" for="ch" forName="circ1Tx" refType="w" fact="0.1"/>
+          <dgm:constr type="t" for="ch" forName="circ1Tx" refType="h" fact="0.12"/>
+          <dgm:constr type="w" for="ch" forName="circ1Tx" refType="w" fact="0.32"/>
+          <dgm:constr type="h" for="ch" forName="circ1Tx" refType="h" fact="0.76"/>
+          <dgm:constr type="ctrX" for="ch" forName="circ2" refType="w" fact="0.7"/>
+          <dgm:constr type="ctrY" for="ch" forName="circ2" refType="h" fact="0.5"/>
+          <dgm:constr type="w" for="ch" forName="circ2" refType="w" fact="0.555"/>
+          <dgm:constr type="h" for="ch" forName="circ2" refType="h" fact="0.99456"/>
+          <dgm:constr type="l" for="ch" forName="circ2Tx" refType="w" fact="0.58"/>
+          <dgm:constr type="t" for="ch" forName="circ2Tx" refType="h" fact="0.12"/>
+          <dgm:constr type="w" for="ch" forName="circ2Tx" refType="w" fact="0.32"/>
+          <dgm:constr type="h" for="ch" forName="circ2Tx" refType="h" fact="0.76"/>
+          <dgm:constr type="primFontSz" for="ch" ptType="node" op="equ"/>
+        </dgm:constrLst>
+      </dgm:if>
+      <dgm:if name="Name12" axis="ch" ptType="node" func="cnt" op="equ" val="3">
+        <dgm:constrLst>
+          <dgm:constr type="ctrX" for="ch" forName="circ1" refType="w" fact="0.5"/>
+          <dgm:constr type="ctrY" for="ch" forName="circ1" refType="w" fact="0.25"/>
+          <dgm:constr type="w" for="ch" forName="circ1" refType="w" fact="0.6"/>
+          <dgm:constr type="h" for="ch" forName="circ1" refType="h" fact="0.6"/>
+          <dgm:constr type="l" for="ch" forName="circ1Tx" refType="w" fact="0.28"/>
+          <dgm:constr type="t" for="ch" forName="circ1Tx" refType="h" fact="0.055"/>
+          <dgm:constr type="w" for="ch" forName="circ1Tx" refType="w" fact="0.44"/>
+          <dgm:constr type="h" for="ch" forName="circ1Tx" refType="h" fact="0.27"/>
+          <dgm:constr type="ctrX" for="ch" forName="circ2" refType="w" fact="0.7165"/>
+          <dgm:constr type="ctrY" for="ch" forName="circ2" refType="w" fact="0.625"/>
+          <dgm:constr type="w" for="ch" forName="circ2" refType="w" fact="0.6"/>
+          <dgm:constr type="h" for="ch" forName="circ2" refType="h" fact="0.6"/>
+          <dgm:constr type="l" for="ch" forName="circ2Tx" refType="w" fact="0.6"/>
+          <dgm:constr type="t" for="ch" forName="circ2Tx" refType="h" fact="0.48"/>
+          <dgm:constr type="w" for="ch" forName="circ2Tx" refType="w" fact="0.36"/>
+          <dgm:constr type="h" for="ch" forName="circ2Tx" refType="h" fact="0.33"/>
+          <dgm:constr type="ctrX" for="ch" forName="circ3" refType="w" fact="0.2835"/>
+          <dgm:constr type="ctrY" for="ch" forName="circ3" refType="w" fact="0.625"/>
+          <dgm:constr type="w" for="ch" forName="circ3" refType="w" fact="0.6"/>
+          <dgm:constr type="h" for="ch" forName="circ3" refType="h" fact="0.6"/>
+          <dgm:constr type="l" for="ch" forName="circ3Tx" refType="w" fact="0.04"/>
+          <dgm:constr type="t" for="ch" forName="circ3Tx" refType="h" fact="0.48"/>
+          <dgm:constr type="w" for="ch" forName="circ3Tx" refType="w" fact="0.36"/>
+          <dgm:constr type="h" for="ch" forName="circ3Tx" refType="h" fact="0.33"/>
+          <dgm:constr type="primFontSz" for="ch" ptType="node" op="equ"/>
+        </dgm:constrLst>
+      </dgm:if>
+      <dgm:if name="Name13" axis="ch" ptType="node" func="cnt" op="equ" val="4">
+        <dgm:constrLst>
+          <dgm:constr type="ctrX" for="ch" forName="circ1" refType="w" fact="0.5"/>
+          <dgm:constr type="ctrY" for="ch" forName="circ1" refType="w" fact="0.27"/>
+          <dgm:constr type="w" for="ch" forName="circ1" refType="w" fact="0.52"/>
+          <dgm:constr type="h" for="ch" forName="circ1" refType="h" fact="0.52"/>
+          <dgm:constr type="l" for="ch" forName="circ1Tx" refType="w" fact="0.3"/>
+          <dgm:constr type="t" for="ch" forName="circ1Tx" refType="h" fact="0.08"/>
+          <dgm:constr type="w" for="ch" forName="circ1Tx" refType="w" fact="0.4"/>
+          <dgm:constr type="h" for="ch" forName="circ1Tx" refType="h" fact="0.165"/>
+          <dgm:constr type="ctrX" for="ch" forName="circ2" refType="w" fact="0.73"/>
+          <dgm:constr type="ctrY" for="ch" forName="circ2" refType="w" fact="0.5"/>
+          <dgm:constr type="w" for="ch" forName="circ2" refType="w" fact="0.52"/>
+          <dgm:constr type="h" for="ch" forName="circ2" refType="h" fact="0.52"/>
+          <dgm:constr type="r" for="ch" forName="circ2Tx" refType="w" fact="0.95"/>
+          <dgm:constr type="t" for="ch" forName="circ2Tx" refType="h" fact="0.3"/>
+          <dgm:constr type="w" for="ch" forName="circ2Tx" refType="w" fact="0.2"/>
+          <dgm:constr type="h" for="ch" forName="circ2Tx" refType="h" fact="0.4"/>
+          <dgm:constr type="ctrX" for="ch" forName="circ3" refType="w" fact="0.5"/>
+          <dgm:constr type="ctrY" for="ch" forName="circ3" refType="w" fact="0.73"/>
+          <dgm:constr type="w" for="ch" forName="circ3" refType="w" fact="0.52"/>
+          <dgm:constr type="h" for="ch" forName="circ3" refType="h" fact="0.52"/>
+          <dgm:constr type="l" for="ch" forName="circ3Tx" refType="w" fact="0.3"/>
+          <dgm:constr type="b" for="ch" forName="circ3Tx" refType="h" fact="0.92"/>
+          <dgm:constr type="w" for="ch" forName="circ3Tx" refType="w" fact="0.4"/>
+          <dgm:constr type="h" for="ch" forName="circ3Tx" refType="h" fact="0.165"/>
+          <dgm:constr type="ctrX" for="ch" forName="circ4" refType="w" fact="0.27"/>
+          <dgm:constr type="ctrY" for="ch" forName="circ4" refType="h" fact="0.5"/>
+          <dgm:constr type="w" for="ch" forName="circ4" refType="w" fact="0.52"/>
+          <dgm:constr type="h" for="ch" forName="circ4" refType="h" fact="0.52"/>
+          <dgm:constr type="l" for="ch" forName="circ4Tx" refType="w" fact="0.05"/>
+          <dgm:constr type="t" for="ch" forName="circ4Tx" refType="h" fact="0.3"/>
+          <dgm:constr type="w" for="ch" forName="circ4Tx" refType="w" fact="0.2"/>
+          <dgm:constr type="h" for="ch" forName="circ4Tx" refType="h" fact="0.4"/>
+          <dgm:constr type="primFontSz" for="ch" ptType="node" op="equ"/>
+        </dgm:constrLst>
+      </dgm:if>
+      <dgm:if name="Name14" axis="ch" ptType="node" func="cnt" op="equ" val="5">
+        <dgm:constrLst>
+          <dgm:constr type="ctrX" for="ch" forName="circ1" refType="w" fact="0.5"/>
+          <dgm:constr type="ctrY" for="ch" forName="circ1" refType="h" fact="0.46"/>
+          <dgm:constr type="w" for="ch" forName="circ1" refType="w" fact="0.25"/>
+          <dgm:constr type="h" for="ch" forName="circ1" refType="h" fact="0.35"/>
+          <dgm:constr type="l" for="ch" forName="circ1Tx" refType="w" fact="0.355"/>
+          <dgm:constr type="t" for="ch" forName="circ1Tx"/>
+          <dgm:constr type="w" for="ch" forName="circ1Tx" refType="w" fact="0.29"/>
+          <dgm:constr type="h" for="ch" forName="circ1Tx" refType="h" fact="0.235"/>
+          <dgm:constr type="ctrX" for="ch" forName="circ2" refType="w" fact="0.5951"/>
+          <dgm:constr type="ctrY" for="ch" forName="circ2" refType="h" fact="0.5567"/>
+          <dgm:constr type="w" for="ch" forName="circ2" refType="w" fact="0.25"/>
+          <dgm:constr type="h" for="ch" forName="circ2" refType="h" fact="0.35"/>
+          <dgm:constr type="l" for="ch" forName="circ2Tx" refType="w" fact="0.74"/>
+          <dgm:constr type="t" for="ch" forName="circ2Tx" refType="h" fact="0.31"/>
+          <dgm:constr type="w" for="ch" forName="circ2Tx" refType="w" fact="0.26"/>
+          <dgm:constr type="h" for="ch" forName="circ2Tx" refType="h" fact="0.255"/>
+          <dgm:constr type="ctrX" for="ch" forName="circ3" refType="w" fact="0.5588"/>
+          <dgm:constr type="ctrY" for="ch" forName="circ3" refType="h" fact="0.7133"/>
+          <dgm:constr type="w" for="ch" forName="circ3" refType="w" fact="0.25"/>
+          <dgm:constr type="h" for="ch" forName="circ3" refType="h" fact="0.35"/>
+          <dgm:constr type="l" for="ch" forName="circ3Tx" refType="w" fact="0.7"/>
+          <dgm:constr type="t" for="ch" forName="circ3Tx" refType="h" fact="0.745"/>
+          <dgm:constr type="w" for="ch" forName="circ3Tx" refType="w" fact="0.26"/>
+          <dgm:constr type="h" for="ch" forName="circ3Tx" refType="h" fact="0.255"/>
+          <dgm:constr type="ctrX" for="ch" forName="circ4" refType="w" fact="0.4412"/>
+          <dgm:constr type="ctrY" for="ch" forName="circ4" refType="h" fact="0.7133"/>
+          <dgm:constr type="w" for="ch" forName="circ4" refType="w" fact="0.25"/>
+          <dgm:constr type="h" for="ch" forName="circ4" refType="h" fact="0.35"/>
+          <dgm:constr type="l" for="ch" forName="circ4Tx" refType="w" fact="0.04"/>
+          <dgm:constr type="t" for="ch" forName="circ4Tx" refType="h" fact="0.745"/>
+          <dgm:constr type="w" for="ch" forName="circ4Tx" refType="w" fact="0.26"/>
+          <dgm:constr type="h" for="ch" forName="circ4Tx" refType="h" fact="0.255"/>
+          <dgm:constr type="ctrX" for="ch" forName="circ5" refType="w" fact="0.4049"/>
+          <dgm:constr type="ctrY" for="ch" forName="circ5" refType="h" fact="0.5567"/>
+          <dgm:constr type="w" for="ch" forName="circ5" refType="w" fact="0.25"/>
+          <dgm:constr type="h" for="ch" forName="circ5" refType="h" fact="0.35"/>
+          <dgm:constr type="l" for="ch" forName="circ5Tx"/>
+          <dgm:constr type="t" for="ch" forName="circ5Tx" refType="h" fact="0.31"/>
+          <dgm:constr type="w" for="ch" forName="circ5Tx" refType="w" fact="0.26"/>
+          <dgm:constr type="h" for="ch" forName="circ5Tx" refType="h" fact="0.255"/>
+          <dgm:constr type="primFontSz" for="ch" ptType="node" op="equ"/>
+        </dgm:constrLst>
+      </dgm:if>
+      <dgm:if name="Name15" axis="ch" ptType="node" func="cnt" op="equ" val="6">
+        <dgm:constrLst>
+          <dgm:constr type="ctrX" for="ch" forName="circ1" refType="w" fact="0.5"/>
+          <dgm:constr type="ctrY" for="ch" forName="circ1" refType="h" fact="0.3844"/>
+          <dgm:constr type="w" for="ch" forName="circ1" refType="w" fact="0.24"/>
+          <dgm:constr type="h" for="ch" forName="circ1" refType="h" fact="0.3084"/>
+          <dgm:constr type="l" for="ch" forName="circ1Tx" refType="w" fact="0.35"/>
+          <dgm:constr type="t" for="ch" forName="circ1Tx"/>
+          <dgm:constr type="w" for="ch" forName="circ1Tx" refType="w" fact="0.3"/>
+          <dgm:constr type="h" for="ch" forName="circ1Tx" refType="h" fact="0.21"/>
+          <dgm:constr type="ctrX" for="ch" forName="circ2" refType="w" fact="0.5779"/>
+          <dgm:constr type="ctrY" for="ch" forName="circ2" refType="h" fact="0.4422"/>
+          <dgm:constr type="w" for="ch" forName="circ2" refType="w" fact="0.24"/>
+          <dgm:constr type="h" for="ch" forName="circ2" refType="h" fact="0.3084"/>
+          <dgm:constr type="l" for="ch" forName="circ2Tx" refType="w" fact="0.7157"/>
+          <dgm:constr type="t" for="ch" forName="circ2Tx" refType="h" fact="0.2"/>
+          <dgm:constr type="w" for="ch" forName="circ2Tx" refType="w" fact="0.2843"/>
+          <dgm:constr type="h" for="ch" forName="circ2Tx" refType="h" fact="0.23"/>
+          <dgm:constr type="ctrX" for="ch" forName="circ3" refType="w" fact="0.5779"/>
+          <dgm:constr type="ctrY" for="ch" forName="circ3" refType="h" fact="0.5578"/>
+          <dgm:constr type="w" for="ch" forName="circ3" refType="w" fact="0.24"/>
+          <dgm:constr type="h" for="ch" forName="circ3" refType="h" fact="0.3084"/>
+          <dgm:constr type="l" for="ch" forName="circ3Tx" refType="w" fact="0.7157"/>
+          <dgm:constr type="t" for="ch" forName="circ3Tx" refType="h" fact="0.543"/>
+          <dgm:constr type="w" for="ch" forName="circ3Tx" refType="w" fact="0.2843"/>
+          <dgm:constr type="h" for="ch" forName="circ3Tx" refType="h" fact="0.257"/>
+          <dgm:constr type="ctrX" for="ch" forName="circ4" refType="w" fact="0.5"/>
+          <dgm:constr type="ctrY" for="ch" forName="circ4" refType="h" fact="0.6157"/>
+          <dgm:constr type="w" for="ch" forName="circ4" refType="w" fact="0.24"/>
+          <dgm:constr type="h" for="ch" forName="circ4" refType="h" fact="0.3084"/>
+          <dgm:constr type="l" for="ch" forName="circ4Tx" refType="w" fact="0.35"/>
+          <dgm:constr type="t" for="ch" forName="circ4Tx" refType="h" fact="0.79"/>
+          <dgm:constr type="w" for="ch" forName="circ4Tx" refType="w" fact="0.3"/>
+          <dgm:constr type="h" for="ch" forName="circ4Tx" refType="h" fact="0.21"/>
+          <dgm:constr type="ctrX" for="ch" forName="circ5" refType="w" fact="0.4221"/>
+          <dgm:constr type="ctrY" for="ch" forName="circ5" refType="h" fact="0.5578"/>
+          <dgm:constr type="w" for="ch" forName="circ5" refType="w" fact="0.24"/>
+          <dgm:constr type="h" for="ch" forName="circ5" refType="h" fact="0.3084"/>
+          <dgm:constr type="l" for="ch" forName="circ5Tx" refType="w" fact="0"/>
+          <dgm:constr type="t" for="ch" forName="circ5Tx" refType="h" fact="0.543"/>
+          <dgm:constr type="w" for="ch" forName="circ5Tx" refType="w" fact="0.2843"/>
+          <dgm:constr type="h" for="ch" forName="circ5Tx" refType="h" fact="0.257"/>
+          <dgm:constr type="ctrX" for="ch" forName="circ6" refType="w" fact="0.4221"/>
+          <dgm:constr type="ctrY" for="ch" forName="circ6" refType="h" fact="0.4422"/>
+          <dgm:constr type="w" for="ch" forName="circ6" refType="w" fact="0.24"/>
+          <dgm:constr type="h" for="ch" forName="circ6" refType="h" fact="0.3084"/>
+          <dgm:constr type="l" for="ch" forName="circ6Tx" refType="w" fact="0"/>
+          <dgm:constr type="t" for="ch" forName="circ6Tx" refType="h" fact="0.2"/>
+          <dgm:constr type="w" for="ch" forName="circ6Tx" refType="w" fact="0.2843"/>
+          <dgm:constr type="h" for="ch" forName="circ6Tx" refType="h" fact="0.257"/>
+          <dgm:constr type="primFontSz" for="ch" ptType="node" op="equ"/>
+        </dgm:constrLst>
+      </dgm:if>
+      <dgm:else name="Name16">
+        <dgm:constrLst>
+          <dgm:constr type="ctrX" for="ch" forName="circ1" refType="w" fact="0.5"/>
+          <dgm:constr type="ctrY" for="ch" forName="circ1" refType="h" fact="0.4177"/>
+          <dgm:constr type="w" for="ch" forName="circ1" refType="w" fact="0.24"/>
+          <dgm:constr type="h" for="ch" forName="circ1" refType="h" fact="0.3262"/>
+          <dgm:constr type="l" for="ch" forName="circ1Tx" refType="w" fact="0.3625"/>
+          <dgm:constr type="t" for="ch" forName="circ1Tx"/>
+          <dgm:constr type="w" for="ch" forName="circ1Tx" refType="w" fact="0.275"/>
+          <dgm:constr type="h" for="ch" forName="circ1Tx" refType="h" fact="0.2"/>
+          <dgm:constr type="ctrX" for="ch" forName="circ2" refType="w" fact="0.5704"/>
+          <dgm:constr type="ctrY" for="ch" forName="circ2" refType="h" fact="0.4637"/>
+          <dgm:constr type="w" for="ch" forName="circ2" refType="w" fact="0.24"/>
+          <dgm:constr type="h" for="ch" forName="circ2" refType="h" fact="0.3262"/>
+          <dgm:constr type="l" for="ch" forName="circ2Tx" refType="w" fact="0.72"/>
+          <dgm:constr type="t" for="ch" forName="circ2Tx" refType="h" fact="0.19"/>
+          <dgm:constr type="w" for="ch" forName="circ2Tx" refType="w" fact="0.26"/>
+          <dgm:constr type="h" for="ch" forName="circ2Tx" refType="h" fact="0.22"/>
+          <dgm:constr type="ctrX" for="ch" forName="circ3" refType="w" fact="0.5877"/>
+          <dgm:constr type="ctrY" for="ch" forName="circ3" refType="h" fact="0.5672"/>
+          <dgm:constr type="w" for="ch" forName="circ3" refType="w" fact="0.24"/>
+          <dgm:constr type="h" for="ch" forName="circ3" refType="h" fact="0.3262"/>
+          <dgm:constr type="l" for="ch" forName="circ3Tx" refType="w" fact="0.745"/>
+          <dgm:constr type="t" for="ch" forName="circ3Tx" refType="h" fact="0.47"/>
+          <dgm:constr type="w" for="ch" forName="circ3Tx" refType="w" fact="0.255"/>
+          <dgm:constr type="h" for="ch" forName="circ3Tx" refType="h" fact="0.235"/>
+          <dgm:constr type="ctrX" for="ch" forName="circ4" refType="w" fact="0.539"/>
+          <dgm:constr type="ctrY" for="ch" forName="circ4" refType="h" fact="0.6502"/>
+          <dgm:constr type="w" for="ch" forName="circ4" refType="w" fact="0.24"/>
+          <dgm:constr type="h" for="ch" forName="circ4" refType="h" fact="0.3262"/>
+          <dgm:constr type="l" for="ch" forName="circ4Tx" refType="w" fact="0.635"/>
+          <dgm:constr type="t" for="ch" forName="circ4Tx" refType="h" fact="0.785"/>
+          <dgm:constr type="w" for="ch" forName="circ4Tx" refType="w" fact="0.275"/>
+          <dgm:constr type="h" for="ch" forName="circ4Tx" refType="h" fact="0.215"/>
+          <dgm:constr type="ctrX" for="ch" forName="circ5" refType="w" fact="0.461"/>
+          <dgm:constr type="ctrY" for="ch" forName="circ5" refType="h" fact="0.6502"/>
+          <dgm:constr type="w" for="ch" forName="circ5" refType="w" fact="0.24"/>
+          <dgm:constr type="h" for="ch" forName="circ5" refType="h" fact="0.3262"/>
+          <dgm:constr type="l" for="ch" forName="circ5Tx" refType="w" fact="0.09"/>
+          <dgm:constr type="t" for="ch" forName="circ5Tx" refType="h" fact="0.785"/>
+          <dgm:constr type="w" for="ch" forName="circ5Tx" refType="w" fact="0.275"/>
+          <dgm:constr type="h" for="ch" forName="circ5Tx" refType="h" fact="0.215"/>
+          <dgm:constr type="ctrX" for="ch" forName="circ6" refType="w" fact="0.4123"/>
+          <dgm:constr type="ctrY" for="ch" forName="circ6" refType="h" fact="0.5672"/>
+          <dgm:constr type="w" for="ch" forName="circ6" refType="w" fact="0.24"/>
+          <dgm:constr type="h" for="ch" forName="circ6" refType="h" fact="0.3262"/>
+          <dgm:constr type="l" for="ch" forName="circ6Tx"/>
+          <dgm:constr type="t" for="ch" forName="circ6Tx" refType="h" fact="0.47"/>
+          <dgm:constr type="w" for="ch" forName="circ6Tx" refType="w" fact="0.255"/>
+          <dgm:constr type="h" for="ch" forName="circ6Tx" refType="h" fact="0.235"/>
+          <dgm:constr type="ctrX" for="ch" forName="circ7" refType="w" fact="0.4296"/>
+          <dgm:constr type="ctrY" for="ch" forName="circ7" refType="h" fact="0.4637"/>
+          <dgm:constr type="w" for="ch" forName="circ7" refType="w" fact="0.24"/>
+          <dgm:constr type="h" for="ch" forName="circ7" refType="h" fact="0.3262"/>
+          <dgm:constr type="l" for="ch" forName="circ7Tx" refType="w" fact="0.02"/>
+          <dgm:constr type="t" for="ch" forName="circ7Tx" refType="h" fact="0.19"/>
+          <dgm:constr type="w" for="ch" forName="circ7Tx" refType="w" fact="0.26"/>
+          <dgm:constr type="h" for="ch" forName="circ7Tx" refType="h" fact="0.22"/>
+          <dgm:constr type="primFontSz" for="ch" ptType="node" op="equ"/>
+        </dgm:constrLst>
+      </dgm:else>
+    </dgm:choose>
+    <dgm:ruleLst/>
+    <dgm:forEach name="Name17" axis="ch" ptType="node" cnt="1">
+      <dgm:choose name="Name18">
+        <dgm:if name="Name19" axis="root ch" ptType="all node" func="cnt" op="equ" val="1">
+          <dgm:layoutNode name="circ1TxSh" styleLbl="vennNode1">
+            <dgm:alg type="tx">
+              <dgm:param type="txAnchorHorzCh" val="ctr"/>
+              <dgm:param type="txAnchorVertCh" val="mid"/>
+            </dgm:alg>
+            <dgm:shape xmlns:r="http://schemas.openxmlformats.org/officeDocument/2006/relationships" type="ellipse" r:blip="">
+              <dgm:adjLst/>
+            </dgm:shape>
+            <dgm:choose name="Name20">
+              <dgm:if name="Name21" func="var" arg="dir" op="equ" val="norm">
+                <dgm:choose name="Name22">
+                  <dgm:if name="Name23" axis="root ch" ptType="all node" func="cnt" op="lte" val="4">
+                    <dgm:presOf axis="desOrSelf" ptType="node"/>
+                  </dgm:if>
+                  <dgm:else name="Name24">
+                    <dgm:presOf/>
+                  </dgm:else>
+                </dgm:choose>
+              </dgm:if>
+              <dgm:else name="Name25">
+                <dgm:choose name="Name26">
+                  <dgm:if name="Name27" axis="root ch" ptType="all node" func="cnt" op="equ" val="2">
+                    <dgm:presOf axis="root ch desOrSelf" ptType="all node node" st="1 2 1" cnt="1 1 0"/>
+                  </dgm:if>
+                  <dgm:else name="Name28">
+                    <dgm:presOf axis="desOrSelf" ptType="node"/>
+                  </dgm:else>
+                </dgm:choose>
+              </dgm:else>
+            </dgm:choose>
+            <dgm:constrLst>
+              <dgm:constr type="tMarg"/>
+              <dgm:constr type="bMarg"/>
+              <dgm:constr type="lMarg"/>
+              <dgm:constr type="rMarg"/>
+              <dgm:constr type="primFontSz" val="65"/>
+            </dgm:constrLst>
+            <dgm:ruleLst>
+              <dgm:rule type="primFontSz" val="5" fact="NaN" max="NaN"/>
+            </dgm:ruleLst>
+          </dgm:layoutNode>
+        </dgm:if>
+        <dgm:else name="Name29">
+          <dgm:layoutNode name="circ1" styleLbl="vennNode1">
+            <dgm:alg type="sp"/>
+            <dgm:shape xmlns:r="http://schemas.openxmlformats.org/officeDocument/2006/relationships" type="ellipse" r:blip="">
+              <dgm:adjLst/>
+            </dgm:shape>
+            <dgm:choose name="Name30">
+              <dgm:if name="Name31" func="var" arg="dir" op="equ" val="norm">
+                <dgm:choose name="Name32">
+                  <dgm:if name="Name33" axis="root ch" ptType="all node" func="cnt" op="lte" val="4">
+                    <dgm:presOf axis="desOrSelf" ptType="node"/>
+                  </dgm:if>
+                  <dgm:else name="Name34">
+                    <dgm:presOf/>
+                  </dgm:else>
+                </dgm:choose>
+              </dgm:if>
+              <dgm:else name="Name35">
+                <dgm:choose name="Name36">
+                  <dgm:if name="Name37" axis="root ch" ptType="all node" func="cnt" op="equ" val="2">
+                    <dgm:presOf axis="root ch desOrSelf" ptType="all node node" st="1 2 1" cnt="1 1 0"/>
+                  </dgm:if>
+                  <dgm:else name="Name38">
+                    <dgm:choose name="Name39">
+                      <dgm:if name="Name40" axis="root ch" ptType="all node" func="cnt" op="lte" val="4">
+                        <dgm:presOf axis="desOrSelf" ptType="node"/>
+                      </dgm:if>
+                      <dgm:else name="Name41">
+                        <dgm:presOf/>
+                      </dgm:else>
+                    </dgm:choose>
+                  </dgm:else>
+                </dgm:choose>
+              </dgm:else>
+            </dgm:choose>
+            <dgm:constrLst/>
+            <dgm:ruleLst/>
+          </dgm:layoutNode>
+          <dgm:layoutNode name="circ1Tx" styleLbl="revTx">
+            <dgm:varLst>
+              <dgm:chMax val="0"/>
+              <dgm:chPref val="0"/>
+              <dgm:bulletEnabled val="1"/>
+            </dgm:varLst>
+            <dgm:alg type="tx">
+              <dgm:param type="txAnchorHorzCh" val="ctr"/>
+              <dgm:param type="txAnchorVertCh" val="mid"/>
+            </dgm:alg>
+            <dgm:shape xmlns:r="http://schemas.openxmlformats.org/officeDocument/2006/relationships" type="rect" r:blip="" hideGeom="1">
+              <dgm:adjLst/>
+            </dgm:shape>
+            <dgm:choose name="Name42">
+              <dgm:if name="Name43" func="var" arg="dir" op="equ" val="norm">
+                <dgm:presOf axis="desOrSelf" ptType="node"/>
+              </dgm:if>
+              <dgm:else name="Name44">
+                <dgm:choose name="Name45">
+                  <dgm:if name="Name46" axis="root ch" ptType="all node" func="cnt" op="equ" val="2">
+                    <dgm:presOf axis="root ch desOrSelf" ptType="all node node" st="1 2 1" cnt="1 1 0"/>
+                  </dgm:if>
+                  <dgm:else name="Name47">
+                    <dgm:presOf axis="desOrSelf" ptType="node"/>
+                  </dgm:else>
+                </dgm:choose>
+              </dgm:else>
+            </dgm:choose>
+            <dgm:constrLst>
+              <dgm:constr type="tMarg"/>
+              <dgm:constr type="bMarg"/>
+              <dgm:constr type="lMarg"/>
+              <dgm:constr type="rMarg"/>
+              <dgm:constr type="primFontSz" val="65"/>
+            </dgm:constrLst>
+            <dgm:ruleLst>
+              <dgm:rule type="primFontSz" val="5" fact="NaN" max="NaN"/>
+            </dgm:ruleLst>
+          </dgm:layoutNode>
+        </dgm:else>
+      </dgm:choose>
+    </dgm:forEach>
+    <dgm:forEach name="Name48" axis="ch" ptType="node" st="2" cnt="1">
+      <dgm:layoutNode name="circ2" styleLbl="vennNode1">
+        <dgm:alg type="sp"/>
+        <dgm:shape xmlns:r="http://schemas.openxmlformats.org/officeDocument/2006/relationships" type="ellipse" r:blip="">
+          <dgm:adjLst/>
+        </dgm:shape>
+        <dgm:choose name="Name49">
+          <dgm:if name="Name50" func="var" arg="dir" op="equ" val="norm">
+            <dgm:choose name="Name51">
+              <dgm:if name="Name52" axis="root ch" ptType="all node" func="cnt" op="lte" val="4">
+                <dgm:presOf axis="desOrSelf" ptType="node"/>
+              </dgm:if>
+              <dgm:else name="Name53">
+                <dgm:presOf/>
+              </dgm:else>
+            </dgm:choose>
+          </dgm:if>
+          <dgm:else name="Name54">
+            <dgm:choose name="Name55">
+              <dgm:if name="Name56" axis="root ch" ptType="all node" func="cnt" op="equ" val="2">
+                <dgm:presOf axis="root ch desOrSelf" ptType="all node node" st="1 1 1" cnt="1 1 0"/>
+              </dgm:if>
+              <dgm:if name="Name57" axis="root ch" ptType="all node" func="cnt" op="equ" val="3">
+                <dgm:presOf axis="root ch desOrSelf" ptType="all node node" st="1 3 1" cnt="1 1 0"/>
+              </dgm:if>
+              <dgm:if name="Name58" axis="root ch" ptType="all node" func="cnt" op="equ" val="4">
+                <dgm:presOf axis="root ch desOrSelf" ptType="all node node" st="1 4 1" cnt="1 1 0"/>
+              </dgm:if>
+              <dgm:else name="Name59">
+                <dgm:presOf/>
+              </dgm:else>
+            </dgm:choose>
+          </dgm:else>
+        </dgm:choose>
+        <dgm:constrLst/>
+        <dgm:ruleLst/>
+      </dgm:layoutNode>
+      <dgm:layoutNode name="circ2Tx" styleLbl="revTx">
+        <dgm:varLst>
+          <dgm:chMax val="0"/>
+          <dgm:chPref val="0"/>
+          <dgm:bulletEnabled val="1"/>
+        </dgm:varLst>
+        <dgm:alg type="tx">
+          <dgm:param type="txAnchorHorzCh" val="ctr"/>
+          <dgm:param type="txAnchorVertCh" val="mid"/>
+        </dgm:alg>
+        <dgm:shape xmlns:r="http://schemas.openxmlformats.org/officeDocument/2006/relationships" type="rect" r:blip="" hideGeom="1">
+          <dgm:adjLst/>
+        </dgm:shape>
+        <dgm:choose name="Name60">
+          <dgm:if name="Name61" func="var" arg="dir" op="equ" val="norm">
+            <dgm:presOf axis="desOrSelf" ptType="node"/>
+          </dgm:if>
+          <dgm:else name="Name62">
+            <dgm:choose name="Name63">
+              <dgm:if name="Name64" axis="root ch" ptType="all node" func="cnt" op="equ" val="2">
+                <dgm:presOf axis="root ch desOrSelf" ptType="all node node" st="1 1 1" cnt="1 1 0"/>
+              </dgm:if>
+              <dgm:if name="Name65" axis="root ch" ptType="all node" func="cnt" op="equ" val="3">
+                <dgm:presOf axis="root ch desOrSelf" ptType="all node node" st="1 3 1" cnt="1 1 0"/>
+              </dgm:if>
+              <dgm:if name="Name66" axis="root ch" ptType="all node" func="cnt" op="equ" val="4">
+                <dgm:presOf axis="root ch desOrSelf" ptType="all node node" st="1 4 1" cnt="1 1 0"/>
+              </dgm:if>
+              <dgm:if name="Name67" axis="root ch" ptType="all node" func="cnt" op="equ" val="5">
+                <dgm:presOf axis="root ch desOrSelf" ptType="all node node" st="1 5 1" cnt="1 1 0"/>
+              </dgm:if>
+              <dgm:if name="Name68" axis="root ch" ptType="all node" func="cnt" op="equ" val="6">
+                <dgm:presOf axis="root ch desOrSelf" ptType="all node node" st="1 6 1" cnt="1 1 0"/>
+              </dgm:if>
+              <dgm:else name="Name69">
+                <dgm:presOf axis="root ch desOrSelf" ptType="all node node" st="1 7 1" cnt="1 1 0"/>
+              </dgm:else>
+            </dgm:choose>
+          </dgm:else>
+        </dgm:choose>
+        <dgm:constrLst>
+          <dgm:constr type="tMarg"/>
+          <dgm:constr type="bMarg"/>
+          <dgm:constr type="lMarg"/>
+          <dgm:constr type="rMarg"/>
+          <dgm:constr type="primFontSz" val="65"/>
+        </dgm:constrLst>
+        <dgm:ruleLst>
+          <dgm:rule type="primFontSz" val="5" fact="NaN" max="NaN"/>
+        </dgm:ruleLst>
+      </dgm:layoutNode>
+    </dgm:forEach>
+    <dgm:forEach name="Name70" axis="ch" ptType="node" st="3" cnt="1">
+      <dgm:layoutNode name="circ3" styleLbl="vennNode1">
+        <dgm:alg type="sp"/>
+        <dgm:shape xmlns:r="http://schemas.openxmlformats.org/officeDocument/2006/relationships" type="ellipse" r:blip="">
+          <dgm:adjLst/>
+        </dgm:shape>
+        <dgm:choose name="Name71">
+          <dgm:if name="Name72" func="var" arg="dir" op="equ" val="norm">
+            <dgm:choose name="Name73">
+              <dgm:if name="Name74" axis="root ch" ptType="all node" func="cnt" op="lte" val="4">
+                <dgm:presOf axis="desOrSelf" ptType="node"/>
+              </dgm:if>
+              <dgm:else name="Name75">
+                <dgm:presOf/>
+              </dgm:else>
+            </dgm:choose>
+          </dgm:if>
+          <dgm:else name="Name76">
+            <dgm:choose name="Name77">
+              <dgm:if name="Name78" axis="root ch" ptType="all node" func="cnt" op="equ" val="3">
+                <dgm:presOf axis="root ch desOrSelf" ptType="all node node" st="1 2 1" cnt="1 1 0"/>
+              </dgm:if>
+              <dgm:if name="Name79" axis="root ch" ptType="all node" func="cnt" op="equ" val="4">
+                <dgm:presOf axis="root ch desOrSelf" ptType="all node node" st="1 3 1" cnt="1 1 0"/>
+              </dgm:if>
+              <dgm:else name="Name80">
+                <dgm:presOf/>
+              </dgm:else>
+            </dgm:choose>
+          </dgm:else>
+        </dgm:choose>
+        <dgm:constrLst/>
+        <dgm:ruleLst/>
+      </dgm:layoutNode>
+      <dgm:layoutNode name="circ3Tx" styleLbl="revTx">
+        <dgm:varLst>
+          <dgm:chMax val="0"/>
+          <dgm:chPref val="0"/>
+          <dgm:bulletEnabled val="1"/>
+        </dgm:varLst>
+        <dgm:alg type="tx">
+          <dgm:param type="txAnchorHorzCh" val="ctr"/>
+          <dgm:param type="txAnchorVertCh" val="mid"/>
+        </dgm:alg>
+        <dgm:shape xmlns:r="http://schemas.openxmlformats.org/officeDocument/2006/relationships" type="rect" r:blip="" hideGeom="1">
+          <dgm:adjLst/>
+        </dgm:shape>
+        <dgm:choose name="Name81">
+          <dgm:if name="Name82" func="var" arg="dir" op="equ" val="norm">
+            <dgm:presOf axis="desOrSelf" ptType="node"/>
+          </dgm:if>
+          <dgm:else name="Name83">
+            <dgm:choose name="Name84">
+              <dgm:if name="Name85" axis="root ch" ptType="all node" func="cnt" op="equ" val="3">
+                <dgm:presOf axis="root ch desOrSelf" ptType="all node node" st="1 2 1" cnt="1 1 0"/>
+              </dgm:if>
+              <dgm:if name="Name86" axis="root ch" ptType="all node" func="cnt" op="equ" val="4">
+                <dgm:presOf axis="root ch desOrSelf" ptType="all node node" st="1 3 1" cnt="1 1 0"/>
+              </dgm:if>
+              <dgm:if name="Name87" axis="root ch" ptType="all node" func="cnt" op="equ" val="5">
+                <dgm:presOf axis="root ch desOrSelf" ptType="all node node" st="1 4 1" cnt="1 1 0"/>
+              </dgm:if>
+              <dgm:if name="Name88" axis="root ch" ptType="all node" func="cnt" op="equ" val="6">
+                <dgm:presOf axis="root ch desOrSelf" ptType="all node node" st="1 5 1" cnt="1 1 0"/>
+              </dgm:if>
+              <dgm:else name="Name89">
+                <dgm:presOf axis="root ch desOrSelf" ptType="all node node" st="1 6 1" cnt="1 1 0"/>
+              </dgm:else>
+            </dgm:choose>
+          </dgm:else>
+        </dgm:choose>
+        <dgm:constrLst>
+          <dgm:constr type="tMarg"/>
+          <dgm:constr type="bMarg"/>
+          <dgm:constr type="lMarg"/>
+          <dgm:constr type="rMarg"/>
+          <dgm:constr type="primFontSz" val="65"/>
+        </dgm:constrLst>
+        <dgm:ruleLst>
+          <dgm:rule type="primFontSz" val="5" fact="NaN" max="NaN"/>
+        </dgm:ruleLst>
+      </dgm:layoutNode>
+    </dgm:forEach>
+    <dgm:forEach name="Name90" axis="ch" ptType="node" st="4" cnt="1">
+      <dgm:layoutNode name="circ4" styleLbl="vennNode1">
+        <dgm:alg type="sp"/>
+        <dgm:shape xmlns:r="http://schemas.openxmlformats.org/officeDocument/2006/relationships" type="ellipse" r:blip="">
+          <dgm:adjLst/>
+        </dgm:shape>
+        <dgm:choose name="Name91">
+          <dgm:if name="Name92" func="var" arg="dir" op="equ" val="norm">
+            <dgm:choose name="Name93">
+              <dgm:if name="Name94" axis="root ch" ptType="all node" func="cnt" op="lte" val="4">
+                <dgm:presOf axis="desOrSelf" ptType="node"/>
+              </dgm:if>
+              <dgm:else name="Name95">
+                <dgm:presOf/>
+              </dgm:else>
+            </dgm:choose>
+          </dgm:if>
+          <dgm:else name="Name96">
+            <dgm:choose name="Name97">
+              <dgm:if name="Name98" axis="root ch" ptType="all node" func="cnt" op="equ" val="4">
+                <dgm:presOf axis="root ch desOrSelf" ptType="all node node" st="1 2 1" cnt="1 1 0"/>
+              </dgm:if>
+              <dgm:else name="Name99">
+                <dgm:presOf/>
+              </dgm:else>
+            </dgm:choose>
+          </dgm:else>
+        </dgm:choose>
+        <dgm:constrLst/>
+        <dgm:ruleLst/>
+      </dgm:layoutNode>
+      <dgm:layoutNode name="circ4Tx" styleLbl="revTx">
+        <dgm:varLst>
+          <dgm:chMax val="0"/>
+          <dgm:chPref val="0"/>
+          <dgm:bulletEnabled val="1"/>
+        </dgm:varLst>
+        <dgm:alg type="tx">
+          <dgm:param type="txAnchorHorzCh" val="ctr"/>
+          <dgm:param type="txAnchorVertCh" val="mid"/>
+        </dgm:alg>
+        <dgm:shape xmlns:r="http://schemas.openxmlformats.org/officeDocument/2006/relationships" type="rect" r:blip="" hideGeom="1">
+          <dgm:adjLst/>
+        </dgm:shape>
+        <dgm:choose name="Name100">
+          <dgm:if name="Name101" func="var" arg="dir" op="equ" val="norm">
+            <dgm:presOf axis="desOrSelf" ptType="node"/>
+          </dgm:if>
+          <dgm:else name="Name102">
+            <dgm:choose name="Name103">
+              <dgm:if name="Name104" axis="root ch" ptType="all node" func="cnt" op="equ" val="4">
+                <dgm:presOf axis="root ch desOrSelf" ptType="all node node" st="1 2 1" cnt="1 1 0"/>
+              </dgm:if>
+              <dgm:if name="Name105" axis="root ch" ptType="all node" func="cnt" op="equ" val="5">
+                <dgm:presOf axis="root ch desOrSelf" ptType="all node node" st="1 3 1" cnt="1 1 0"/>
+              </dgm:if>
+              <dgm:if name="Name106" axis="root ch" ptType="all node" func="cnt" op="equ" val="6">
+                <dgm:presOf axis="root ch desOrSelf" ptType="all node node" st="1 4 1" cnt="1 1 0"/>
+              </dgm:if>
+              <dgm:else name="Name107">
+                <dgm:presOf axis="root ch desOrSelf" ptType="all node node" st="1 5 1" cnt="1 1 0"/>
+              </dgm:else>
+            </dgm:choose>
+          </dgm:else>
+        </dgm:choose>
+        <dgm:constrLst>
+          <dgm:constr type="tMarg"/>
+          <dgm:constr type="bMarg"/>
+          <dgm:constr type="lMarg"/>
+          <dgm:constr type="rMarg"/>
+          <dgm:constr type="primFontSz" val="65"/>
+        </dgm:constrLst>
+        <dgm:ruleLst>
+          <dgm:rule type="primFontSz" val="5" fact="NaN" max="NaN"/>
+        </dgm:ruleLst>
+      </dgm:layoutNode>
+    </dgm:forEach>
+    <dgm:forEach name="Name108" axis="ch" ptType="node" st="5" cnt="1">
+      <dgm:layoutNode name="circ5" styleLbl="vennNode1">
+        <dgm:alg type="sp"/>
+        <dgm:shape xmlns:r="http://schemas.openxmlformats.org/officeDocument/2006/relationships" type="ellipse" r:blip="">
+          <dgm:adjLst/>
+        </dgm:shape>
+        <dgm:presOf/>
+        <dgm:constrLst/>
+        <dgm:ruleLst/>
+      </dgm:layoutNode>
+      <dgm:layoutNode name="circ5Tx" styleLbl="revTx">
+        <dgm:varLst>
+          <dgm:chMax val="0"/>
+          <dgm:chPref val="0"/>
+          <dgm:bulletEnabled val="1"/>
+        </dgm:varLst>
+        <dgm:alg type="tx">
+          <dgm:param type="txAnchorHorzCh" val="ctr"/>
+          <dgm:param type="txAnchorVertCh" val="mid"/>
+        </dgm:alg>
+        <dgm:shape xmlns:r="http://schemas.openxmlformats.org/officeDocument/2006/relationships" type="rect" r:blip="" hideGeom="1">
+          <dgm:adjLst/>
+        </dgm:shape>
+        <dgm:choose name="Name109">
+          <dgm:if name="Name110" func="var" arg="dir" op="equ" val="norm">
+            <dgm:presOf axis="desOrSelf" ptType="node"/>
+          </dgm:if>
+          <dgm:else name="Name111">
+            <dgm:choose name="Name112">
+              <dgm:if name="Name113" axis="root ch" ptType="all node" func="cnt" op="equ" val="5">
+                <dgm:presOf axis="root ch desOrSelf" ptType="all node node" st="1 2 1" cnt="1 1 0"/>
+              </dgm:if>
+              <dgm:if name="Name114" axis="root ch" ptType="all node" func="cnt" op="equ" val="6">
+                <dgm:presOf axis="root ch desOrSelf" ptType="all node node" st="1 3 1" cnt="1 1 0"/>
+              </dgm:if>
+              <dgm:else name="Name115">
+                <dgm:presOf axis="root ch desOrSelf" ptType="all node node" st="1 4 1" cnt="1 1 0"/>
+              </dgm:else>
+            </dgm:choose>
+          </dgm:else>
+        </dgm:choose>
+        <dgm:constrLst>
+          <dgm:constr type="tMarg"/>
+          <dgm:constr type="bMarg"/>
+          <dgm:constr type="lMarg"/>
+          <dgm:constr type="rMarg"/>
+          <dgm:constr type="primFontSz" val="65"/>
+        </dgm:constrLst>
+        <dgm:ruleLst>
+          <dgm:rule type="primFontSz" val="5" fact="NaN" max="NaN"/>
+        </dgm:ruleLst>
+      </dgm:layoutNode>
+    </dgm:forEach>
+    <dgm:forEach name="Name116" axis="ch" ptType="node" st="6" cnt="1">
+      <dgm:layoutNode name="circ6" styleLbl="vennNode1">
+        <dgm:alg type="sp"/>
+        <dgm:shape xmlns:r="http://schemas.openxmlformats.org/officeDocument/2006/relationships" type="ellipse" r:blip="">
+          <dgm:adjLst/>
+        </dgm:shape>
+        <dgm:presOf/>
+        <dgm:constrLst/>
+        <dgm:ruleLst/>
+      </dgm:layoutNode>
+      <dgm:layoutNode name="circ6Tx" styleLbl="revTx">
+        <dgm:varLst>
+          <dgm:chMax val="0"/>
+          <dgm:chPref val="0"/>
+          <dgm:bulletEnabled val="1"/>
+        </dgm:varLst>
+        <dgm:alg type="tx">
+          <dgm:param type="txAnchorHorzCh" val="ctr"/>
+          <dgm:param type="txAnchorVertCh" val="mid"/>
+        </dgm:alg>
+        <dgm:shape xmlns:r="http://schemas.openxmlformats.org/officeDocument/2006/relationships" type="rect" r:blip="" hideGeom="1">
+          <dgm:adjLst/>
+        </dgm:shape>
+        <dgm:choose name="Name117">
+          <dgm:if name="Name118" func="var" arg="dir" op="equ" val="norm">
+            <dgm:presOf axis="desOrSelf" ptType="node"/>
+          </dgm:if>
+          <dgm:else name="Name119">
+            <dgm:choose name="Name120">
+              <dgm:if name="Name121" axis="root ch" ptType="all node" func="cnt" op="equ" val="6">
+                <dgm:presOf axis="root ch desOrSelf" ptType="all node node" st="1 2 1" cnt="1 1 0"/>
+              </dgm:if>
+              <dgm:else name="Name122">
+                <dgm:presOf axis="root ch desOrSelf" ptType="all node node" st="1 3 1" cnt="1 1 0"/>
+              </dgm:else>
+            </dgm:choose>
+          </dgm:else>
+        </dgm:choose>
+        <dgm:constrLst>
+          <dgm:constr type="tMarg"/>
+          <dgm:constr type="bMarg"/>
+          <dgm:constr type="lMarg"/>
+          <dgm:constr type="rMarg"/>
+          <dgm:constr type="primFontSz" val="65"/>
+        </dgm:constrLst>
+        <dgm:ruleLst>
+          <dgm:rule type="primFontSz" val="5" fact="NaN" max="NaN"/>
+        </dgm:ruleLst>
+      </dgm:layoutNode>
+    </dgm:forEach>
+    <dgm:forEach name="Name123" axis="ch" ptType="node" st="7" cnt="1">
+      <dgm:layoutNode name="circ7" styleLbl="vennNode1">
+        <dgm:alg type="sp"/>
+        <dgm:shape xmlns:r="http://schemas.openxmlformats.org/officeDocument/2006/relationships" type="ellipse" r:blip="">
+          <dgm:adjLst/>
+        </dgm:shape>
+        <dgm:presOf/>
+        <dgm:constrLst/>
+        <dgm:ruleLst/>
+      </dgm:layoutNode>
+      <dgm:layoutNode name="circ7Tx" styleLbl="revTx">
+        <dgm:varLst>
+          <dgm:chMax val="0"/>
+          <dgm:chPref val="0"/>
+          <dgm:bulletEnabled val="1"/>
+        </dgm:varLst>
+        <dgm:alg type="tx">
+          <dgm:param type="txAnchorHorzCh" val="ctr"/>
+          <dgm:param type="txAnchorVertCh" val="mid"/>
+        </dgm:alg>
+        <dgm:shape xmlns:r="http://schemas.openxmlformats.org/officeDocument/2006/relationships" type="rect" r:blip="" hideGeom="1">
+          <dgm:adjLst/>
+        </dgm:shape>
+        <dgm:choose name="Name124">
+          <dgm:if name="Name125" func="var" arg="dir" op="equ" val="norm">
+            <dgm:presOf axis="desOrSelf" ptType="node"/>
+          </dgm:if>
+          <dgm:else name="Name126">
+            <dgm:presOf axis="root ch desOrSelf" ptType="all node node" st="1 2 1" cnt="1 1 0"/>
+          </dgm:else>
+        </dgm:choose>
+        <dgm:constrLst>
+          <dgm:constr type="tMarg"/>
+          <dgm:constr type="bMarg"/>
+          <dgm:constr type="lMarg"/>
+          <dgm:constr type="rMarg"/>
+          <dgm:constr type="primFontSz" val="65"/>
+        </dgm:constrLst>
+        <dgm:ruleLst>
+          <dgm:rule type="primFontSz" val="5" fact="NaN" max="NaN"/>
+        </dgm:ruleLst>
+      </dgm:layoutNode>
+    </dgm:forEach>
+  </dgm:layoutNode>
+</dgm:layoutDef>
+</file>
+
+<file path=ppt/diagrams/quickStyle1.xml><?xml version="1.0" encoding="utf-8"?>
+<dgm:styleDef xmlns:dgm="http://schemas.openxmlformats.org/drawingml/2006/diagram" xmlns:a="http://schemas.openxmlformats.org/drawingml/2006/main" uniqueId="urn:microsoft.com/office/officeart/2005/8/quickstyle/simple1">
+  <dgm:title val=""/>
+  <dgm:desc val=""/>
+  <dgm:catLst>
+    <dgm:cat type="simple" pri="10100"/>
+  </dgm:catLst>
+  <dgm:scene3d>
+    <a:camera prst="orthographicFront"/>
+    <a:lightRig rig="threePt" dir="t"/>
+  </dgm:scene3d>
+  <dgm:styleLbl name="node0">
+    <dgm:scene3d>
+      <a:camera prst="orthographicFront"/>
+      <a:lightRig rig="threePt" dir="t"/>
+    </dgm:scene3d>
+    <dgm:sp3d/>
+    <dgm:txPr/>
+    <dgm:style>
+      <a:lnRef idx="2">
+        <a:scrgbClr r="0" g="0" b="0"/>
+      </a:lnRef>
+      <a:fillRef idx="1">
+        <a:scrgbClr r="0" g="0" b="0"/>
+      </a:fillRef>
+      <a:effectRef idx="0">
+        <a:scrgbClr r="0" g="0" b="0"/>
+      </a:effectRef>
+      <a:fontRef idx="minor">
+        <a:schemeClr val="lt1"/>
+      </a:fontRef>
+    </dgm:style>
+  </dgm:styleLbl>
+  <dgm:styleLbl name="lnNode1">
+    <dgm:scene3d>
+      <a:camera prst="orthographicFront"/>
+      <a:lightRig rig="threePt" dir="t"/>
+    </dgm:scene3d>
+    <dgm:sp3d/>
+    <dgm:txPr/>
+    <dgm:style>
+      <a:lnRef idx="2">
+        <a:scrgbClr r="0" g="0" b="0"/>
+      </a:lnRef>
+      <a:fillRef idx="1">
+        <a:scrgbClr r="0" g="0" b="0"/>
+      </a:fillRef>
+      <a:effectRef idx="0">
+        <a:scrgbClr r="0" g="0" b="0"/>
+      </a:effectRef>
+      <a:fontRef idx="minor">
+        <a:schemeClr val="lt1"/>
+      </a:fontRef>
+    </dgm:style>
+  </dgm:styleLbl>
+  <dgm:styleLbl name="vennNode1">
+    <dgm:scene3d>
+      <a:camera prst="orthographicFront"/>
+      <a:lightRig rig="threePt" dir="t"/>
+    </dgm:scene3d>
+    <dgm:sp3d/>
+    <dgm:txPr/>
+    <dgm:style>
+      <a:lnRef idx="2">
+        <a:scrgbClr r="0" g="0" b="0"/>
+      </a:lnRef>
+      <a:fillRef idx="1">
+        <a:scrgbClr r="0" g="0" b="0"/>
+      </a:fillRef>
+      <a:effectRef idx="0">
+        <a:scrgbClr r="0" g="0" b="0"/>
+      </a:effectRef>
+      <a:fontRef idx="minor">
+        <a:schemeClr val="tx1"/>
+      </a:fontRef>
+    </dgm:style>
+  </dgm:styleLbl>
+  <dgm:styleLbl name="alignNode1">
+    <dgm:scene3d>
+      <a:camera prst="orthographicFront"/>
+      <a:lightRig rig="threePt" dir="t"/>
+    </dgm:scene3d>
+    <dgm:sp3d/>
+    <dgm:txPr/>
+    <dgm:style>
+      <a:lnRef idx="2">
+        <a:scrgbClr r="0" g="0" b="0"/>
+      </a:lnRef>
+      <a:fillRef idx="1">
+        <a:scrgbClr r="0" g="0" b="0"/>
+      </a:fillRef>
+      <a:effectRef idx="0">
+        <a:scrgbClr r="0" g="0" b="0"/>
+      </a:effectRef>
+      <a:fontRef idx="minor">
+        <a:schemeClr val="lt1"/>
+      </a:fontRef>
+    </dgm:style>
+  </dgm:styleLbl>
+  <dgm:styleLbl name="node1">
+    <dgm:scene3d>
+      <a:camera prst="orthographicFront"/>
+      <a:lightRig rig="threePt" dir="t"/>
+    </dgm:scene3d>
+    <dgm:sp3d/>
+    <dgm:txPr/>
+    <dgm:style>
+      <a:lnRef idx="2">
+        <a:scrgbClr r="0" g="0" b="0"/>
+      </a:lnRef>
+      <a:fillRef idx="1">
+        <a:scrgbClr r="0" g="0" b="0"/>
+      </a:fillRef>
+      <a:effectRef idx="0">
+        <a:scrgbClr r="0" g="0" b="0"/>
+      </a:effectRef>
+      <a:fontRef idx="minor">
+        <a:schemeClr val="lt1"/>
+      </a:fontRef>
+    </dgm:style>
+  </dgm:styleLbl>
+  <dgm:styleLbl name="node2">
+    <dgm:scene3d>
+      <a:camera prst="orthographicFront"/>
+      <a:lightRig rig="threePt" dir="t"/>
+    </dgm:scene3d>
+    <dgm:sp3d/>
+    <dgm:txPr/>
+    <dgm:style>
+      <a:lnRef idx="2">
+        <a:scrgbClr r="0" g="0" b="0"/>
+      </a:lnRef>
+      <a:fillRef idx="1">
+        <a:scrgbClr r="0" g="0" b="0"/>
+      </a:fillRef>
+      <a:effectRef idx="0">
+        <a:scrgbClr r="0" g="0" b="0"/>
+      </a:effectRef>
+      <a:fontRef idx="minor">
+        <a:schemeClr val="lt1"/>
+      </a:fontRef>
+    </dgm:style>
+  </dgm:styleLbl>
+  <dgm:styleLbl name="node3">
+    <dgm:scene3d>
+      <a:camera prst="orthographicFront"/>
+      <a:lightRig rig="threePt" dir="t"/>
+    </dgm:scene3d>
+    <dgm:sp3d/>
+    <dgm:txPr/>
+    <dgm:style>
+      <a:lnRef idx="2">
+        <a:scrgbClr r="0" g="0" b="0"/>
+      </a:lnRef>
+      <a:fillRef idx="1">
+        <a:scrgbClr r="0" g="0" b="0"/>
+      </a:fillRef>
+      <a:effectRef idx="0">
+        <a:scrgbClr r="0" g="0" b="0"/>
+      </a:effectRef>
+      <a:fontRef idx="minor">
+        <a:schemeClr val="lt1"/>
+      </a:fontRef>
+    </dgm:style>
+  </dgm:styleLbl>
+  <dgm:styleLbl name="node4">
+    <dgm:scene3d>
+      <a:camera prst="orthographicFront"/>
+      <a:lightRig rig="threePt" dir="t"/>
+    </dgm:scene3d>
+    <dgm:sp3d/>
+    <dgm:txPr/>
+    <dgm:style>
+      <a:lnRef idx="2">
+        <a:scrgbClr r="0" g="0" b="0"/>
+      </a:lnRef>
+      <a:fillRef idx="1">
+        <a:scrgbClr r="0" g="0" b="0"/>
+      </a:fillRef>
+      <a:effectRef idx="0">
+        <a:scrgbClr r="0" g="0" b="0"/>
+      </a:effectRef>
+      <a:fontRef idx="minor">
+        <a:schemeClr val="lt1"/>
+      </a:fontRef>
+    </dgm:style>
+  </dgm:styleLbl>
+  <dgm:styleLbl name="fgImgPlace1">
+    <dgm:scene3d>
+      <a:camera prst="orthographicFront"/>
+      <a:lightRig rig="threePt" dir="t"/>
+    </dgm:scene3d>
+    <dgm:sp3d/>
+    <dgm:txPr/>
+    <dgm:style>
+      <a:lnRef idx="2">
+        <a:scrgbClr r="0" g="0" b="0"/>
+      </a:lnRef>
+      <a:fillRef idx="1">
+        <a:scrgbClr r="0" g="0" b="0"/>
+      </a:fillRef>
+      <a:effectRef idx="0">
+        <a:scrgbClr r="0" g="0" b="0"/>
+      </a:effectRef>
+      <a:fontRef idx="minor"/>
+    </dgm:style>
+  </dgm:styleLbl>
+  <dgm:styleLbl name="alignImgPlace1">
+    <dgm:scene3d>
+      <a:camera prst="orthographicFront"/>
+      <a:lightRig rig="threePt" dir="t"/>
+    </dgm:scene3d>
+    <dgm:sp3d/>
+    <dgm:txPr/>
+    <dgm:style>
+      <a:lnRef idx="2">
+        <a:scrgbClr r="0" g="0" b="0"/>
+      </a:lnRef>
+      <a:fillRef idx="1">
+        <a:scrgbClr r="0" g="0" b="0"/>
+      </a:fillRef>
+      <a:effectRef idx="0">
+        <a:scrgbClr r="0" g="0" b="0"/>
+      </a:effectRef>
+      <a:fontRef idx="minor"/>
+    </dgm:style>
+  </dgm:styleLbl>
+  <dgm:styleLbl name="bgImgPlace1">
+    <dgm:scene3d>
+      <a:camera prst="orthographicFront"/>
+      <a:lightRig rig="threePt" dir="t"/>
+    </dgm:scene3d>
+    <dgm:sp3d/>
+    <dgm:txPr/>
+    <dgm:style>
+      <a:lnRef idx="2">
+        <a:scrgbClr r="0" g="0" b="0"/>
+      </a:lnRef>
+      <a:fillRef idx="1">
+        <a:scrgbClr r="0" g="0" b="0"/>
+      </a:fillRef>
+      <a:effectRef idx="0">
+        <a:scrgbClr r="0" g="0" b="0"/>
+      </a:effectRef>
+      <a:fontRef idx="minor"/>
+    </dgm:style>
+  </dgm:styleLbl>
+  <dgm:styleLbl name="sibTrans2D1">
+    <dgm:scene3d>
+      <a:camera prst="orthographicFront"/>
+      <a:lightRig rig="threePt" dir="t"/>
+    </dgm:scene3d>
+    <dgm:sp3d/>
+    <dgm:txPr/>
+    <dgm:style>
+      <a:lnRef idx="0">
+        <a:scrgbClr r="0" g="0" b="0"/>
+      </a:lnRef>
+      <a:fillRef idx="1">
+        <a:scrgbClr r="0" g="0" b="0"/>
+      </a:fillRef>
+      <a:effectRef idx="0">
+        <a:scrgbClr r="0" g="0" b="0"/>
+      </a:effectRef>
+      <a:fontRef idx="minor">
+        <a:schemeClr val="lt1"/>
+      </a:fontRef>
+    </dgm:style>
+  </dgm:styleLbl>
+  <dgm:styleLbl name="fgSibTrans2D1">
+    <dgm:scene3d>
+      <a:camera prst="orthographicFront"/>
+      <a:lightRig rig="threePt" dir="t"/>
+    </dgm:scene3d>
+    <dgm:sp3d/>
+    <dgm:txPr/>
+    <dgm:style>
+      <a:lnRef idx="0">
+        <a:scrgbClr r="0" g="0" b="0"/>
+      </a:lnRef>
+      <a:fillRef idx="1">
+        <a:scrgbClr r="0" g="0" b="0"/>
+      </a:fillRef>
+      <a:effectRef idx="0">
+        <a:scrgbClr r="0" g="0" b="0"/>
+      </a:effectRef>
+      <a:fontRef idx="minor">
+        <a:schemeClr val="lt1"/>
+      </a:fontRef>
+    </dgm:style>
+  </dgm:styleLbl>
+  <dgm:styleLbl name="bgSibTrans2D1">
+    <dgm:scene3d>
+      <a:camera prst="orthographicFront"/>
+      <a:lightRig rig="threePt" dir="t"/>
+    </dgm:scene3d>
+    <dgm:sp3d/>
+    <dgm:txPr/>
+    <dgm:style>
+      <a:lnRef idx="0">
+        <a:scrgbClr r="0" g="0" b="0"/>
+      </a:lnRef>
+      <a:fillRef idx="1">
+        <a:scrgbClr r="0" g="0" b="0"/>
+      </a:fillRef>
+      <a:effectRef idx="0">
+        <a:scrgbClr r="0" g="0" b="0"/>
+      </a:effectRef>
+      <a:fontRef idx="minor">
+        <a:schemeClr val="lt1"/>
+      </a:fontRef>
+    </dgm:style>
+  </dgm:styleLbl>
+  <dgm:styleLbl name="sibTrans1D1">
+    <dgm:scene3d>
+      <a:camera prst="orthographicFront"/>
+      <a:lightRig rig="threePt" dir="t"/>
+    </dgm:scene3d>
+    <dgm:sp3d/>
+    <dgm:txPr/>
+    <dgm:style>
+      <a:lnRef idx="1">
+        <a:scrgbClr r="0" g="0" b="0"/>
+      </a:lnRef>
+      <a:fillRef idx="0">
+        <a:scrgbClr r="0" g="0" b="0"/>
+      </a:fillRef>
+      <a:effectRef idx="0">
+        <a:scrgbClr r="0" g="0" b="0"/>
+      </a:effectRef>
+      <a:fontRef idx="minor"/>
+    </dgm:style>
+  </dgm:styleLbl>
+  <dgm:styleLbl name="callout">
+    <dgm:scene3d>
+      <a:camera prst="orthographicFront"/>
+      <a:lightRig rig="threePt" dir="t"/>
+    </dgm:scene3d>
+    <dgm:sp3d/>
+    <dgm:txPr/>
+    <dgm:style>
+      <a:lnRef idx="2">
+        <a:scrgbClr r="0" g="0" b="0"/>
+      </a:lnRef>
+      <a:fillRef idx="1">
+        <a:scrgbClr r="0" g="0" b="0"/>
+      </a:fillRef>
+      <a:effectRef idx="0">
+        <a:scrgbClr r="0" g="0" b="0"/>
+      </a:effectRef>
+      <a:fontRef idx="minor"/>
+    </dgm:style>
+  </dgm:styleLbl>
+  <dgm:styleLbl name="asst0">
+    <dgm:scene3d>
+      <a:camera prst="orthographicFront"/>
+      <a:lightRig rig="threePt" dir="t"/>
+    </dgm:scene3d>
+    <dgm:sp3d/>
+    <dgm:txPr/>
+    <dgm:style>
+      <a:lnRef idx="2">
+        <a:scrgbClr r="0" g="0" b="0"/>
+      </a:lnRef>
+      <a:fillRef idx="1">
+        <a:scrgbClr r="0" g="0" b="0"/>
+      </a:fillRef>
+      <a:effectRef idx="0">
+        <a:scrgbClr r="0" g="0" b="0"/>
+      </a:effectRef>
+      <a:fontRef idx="minor">
+        <a:schemeClr val="lt1"/>
+      </a:fontRef>
+    </dgm:style>
+  </dgm:styleLbl>
+  <dgm:styleLbl name="asst1">
+    <dgm:scene3d>
+      <a:camera prst="orthographicFront"/>
+      <a:lightRig rig="threePt" dir="t"/>
+    </dgm:scene3d>
+    <dgm:sp3d/>
+    <dgm:txPr/>
+    <dgm:style>
+      <a:lnRef idx="2">
+        <a:scrgbClr r="0" g="0" b="0"/>
+      </a:lnRef>
+      <a:fillRef idx="1">
+        <a:scrgbClr r="0" g="0" b="0"/>
+      </a:fillRef>
+      <a:effectRef idx="0">
+        <a:scrgbClr r="0" g="0" b="0"/>
+      </a:effectRef>
+      <a:fontRef idx="minor">
+        <a:schemeClr val="lt1"/>
+      </a:fontRef>
+    </dgm:style>
+  </dgm:styleLbl>
+  <dgm:styleLbl name="asst2">
+    <dgm:scene3d>
+      <a:camera prst="orthographicFront"/>
+      <a:lightRig rig="threePt" dir="t"/>
+    </dgm:scene3d>
+    <dgm:sp3d/>
+    <dgm:txPr/>
+    <dgm:style>
+      <a:lnRef idx="2">
+        <a:scrgbClr r="0" g="0" b="0"/>
+      </a:lnRef>
+      <a:fillRef idx="1">
+        <a:scrgbClr r="0" g="0" b="0"/>
+      </a:fillRef>
+      <a:effectRef idx="0">
+        <a:scrgbClr r="0" g="0" b="0"/>
+      </a:effectRef>
+      <a:fontRef idx="minor">
+        <a:schemeClr val="lt1"/>
+      </a:fontRef>
+    </dgm:style>
+  </dgm:styleLbl>
+  <dgm:styleLbl name="asst3">
+    <dgm:scene3d>
+      <a:camera prst="orthographicFront"/>
+      <a:lightRig rig="threePt" dir="t"/>
+    </dgm:scene3d>
+    <dgm:sp3d/>
+    <dgm:txPr/>
+    <dgm:style>
+      <a:lnRef idx="2">
+        <a:scrgbClr r="0" g="0" b="0"/>
+      </a:lnRef>
+      <a:fillRef idx="1">
+        <a:scrgbClr r="0" g="0" b="0"/>
+      </a:fillRef>
+      <a:effectRef idx="0">
+        <a:scrgbClr r="0" g="0" b="0"/>
+      </a:effectRef>
+      <a:fontRef idx="minor">
+        <a:schemeClr val="lt1"/>
+      </a:fontRef>
+    </dgm:style>
+  </dgm:styleLbl>
+  <dgm:styleLbl name="asst4">
+    <dgm:scene3d>
+      <a:camera prst="orthographicFront"/>
+      <a:lightRig rig="threePt" dir="t"/>
+    </dgm:scene3d>
+    <dgm:sp3d/>
+    <dgm:txPr/>
+    <dgm:style>
+      <a:lnRef idx="2">
+        <a:scrgbClr r="0" g="0" b="0"/>
+      </a:lnRef>
+      <a:fillRef idx="1">
+        <a:scrgbClr r="0" g="0" b="0"/>
+      </a:fillRef>
+      <a:effectRef idx="0">
+        <a:scrgbClr r="0" g="0" b="0"/>
+      </a:effectRef>
+      <a:fontRef idx="minor">
+        <a:schemeClr val="lt1"/>
+      </a:fontRef>
+    </dgm:style>
+  </dgm:styleLbl>
+  <dgm:styleLbl name="parChTrans2D1">
+    <dgm:scene3d>
+      <a:camera prst="orthographicFront"/>
+      <a:lightRig rig="threePt" dir="t"/>
+    </dgm:scene3d>
+    <dgm:sp3d/>
+    <dgm:txPr/>
+    <dgm:style>
+      <a:lnRef idx="2">
+        <a:scrgbClr r="0" g="0" b="0"/>
+      </a:lnRef>
+      <a:fillRef idx="1">
+        <a:scrgbClr r="0" g="0" b="0"/>
+      </a:fillRef>
+      <a:effectRef idx="0">
+        <a:scrgbClr r="0" g="0" b="0"/>
+      </a:effectRef>
+      <a:fontRef idx="minor">
+        <a:schemeClr val="lt1"/>
+      </a:fontRef>
+    </dgm:style>
+  </dgm:styleLbl>
+  <dgm:styleLbl name="parChTrans2D2">
+    <dgm:scene3d>
+      <a:camera prst="orthographicFront"/>
+      <a:lightRig rig="threePt" dir="t"/>
+    </dgm:scene3d>
+    <dgm:sp3d/>
+    <dgm:txPr/>
+    <dgm:style>
+      <a:lnRef idx="2">
+        <a:scrgbClr r="0" g="0" b="0"/>
+      </a:lnRef>
+      <a:fillRef idx="1">
+        <a:scrgbClr r="0" g="0" b="0"/>
+      </a:fillRef>
+      <a:effectRef idx="0">
+        <a:scrgbClr r="0" g="0" b="0"/>
+      </a:effectRef>
+      <a:fontRef idx="minor">
+        <a:schemeClr val="lt1"/>
+      </a:fontRef>
+    </dgm:style>
+  </dgm:styleLbl>
+  <dgm:styleLbl name="parChTrans2D3">
+    <dgm:scene3d>
+      <a:camera prst="orthographicFront"/>
+      <a:lightRig rig="threePt" dir="t"/>
+    </dgm:scene3d>
+    <dgm:sp3d/>
+    <dgm:txPr/>
+    <dgm:style>
+      <a:lnRef idx="2">
+        <a:scrgbClr r="0" g="0" b="0"/>
+      </a:lnRef>
+      <a:fillRef idx="1">
+        <a:scrgbClr r="0" g="0" b="0"/>
+      </a:fillRef>
+      <a:effectRef idx="0">
+        <a:scrgbClr r="0" g="0" b="0"/>
+      </a:effectRef>
+      <a:fontRef idx="minor">
+        <a:schemeClr val="lt1"/>
+      </a:fontRef>
+    </dgm:style>
+  </dgm:styleLbl>
+  <dgm:styleLbl name="parChTrans2D4">
+    <dgm:scene3d>
+      <a:camera prst="orthographicFront"/>
+      <a:lightRig rig="threePt" dir="t"/>
+    </dgm:scene3d>
+    <dgm:sp3d/>
+    <dgm:txPr/>
+    <dgm:style>
+      <a:lnRef idx="2">
+        <a:scrgbClr r="0" g="0" b="0"/>
+      </a:lnRef>
+      <a:fillRef idx="1">
+        <a:scrgbClr r="0" g="0" b="0"/>
+      </a:fillRef>
+      <a:effectRef idx="0">
+        <a:scrgbClr r="0" g="0" b="0"/>
+      </a:effectRef>
+      <a:fontRef idx="minor">
+        <a:schemeClr val="lt1"/>
+      </a:fontRef>
+    </dgm:style>
+  </dgm:styleLbl>
+  <dgm:styleLbl name="parChTrans1D1">
+    <dgm:scene3d>
+      <a:camera prst="orthographicFront"/>
+      <a:lightRig rig="threePt" dir="t"/>
+    </dgm:scene3d>
+    <dgm:sp3d/>
+    <dgm:txPr/>
+    <dgm:style>
+      <a:lnRef idx="2">
+        <a:scrgbClr r="0" g="0" b="0"/>
+      </a:lnRef>
+      <a:fillRef idx="0">
+        <a:scrgbClr r="0" g="0" b="0"/>
+      </a:fillRef>
+      <a:effectRef idx="0">
+        <a:scrgbClr r="0" g="0" b="0"/>
+      </a:effectRef>
+      <a:fontRef idx="minor"/>
+    </dgm:style>
+  </dgm:styleLbl>
+  <dgm:styleLbl name="parChTrans1D2">
+    <dgm:scene3d>
+      <a:camera prst="orthographicFront"/>
+      <a:lightRig rig="threePt" dir="t"/>
+    </dgm:scene3d>
+    <dgm:sp3d/>
+    <dgm:txPr/>
+    <dgm:style>
+      <a:lnRef idx="2">
+        <a:scrgbClr r="0" g="0" b="0"/>
+      </a:lnRef>
+      <a:fillRef idx="0">
+        <a:scrgbClr r="0" g="0" b="0"/>
+      </a:fillRef>
+      <a:effectRef idx="0">
+        <a:scrgbClr r="0" g="0" b="0"/>
+      </a:effectRef>
+      <a:fontRef idx="minor"/>
+    </dgm:style>
+  </dgm:styleLbl>
+  <dgm:styleLbl name="parChTrans1D3">
+    <dgm:scene3d>
+      <a:camera prst="orthographicFront"/>
+      <a:lightRig rig="threePt" dir="t"/>
+    </dgm:scene3d>
+    <dgm:sp3d/>
+    <dgm:txPr/>
+    <dgm:style>
+      <a:lnRef idx="2">
+        <a:scrgbClr r="0" g="0" b="0"/>
+      </a:lnRef>
+      <a:fillRef idx="0">
+        <a:scrgbClr r="0" g="0" b="0"/>
+      </a:fillRef>
+      <a:effectRef idx="0">
+        <a:scrgbClr r="0" g="0" b="0"/>
+      </a:effectRef>
+      <a:fontRef idx="minor"/>
+    </dgm:style>
+  </dgm:styleLbl>
+  <dgm:styleLbl name="parChTrans1D4">
+    <dgm:scene3d>
+      <a:camera prst="orthographicFront"/>
+      <a:lightRig rig="threePt" dir="t"/>
+    </dgm:scene3d>
+    <dgm:sp3d/>
+    <dgm:txPr/>
+    <dgm:style>
+      <a:lnRef idx="2">
+        <a:scrgbClr r="0" g="0" b="0"/>
+      </a:lnRef>
+      <a:fillRef idx="0">
+        <a:scrgbClr r="0" g="0" b="0"/>
+      </a:fillRef>
+      <a:effectRef idx="0">
+        <a:scrgbClr r="0" g="0" b="0"/>
+      </a:effectRef>
+      <a:fontRef idx="minor"/>
+    </dgm:style>
+  </dgm:styleLbl>
+  <dgm:styleLbl name="fgAcc1">
+    <dgm:scene3d>
+      <a:camera prst="orthographicFront"/>
+      <a:lightRig rig="threePt" dir="t"/>
+    </dgm:scene3d>
+    <dgm:sp3d/>
+    <dgm:txPr/>
+    <dgm:style>
+      <a:lnRef idx="2">
+        <a:scrgbClr r="0" g="0" b="0"/>
+      </a:lnRef>
+      <a:fillRef idx="1">
+        <a:scrgbClr r="0" g="0" b="0"/>
+      </a:fillRef>
+      <a:effectRef idx="0">
+        <a:scrgbClr r="0" g="0" b="0"/>
+      </a:effectRef>
+      <a:fontRef idx="minor"/>
+    </dgm:style>
+  </dgm:styleLbl>
+  <dgm:styleLbl name="conFgAcc1">
+    <dgm:scene3d>
+      <a:camera prst="orthographicFront"/>
+      <a:lightRig rig="threePt" dir="t"/>
+    </dgm:scene3d>
+    <dgm:sp3d/>
+    <dgm:txPr/>
+    <dgm:style>
+      <a:lnRef idx="2">
+        <a:scrgbClr r="0" g="0" b="0"/>
+      </a:lnRef>
+      <a:fillRef idx="1">
+        <a:scrgbClr r="0" g="0" b="0"/>
+      </a:fillRef>
+      <a:effectRef idx="0">
+        <a:scrgbClr r="0" g="0" b="0"/>
+      </a:effectRef>
+      <a:fontRef idx="minor"/>
+    </dgm:style>
+  </dgm:styleLbl>
+  <dgm:styleLbl name="alignAcc1">
+    <dgm:scene3d>
+      <a:camera prst="orthographicFront"/>
+      <a:lightRig rig="threePt" dir="t"/>
+    </dgm:scene3d>
+    <dgm:sp3d/>
+    <dgm:txPr/>
+    <dgm:style>
+      <a:lnRef idx="2">
+        <a:scrgbClr r="0" g="0" b="0"/>
+      </a:lnRef>
+      <a:fillRef idx="1">
+        <a:scrgbClr r="0" g="0" b="0"/>
+      </a:fillRef>
+      <a:effectRef idx="0">
+        <a:scrgbClr r="0" g="0" b="0"/>
+      </a:effectRef>
+      <a:fontRef idx="minor"/>
+    </dgm:style>
+  </dgm:styleLbl>
+  <dgm:styleLbl name="trAlignAcc1">
+    <dgm:scene3d>
+      <a:camera prst="orthographicFront"/>
+      <a:lightRig rig="threePt" dir="t"/>
+    </dgm:scene3d>
+    <dgm:sp3d/>
+    <dgm:txPr/>
+    <dgm:style>
+      <a:lnRef idx="1">
+        <a:scrgbClr r="0" g="0" b="0"/>
+      </a:lnRef>
+      <a:fillRef idx="1">
+        <a:scrgbClr r="0" g="0" b="0"/>
+      </a:fillRef>
+      <a:effectRef idx="0">
+        <a:scrgbClr r="0" g="0" b="0"/>
+      </a:effectRef>
+      <a:fontRef idx="minor"/>
+    </dgm:style>
+  </dgm:styleLbl>
+  <dgm:styleLbl name="bgAcc1">
+    <dgm:scene3d>
+      <a:camera prst="orthographicFront"/>
+      <a:lightRig rig="threePt" dir="t"/>
+    </dgm:scene3d>
+    <dgm:sp3d/>
+    <dgm:txPr/>
+    <dgm:style>
+      <a:lnRef idx="2">
+        <a:scrgbClr r="0" g="0" b="0"/>
+      </a:lnRef>
+      <a:fillRef idx="1">
+        <a:scrgbClr r="0" g="0" b="0"/>
+      </a:fillRef>
+      <a:effectRef idx="0">
+        <a:scrgbClr r="0" g="0" b="0"/>
+      </a:effectRef>
+      <a:fontRef idx="minor"/>
+    </dgm:style>
+  </dgm:styleLbl>
+  <dgm:styleLbl name="solidFgAcc1">
+    <dgm:scene3d>
+      <a:camera prst="orthographicFront"/>
+      <a:lightRig rig="threePt" dir="t"/>
+    </dgm:scene3d>
+    <dgm:sp3d/>
+    <dgm:txPr/>
+    <dgm:style>
+      <a:lnRef idx="2">
+        <a:scrgbClr r="0" g="0" b="0"/>
+      </a:lnRef>
+      <a:fillRef idx="1">
+        <a:scrgbClr r="0" g="0" b="0"/>
+      </a:fillRef>
+      <a:effectRef idx="0">
+        <a:scrgbClr r="0" g="0" b="0"/>
+      </a:effectRef>
+      <a:fontRef idx="minor"/>
+    </dgm:style>
+  </dgm:styleLbl>
+  <dgm:styleLbl name="solidAlignAcc1">
+    <dgm:scene3d>
+      <a:camera prst="orthographicFront"/>
+      <a:lightRig rig="threePt" dir="t"/>
+    </dgm:scene3d>
+    <dgm:sp3d/>
+    <dgm:txPr/>
+    <dgm:style>
+      <a:lnRef idx="2">
+        <a:scrgbClr r="0" g="0" b="0"/>
+      </a:lnRef>
+      <a:fillRef idx="1">
+        <a:scrgbClr r="0" g="0" b="0"/>
+      </a:fillRef>
+      <a:effectRef idx="0">
+        <a:scrgbClr r="0" g="0" b="0"/>
+      </a:effectRef>
+      <a:fontRef idx="minor"/>
+    </dgm:style>
+  </dgm:styleLbl>
+  <dgm:styleLbl name="solidBgAcc1">
+    <dgm:scene3d>
+      <a:camera prst="orthographicFront"/>
+      <a:lightRig rig="threePt" dir="t"/>
+    </dgm:scene3d>
+    <dgm:sp3d/>
+    <dgm:txPr/>
+    <dgm:style>
+      <a:lnRef idx="2">
+        <a:scrgbClr r="0" g="0" b="0"/>
+      </a:lnRef>
+      <a:fillRef idx="1">
+        <a:scrgbClr r="0" g="0" b="0"/>
+      </a:fillRef>
+      <a:effectRef idx="0">
+        <a:scrgbClr r="0" g="0" b="0"/>
+      </a:effectRef>
+      <a:fontRef idx="minor"/>
+    </dgm:style>
+  </dgm:styleLbl>
+  <dgm:styleLbl name="fgAccFollowNode1">
+    <dgm:scene3d>
+      <a:camera prst="orthographicFront"/>
+      <a:lightRig rig="threePt" dir="t"/>
+    </dgm:scene3d>
+    <dgm:sp3d/>
+    <dgm:txPr/>
+    <dgm:style>
+      <a:lnRef idx="2">
+        <a:scrgbClr r="0" g="0" b="0"/>
+      </a:lnRef>
+      <a:fillRef idx="1">
+        <a:scrgbClr r="0" g="0" b="0"/>
+      </a:fillRef>
+      <a:effectRef idx="0">
+        <a:scrgbClr r="0" g="0" b="0"/>
+      </a:effectRef>
+      <a:fontRef idx="minor"/>
+    </dgm:style>
+  </dgm:styleLbl>
+  <dgm:styleLbl name="alignAccFollowNode1">
+    <dgm:scene3d>
+      <a:camera prst="orthographicFront"/>
+      <a:lightRig rig="threePt" dir="t"/>
+    </dgm:scene3d>
+    <dgm:sp3d/>
+    <dgm:txPr/>
+    <dgm:style>
+      <a:lnRef idx="2">
+        <a:scrgbClr r="0" g="0" b="0"/>
+      </a:lnRef>
+      <a:fillRef idx="1">
+        <a:scrgbClr r="0" g="0" b="0"/>
+      </a:fillRef>
+      <a:effectRef idx="0">
+        <a:scrgbClr r="0" g="0" b="0"/>
+      </a:effectRef>
+      <a:fontRef idx="minor"/>
+    </dgm:style>
+  </dgm:styleLbl>
+  <dgm:styleLbl name="bgAccFollowNode1">
+    <dgm:scene3d>
+      <a:camera prst="orthographicFront"/>
+      <a:lightRig rig="threePt" dir="t"/>
+    </dgm:scene3d>
+    <dgm:sp3d/>
+    <dgm:txPr/>
+    <dgm:style>
+      <a:lnRef idx="2">
+        <a:scrgbClr r="0" g="0" b="0"/>
+      </a:lnRef>
+      <a:fillRef idx="1">
+        <a:scrgbClr r="0" g="0" b="0"/>
+      </a:fillRef>
+      <a:effectRef idx="0">
+        <a:scrgbClr r="0" g="0" b="0"/>
+      </a:effectRef>
+      <a:fontRef idx="minor"/>
+    </dgm:style>
+  </dgm:styleLbl>
+  <dgm:styleLbl name="fgAcc0">
+    <dgm:scene3d>
+      <a:camera prst="orthographicFront"/>
+      <a:lightRig rig="threePt" dir="t"/>
+    </dgm:scene3d>
+    <dgm:sp3d/>
+    <dgm:txPr/>
+    <dgm:style>
+      <a:lnRef idx="2">
+        <a:scrgbClr r="0" g="0" b="0"/>
+      </a:lnRef>
+      <a:fillRef idx="1">
+        <a:scrgbClr r="0" g="0" b="0"/>
+      </a:fillRef>
+      <a:effectRef idx="0">
+        <a:scrgbClr r="0" g="0" b="0"/>
+      </a:effectRef>
+      <a:fontRef idx="minor"/>
+    </dgm:style>
+  </dgm:styleLbl>
+  <dgm:styleLbl name="fgAcc2">
+    <dgm:scene3d>
+      <a:camera prst="orthographicFront"/>
+      <a:lightRig rig="threePt" dir="t"/>
+    </dgm:scene3d>
+    <dgm:sp3d/>
+    <dgm:txPr/>
+    <dgm:style>
+      <a:lnRef idx="2">
+        <a:scrgbClr r="0" g="0" b="0"/>
+      </a:lnRef>
+      <a:fillRef idx="1">
+        <a:scrgbClr r="0" g="0" b="0"/>
+      </a:fillRef>
+      <a:effectRef idx="0">
+        <a:scrgbClr r="0" g="0" b="0"/>
+      </a:effectRef>
+      <a:fontRef idx="minor"/>
+    </dgm:style>
+  </dgm:styleLbl>
+  <dgm:styleLbl name="fgAcc3">
+    <dgm:scene3d>
+      <a:camera prst="orthographicFront"/>
+      <a:lightRig rig="threePt" dir="t"/>
+    </dgm:scene3d>
+    <dgm:sp3d/>
+    <dgm:txPr/>
+    <dgm:style>
+      <a:lnRef idx="2">
+        <a:scrgbClr r="0" g="0" b="0"/>
+      </a:lnRef>
+      <a:fillRef idx="1">
+        <a:scrgbClr r="0" g="0" b="0"/>
+      </a:fillRef>
+      <a:effectRef idx="0">
+        <a:scrgbClr r="0" g="0" b="0"/>
+      </a:effectRef>
+      <a:fontRef idx="minor"/>
+    </dgm:style>
+  </dgm:styleLbl>
+  <dgm:styleLbl name="fgAcc4">
+    <dgm:scene3d>
+      <a:camera prst="orthographicFront"/>
+      <a:lightRig rig="threePt" dir="t"/>
+    </dgm:scene3d>
+    <dgm:sp3d/>
+    <dgm:txPr/>
+    <dgm:style>
+      <a:lnRef idx="2">
+        <a:scrgbClr r="0" g="0" b="0"/>
+      </a:lnRef>
+      <a:fillRef idx="1">
+        <a:scrgbClr r="0" g="0" b="0"/>
+      </a:fillRef>
+      <a:effectRef idx="0">
+        <a:scrgbClr r="0" g="0" b="0"/>
+      </a:effectRef>
+      <a:fontRef idx="minor"/>
+    </dgm:style>
+  </dgm:styleLbl>
+  <dgm:styleLbl name="bgShp">
+    <dgm:scene3d>
+      <a:camera prst="orthographicFront"/>
+      <a:lightRig rig="threePt" dir="t"/>
+    </dgm:scene3d>
+    <dgm:sp3d/>
+    <dgm:txPr/>
+    <dgm:style>
+      <a:lnRef idx="0">
+        <a:scrgbClr r="0" g="0" b="0"/>
+      </a:lnRef>
+      <a:fillRef idx="1">
+        <a:scrgbClr r="0" g="0" b="0"/>
+      </a:fillRef>
+      <a:effectRef idx="0">
+        <a:scrgbClr r="0" g="0" b="0"/>
+      </a:effectRef>
+      <a:fontRef idx="minor"/>
+    </dgm:style>
+  </dgm:styleLbl>
+  <dgm:styleLbl name="dkBgShp">
+    <dgm:scene3d>
+      <a:camera prst="orthographicFront"/>
+      <a:lightRig rig="threePt" dir="t"/>
+    </dgm:scene3d>
+    <dgm:sp3d/>
+    <dgm:txPr/>
+    <dgm:style>
+      <a:lnRef idx="0">
+        <a:scrgbClr r="0" g="0" b="0"/>
+      </a:lnRef>
+      <a:fillRef idx="1">
+        <a:scrgbClr r="0" g="0" b="0"/>
+      </a:fillRef>
+      <a:effectRef idx="0">
+        <a:scrgbClr r="0" g="0" b="0"/>
+      </a:effectRef>
+      <a:fontRef idx="minor"/>
+    </dgm:style>
+  </dgm:styleLbl>
+  <dgm:styleLbl name="trBgShp">
+    <dgm:scene3d>
+      <a:camera prst="orthographicFront"/>
+      <a:lightRig rig="threePt" dir="t"/>
+    </dgm:scene3d>
+    <dgm:sp3d/>
+    <dgm:txPr/>
+    <dgm:style>
+      <a:lnRef idx="0">
+        <a:scrgbClr r="0" g="0" b="0"/>
+      </a:lnRef>
+      <a:fillRef idx="1">
+        <a:scrgbClr r="0" g="0" b="0"/>
+      </a:fillRef>
+      <a:effectRef idx="0">
+        <a:scrgbClr r="0" g="0" b="0"/>
+      </a:effectRef>
+      <a:fontRef idx="minor"/>
+    </dgm:style>
+  </dgm:styleLbl>
+  <dgm:styleLbl name="fgShp">
+    <dgm:scene3d>
+      <a:camera prst="orthographicFront"/>
+      <a:lightRig rig="threePt" dir="t"/>
+    </dgm:scene3d>
+    <dgm:sp3d/>
+    <dgm:txPr/>
+    <dgm:style>
+      <a:lnRef idx="2">
+        <a:scrgbClr r="0" g="0" b="0"/>
+      </a:lnRef>
+      <a:fillRef idx="1">
+        <a:scrgbClr r="0" g="0" b="0"/>
+      </a:fillRef>
+      <a:effectRef idx="0">
+        <a:scrgbClr r="0" g="0" b="0"/>
+      </a:effectRef>
+      <a:fontRef idx="minor"/>
+    </dgm:style>
+  </dgm:styleLbl>
+  <dgm:styleLbl name="revTx">
+    <dgm:scene3d>
+      <a:camera prst="orthographicFront"/>
+      <a:lightRig rig="threePt" dir="t"/>
+    </dgm:scene3d>
+    <dgm:sp3d/>
+    <dgm:txPr/>
+    <dgm:style>
+      <a:lnRef idx="0">
+        <a:scrgbClr r="0" g="0" b="0"/>
+      </a:lnRef>
+      <a:fillRef idx="0">
+        <a:scrgbClr r="0" g="0" b="0"/>
+      </a:fillRef>
+      <a:effectRef idx="0">
+        <a:scrgbClr r="0" g="0" b="0"/>
+      </a:effectRef>
+      <a:fontRef idx="minor"/>
+    </dgm:style>
+  </dgm:styleLbl>
+</dgm:styleDef>
 </file>
 
 <file path=ppt/notesMasters/notesMaster1.xml><?xml version="1.0" encoding="utf-8"?>
@@ -13863,8 +16830,8 @@
           </a:p>
         </p:txBody>
       </p:sp>
-      <mc:AlternateContent xmlns:mc="http://schemas.openxmlformats.org/markup-compatibility/2006">
-        <mc:Choice xmlns:a14="http://schemas.microsoft.com/office/drawing/2010/main" Requires="a14">
+      <mc:AlternateContent xmlns:mc="http://schemas.openxmlformats.org/markup-compatibility/2006" xmlns:a14="http://schemas.microsoft.com/office/drawing/2010/main">
+        <mc:Choice Requires="a14">
           <p:sp>
             <p:nvSpPr>
               <p:cNvPr id="203" name="Google Shape;203;p17"/>
@@ -14321,7 +17288,7 @@
             </p:txBody>
           </p:sp>
         </mc:Choice>
-        <mc:Fallback>
+        <mc:Fallback xmlns="">
           <p:sp>
             <p:nvSpPr>
               <p:cNvPr id="203" name="Google Shape;203;p17"/>
@@ -29333,7 +32300,14 @@
             </a:pPr>
             <a:r>
               <a:rPr lang="en-US" dirty="0"/>
-              <a:t>investigate data structure (unsupervised ML).</a:t>
+              <a:t>investigate data structure </a:t>
+            </a:r>
+            <a:br>
+              <a:rPr lang="en-US" dirty="0"/>
+            </a:br>
+            <a:r>
+              <a:rPr lang="en-US" dirty="0"/>
+              <a:t>(unsupervised ML).</a:t>
             </a:r>
           </a:p>
           <a:p>
@@ -29396,6 +32370,69 @@
               <a:t>4</a:t>
             </a:fld>
             <a:endParaRPr dirty="0"/>
+          </a:p>
+        </p:txBody>
+      </p:sp>
+      <p:graphicFrame>
+        <p:nvGraphicFramePr>
+          <p:cNvPr id="3" name="Diagramm 2">
+            <a:extLst>
+              <a:ext uri="{FF2B5EF4-FFF2-40B4-BE49-F238E27FC236}">
+                <a16:creationId xmlns:a16="http://schemas.microsoft.com/office/drawing/2014/main" id="{35CA5023-5AC8-4653-9A92-55CEFF3FB3E3}"/>
+              </a:ext>
+            </a:extLst>
+          </p:cNvPr>
+          <p:cNvGraphicFramePr/>
+          <p:nvPr>
+            <p:extLst>
+              <p:ext uri="{D42A27DB-BD31-4B8C-83A1-F6EECF244321}">
+                <p14:modId xmlns:p14="http://schemas.microsoft.com/office/powerpoint/2010/main" val="3288396902"/>
+              </p:ext>
+            </p:extLst>
+          </p:nvPr>
+        </p:nvGraphicFramePr>
+        <p:xfrm>
+          <a:off x="4952102" y="2470431"/>
+          <a:ext cx="2500257" cy="1827894"/>
+        </p:xfrm>
+        <a:graphic>
+          <a:graphicData uri="http://schemas.openxmlformats.org/drawingml/2006/diagram">
+            <dgm:relIds xmlns:dgm="http://schemas.openxmlformats.org/drawingml/2006/diagram" xmlns:r="http://schemas.openxmlformats.org/officeDocument/2006/relationships" r:dm="rId3" r:lo="rId4" r:qs="rId5" r:cs="rId6"/>
+          </a:graphicData>
+        </a:graphic>
+      </p:graphicFrame>
+      <p:sp>
+        <p:nvSpPr>
+          <p:cNvPr id="4" name="Textfeld 3">
+            <a:extLst>
+              <a:ext uri="{FF2B5EF4-FFF2-40B4-BE49-F238E27FC236}">
+                <a16:creationId xmlns:a16="http://schemas.microsoft.com/office/drawing/2014/main" id="{72D3B592-68AF-4311-967B-7D35A319FD85}"/>
+              </a:ext>
+            </a:extLst>
+          </p:cNvPr>
+          <p:cNvSpPr txBox="1"/>
+          <p:nvPr/>
+        </p:nvSpPr>
+        <p:spPr>
+          <a:xfrm>
+            <a:off x="5904603" y="3245878"/>
+            <a:ext cx="397866" cy="276999"/>
+          </a:xfrm>
+          <a:prstGeom prst="rect">
+            <a:avLst/>
+          </a:prstGeom>
+          <a:noFill/>
+        </p:spPr>
+        <p:txBody>
+          <a:bodyPr wrap="none" rtlCol="0">
+            <a:spAutoFit/>
+          </a:bodyPr>
+          <a:lstStyle/>
+          <a:p>
+            <a:r>
+              <a:rPr lang="de-CH" sz="1200" dirty="0"/>
+              <a:t>ML</a:t>
+            </a:r>
           </a:p>
         </p:txBody>
       </p:sp>

</xml_diff>

<commit_message>
add Michael's analysis scheme X
</commit_message>
<xml_diff>
--- a/slides/ML_Lecture.pptx
+++ b/slides/ML_Lecture.pptx
@@ -5,7 +5,7 @@
     <p:sldMasterId id="2147483658" r:id="rId1"/>
   </p:sldMasterIdLst>
   <p:notesMasterIdLst>
-    <p:notesMasterId r:id="rId67"/>
+    <p:notesMasterId r:id="rId68"/>
   </p:notesMasterIdLst>
   <p:sldIdLst>
     <p:sldId id="256" r:id="rId2"/>
@@ -73,32 +73,33 @@
     <p:sldId id="336" r:id="rId64"/>
     <p:sldId id="337" r:id="rId65"/>
     <p:sldId id="338" r:id="rId66"/>
+    <p:sldId id="354" r:id="rId67"/>
   </p:sldIdLst>
   <p:sldSz cx="9144000" cy="5143500" type="screen16x9"/>
   <p:notesSz cx="6858000" cy="9144000"/>
   <p:embeddedFontLst>
     <p:embeddedFont>
       <p:font typeface="Cambria Math" panose="02040503050406030204" pitchFamily="18" charset="0"/>
-      <p:regular r:id="rId68"/>
+      <p:regular r:id="rId69"/>
     </p:embeddedFont>
     <p:embeddedFont>
       <p:font typeface="Consolas" panose="020B0609020204030204" pitchFamily="49" charset="0"/>
-      <p:regular r:id="rId69"/>
-      <p:bold r:id="rId70"/>
-      <p:italic r:id="rId71"/>
-      <p:boldItalic r:id="rId72"/>
+      <p:regular r:id="rId70"/>
+      <p:bold r:id="rId71"/>
+      <p:italic r:id="rId72"/>
+      <p:boldItalic r:id="rId73"/>
     </p:embeddedFont>
     <p:embeddedFont>
       <p:font typeface="Oswald" panose="00000500000000000000" pitchFamily="2" charset="0"/>
-      <p:regular r:id="rId73"/>
-      <p:bold r:id="rId74"/>
+      <p:regular r:id="rId74"/>
+      <p:bold r:id="rId75"/>
     </p:embeddedFont>
     <p:embeddedFont>
       <p:font typeface="Roboto Condensed" panose="02000000000000000000" pitchFamily="2" charset="0"/>
-      <p:regular r:id="rId75"/>
-      <p:bold r:id="rId76"/>
-      <p:italic r:id="rId77"/>
-      <p:boldItalic r:id="rId78"/>
+      <p:regular r:id="rId76"/>
+      <p:bold r:id="rId77"/>
+      <p:italic r:id="rId78"/>
+      <p:boldItalic r:id="rId79"/>
     </p:embeddedFont>
   </p:embeddedFontLst>
   <p:defaultTextStyle>
@@ -10494,6 +10495,115 @@
 </p:notes>
 </file>
 
+<file path=ppt/notesSlides/notesSlide66.xml><?xml version="1.0" encoding="utf-8"?>
+<p:notes xmlns:a="http://schemas.openxmlformats.org/drawingml/2006/main" xmlns:r="http://schemas.openxmlformats.org/officeDocument/2006/relationships" xmlns:p="http://schemas.openxmlformats.org/presentationml/2006/main" showMasterSp="0" showMasterPhAnim="0">
+  <p:cSld>
+    <p:spTree>
+      <p:nvGrpSpPr>
+        <p:cNvPr id="1" name="Shape 198"/>
+        <p:cNvGrpSpPr/>
+        <p:nvPr/>
+      </p:nvGrpSpPr>
+      <p:grpSpPr>
+        <a:xfrm>
+          <a:off x="0" y="0"/>
+          <a:ext cx="0" cy="0"/>
+          <a:chOff x="0" y="0"/>
+          <a:chExt cx="0" cy="0"/>
+        </a:xfrm>
+      </p:grpSpPr>
+      <p:sp>
+        <p:nvSpPr>
+          <p:cNvPr id="199" name="Google Shape;199;p:notes"/>
+          <p:cNvSpPr>
+            <a:spLocks noGrp="1" noRot="1" noChangeAspect="1"/>
+          </p:cNvSpPr>
+          <p:nvPr>
+            <p:ph type="sldImg" idx="2"/>
+          </p:nvPr>
+        </p:nvSpPr>
+        <p:spPr>
+          <a:xfrm>
+            <a:off x="381000" y="685800"/>
+            <a:ext cx="6096000" cy="3429000"/>
+          </a:xfrm>
+          <a:custGeom>
+            <a:avLst/>
+            <a:gdLst/>
+            <a:ahLst/>
+            <a:cxnLst/>
+            <a:rect l="l" t="t" r="r" b="b"/>
+            <a:pathLst>
+              <a:path w="120000" h="120000" extrusionOk="0">
+                <a:moveTo>
+                  <a:pt x="0" y="0"/>
+                </a:moveTo>
+                <a:lnTo>
+                  <a:pt x="120000" y="0"/>
+                </a:lnTo>
+                <a:lnTo>
+                  <a:pt x="120000" y="120000"/>
+                </a:lnTo>
+                <a:lnTo>
+                  <a:pt x="0" y="120000"/>
+                </a:lnTo>
+                <a:close/>
+              </a:path>
+            </a:pathLst>
+          </a:custGeom>
+        </p:spPr>
+      </p:sp>
+      <p:sp>
+        <p:nvSpPr>
+          <p:cNvPr id="200" name="Google Shape;200;p:notes"/>
+          <p:cNvSpPr txBox="1">
+            <a:spLocks noGrp="1"/>
+          </p:cNvSpPr>
+          <p:nvPr>
+            <p:ph type="body" idx="1"/>
+          </p:nvPr>
+        </p:nvSpPr>
+        <p:spPr>
+          <a:xfrm>
+            <a:off x="685800" y="4343400"/>
+            <a:ext cx="5486400" cy="4114800"/>
+          </a:xfrm>
+          <a:prstGeom prst="rect">
+            <a:avLst/>
+          </a:prstGeom>
+        </p:spPr>
+        <p:txBody>
+          <a:bodyPr spcFirstLastPara="1" wrap="square" lIns="91425" tIns="91425" rIns="91425" bIns="91425" anchor="t" anchorCtr="0">
+            <a:noAutofit/>
+          </a:bodyPr>
+          <a:lstStyle/>
+          <a:p>
+            <a:pPr marL="0" lvl="0" indent="0" algn="l" rtl="0">
+              <a:spcBef>
+                <a:spcPts val="0"/>
+              </a:spcBef>
+              <a:spcAft>
+                <a:spcPts val="0"/>
+              </a:spcAft>
+              <a:buNone/>
+            </a:pPr>
+            <a:endParaRPr/>
+          </a:p>
+        </p:txBody>
+      </p:sp>
+    </p:spTree>
+    <p:extLst>
+      <p:ext uri="{BB962C8B-B14F-4D97-AF65-F5344CB8AC3E}">
+        <p14:creationId xmlns:p14="http://schemas.microsoft.com/office/powerpoint/2010/main" val="518814602"/>
+      </p:ext>
+    </p:extLst>
+  </p:cSld>
+  <p:clrMapOvr>
+    <a:masterClrMapping/>
+  </p:clrMapOvr>
+</p:notes>
+</file>
+
 <file path=ppt/notesSlides/notesSlide7.xml><?xml version="1.0" encoding="utf-8"?>
 <p:notes xmlns:a="http://schemas.openxmlformats.org/drawingml/2006/main" xmlns:r="http://schemas.openxmlformats.org/officeDocument/2006/relationships" xmlns:p="http://schemas.openxmlformats.org/presentationml/2006/main" showMasterSp="0" showMasterPhAnim="0">
   <p:cSld>
@@ -55060,6 +55170,1073 @@
 </p:sld>
 </file>
 
+<file path=ppt/slides/slide66.xml><?xml version="1.0" encoding="utf-8"?>
+<p:sld xmlns:a="http://schemas.openxmlformats.org/drawingml/2006/main" xmlns:r="http://schemas.openxmlformats.org/officeDocument/2006/relationships" xmlns:p="http://schemas.openxmlformats.org/presentationml/2006/main">
+  <p:cSld>
+    <p:spTree>
+      <p:nvGrpSpPr>
+        <p:cNvPr id="1" name="Shape 201"/>
+        <p:cNvGrpSpPr/>
+        <p:nvPr/>
+      </p:nvGrpSpPr>
+      <p:grpSpPr>
+        <a:xfrm>
+          <a:off x="0" y="0"/>
+          <a:ext cx="0" cy="0"/>
+          <a:chOff x="0" y="0"/>
+          <a:chExt cx="0" cy="0"/>
+        </a:xfrm>
+      </p:grpSpPr>
+      <p:sp>
+        <p:nvSpPr>
+          <p:cNvPr id="202" name="Google Shape;202;p17"/>
+          <p:cNvSpPr txBox="1">
+            <a:spLocks noGrp="1"/>
+          </p:cNvSpPr>
+          <p:nvPr>
+            <p:ph type="title"/>
+          </p:nvPr>
+        </p:nvSpPr>
+        <p:spPr>
+          <a:xfrm>
+            <a:off x="1031425" y="1149725"/>
+            <a:ext cx="5760300" cy="680700"/>
+          </a:xfrm>
+          <a:prstGeom prst="rect">
+            <a:avLst/>
+          </a:prstGeom>
+        </p:spPr>
+        <p:txBody>
+          <a:bodyPr spcFirstLastPara="1" wrap="square" lIns="91425" tIns="91425" rIns="91425" bIns="91425" anchor="b" anchorCtr="0">
+            <a:noAutofit/>
+          </a:bodyPr>
+          <a:lstStyle/>
+          <a:p>
+            <a:r>
+              <a:rPr lang="en-US" dirty="0"/>
+              <a:t>“Michael’s Analysis Scheme X”</a:t>
+            </a:r>
+            <a:endParaRPr dirty="0"/>
+          </a:p>
+        </p:txBody>
+      </p:sp>
+      <mc:AlternateContent xmlns:mc="http://schemas.openxmlformats.org/markup-compatibility/2006">
+        <mc:Choice xmlns:a14="http://schemas.microsoft.com/office/drawing/2010/main" Requires="a14">
+          <p:sp>
+            <p:nvSpPr>
+              <p:cNvPr id="203" name="Google Shape;203;p17"/>
+              <p:cNvSpPr txBox="1">
+                <a:spLocks noGrp="1"/>
+              </p:cNvSpPr>
+              <p:nvPr>
+                <p:ph type="body" idx="1"/>
+              </p:nvPr>
+            </p:nvSpPr>
+            <p:spPr>
+              <a:xfrm>
+                <a:off x="1031425" y="1777125"/>
+                <a:ext cx="6126826" cy="2861620"/>
+              </a:xfrm>
+              <a:prstGeom prst="rect">
+                <a:avLst/>
+              </a:prstGeom>
+            </p:spPr>
+            <p:txBody>
+              <a:bodyPr spcFirstLastPara="1" wrap="square" lIns="91425" tIns="91425" rIns="91425" bIns="91425" anchor="t" anchorCtr="0">
+                <a:noAutofit/>
+              </a:bodyPr>
+              <a:lstStyle/>
+              <a:p>
+                <a:pPr marL="558800" indent="-457200">
+                  <a:buFont typeface="+mj-lt"/>
+                  <a:buAutoNum type="arabicPeriod"/>
+                </a:pPr>
+                <a:r>
+                  <a:rPr lang="de-CH" sz="1600" dirty="0"/>
+                  <a:t>Take </a:t>
+                </a:r>
+                <a:r>
+                  <a:rPr lang="de-CH" sz="1600" dirty="0" err="1"/>
+                  <a:t>any</a:t>
+                </a:r>
+                <a:r>
+                  <a:rPr lang="de-CH" sz="1600" dirty="0"/>
+                  <a:t> </a:t>
+                </a:r>
+                <a:r>
+                  <a:rPr lang="de-CH" sz="1600" dirty="0" err="1"/>
+                  <a:t>property</a:t>
+                </a:r>
+                <a:r>
+                  <a:rPr lang="de-CH" sz="1600" dirty="0"/>
+                  <a:t> </a:t>
+                </a:r>
+                <a14:m>
+                  <m:oMath xmlns:m="http://schemas.openxmlformats.org/officeDocument/2006/math">
+                    <m:r>
+                      <a:rPr lang="de-CH" sz="1600" b="0" i="1" smtClean="0">
+                        <a:latin typeface="Cambria Math" panose="02040503050406030204" pitchFamily="18" charset="0"/>
+                      </a:rPr>
+                      <m:t>𝑇</m:t>
+                    </m:r>
+                    <m:r>
+                      <a:rPr lang="de-CH" sz="1600" b="0" i="1" smtClean="0">
+                        <a:latin typeface="Cambria Math" panose="02040503050406030204" pitchFamily="18" charset="0"/>
+                      </a:rPr>
+                      <m:t>(</m:t>
+                    </m:r>
+                    <m:r>
+                      <a:rPr lang="de-CH" sz="1600" b="0" i="1" smtClean="0">
+                        <a:latin typeface="Cambria Math" panose="02040503050406030204" pitchFamily="18" charset="0"/>
+                      </a:rPr>
+                      <m:t>𝑌</m:t>
+                    </m:r>
+                    <m:r>
+                      <a:rPr lang="de-CH" sz="1600" b="0" i="1" smtClean="0">
+                        <a:latin typeface="Cambria Math" panose="02040503050406030204" pitchFamily="18" charset="0"/>
+                      </a:rPr>
+                      <m:t>)</m:t>
+                    </m:r>
+                  </m:oMath>
+                </a14:m>
+                <a:r>
+                  <a:rPr lang="de-CH" sz="1600" dirty="0"/>
+                  <a:t> </a:t>
+                </a:r>
+                <a:r>
+                  <a:rPr lang="de-CH" sz="1600" dirty="0" err="1"/>
+                  <a:t>of</a:t>
+                </a:r>
+                <a:r>
+                  <a:rPr lang="de-CH" sz="1600" dirty="0"/>
+                  <a:t> </a:t>
+                </a:r>
+                <a:r>
+                  <a:rPr lang="de-CH" sz="1600" dirty="0" err="1"/>
+                  <a:t>key</a:t>
+                </a:r>
+                <a:r>
+                  <a:rPr lang="de-CH" sz="1600" dirty="0"/>
+                  <a:t> </a:t>
+                </a:r>
+                <a:r>
+                  <a:rPr lang="de-CH" sz="1600" dirty="0" err="1"/>
+                  <a:t>interest</a:t>
+                </a:r>
+                <a:r>
+                  <a:rPr lang="de-CH" sz="1600" dirty="0"/>
+                  <a:t> (</a:t>
+                </a:r>
+                <a:r>
+                  <a:rPr lang="de-CH" sz="1600" dirty="0" err="1"/>
+                  <a:t>churn</a:t>
+                </a:r>
+                <a:r>
+                  <a:rPr lang="de-CH" sz="1600" dirty="0"/>
+                  <a:t> rate, </a:t>
+                </a:r>
+                <a:r>
+                  <a:rPr lang="de-CH" sz="1600" dirty="0" err="1"/>
+                  <a:t>claims</a:t>
+                </a:r>
+                <a:r>
+                  <a:rPr lang="de-CH" sz="1600" dirty="0"/>
+                  <a:t> </a:t>
+                </a:r>
+                <a:r>
+                  <a:rPr lang="de-CH" sz="1600" dirty="0" err="1"/>
+                  <a:t>frequency</a:t>
+                </a:r>
+                <a:r>
+                  <a:rPr lang="de-CH" sz="1600" dirty="0"/>
+                  <a:t>, </a:t>
+                </a:r>
+                <a:r>
+                  <a:rPr lang="de-CH" sz="1600" dirty="0" err="1"/>
+                  <a:t>loss</a:t>
+                </a:r>
+                <a:r>
+                  <a:rPr lang="de-CH" sz="1600" dirty="0"/>
+                  <a:t> </a:t>
+                </a:r>
+                <a:r>
+                  <a:rPr lang="de-CH" sz="1600" dirty="0" err="1"/>
+                  <a:t>ratio</a:t>
+                </a:r>
+                <a:r>
+                  <a:rPr lang="de-CH" sz="1600" dirty="0"/>
+                  <a:t>, …) and </a:t>
+                </a:r>
+                <a:r>
+                  <a:rPr lang="de-CH" sz="1600" dirty="0" err="1"/>
+                  <a:t>calculate</a:t>
+                </a:r>
+                <a:r>
+                  <a:rPr lang="de-CH" sz="1600" dirty="0"/>
+                  <a:t> </a:t>
+                </a:r>
+                <a:r>
+                  <a:rPr lang="de-CH" sz="1600" dirty="0" err="1"/>
+                  <a:t>its</a:t>
+                </a:r>
+                <a:r>
+                  <a:rPr lang="de-CH" sz="1600" dirty="0"/>
+                  <a:t> </a:t>
+                </a:r>
+                <a:r>
+                  <a:rPr lang="de-CH" sz="1600" dirty="0" err="1"/>
+                  <a:t>value</a:t>
+                </a:r>
+                <a:r>
+                  <a:rPr lang="de-CH" sz="1600" dirty="0"/>
+                  <a:t> on </a:t>
+                </a:r>
+                <a:r>
+                  <a:rPr lang="de-CH" sz="1600" dirty="0" err="1"/>
+                  <a:t>the</a:t>
+                </a:r>
+                <a:r>
+                  <a:rPr lang="de-CH" sz="1600" dirty="0"/>
+                  <a:t> </a:t>
+                </a:r>
+                <a:r>
+                  <a:rPr lang="de-CH" sz="1600" dirty="0" err="1"/>
+                  <a:t>full</a:t>
+                </a:r>
+                <a:r>
+                  <a:rPr lang="de-CH" sz="1600" dirty="0"/>
+                  <a:t> </a:t>
+                </a:r>
+                <a:r>
+                  <a:rPr lang="de-CH" sz="1600" dirty="0" err="1"/>
+                  <a:t>dataset</a:t>
+                </a:r>
+                <a:r>
+                  <a:rPr lang="de-CH" sz="1600" dirty="0"/>
+                  <a:t>.</a:t>
+                </a:r>
+              </a:p>
+              <a:p>
+                <a:pPr marL="558800" indent="-457200">
+                  <a:buFont typeface="+mj-lt"/>
+                  <a:buAutoNum type="arabicPeriod"/>
+                </a:pPr>
+                <a:r>
+                  <a:rPr lang="de-CH" sz="1600" dirty="0"/>
+                  <a:t>Do a </a:t>
+                </a:r>
+                <a:r>
+                  <a:rPr lang="de-CH" sz="1600" dirty="0" err="1"/>
+                  <a:t>descriptive</a:t>
+                </a:r>
+                <a:r>
+                  <a:rPr lang="de-CH" sz="1600" dirty="0"/>
+                  <a:t> </a:t>
+                </a:r>
+                <a:r>
+                  <a:rPr lang="de-CH" sz="1600" dirty="0" err="1"/>
+                  <a:t>analysis</a:t>
+                </a:r>
+                <a:r>
+                  <a:rPr lang="de-CH" sz="1600" dirty="0"/>
+                  <a:t> </a:t>
+                </a:r>
+                <a:r>
+                  <a:rPr lang="de-CH" sz="1600" dirty="0" err="1"/>
+                  <a:t>of</a:t>
+                </a:r>
+                <a:r>
+                  <a:rPr lang="de-CH" sz="1600" dirty="0"/>
+                  <a:t> </a:t>
+                </a:r>
+                <a14:m>
+                  <m:oMath xmlns:m="http://schemas.openxmlformats.org/officeDocument/2006/math">
+                    <m:r>
+                      <a:rPr lang="de-CH" sz="1600" b="0" i="1" smtClean="0">
+                        <a:latin typeface="Cambria Math" panose="02040503050406030204" pitchFamily="18" charset="0"/>
+                      </a:rPr>
+                      <m:t>𝑇</m:t>
+                    </m:r>
+                    <m:r>
+                      <a:rPr lang="de-CH" sz="1600" b="0" i="1" smtClean="0">
+                        <a:latin typeface="Cambria Math" panose="02040503050406030204" pitchFamily="18" charset="0"/>
+                      </a:rPr>
+                      <m:t>(</m:t>
+                    </m:r>
+                    <m:r>
+                      <a:rPr lang="de-CH" sz="1600" b="0" i="1" smtClean="0">
+                        <a:latin typeface="Cambria Math" panose="02040503050406030204" pitchFamily="18" charset="0"/>
+                      </a:rPr>
+                      <m:t>𝑌</m:t>
+                    </m:r>
+                    <m:r>
+                      <a:rPr lang="de-CH" sz="1600" b="0" i="1" smtClean="0">
+                        <a:latin typeface="Cambria Math" panose="02040503050406030204" pitchFamily="18" charset="0"/>
+                      </a:rPr>
+                      <m:t>∣</m:t>
+                    </m:r>
+                    <m:sSub>
+                      <m:sSubPr>
+                        <m:ctrlPr>
+                          <a:rPr lang="de-CH" sz="1600" b="0" i="1" smtClean="0">
+                            <a:latin typeface="Cambria Math" panose="02040503050406030204" pitchFamily="18" charset="0"/>
+                          </a:rPr>
+                        </m:ctrlPr>
+                      </m:sSubPr>
+                      <m:e>
+                        <m:r>
+                          <a:rPr lang="de-CH" sz="1600" b="0" i="1" smtClean="0">
+                            <a:latin typeface="Cambria Math" panose="02040503050406030204" pitchFamily="18" charset="0"/>
+                          </a:rPr>
+                          <m:t>𝑋</m:t>
+                        </m:r>
+                      </m:e>
+                      <m:sub>
+                        <m:r>
+                          <a:rPr lang="de-CH" sz="1600" b="0" i="1" smtClean="0">
+                            <a:latin typeface="Cambria Math" panose="02040503050406030204" pitchFamily="18" charset="0"/>
+                          </a:rPr>
+                          <m:t>𝑗</m:t>
+                        </m:r>
+                      </m:sub>
+                    </m:sSub>
+                    <m:r>
+                      <a:rPr lang="de-CH" sz="1600" b="0" i="1" smtClean="0">
+                        <a:latin typeface="Cambria Math" panose="02040503050406030204" pitchFamily="18" charset="0"/>
+                      </a:rPr>
+                      <m:t>)</m:t>
+                    </m:r>
+                  </m:oMath>
+                </a14:m>
+                <a:r>
+                  <a:rPr lang="de-CH" sz="1600" dirty="0"/>
+                  <a:t> </a:t>
+                </a:r>
+                <a:r>
+                  <a:rPr lang="de-CH" sz="1600" dirty="0" err="1"/>
+                  <a:t>for</a:t>
+                </a:r>
+                <a:r>
+                  <a:rPr lang="de-CH" sz="1600" dirty="0"/>
+                  <a:t> a </a:t>
+                </a:r>
+                <a:r>
+                  <a:rPr lang="de-CH" sz="1600" dirty="0" err="1"/>
+                  <a:t>couple</a:t>
+                </a:r>
+                <a:r>
+                  <a:rPr lang="de-CH" sz="1600" dirty="0"/>
+                  <a:t> </a:t>
+                </a:r>
+                <a:r>
+                  <a:rPr lang="de-CH" sz="1600" dirty="0" err="1"/>
+                  <a:t>of</a:t>
+                </a:r>
+                <a:r>
+                  <a:rPr lang="de-CH" sz="1600" dirty="0"/>
+                  <a:t> </a:t>
+                </a:r>
+                <a:r>
+                  <a:rPr lang="de-CH" sz="1600" dirty="0" err="1"/>
+                  <a:t>covariates</a:t>
+                </a:r>
+                <a:r>
+                  <a:rPr lang="de-CH" sz="1600" dirty="0"/>
+                  <a:t> </a:t>
+                </a:r>
+                <a:r>
+                  <a:rPr lang="de-CH" sz="1600" dirty="0" err="1"/>
+                  <a:t>to</a:t>
+                </a:r>
+                <a:r>
+                  <a:rPr lang="de-CH" sz="1600" dirty="0"/>
+                  <a:t> </a:t>
+                </a:r>
+                <a:r>
+                  <a:rPr lang="de-CH" sz="1600" dirty="0" err="1"/>
+                  <a:t>study</a:t>
+                </a:r>
+                <a:r>
+                  <a:rPr lang="de-CH" sz="1600" dirty="0"/>
+                  <a:t> </a:t>
+                </a:r>
+                <a:r>
+                  <a:rPr lang="de-CH" sz="1600" dirty="0" err="1"/>
+                  <a:t>the</a:t>
+                </a:r>
+                <a:r>
+                  <a:rPr lang="de-CH" sz="1600" dirty="0"/>
+                  <a:t> bivariate </a:t>
+                </a:r>
+                <a:r>
+                  <a:rPr lang="de-CH" sz="1600" dirty="0" err="1"/>
+                  <a:t>association</a:t>
+                </a:r>
+                <a:r>
+                  <a:rPr lang="de-CH" sz="1600" dirty="0"/>
+                  <a:t> </a:t>
+                </a:r>
+                <a:r>
+                  <a:rPr lang="de-CH" sz="1600" dirty="0" err="1"/>
+                  <a:t>between</a:t>
+                </a:r>
+                <a:r>
+                  <a:rPr lang="de-CH" sz="1600" dirty="0"/>
+                  <a:t> </a:t>
+                </a:r>
+                <a14:m>
+                  <m:oMath xmlns:m="http://schemas.openxmlformats.org/officeDocument/2006/math">
+                    <m:r>
+                      <a:rPr lang="de-CH" sz="1600" i="1">
+                        <a:latin typeface="Cambria Math" panose="02040503050406030204" pitchFamily="18" charset="0"/>
+                      </a:rPr>
+                      <m:t>𝑌</m:t>
+                    </m:r>
+                  </m:oMath>
+                </a14:m>
+                <a:r>
+                  <a:rPr lang="de-CH" sz="1600" dirty="0"/>
+                  <a:t> and </a:t>
+                </a:r>
+                <a:r>
+                  <a:rPr lang="de-CH" sz="1600" dirty="0" err="1"/>
+                  <a:t>each</a:t>
+                </a:r>
+                <a:r>
+                  <a:rPr lang="de-CH" sz="1600" dirty="0"/>
+                  <a:t> </a:t>
+                </a:r>
+                <a14:m>
+                  <m:oMath xmlns:m="http://schemas.openxmlformats.org/officeDocument/2006/math">
+                    <m:sSub>
+                      <m:sSubPr>
+                        <m:ctrlPr>
+                          <a:rPr lang="de-CH" sz="1600" i="1">
+                            <a:latin typeface="Cambria Math" panose="02040503050406030204" pitchFamily="18" charset="0"/>
+                          </a:rPr>
+                        </m:ctrlPr>
+                      </m:sSubPr>
+                      <m:e>
+                        <m:r>
+                          <a:rPr lang="de-CH" sz="1600" i="1">
+                            <a:latin typeface="Cambria Math" panose="02040503050406030204" pitchFamily="18" charset="0"/>
+                          </a:rPr>
+                          <m:t>𝑋</m:t>
+                        </m:r>
+                      </m:e>
+                      <m:sub>
+                        <m:r>
+                          <a:rPr lang="de-CH" sz="1600" i="1">
+                            <a:latin typeface="Cambria Math" panose="02040503050406030204" pitchFamily="18" charset="0"/>
+                          </a:rPr>
+                          <m:t>𝑗</m:t>
+                        </m:r>
+                      </m:sub>
+                    </m:sSub>
+                  </m:oMath>
+                </a14:m>
+                <a:r>
+                  <a:rPr lang="de-CH" sz="1600" dirty="0"/>
+                  <a:t> separately.</a:t>
+                </a:r>
+              </a:p>
+              <a:p>
+                <a:pPr marL="558800" indent="-457200">
+                  <a:buFont typeface="+mj-lt"/>
+                  <a:buAutoNum type="arabicPeriod"/>
+                </a:pPr>
+                <a:r>
+                  <a:rPr lang="de-CH" sz="1600" dirty="0" err="1"/>
+                  <a:t>Accompany</a:t>
+                </a:r>
+                <a:r>
+                  <a:rPr lang="de-CH" sz="1600" dirty="0"/>
+                  <a:t> </a:t>
+                </a:r>
+                <a:r>
+                  <a:rPr lang="de-CH" sz="1600" dirty="0" err="1"/>
+                  <a:t>Step</a:t>
+                </a:r>
+                <a:r>
+                  <a:rPr lang="de-CH" sz="1600" dirty="0"/>
+                  <a:t> 2 </a:t>
+                </a:r>
+                <a:r>
+                  <a:rPr lang="de-CH" sz="1600" dirty="0" err="1"/>
+                  <a:t>by</a:t>
+                </a:r>
+                <a:r>
+                  <a:rPr lang="de-CH" sz="1600" dirty="0"/>
+                  <a:t> ML </a:t>
+                </a:r>
+                <a:r>
+                  <a:rPr lang="de-CH" sz="1600" dirty="0" err="1"/>
+                  <a:t>model</a:t>
+                </a:r>
+                <a:r>
+                  <a:rPr lang="de-CH" sz="1600" dirty="0"/>
+                  <a:t> </a:t>
+                </a:r>
+                <a14:m>
+                  <m:oMath xmlns:m="http://schemas.openxmlformats.org/officeDocument/2006/math">
+                    <m:r>
+                      <a:rPr lang="de-CH" sz="1600" b="0" i="1" smtClean="0">
+                        <a:latin typeface="Cambria Math" panose="02040503050406030204" pitchFamily="18" charset="0"/>
+                      </a:rPr>
+                      <m:t>𝑇</m:t>
+                    </m:r>
+                    <m:d>
+                      <m:dPr>
+                        <m:sepChr m:val="∣"/>
+                        <m:ctrlPr>
+                          <a:rPr lang="de-CH" sz="1600" b="0" i="1" smtClean="0">
+                            <a:latin typeface="Cambria Math" panose="02040503050406030204" pitchFamily="18" charset="0"/>
+                          </a:rPr>
+                        </m:ctrlPr>
+                      </m:dPr>
+                      <m:e>
+                        <m:r>
+                          <a:rPr lang="de-CH" sz="1600" b="0" i="1" smtClean="0">
+                            <a:latin typeface="Cambria Math" panose="02040503050406030204" pitchFamily="18" charset="0"/>
+                          </a:rPr>
+                          <m:t>𝑌</m:t>
+                        </m:r>
+                      </m:e>
+                      <m:e>
+                        <m:sSub>
+                          <m:sSubPr>
+                            <m:ctrlPr>
+                              <a:rPr lang="de-CH" sz="1600" i="1">
+                                <a:latin typeface="Cambria Math" panose="02040503050406030204" pitchFamily="18" charset="0"/>
+                              </a:rPr>
+                            </m:ctrlPr>
+                          </m:sSubPr>
+                          <m:e>
+                            <m:r>
+                              <a:rPr lang="de-CH" sz="1600" i="1">
+                                <a:latin typeface="Cambria Math" panose="02040503050406030204" pitchFamily="18" charset="0"/>
+                              </a:rPr>
+                              <m:t>𝑋</m:t>
+                            </m:r>
+                          </m:e>
+                          <m:sub>
+                            <m:r>
+                              <a:rPr lang="de-CH" sz="1600" i="1">
+                                <a:latin typeface="Cambria Math" panose="02040503050406030204" pitchFamily="18" charset="0"/>
+                              </a:rPr>
+                              <m:t>1</m:t>
+                            </m:r>
+                          </m:sub>
+                        </m:sSub>
+                        <m:r>
+                          <a:rPr lang="de-CH" sz="1600" i="1">
+                            <a:latin typeface="Cambria Math" panose="02040503050406030204" pitchFamily="18" charset="0"/>
+                          </a:rPr>
+                          <m:t>,…, </m:t>
+                        </m:r>
+                        <m:sSub>
+                          <m:sSubPr>
+                            <m:ctrlPr>
+                              <a:rPr lang="de-CH" sz="1600" i="1">
+                                <a:latin typeface="Cambria Math" panose="02040503050406030204" pitchFamily="18" charset="0"/>
+                              </a:rPr>
+                            </m:ctrlPr>
+                          </m:sSubPr>
+                          <m:e>
+                            <m:r>
+                              <a:rPr lang="de-CH" sz="1600" i="1">
+                                <a:latin typeface="Cambria Math" panose="02040503050406030204" pitchFamily="18" charset="0"/>
+                              </a:rPr>
+                              <m:t>𝑋</m:t>
+                            </m:r>
+                          </m:e>
+                          <m:sub>
+                            <m:r>
+                              <a:rPr lang="de-CH" sz="1600" i="1">
+                                <a:latin typeface="Cambria Math" panose="02040503050406030204" pitchFamily="18" charset="0"/>
+                              </a:rPr>
+                              <m:t>𝑝</m:t>
+                            </m:r>
+                          </m:sub>
+                        </m:sSub>
+                      </m:e>
+                    </m:d>
+                    <m:r>
+                      <a:rPr lang="de-CH" sz="1600" b="0" i="1" smtClean="0">
+                        <a:latin typeface="Cambria Math" panose="02040503050406030204" pitchFamily="18" charset="0"/>
+                      </a:rPr>
+                      <m:t>=</m:t>
+                    </m:r>
+                    <m:r>
+                      <a:rPr lang="de-CH" sz="1600" b="0" i="1" smtClean="0">
+                        <a:latin typeface="Cambria Math" panose="02040503050406030204" pitchFamily="18" charset="0"/>
+                      </a:rPr>
+                      <m:t>𝑓</m:t>
+                    </m:r>
+                    <m:r>
+                      <a:rPr lang="de-CH" sz="1600" b="0" i="1" smtClean="0">
+                        <a:latin typeface="Cambria Math" panose="02040503050406030204" pitchFamily="18" charset="0"/>
+                      </a:rPr>
+                      <m:t>(</m:t>
+                    </m:r>
+                    <m:sSub>
+                      <m:sSubPr>
+                        <m:ctrlPr>
+                          <a:rPr lang="de-CH" sz="1600" b="0" i="1" smtClean="0">
+                            <a:latin typeface="Cambria Math" panose="02040503050406030204" pitchFamily="18" charset="0"/>
+                          </a:rPr>
+                        </m:ctrlPr>
+                      </m:sSubPr>
+                      <m:e>
+                        <m:r>
+                          <a:rPr lang="de-CH" sz="1600" b="0" i="1" smtClean="0">
+                            <a:latin typeface="Cambria Math" panose="02040503050406030204" pitchFamily="18" charset="0"/>
+                          </a:rPr>
+                          <m:t>𝑋</m:t>
+                        </m:r>
+                      </m:e>
+                      <m:sub>
+                        <m:r>
+                          <a:rPr lang="de-CH" sz="1600" b="0" i="1" smtClean="0">
+                            <a:latin typeface="Cambria Math" panose="02040503050406030204" pitchFamily="18" charset="0"/>
+                          </a:rPr>
+                          <m:t>1</m:t>
+                        </m:r>
+                      </m:sub>
+                    </m:sSub>
+                    <m:r>
+                      <a:rPr lang="de-CH" sz="1600" b="0" i="1" smtClean="0">
+                        <a:latin typeface="Cambria Math" panose="02040503050406030204" pitchFamily="18" charset="0"/>
+                      </a:rPr>
+                      <m:t>,…, </m:t>
+                    </m:r>
+                    <m:sSub>
+                      <m:sSubPr>
+                        <m:ctrlPr>
+                          <a:rPr lang="de-CH" sz="1600" b="0" i="1" smtClean="0">
+                            <a:latin typeface="Cambria Math" panose="02040503050406030204" pitchFamily="18" charset="0"/>
+                          </a:rPr>
+                        </m:ctrlPr>
+                      </m:sSubPr>
+                      <m:e>
+                        <m:r>
+                          <a:rPr lang="de-CH" sz="1600" b="0" i="1" smtClean="0">
+                            <a:latin typeface="Cambria Math" panose="02040503050406030204" pitchFamily="18" charset="0"/>
+                          </a:rPr>
+                          <m:t>𝑋</m:t>
+                        </m:r>
+                      </m:e>
+                      <m:sub>
+                        <m:r>
+                          <a:rPr lang="de-CH" sz="1600" b="0" i="1" smtClean="0">
+                            <a:latin typeface="Cambria Math" panose="02040503050406030204" pitchFamily="18" charset="0"/>
+                          </a:rPr>
+                          <m:t>𝑝</m:t>
+                        </m:r>
+                      </m:sub>
+                    </m:sSub>
+                    <m:r>
+                      <a:rPr lang="de-CH" sz="1600" b="0" i="1" smtClean="0">
+                        <a:latin typeface="Cambria Math" panose="02040503050406030204" pitchFamily="18" charset="0"/>
+                      </a:rPr>
+                      <m:t>)</m:t>
+                    </m:r>
+                  </m:oMath>
+                </a14:m>
+                <a:r>
+                  <a:rPr lang="de-CH" sz="1600" dirty="0"/>
+                  <a:t> </a:t>
+                </a:r>
+              </a:p>
+              <a:p>
+                <a:pPr lvl="1">
+                  <a:buSzPct val="100000"/>
+                </a:pPr>
+                <a:r>
+                  <a:rPr lang="de-CH" sz="1400" dirty="0"/>
+                  <a:t>Check </a:t>
+                </a:r>
+                <a:r>
+                  <a:rPr lang="de-CH" sz="1400" dirty="0" err="1"/>
+                  <a:t>its</a:t>
+                </a:r>
+                <a:r>
+                  <a:rPr lang="de-CH" sz="1400" dirty="0"/>
+                  <a:t> </a:t>
+                </a:r>
+                <a:r>
+                  <a:rPr lang="de-CH" sz="1400" dirty="0" err="1"/>
+                  <a:t>performance</a:t>
+                </a:r>
+                <a:r>
+                  <a:rPr lang="de-CH" sz="1400" dirty="0"/>
+                  <a:t>.</a:t>
+                </a:r>
+              </a:p>
+              <a:p>
+                <a:pPr lvl="1">
+                  <a:buSzPct val="100000"/>
+                </a:pPr>
+                <a:r>
+                  <a:rPr lang="de-CH" sz="1400" dirty="0"/>
+                  <a:t>Study variable </a:t>
+                </a:r>
+                <a:r>
+                  <a:rPr lang="de-CH" sz="1400" dirty="0" err="1"/>
+                  <a:t>importance</a:t>
+                </a:r>
+                <a:r>
+                  <a:rPr lang="de-CH" sz="1400" dirty="0"/>
+                  <a:t> and </a:t>
+                </a:r>
+                <a:r>
+                  <a:rPr lang="de-CH" sz="1400" dirty="0" err="1"/>
+                  <a:t>use</a:t>
+                </a:r>
+                <a:r>
+                  <a:rPr lang="de-CH" sz="1400" dirty="0"/>
+                  <a:t> </a:t>
+                </a:r>
+                <a:r>
+                  <a:rPr lang="de-CH" sz="1400" dirty="0" err="1"/>
+                  <a:t>it</a:t>
+                </a:r>
+                <a:r>
+                  <a:rPr lang="de-CH" sz="1400" dirty="0"/>
+                  <a:t> </a:t>
+                </a:r>
+                <a:r>
+                  <a:rPr lang="de-CH" sz="1400" dirty="0" err="1"/>
+                  <a:t>to</a:t>
+                </a:r>
+                <a:r>
+                  <a:rPr lang="de-CH" sz="1400" dirty="0"/>
+                  <a:t> </a:t>
+                </a:r>
+                <a:r>
+                  <a:rPr lang="de-CH" sz="1400" dirty="0" err="1"/>
+                  <a:t>sort</a:t>
+                </a:r>
+                <a:r>
+                  <a:rPr lang="de-CH" sz="1400" dirty="0"/>
+                  <a:t> </a:t>
+                </a:r>
+                <a:r>
+                  <a:rPr lang="de-CH" sz="1400" dirty="0" err="1"/>
+                  <a:t>the</a:t>
+                </a:r>
+                <a:r>
+                  <a:rPr lang="de-CH" sz="1400" dirty="0"/>
+                  <a:t> </a:t>
+                </a:r>
+                <a:r>
+                  <a:rPr lang="de-CH" sz="1400" dirty="0" err="1"/>
+                  <a:t>results</a:t>
+                </a:r>
+                <a:r>
+                  <a:rPr lang="de-CH" sz="1400" dirty="0"/>
+                  <a:t> </a:t>
+                </a:r>
+                <a:r>
+                  <a:rPr lang="de-CH" sz="1400" dirty="0" err="1"/>
+                  <a:t>of</a:t>
+                </a:r>
+                <a:r>
+                  <a:rPr lang="de-CH" sz="1400" dirty="0"/>
+                  <a:t> </a:t>
+                </a:r>
+                <a:r>
+                  <a:rPr lang="de-CH" sz="1400" dirty="0" err="1"/>
+                  <a:t>Step</a:t>
+                </a:r>
+                <a:r>
+                  <a:rPr lang="de-CH" sz="1400" dirty="0"/>
+                  <a:t> 2.</a:t>
+                </a:r>
+              </a:p>
+              <a:p>
+                <a:pPr lvl="1">
+                  <a:buSzPct val="100000"/>
+                </a:pPr>
+                <a:r>
+                  <a:rPr lang="de-CH" sz="1400" dirty="0"/>
+                  <a:t>Study partial (</a:t>
+                </a:r>
+                <a:r>
+                  <a:rPr lang="de-CH" sz="1400" dirty="0" err="1"/>
+                  <a:t>or</a:t>
+                </a:r>
+                <a:r>
+                  <a:rPr lang="de-CH" sz="1400" dirty="0"/>
+                  <a:t> SHAP) </a:t>
+                </a:r>
+                <a:r>
+                  <a:rPr lang="de-CH" sz="1400" dirty="0" err="1"/>
+                  <a:t>dependence</a:t>
+                </a:r>
+                <a:r>
+                  <a:rPr lang="de-CH" sz="1400" dirty="0"/>
+                  <a:t> </a:t>
+                </a:r>
+                <a:r>
+                  <a:rPr lang="de-CH" sz="1400" dirty="0" err="1"/>
+                  <a:t>plots</a:t>
+                </a:r>
+                <a:r>
+                  <a:rPr lang="de-CH" sz="1400" dirty="0"/>
+                  <a:t> </a:t>
+                </a:r>
+                <a:r>
+                  <a:rPr lang="de-CH" sz="1400" dirty="0" err="1"/>
+                  <a:t>for</a:t>
+                </a:r>
+                <a:r>
+                  <a:rPr lang="de-CH" sz="1400" dirty="0"/>
+                  <a:t> </a:t>
+                </a:r>
+                <a:r>
+                  <a:rPr lang="de-CH" sz="1400" dirty="0" err="1"/>
+                  <a:t>each</a:t>
+                </a:r>
+                <a:r>
+                  <a:rPr lang="de-CH" sz="1400" dirty="0"/>
+                  <a:t> </a:t>
+                </a:r>
+                <a14:m>
+                  <m:oMath xmlns:m="http://schemas.openxmlformats.org/officeDocument/2006/math">
+                    <m:sSub>
+                      <m:sSubPr>
+                        <m:ctrlPr>
+                          <a:rPr lang="de-CH" sz="1400" b="0" i="1" smtClean="0">
+                            <a:latin typeface="Cambria Math" panose="02040503050406030204" pitchFamily="18" charset="0"/>
+                          </a:rPr>
+                        </m:ctrlPr>
+                      </m:sSubPr>
+                      <m:e>
+                        <m:r>
+                          <a:rPr lang="de-CH" sz="1400" b="0" i="1" smtClean="0">
+                            <a:latin typeface="Cambria Math" panose="02040503050406030204" pitchFamily="18" charset="0"/>
+                          </a:rPr>
+                          <m:t>𝑋</m:t>
+                        </m:r>
+                      </m:e>
+                      <m:sub>
+                        <m:r>
+                          <a:rPr lang="de-CH" sz="1400" b="0" i="1" smtClean="0">
+                            <a:latin typeface="Cambria Math" panose="02040503050406030204" pitchFamily="18" charset="0"/>
+                          </a:rPr>
+                          <m:t>𝑗</m:t>
+                        </m:r>
+                      </m:sub>
+                    </m:sSub>
+                  </m:oMath>
+                </a14:m>
+                <a:r>
+                  <a:rPr lang="de-CH" sz="1400" dirty="0"/>
+                  <a:t> and </a:t>
+                </a:r>
+                <a:r>
+                  <a:rPr lang="de-CH" sz="1400" dirty="0" err="1"/>
+                  <a:t>compare</a:t>
+                </a:r>
+                <a:r>
+                  <a:rPr lang="de-CH" sz="1400" dirty="0"/>
+                  <a:t> </a:t>
+                </a:r>
+                <a:r>
+                  <a:rPr lang="de-CH" sz="1400" dirty="0" err="1"/>
+                  <a:t>them</a:t>
+                </a:r>
+                <a:r>
+                  <a:rPr lang="de-CH" sz="1400" dirty="0"/>
+                  <a:t> </a:t>
+                </a:r>
+                <a:r>
+                  <a:rPr lang="de-CH" sz="1400" dirty="0" err="1"/>
+                  <a:t>with</a:t>
+                </a:r>
+                <a:r>
+                  <a:rPr lang="de-CH" sz="1400" dirty="0"/>
+                  <a:t> </a:t>
+                </a:r>
+                <a:r>
+                  <a:rPr lang="de-CH" sz="1400" dirty="0" err="1"/>
+                  <a:t>the</a:t>
+                </a:r>
+                <a:r>
+                  <a:rPr lang="de-CH" sz="1400" dirty="0"/>
+                  <a:t> </a:t>
+                </a:r>
+                <a:r>
+                  <a:rPr lang="de-CH" sz="1400" dirty="0" err="1"/>
+                  <a:t>associations</a:t>
+                </a:r>
+                <a:r>
+                  <a:rPr lang="de-CH" sz="1400" dirty="0"/>
+                  <a:t> </a:t>
+                </a:r>
+                <a:r>
+                  <a:rPr lang="de-CH" sz="1400" dirty="0" err="1"/>
+                  <a:t>from</a:t>
+                </a:r>
+                <a:r>
+                  <a:rPr lang="de-CH" sz="1400" dirty="0"/>
+                  <a:t> </a:t>
+                </a:r>
+                <a:r>
+                  <a:rPr lang="de-CH" sz="1400" dirty="0" err="1"/>
+                  <a:t>Step</a:t>
+                </a:r>
+                <a:r>
+                  <a:rPr lang="de-CH" sz="1400" dirty="0"/>
+                  <a:t> 2.</a:t>
+                </a:r>
+              </a:p>
+              <a:p>
+                <a:pPr marL="101600" indent="0">
+                  <a:buNone/>
+                </a:pPr>
+                <a:r>
+                  <a:rPr lang="de-CH" dirty="0" err="1"/>
+                  <a:t>What</a:t>
+                </a:r>
+                <a:r>
+                  <a:rPr lang="de-CH" dirty="0"/>
+                  <a:t> </a:t>
+                </a:r>
+                <a:r>
+                  <a:rPr lang="de-CH" dirty="0" err="1"/>
+                  <a:t>did</a:t>
+                </a:r>
+                <a:r>
+                  <a:rPr lang="de-CH" dirty="0"/>
+                  <a:t> </a:t>
+                </a:r>
+                <a:r>
+                  <a:rPr lang="de-CH" dirty="0" err="1"/>
+                  <a:t>you</a:t>
+                </a:r>
+                <a:r>
+                  <a:rPr lang="de-CH" dirty="0"/>
+                  <a:t> </a:t>
+                </a:r>
+                <a:r>
+                  <a:rPr lang="de-CH" dirty="0" err="1"/>
+                  <a:t>learn</a:t>
+                </a:r>
+                <a:r>
+                  <a:rPr lang="de-CH" dirty="0"/>
+                  <a:t> </a:t>
+                </a:r>
+                <a:r>
+                  <a:rPr lang="de-CH" dirty="0" err="1"/>
+                  <a:t>from</a:t>
+                </a:r>
+                <a:r>
+                  <a:rPr lang="de-CH" dirty="0"/>
+                  <a:t> </a:t>
+                </a:r>
+                <a:r>
+                  <a:rPr lang="de-CH" dirty="0" err="1"/>
+                  <a:t>Step</a:t>
+                </a:r>
+                <a:r>
+                  <a:rPr lang="de-CH"/>
+                  <a:t> 3?</a:t>
+                </a:r>
+                <a:endParaRPr lang="de-CH" dirty="0"/>
+              </a:p>
+            </p:txBody>
+          </p:sp>
+        </mc:Choice>
+        <mc:Fallback>
+          <p:sp>
+            <p:nvSpPr>
+              <p:cNvPr id="203" name="Google Shape;203;p17"/>
+              <p:cNvSpPr txBox="1">
+                <a:spLocks noGrp="1" noRot="1" noChangeAspect="1" noMove="1" noResize="1" noEditPoints="1" noAdjustHandles="1" noChangeArrowheads="1" noChangeShapeType="1" noTextEdit="1"/>
+              </p:cNvSpPr>
+              <p:nvPr>
+                <p:ph type="body" idx="1"/>
+              </p:nvPr>
+            </p:nvSpPr>
+            <p:spPr>
+              <a:xfrm>
+                <a:off x="1031425" y="1777125"/>
+                <a:ext cx="6126826" cy="2861620"/>
+              </a:xfrm>
+              <a:prstGeom prst="rect">
+                <a:avLst/>
+              </a:prstGeom>
+              <a:blipFill>
+                <a:blip r:embed="rId3"/>
+                <a:stretch>
+                  <a:fillRect r="-199" b="-5757"/>
+                </a:stretch>
+              </a:blipFill>
+            </p:spPr>
+            <p:txBody>
+              <a:bodyPr/>
+              <a:lstStyle/>
+              <a:p>
+                <a:r>
+                  <a:rPr lang="de-CH">
+                    <a:noFill/>
+                  </a:rPr>
+                  <a:t> </a:t>
+                </a:r>
+              </a:p>
+            </p:txBody>
+          </p:sp>
+        </mc:Fallback>
+      </mc:AlternateContent>
+      <p:sp>
+        <p:nvSpPr>
+          <p:cNvPr id="204" name="Google Shape;204;p17"/>
+          <p:cNvSpPr txBox="1">
+            <a:spLocks noGrp="1"/>
+          </p:cNvSpPr>
+          <p:nvPr>
+            <p:ph type="sldNum" idx="12"/>
+          </p:nvPr>
+        </p:nvSpPr>
+        <p:spPr>
+          <a:xfrm>
+            <a:off x="8556784" y="1"/>
+            <a:ext cx="548700" cy="393600"/>
+          </a:xfrm>
+          <a:prstGeom prst="rect">
+            <a:avLst/>
+          </a:prstGeom>
+        </p:spPr>
+        <p:txBody>
+          <a:bodyPr spcFirstLastPara="1" wrap="square" lIns="91425" tIns="91425" rIns="91425" bIns="91425" anchor="t" anchorCtr="0">
+            <a:noAutofit/>
+          </a:bodyPr>
+          <a:lstStyle/>
+          <a:p>
+            <a:fld id="{00000000-1234-1234-1234-123412341234}" type="slidenum">
+              <a:rPr lang="en"/>
+              <a:pPr/>
+              <a:t>66</a:t>
+            </a:fld>
+            <a:endParaRPr/>
+          </a:p>
+        </p:txBody>
+      </p:sp>
+    </p:spTree>
+    <p:extLst>
+      <p:ext uri="{BB962C8B-B14F-4D97-AF65-F5344CB8AC3E}">
+        <p14:creationId xmlns:p14="http://schemas.microsoft.com/office/powerpoint/2010/main" val="4206837477"/>
+      </p:ext>
+    </p:extLst>
+  </p:cSld>
+  <p:clrMapOvr>
+    <a:masterClrMapping/>
+  </p:clrMapOvr>
+</p:sld>
+</file>
+
 <file path=ppt/slides/slide7.xml><?xml version="1.0" encoding="utf-8"?>
 <p:sld xmlns:a="http://schemas.openxmlformats.org/drawingml/2006/main" xmlns:r="http://schemas.openxmlformats.org/officeDocument/2006/relationships" xmlns:p="http://schemas.openxmlformats.org/presentationml/2006/main">
   <p:cSld>

</xml_diff>